<commit_message>
Added content to my slides. Also added a slide for Image Database statistics and updated the Overview slide to reflect this.
</commit_message>
<xml_diff>
--- a/documents/830_Presentation_Fasburg_Thomas_Reiff.pptx
+++ b/documents/830_Presentation_Fasburg_Thomas_Reiff.pptx
@@ -5,23 +5,26 @@
     <p:sldMasterId id="2147483761" r:id="rId1"/>
   </p:sldMasterIdLst>
   <p:notesMasterIdLst>
-    <p:notesMasterId r:id="rId13"/>
+    <p:notesMasterId r:id="rId16"/>
   </p:notesMasterIdLst>
   <p:handoutMasterIdLst>
-    <p:handoutMasterId r:id="rId14"/>
+    <p:handoutMasterId r:id="rId17"/>
   </p:handoutMasterIdLst>
   <p:sldIdLst>
     <p:sldId id="256" r:id="rId2"/>
-    <p:sldId id="291" r:id="rId3"/>
+    <p:sldId id="298" r:id="rId3"/>
     <p:sldId id="290" r:id="rId4"/>
     <p:sldId id="293" r:id="rId5"/>
     <p:sldId id="297" r:id="rId6"/>
-    <p:sldId id="294" r:id="rId7"/>
-    <p:sldId id="295" r:id="rId8"/>
-    <p:sldId id="296" r:id="rId9"/>
-    <p:sldId id="280" r:id="rId10"/>
-    <p:sldId id="281" r:id="rId11"/>
-    <p:sldId id="292" r:id="rId12"/>
+    <p:sldId id="299" r:id="rId7"/>
+    <p:sldId id="300" r:id="rId8"/>
+    <p:sldId id="295" r:id="rId9"/>
+    <p:sldId id="296" r:id="rId10"/>
+    <p:sldId id="305" r:id="rId11"/>
+    <p:sldId id="280" r:id="rId12"/>
+    <p:sldId id="303" r:id="rId13"/>
+    <p:sldId id="304" r:id="rId14"/>
+    <p:sldId id="292" r:id="rId15"/>
   </p:sldIdLst>
   <p:sldSz cx="9144000" cy="6858000" type="screen4x3"/>
   <p:notesSz cx="9144000" cy="6858000"/>
@@ -122,7 +125,7 @@
   </p:defaultTextStyle>
   <p:extLst>
     <p:ext uri="{EFAFB233-063F-42B5-8137-9DF3F51BA10A}">
-      <p15:sldGuideLst xmlns:p15="http://schemas.microsoft.com/office/powerpoint/2012/main" xmlns="">
+      <p15:sldGuideLst xmlns:p15="http://schemas.microsoft.com/office/powerpoint/2012/main">
         <p15:guide id="1" orient="horz" pos="2160">
           <p15:clr>
             <a:srgbClr val="A4A3A4"/>
@@ -2382,6 +2385,13 @@
         </dgm:presLayoutVars>
       </dgm:prSet>
       <dgm:spPr/>
+      <dgm:t>
+        <a:bodyPr/>
+        <a:lstStyle/>
+        <a:p>
+          <a:endParaRPr lang="en-US"/>
+        </a:p>
+      </dgm:t>
     </dgm:pt>
     <dgm:pt modelId="{6009FFD0-D222-4B03-9EA9-C92471BCD9DC}" type="pres">
       <dgm:prSet presAssocID="{F48E332F-3459-4705-B30A-DCA8D851F334}" presName="parentText" presStyleLbl="node1" presStyleIdx="0" presStyleCnt="2">
@@ -2391,6 +2401,13 @@
         </dgm:presLayoutVars>
       </dgm:prSet>
       <dgm:spPr/>
+      <dgm:t>
+        <a:bodyPr/>
+        <a:lstStyle/>
+        <a:p>
+          <a:endParaRPr lang="en-US"/>
+        </a:p>
+      </dgm:t>
     </dgm:pt>
     <dgm:pt modelId="{09BB81D5-4EF3-4B5E-A23A-812D61905779}" type="pres">
       <dgm:prSet presAssocID="{F48E332F-3459-4705-B30A-DCA8D851F334}" presName="childText" presStyleLbl="revTx" presStyleIdx="0" presStyleCnt="2">
@@ -2399,6 +2416,13 @@
         </dgm:presLayoutVars>
       </dgm:prSet>
       <dgm:spPr/>
+      <dgm:t>
+        <a:bodyPr/>
+        <a:lstStyle/>
+        <a:p>
+          <a:endParaRPr lang="en-US"/>
+        </a:p>
+      </dgm:t>
     </dgm:pt>
     <dgm:pt modelId="{ADF7AE22-5AB6-4652-9D04-B2F8740234A9}" type="pres">
       <dgm:prSet presAssocID="{633974BF-3B2D-4789-B7AE-06337E9FB7D9}" presName="parentText" presStyleLbl="node1" presStyleIdx="1" presStyleCnt="2">
@@ -2408,6 +2432,13 @@
         </dgm:presLayoutVars>
       </dgm:prSet>
       <dgm:spPr/>
+      <dgm:t>
+        <a:bodyPr/>
+        <a:lstStyle/>
+        <a:p>
+          <a:endParaRPr lang="en-US"/>
+        </a:p>
+      </dgm:t>
     </dgm:pt>
     <dgm:pt modelId="{23655599-5F59-49D3-B74B-3CFA1652679D}" type="pres">
       <dgm:prSet presAssocID="{633974BF-3B2D-4789-B7AE-06337E9FB7D9}" presName="childText" presStyleLbl="revTx" presStyleIdx="1" presStyleCnt="2">
@@ -2416,26 +2447,33 @@
         </dgm:presLayoutVars>
       </dgm:prSet>
       <dgm:spPr/>
+      <dgm:t>
+        <a:bodyPr/>
+        <a:lstStyle/>
+        <a:p>
+          <a:endParaRPr lang="en-US"/>
+        </a:p>
+      </dgm:t>
     </dgm:pt>
   </dgm:ptLst>
   <dgm:cxnLst>
-    <dgm:cxn modelId="{81538735-24C4-4D1E-8DDF-80969253CA3F}" type="presOf" srcId="{921C9304-D004-4B55-9339-A74C4C375A83}" destId="{23655599-5F59-49D3-B74B-3CFA1652679D}" srcOrd="0" destOrd="0" presId="urn:microsoft.com/office/officeart/2005/8/layout/vList2"/>
-    <dgm:cxn modelId="{58C3B35D-9E14-4554-9D2A-F514CA2CA0CE}" srcId="{F48E332F-3459-4705-B30A-DCA8D851F334}" destId="{6AC8E305-EA1A-4C4B-AEAF-0289D28EC03C}" srcOrd="0" destOrd="0" parTransId="{37C17898-C3FE-42A9-9EBB-0EC7E6993A8D}" sibTransId="{81825B54-1BE6-43C1-BC48-D80D33C66BD9}"/>
-    <dgm:cxn modelId="{7B0758A3-B93C-441D-A501-D94C3C5E7F2C}" srcId="{633974BF-3B2D-4789-B7AE-06337E9FB7D9}" destId="{921C9304-D004-4B55-9339-A74C4C375A83}" srcOrd="0" destOrd="0" parTransId="{DB367345-FD00-4BA4-98AD-5370147A785A}" sibTransId="{12F73EB5-8087-4EEC-BA6E-9EC4C016D178}"/>
-    <dgm:cxn modelId="{7795F79C-0511-4440-933E-DFE551DBAE00}" type="presOf" srcId="{6AC8E305-EA1A-4C4B-AEAF-0289D28EC03C}" destId="{09BB81D5-4EF3-4B5E-A23A-812D61905779}" srcOrd="0" destOrd="0" presId="urn:microsoft.com/office/officeart/2005/8/layout/vList2"/>
-    <dgm:cxn modelId="{45B1F115-1CD0-4AAC-B749-5873E0388D1E}" type="presOf" srcId="{D689AE45-E95D-479B-8D03-827CA800941B}" destId="{23655599-5F59-49D3-B74B-3CFA1652679D}" srcOrd="0" destOrd="1" presId="urn:microsoft.com/office/officeart/2005/8/layout/vList2"/>
-    <dgm:cxn modelId="{6B0BA37A-6E52-4018-AB9B-AD6DD0E8BF7C}" type="presOf" srcId="{E8092218-1880-4FA2-9E72-8182C1B907DB}" destId="{23655599-5F59-49D3-B74B-3CFA1652679D}" srcOrd="0" destOrd="2" presId="urn:microsoft.com/office/officeart/2005/8/layout/vList2"/>
+    <dgm:cxn modelId="{40137773-6053-4389-9303-8894BD2EAF1C}" type="presOf" srcId="{0DCC5701-4214-4D94-A82D-12071A2E3B2E}" destId="{23655599-5F59-49D3-B74B-3CFA1652679D}" srcOrd="0" destOrd="3" presId="urn:microsoft.com/office/officeart/2005/8/layout/vList2"/>
+    <dgm:cxn modelId="{3E441C9A-9985-44DB-94D6-A1BE2FDB1E9C}" srcId="{89AD39A8-033A-42C3-8E9C-A240A7F480B6}" destId="{F48E332F-3459-4705-B30A-DCA8D851F334}" srcOrd="0" destOrd="0" parTransId="{3C979CFD-11EB-41F9-A009-362E8D85DC23}" sibTransId="{64084D07-3E4B-4685-9828-4108A11DC468}"/>
     <dgm:cxn modelId="{9054E373-FAEA-4A13-8742-B78C0A25B758}" srcId="{0DCC5701-4214-4D94-A82D-12071A2E3B2E}" destId="{FBB4F203-21B3-4A87-A5E7-AC62876F7206}" srcOrd="0" destOrd="0" parTransId="{0BC08C12-291C-4A0B-981B-1969F7DDF715}" sibTransId="{0A702FD3-653D-47B8-94A7-A4C963ABC796}"/>
     <dgm:cxn modelId="{20380F70-69B6-4903-8BD3-283A093BDCBE}" srcId="{921C9304-D004-4B55-9339-A74C4C375A83}" destId="{E8092218-1880-4FA2-9E72-8182C1B907DB}" srcOrd="1" destOrd="0" parTransId="{9B2AF06A-C9BD-4617-9AA7-E8D9E2163974}" sibTransId="{B3BE207C-E843-435D-A18E-8AC29B1988FA}"/>
+    <dgm:cxn modelId="{F406F9F3-DF8A-4444-A361-89B08D7B0874}" type="presOf" srcId="{633974BF-3B2D-4789-B7AE-06337E9FB7D9}" destId="{ADF7AE22-5AB6-4652-9D04-B2F8740234A9}" srcOrd="0" destOrd="0" presId="urn:microsoft.com/office/officeart/2005/8/layout/vList2"/>
+    <dgm:cxn modelId="{F6EDB919-2F41-4ED5-A332-E4791C3F3A8F}" type="presOf" srcId="{89AD39A8-033A-42C3-8E9C-A240A7F480B6}" destId="{089AA8DD-57E6-4550-957F-84930441691D}" srcOrd="0" destOrd="0" presId="urn:microsoft.com/office/officeart/2005/8/layout/vList2"/>
     <dgm:cxn modelId="{03688B73-7989-4645-AC3B-182519CE0065}" srcId="{633974BF-3B2D-4789-B7AE-06337E9FB7D9}" destId="{0DCC5701-4214-4D94-A82D-12071A2E3B2E}" srcOrd="1" destOrd="0" parTransId="{B18DEC48-FBEF-4DA3-96F1-0DDA6CBD8DDE}" sibTransId="{DA11D180-F121-4F02-9117-67357BF609EB}"/>
+    <dgm:cxn modelId="{52FFC685-00EB-4B0E-B32B-3607423E28ED}" type="presOf" srcId="{FBB4F203-21B3-4A87-A5E7-AC62876F7206}" destId="{23655599-5F59-49D3-B74B-3CFA1652679D}" srcOrd="0" destOrd="4" presId="urn:microsoft.com/office/officeart/2005/8/layout/vList2"/>
+    <dgm:cxn modelId="{6B0BA37A-6E52-4018-AB9B-AD6DD0E8BF7C}" type="presOf" srcId="{E8092218-1880-4FA2-9E72-8182C1B907DB}" destId="{23655599-5F59-49D3-B74B-3CFA1652679D}" srcOrd="0" destOrd="2" presId="urn:microsoft.com/office/officeart/2005/8/layout/vList2"/>
+    <dgm:cxn modelId="{7C3A9F6A-98DF-47F0-BC62-B50AA1F69EAF}" srcId="{921C9304-D004-4B55-9339-A74C4C375A83}" destId="{D689AE45-E95D-479B-8D03-827CA800941B}" srcOrd="0" destOrd="0" parTransId="{A247B7AF-19BC-43AF-B765-9696ED440556}" sibTransId="{1981BD0F-B2E9-46A1-9EB1-2A710AD9CF85}"/>
+    <dgm:cxn modelId="{7F6092A7-4BA4-4D5C-88C3-07E7286C88C2}" srcId="{89AD39A8-033A-42C3-8E9C-A240A7F480B6}" destId="{633974BF-3B2D-4789-B7AE-06337E9FB7D9}" srcOrd="1" destOrd="0" parTransId="{3E7F34C2-4E3A-495E-B60F-2B419B414F50}" sibTransId="{CDE4D286-0332-455A-B204-23327CE0C98C}"/>
+    <dgm:cxn modelId="{7B0758A3-B93C-441D-A501-D94C3C5E7F2C}" srcId="{633974BF-3B2D-4789-B7AE-06337E9FB7D9}" destId="{921C9304-D004-4B55-9339-A74C4C375A83}" srcOrd="0" destOrd="0" parTransId="{DB367345-FD00-4BA4-98AD-5370147A785A}" sibTransId="{12F73EB5-8087-4EEC-BA6E-9EC4C016D178}"/>
+    <dgm:cxn modelId="{58C3B35D-9E14-4554-9D2A-F514CA2CA0CE}" srcId="{F48E332F-3459-4705-B30A-DCA8D851F334}" destId="{6AC8E305-EA1A-4C4B-AEAF-0289D28EC03C}" srcOrd="0" destOrd="0" parTransId="{37C17898-C3FE-42A9-9EBB-0EC7E6993A8D}" sibTransId="{81825B54-1BE6-43C1-BC48-D80D33C66BD9}"/>
+    <dgm:cxn modelId="{81538735-24C4-4D1E-8DDF-80969253CA3F}" type="presOf" srcId="{921C9304-D004-4B55-9339-A74C4C375A83}" destId="{23655599-5F59-49D3-B74B-3CFA1652679D}" srcOrd="0" destOrd="0" presId="urn:microsoft.com/office/officeart/2005/8/layout/vList2"/>
+    <dgm:cxn modelId="{7795F79C-0511-4440-933E-DFE551DBAE00}" type="presOf" srcId="{6AC8E305-EA1A-4C4B-AEAF-0289D28EC03C}" destId="{09BB81D5-4EF3-4B5E-A23A-812D61905779}" srcOrd="0" destOrd="0" presId="urn:microsoft.com/office/officeart/2005/8/layout/vList2"/>
     <dgm:cxn modelId="{0A6E8141-AC9D-4FEF-A53E-B1A5283D5A5B}" type="presOf" srcId="{F48E332F-3459-4705-B30A-DCA8D851F334}" destId="{6009FFD0-D222-4B03-9EA9-C92471BCD9DC}" srcOrd="0" destOrd="0" presId="urn:microsoft.com/office/officeart/2005/8/layout/vList2"/>
-    <dgm:cxn modelId="{7C3A9F6A-98DF-47F0-BC62-B50AA1F69EAF}" srcId="{921C9304-D004-4B55-9339-A74C4C375A83}" destId="{D689AE45-E95D-479B-8D03-827CA800941B}" srcOrd="0" destOrd="0" parTransId="{A247B7AF-19BC-43AF-B765-9696ED440556}" sibTransId="{1981BD0F-B2E9-46A1-9EB1-2A710AD9CF85}"/>
-    <dgm:cxn modelId="{52FFC685-00EB-4B0E-B32B-3607423E28ED}" type="presOf" srcId="{FBB4F203-21B3-4A87-A5E7-AC62876F7206}" destId="{23655599-5F59-49D3-B74B-3CFA1652679D}" srcOrd="0" destOrd="4" presId="urn:microsoft.com/office/officeart/2005/8/layout/vList2"/>
-    <dgm:cxn modelId="{3E441C9A-9985-44DB-94D6-A1BE2FDB1E9C}" srcId="{89AD39A8-033A-42C3-8E9C-A240A7F480B6}" destId="{F48E332F-3459-4705-B30A-DCA8D851F334}" srcOrd="0" destOrd="0" parTransId="{3C979CFD-11EB-41F9-A009-362E8D85DC23}" sibTransId="{64084D07-3E4B-4685-9828-4108A11DC468}"/>
-    <dgm:cxn modelId="{F406F9F3-DF8A-4444-A361-89B08D7B0874}" type="presOf" srcId="{633974BF-3B2D-4789-B7AE-06337E9FB7D9}" destId="{ADF7AE22-5AB6-4652-9D04-B2F8740234A9}" srcOrd="0" destOrd="0" presId="urn:microsoft.com/office/officeart/2005/8/layout/vList2"/>
-    <dgm:cxn modelId="{7F6092A7-4BA4-4D5C-88C3-07E7286C88C2}" srcId="{89AD39A8-033A-42C3-8E9C-A240A7F480B6}" destId="{633974BF-3B2D-4789-B7AE-06337E9FB7D9}" srcOrd="1" destOrd="0" parTransId="{3E7F34C2-4E3A-495E-B60F-2B419B414F50}" sibTransId="{CDE4D286-0332-455A-B204-23327CE0C98C}"/>
-    <dgm:cxn modelId="{F6EDB919-2F41-4ED5-A332-E4791C3F3A8F}" type="presOf" srcId="{89AD39A8-033A-42C3-8E9C-A240A7F480B6}" destId="{089AA8DD-57E6-4550-957F-84930441691D}" srcOrd="0" destOrd="0" presId="urn:microsoft.com/office/officeart/2005/8/layout/vList2"/>
-    <dgm:cxn modelId="{40137773-6053-4389-9303-8894BD2EAF1C}" type="presOf" srcId="{0DCC5701-4214-4D94-A82D-12071A2E3B2E}" destId="{23655599-5F59-49D3-B74B-3CFA1652679D}" srcOrd="0" destOrd="3" presId="urn:microsoft.com/office/officeart/2005/8/layout/vList2"/>
+    <dgm:cxn modelId="{45B1F115-1CD0-4AAC-B749-5873E0388D1E}" type="presOf" srcId="{D689AE45-E95D-479B-8D03-827CA800941B}" destId="{23655599-5F59-49D3-B74B-3CFA1652679D}" srcOrd="0" destOrd="1" presId="urn:microsoft.com/office/officeart/2005/8/layout/vList2"/>
     <dgm:cxn modelId="{B9ACB2BF-9612-4AE1-8F00-302335F43008}" type="presParOf" srcId="{089AA8DD-57E6-4550-957F-84930441691D}" destId="{6009FFD0-D222-4B03-9EA9-C92471BCD9DC}" srcOrd="0" destOrd="0" presId="urn:microsoft.com/office/officeart/2005/8/layout/vList2"/>
     <dgm:cxn modelId="{C83E07CF-7726-42BC-B5B3-2651C3170887}" type="presParOf" srcId="{089AA8DD-57E6-4550-957F-84930441691D}" destId="{09BB81D5-4EF3-4B5E-A23A-812D61905779}" srcOrd="1" destOrd="0" presId="urn:microsoft.com/office/officeart/2005/8/layout/vList2"/>
     <dgm:cxn modelId="{9EC744F7-327B-4592-B4E7-4BD205761B8E}" type="presParOf" srcId="{089AA8DD-57E6-4550-957F-84930441691D}" destId="{ADF7AE22-5AB6-4652-9D04-B2F8740234A9}" srcOrd="2" destOrd="0" presId="urn:microsoft.com/office/officeart/2005/8/layout/vList2"/>
@@ -7465,6 +7503,200 @@
 </p:notes>
 </file>
 
+<file path=ppt/notesSlides/notesSlide10.xml><?xml version="1.0" encoding="utf-8"?>
+<p:notes xmlns:a="http://schemas.openxmlformats.org/drawingml/2006/main" xmlns:r="http://schemas.openxmlformats.org/officeDocument/2006/relationships" xmlns:p="http://schemas.openxmlformats.org/presentationml/2006/main">
+  <p:cSld>
+    <p:spTree>
+      <p:nvGrpSpPr>
+        <p:cNvPr id="1" name=""/>
+        <p:cNvGrpSpPr/>
+        <p:nvPr/>
+      </p:nvGrpSpPr>
+      <p:grpSpPr>
+        <a:xfrm>
+          <a:off x="0" y="0"/>
+          <a:ext cx="0" cy="0"/>
+          <a:chOff x="0" y="0"/>
+          <a:chExt cx="0" cy="0"/>
+        </a:xfrm>
+      </p:grpSpPr>
+      <p:sp>
+        <p:nvSpPr>
+          <p:cNvPr id="2" name="Slide Image Placeholder 1"/>
+          <p:cNvSpPr>
+            <a:spLocks noGrp="1" noRot="1" noChangeAspect="1"/>
+          </p:cNvSpPr>
+          <p:nvPr>
+            <p:ph type="sldImg"/>
+          </p:nvPr>
+        </p:nvSpPr>
+        <p:spPr/>
+      </p:sp>
+      <p:sp>
+        <p:nvSpPr>
+          <p:cNvPr id="3" name="Notes Placeholder 2"/>
+          <p:cNvSpPr>
+            <a:spLocks noGrp="1"/>
+          </p:cNvSpPr>
+          <p:nvPr>
+            <p:ph type="body" idx="1"/>
+          </p:nvPr>
+        </p:nvSpPr>
+        <p:spPr/>
+        <p:txBody>
+          <a:bodyPr/>
+          <a:lstStyle/>
+          <a:p>
+            <a:endParaRPr lang="en-US" dirty="0"/>
+          </a:p>
+        </p:txBody>
+      </p:sp>
+      <p:sp>
+        <p:nvSpPr>
+          <p:cNvPr id="4" name="Slide Number Placeholder 3"/>
+          <p:cNvSpPr>
+            <a:spLocks noGrp="1"/>
+          </p:cNvSpPr>
+          <p:nvPr>
+            <p:ph type="sldNum" sz="quarter" idx="10"/>
+          </p:nvPr>
+        </p:nvSpPr>
+        <p:spPr/>
+        <p:txBody>
+          <a:bodyPr/>
+          <a:lstStyle/>
+          <a:p>
+            <a:fld id="{B8B3BC3C-0900-4ACD-9030-5BE6C2442A68}" type="slidenum">
+              <a:rPr lang="en-US" smtClean="0"/>
+              <a:t>11</a:t>
+            </a:fld>
+            <a:endParaRPr lang="en-US" dirty="0"/>
+          </a:p>
+        </p:txBody>
+      </p:sp>
+    </p:spTree>
+    <p:extLst>
+      <p:ext uri="{BB962C8B-B14F-4D97-AF65-F5344CB8AC3E}">
+        <p14:creationId xmlns:p14="http://schemas.microsoft.com/office/powerpoint/2010/main" val="1971904817"/>
+      </p:ext>
+    </p:extLst>
+  </p:cSld>
+  <p:clrMapOvr>
+    <a:masterClrMapping/>
+  </p:clrMapOvr>
+</p:notes>
+</file>
+
+<file path=ppt/notesSlides/notesSlide11.xml><?xml version="1.0" encoding="utf-8"?>
+<p:notes xmlns:a="http://schemas.openxmlformats.org/drawingml/2006/main" xmlns:r="http://schemas.openxmlformats.org/officeDocument/2006/relationships" xmlns:p="http://schemas.openxmlformats.org/presentationml/2006/main">
+  <p:cSld>
+    <p:spTree>
+      <p:nvGrpSpPr>
+        <p:cNvPr id="1" name=""/>
+        <p:cNvGrpSpPr/>
+        <p:nvPr/>
+      </p:nvGrpSpPr>
+      <p:grpSpPr>
+        <a:xfrm>
+          <a:off x="0" y="0"/>
+          <a:ext cx="0" cy="0"/>
+          <a:chOff x="0" y="0"/>
+          <a:chExt cx="0" cy="0"/>
+        </a:xfrm>
+      </p:grpSpPr>
+      <p:sp>
+        <p:nvSpPr>
+          <p:cNvPr id="2" name="Slide Image Placeholder 1"/>
+          <p:cNvSpPr>
+            <a:spLocks noGrp="1" noRot="1" noChangeAspect="1"/>
+          </p:cNvSpPr>
+          <p:nvPr>
+            <p:ph type="sldImg"/>
+          </p:nvPr>
+        </p:nvSpPr>
+        <p:spPr/>
+      </p:sp>
+      <p:sp>
+        <p:nvSpPr>
+          <p:cNvPr id="3" name="Notes Placeholder 2"/>
+          <p:cNvSpPr>
+            <a:spLocks noGrp="1"/>
+          </p:cNvSpPr>
+          <p:nvPr>
+            <p:ph type="body" idx="1"/>
+          </p:nvPr>
+        </p:nvSpPr>
+        <p:spPr/>
+        <p:txBody>
+          <a:bodyPr/>
+          <a:lstStyle/>
+          <a:p>
+            <a:pPr marL="171450" indent="-171450">
+              <a:buFont typeface="Arial" panose="020B0604020202020204" pitchFamily="34" charset="0"/>
+              <a:buChar char="•"/>
+            </a:pPr>
+            <a:r>
+              <a:rPr lang="en-US" baseline="0" dirty="0" smtClean="0"/>
+              <a:t>B</a:t>
+            </a:r>
+            <a:r>
+              <a:rPr lang="en-US" dirty="0" smtClean="0"/>
+              <a:t>ullet #1:</a:t>
+            </a:r>
+            <a:r>
+              <a:rPr lang="en-US" baseline="0" dirty="0" smtClean="0"/>
+              <a:t> referencing interactions between various parts of the system is meant to refer to the fact that we found that a feature may do a good job classifying the images, but when combined with the other features may actually be detrimental to the performance of the system</a:t>
+            </a:r>
+          </a:p>
+          <a:p>
+            <a:pPr marL="171450" indent="-171450">
+              <a:buFont typeface="Arial" panose="020B0604020202020204" pitchFamily="34" charset="0"/>
+              <a:buChar char="•"/>
+            </a:pPr>
+            <a:r>
+              <a:rPr lang="en-US" baseline="0" dirty="0" smtClean="0"/>
+              <a:t>Bullet #2: while implementing the feature calculations is important, the system also needs quality images in the database and needs a good structure for the classification system (spent more time than expected on how to combine the results of the features into a system that can actually recognize the food images)</a:t>
+            </a:r>
+            <a:endParaRPr lang="en-US" dirty="0"/>
+          </a:p>
+        </p:txBody>
+      </p:sp>
+      <p:sp>
+        <p:nvSpPr>
+          <p:cNvPr id="4" name="Slide Number Placeholder 3"/>
+          <p:cNvSpPr>
+            <a:spLocks noGrp="1"/>
+          </p:cNvSpPr>
+          <p:nvPr>
+            <p:ph type="sldNum" sz="quarter" idx="10"/>
+          </p:nvPr>
+        </p:nvSpPr>
+        <p:spPr/>
+        <p:txBody>
+          <a:bodyPr/>
+          <a:lstStyle/>
+          <a:p>
+            <a:fld id="{B8B3BC3C-0900-4ACD-9030-5BE6C2442A68}" type="slidenum">
+              <a:rPr lang="en-US" smtClean="0"/>
+              <a:t>13</a:t>
+            </a:fld>
+            <a:endParaRPr lang="en-US" dirty="0"/>
+          </a:p>
+        </p:txBody>
+      </p:sp>
+    </p:spTree>
+    <p:extLst>
+      <p:ext uri="{BB962C8B-B14F-4D97-AF65-F5344CB8AC3E}">
+        <p14:creationId xmlns:p14="http://schemas.microsoft.com/office/powerpoint/2010/main" val="3893849086"/>
+      </p:ext>
+    </p:extLst>
+  </p:cSld>
+  <p:clrMapOvr>
+    <a:masterClrMapping/>
+  </p:clrMapOvr>
+</p:notes>
+</file>
+
 <file path=ppt/notesSlides/notesSlide2.xml><?xml version="1.0" encoding="utf-8"?>
 <p:notes xmlns:a="http://schemas.openxmlformats.org/drawingml/2006/main" xmlns:r="http://schemas.openxmlformats.org/officeDocument/2006/relationships" xmlns:p="http://schemas.openxmlformats.org/presentationml/2006/main">
   <p:cSld>
@@ -7539,7 +7771,7 @@
     </p:spTree>
     <p:extLst>
       <p:ext uri="{BB962C8B-B14F-4D97-AF65-F5344CB8AC3E}">
-        <p14:creationId xmlns:p14="http://schemas.microsoft.com/office/powerpoint/2010/main" val="2616936225"/>
+        <p14:creationId xmlns:p14="http://schemas.microsoft.com/office/powerpoint/2010/main" val="3015185076"/>
       </p:ext>
     </p:extLst>
   </p:cSld>
@@ -7845,6 +8077,46 @@
           <a:bodyPr/>
           <a:lstStyle/>
           <a:p>
+            <a:r>
+              <a:rPr lang="en-US" dirty="0" err="1" smtClean="0"/>
+              <a:t>rangefilt</a:t>
+            </a:r>
+            <a:r>
+              <a:rPr lang="en-US" baseline="0" dirty="0" smtClean="0"/>
+              <a:t> function: each output cell contains the range value (maximum value – minimum value) of the 3x3 neighborhood around the corresponding pixel in the input image</a:t>
+            </a:r>
+          </a:p>
+          <a:p>
+            <a:r>
+              <a:rPr lang="en-US" baseline="0" dirty="0" smtClean="0"/>
+              <a:t>Note: filter applied to a grayscale version of the foregrounded image</a:t>
+            </a:r>
+            <a:endParaRPr lang="en-US" dirty="0" smtClean="0"/>
+          </a:p>
+          <a:p>
+            <a:endParaRPr lang="en-US" dirty="0" smtClean="0"/>
+          </a:p>
+          <a:p>
+            <a:r>
+              <a:rPr lang="en-US" dirty="0" smtClean="0"/>
+              <a:t>Value</a:t>
+            </a:r>
+            <a:r>
+              <a:rPr lang="en-US" baseline="0" dirty="0" smtClean="0"/>
+              <a:t> returned for the broccoli image =  1721079 / 25095 = 68.5825</a:t>
+            </a:r>
+          </a:p>
+          <a:p>
+            <a:r>
+              <a:rPr lang="en-US" baseline="0" dirty="0" smtClean="0"/>
+              <a:t>Value returned for the fries image = 2352384 / 1010810 = 23.2725</a:t>
+            </a:r>
+          </a:p>
+          <a:p>
+            <a:r>
+              <a:rPr lang="en-US" baseline="0" dirty="0" smtClean="0"/>
+              <a:t>Value returned for the strawberry image = 952773 / 12306 = 77.4235</a:t>
+            </a:r>
             <a:endParaRPr lang="en-US" dirty="0"/>
           </a:p>
         </p:txBody>
@@ -7875,7 +8147,7 @@
     </p:spTree>
     <p:extLst>
       <p:ext uri="{BB962C8B-B14F-4D97-AF65-F5344CB8AC3E}">
-        <p14:creationId xmlns:p14="http://schemas.microsoft.com/office/powerpoint/2010/main" val="3762026629"/>
+        <p14:creationId xmlns:p14="http://schemas.microsoft.com/office/powerpoint/2010/main" val="899459773"/>
       </p:ext>
     </p:extLst>
   </p:cSld>
@@ -7929,6 +8201,40 @@
           <a:bodyPr/>
           <a:lstStyle/>
           <a:p>
+            <a:pPr marL="171450" indent="-171450">
+              <a:buFont typeface="Arial" panose="020B0604020202020204" pitchFamily="34" charset="0"/>
+              <a:buChar char="•"/>
+            </a:pPr>
+            <a:r>
+              <a:rPr lang="en-US" baseline="0" dirty="0" smtClean="0"/>
+              <a:t>Filters applied to the image are formed by convolving combinations of level, edge, spot, and ripple detector 1-dimensional vectors</a:t>
+            </a:r>
+          </a:p>
+          <a:p>
+            <a:pPr marL="171450" indent="-171450">
+              <a:buFont typeface="Arial" panose="020B0604020202020204" pitchFamily="34" charset="0"/>
+              <a:buChar char="•"/>
+            </a:pPr>
+            <a:r>
+              <a:rPr lang="en-US" baseline="0" dirty="0" smtClean="0"/>
+              <a:t>Goal of the variation analysis: high interclass variation and low intraclass variation</a:t>
+            </a:r>
+          </a:p>
+          <a:p>
+            <a:pPr marL="171450" indent="-171450">
+              <a:buFont typeface="Arial" panose="020B0604020202020204" pitchFamily="34" charset="0"/>
+              <a:buChar char="•"/>
+            </a:pPr>
+            <a:r>
+              <a:rPr lang="en-US" baseline="0" dirty="0" smtClean="0"/>
+              <a:t>Previously explained method is more efficient and was thus chosen because Laws did not provide any advantage</a:t>
+            </a:r>
+          </a:p>
+          <a:p>
+            <a:pPr marL="171450" indent="-171450">
+              <a:buFont typeface="Arial" panose="020B0604020202020204" pitchFamily="34" charset="0"/>
+              <a:buChar char="•"/>
+            </a:pPr>
             <a:endParaRPr lang="en-US" dirty="0"/>
           </a:p>
         </p:txBody>
@@ -7959,7 +8265,7 @@
     </p:spTree>
     <p:extLst>
       <p:ext uri="{BB962C8B-B14F-4D97-AF65-F5344CB8AC3E}">
-        <p14:creationId xmlns:p14="http://schemas.microsoft.com/office/powerpoint/2010/main" val="3762026629"/>
+        <p14:creationId xmlns:p14="http://schemas.microsoft.com/office/powerpoint/2010/main" val="3857760692"/>
       </p:ext>
     </p:extLst>
   </p:cSld>
@@ -8127,7 +8433,7 @@
     </p:spTree>
     <p:extLst>
       <p:ext uri="{BB962C8B-B14F-4D97-AF65-F5344CB8AC3E}">
-        <p14:creationId xmlns:p14="http://schemas.microsoft.com/office/powerpoint/2010/main" val="1971904817"/>
+        <p14:creationId xmlns:p14="http://schemas.microsoft.com/office/powerpoint/2010/main" val="3762026629"/>
       </p:ext>
     </p:extLst>
   </p:cSld>
@@ -12767,7 +13073,7 @@
           <a:bodyPr/>
           <a:lstStyle/>
           <a:p>
-            <a:endParaRPr lang="en-US" dirty="0"/>
+            <a:endParaRPr lang="en-US"/>
           </a:p>
         </p:txBody>
       </p:sp>
@@ -12787,17 +13093,108 @@
           <a:lstStyle/>
           <a:p>
             <a:r>
-              <a:rPr lang="en-US" dirty="0" smtClean="0"/>
-              <a:t>Conclusions</a:t>
+              <a:rPr lang="en-US" smtClean="0"/>
+              <a:t>Image Database</a:t>
             </a:r>
-            <a:endParaRPr lang="en-US" dirty="0"/>
+            <a:endParaRPr lang="en-US"/>
           </a:p>
         </p:txBody>
       </p:sp>
     </p:spTree>
     <p:extLst>
       <p:ext uri="{BB962C8B-B14F-4D97-AF65-F5344CB8AC3E}">
-        <p14:creationId xmlns:p14="http://schemas.microsoft.com/office/powerpoint/2010/main" val="3583244977"/>
+        <p14:creationId xmlns:p14="http://schemas.microsoft.com/office/powerpoint/2010/main" val="155959207"/>
+      </p:ext>
+    </p:extLst>
+  </p:cSld>
+  <p:clrMapOvr>
+    <a:masterClrMapping/>
+  </p:clrMapOvr>
+</p:sld>
+</file>
+
+<file path=ppt/slides/slide11.xml><?xml version="1.0" encoding="utf-8"?>
+<p:sld xmlns:a="http://schemas.openxmlformats.org/drawingml/2006/main" xmlns:r="http://schemas.openxmlformats.org/officeDocument/2006/relationships" xmlns:p="http://schemas.openxmlformats.org/presentationml/2006/main">
+  <p:cSld>
+    <p:spTree>
+      <p:nvGrpSpPr>
+        <p:cNvPr id="1" name=""/>
+        <p:cNvGrpSpPr/>
+        <p:nvPr/>
+      </p:nvGrpSpPr>
+      <p:grpSpPr>
+        <a:xfrm>
+          <a:off x="0" y="0"/>
+          <a:ext cx="0" cy="0"/>
+          <a:chOff x="0" y="0"/>
+          <a:chExt cx="0" cy="0"/>
+        </a:xfrm>
+      </p:grpSpPr>
+      <p:sp>
+        <p:nvSpPr>
+          <p:cNvPr id="2" name="Content Placeholder 1"/>
+          <p:cNvSpPr>
+            <a:spLocks noGrp="1"/>
+          </p:cNvSpPr>
+          <p:nvPr>
+            <p:ph idx="1"/>
+          </p:nvPr>
+        </p:nvSpPr>
+        <p:spPr>
+          <a:xfrm>
+            <a:off x="457200" y="1481328"/>
+            <a:ext cx="8229600" cy="4843272"/>
+          </a:xfrm>
+        </p:spPr>
+        <p:txBody>
+          <a:bodyPr>
+            <a:normAutofit/>
+          </a:bodyPr>
+          <a:lstStyle/>
+          <a:p>
+            <a:endParaRPr lang="en-US" i="1" dirty="0" smtClean="0"/>
+          </a:p>
+          <a:p>
+            <a:pPr marL="393192" lvl="1" indent="0">
+              <a:buNone/>
+            </a:pPr>
+            <a:endParaRPr lang="en-US" i="1" dirty="0"/>
+          </a:p>
+          <a:p>
+            <a:pPr marL="393192" lvl="1" indent="0">
+              <a:buNone/>
+            </a:pPr>
+            <a:endParaRPr lang="en-US" i="1" dirty="0" smtClean="0"/>
+          </a:p>
+        </p:txBody>
+      </p:sp>
+      <p:sp>
+        <p:nvSpPr>
+          <p:cNvPr id="3" name="Title 2"/>
+          <p:cNvSpPr>
+            <a:spLocks noGrp="1"/>
+          </p:cNvSpPr>
+          <p:nvPr>
+            <p:ph type="title"/>
+          </p:nvPr>
+        </p:nvSpPr>
+        <p:spPr/>
+        <p:txBody>
+          <a:bodyPr/>
+          <a:lstStyle/>
+          <a:p>
+            <a:r>
+              <a:rPr lang="en-US" dirty="0" smtClean="0"/>
+              <a:t>Results</a:t>
+            </a:r>
+            <a:endParaRPr lang="en-US" dirty="0"/>
+          </a:p>
+        </p:txBody>
+      </p:sp>
+    </p:spTree>
+    <p:extLst>
+      <p:ext uri="{BB962C8B-B14F-4D97-AF65-F5344CB8AC3E}">
+        <p14:creationId xmlns:p14="http://schemas.microsoft.com/office/powerpoint/2010/main" val="2077121703"/>
       </p:ext>
     </p:extLst>
   </p:cSld>
@@ -12814,7 +13211,206 @@
 </p:sld>
 </file>
 
-<file path=ppt/slides/slide11.xml><?xml version="1.0" encoding="utf-8"?>
+<file path=ppt/slides/slide12.xml><?xml version="1.0" encoding="utf-8"?>
+<p:sld xmlns:a="http://schemas.openxmlformats.org/drawingml/2006/main" xmlns:r="http://schemas.openxmlformats.org/officeDocument/2006/relationships" xmlns:p="http://schemas.openxmlformats.org/presentationml/2006/main">
+  <p:cSld>
+    <p:spTree>
+      <p:nvGrpSpPr>
+        <p:cNvPr id="1" name=""/>
+        <p:cNvGrpSpPr/>
+        <p:nvPr/>
+      </p:nvGrpSpPr>
+      <p:grpSpPr>
+        <a:xfrm>
+          <a:off x="0" y="0"/>
+          <a:ext cx="0" cy="0"/>
+          <a:chOff x="0" y="0"/>
+          <a:chExt cx="0" cy="0"/>
+        </a:xfrm>
+      </p:grpSpPr>
+      <p:sp>
+        <p:nvSpPr>
+          <p:cNvPr id="2" name="Content Placeholder 1"/>
+          <p:cNvSpPr>
+            <a:spLocks noGrp="1"/>
+          </p:cNvSpPr>
+          <p:nvPr>
+            <p:ph idx="1"/>
+          </p:nvPr>
+        </p:nvSpPr>
+        <p:spPr/>
+        <p:txBody>
+          <a:bodyPr/>
+          <a:lstStyle/>
+          <a:p>
+            <a:r>
+              <a:rPr lang="en-US" dirty="0"/>
+              <a:t>Performance of feature calculations limited by foreground </a:t>
+            </a:r>
+            <a:r>
+              <a:rPr lang="en-US" dirty="0" smtClean="0"/>
+              <a:t>calculations</a:t>
+            </a:r>
+          </a:p>
+          <a:p>
+            <a:endParaRPr lang="en-US" dirty="0"/>
+          </a:p>
+          <a:p>
+            <a:r>
+              <a:rPr lang="en-US" dirty="0" smtClean="0"/>
+              <a:t>Potential to improve the classification system:</a:t>
+            </a:r>
+          </a:p>
+          <a:p>
+            <a:pPr lvl="1"/>
+            <a:r>
+              <a:rPr lang="en-US" dirty="0" smtClean="0"/>
+              <a:t>Decision tree-like structure instead of using means and standard deviations of image classes from training</a:t>
+            </a:r>
+          </a:p>
+          <a:p>
+            <a:pPr lvl="1"/>
+            <a:r>
+              <a:rPr lang="en-US" dirty="0" smtClean="0"/>
+              <a:t>Addition of a reject class</a:t>
+            </a:r>
+            <a:endParaRPr lang="en-US" dirty="0"/>
+          </a:p>
+        </p:txBody>
+      </p:sp>
+      <p:sp>
+        <p:nvSpPr>
+          <p:cNvPr id="3" name="Title 2"/>
+          <p:cNvSpPr>
+            <a:spLocks noGrp="1"/>
+          </p:cNvSpPr>
+          <p:nvPr>
+            <p:ph type="title"/>
+          </p:nvPr>
+        </p:nvSpPr>
+        <p:spPr/>
+        <p:txBody>
+          <a:bodyPr/>
+          <a:lstStyle/>
+          <a:p>
+            <a:r>
+              <a:rPr lang="en-US" dirty="0" smtClean="0"/>
+              <a:t>Limitations and Improvements</a:t>
+            </a:r>
+            <a:endParaRPr lang="en-US" dirty="0"/>
+          </a:p>
+        </p:txBody>
+      </p:sp>
+    </p:spTree>
+    <p:extLst>
+      <p:ext uri="{BB962C8B-B14F-4D97-AF65-F5344CB8AC3E}">
+        <p14:creationId xmlns:p14="http://schemas.microsoft.com/office/powerpoint/2010/main" val="1213478019"/>
+      </p:ext>
+    </p:extLst>
+  </p:cSld>
+  <p:clrMapOvr>
+    <a:masterClrMapping/>
+  </p:clrMapOvr>
+</p:sld>
+</file>
+
+<file path=ppt/slides/slide13.xml><?xml version="1.0" encoding="utf-8"?>
+<p:sld xmlns:a="http://schemas.openxmlformats.org/drawingml/2006/main" xmlns:r="http://schemas.openxmlformats.org/officeDocument/2006/relationships" xmlns:p="http://schemas.openxmlformats.org/presentationml/2006/main">
+  <p:cSld>
+    <p:spTree>
+      <p:nvGrpSpPr>
+        <p:cNvPr id="1" name=""/>
+        <p:cNvGrpSpPr/>
+        <p:nvPr/>
+      </p:nvGrpSpPr>
+      <p:grpSpPr>
+        <a:xfrm>
+          <a:off x="0" y="0"/>
+          <a:ext cx="0" cy="0"/>
+          <a:chOff x="0" y="0"/>
+          <a:chExt cx="0" cy="0"/>
+        </a:xfrm>
+      </p:grpSpPr>
+      <p:sp>
+        <p:nvSpPr>
+          <p:cNvPr id="2" name="Content Placeholder 1"/>
+          <p:cNvSpPr>
+            <a:spLocks noGrp="1"/>
+          </p:cNvSpPr>
+          <p:nvPr>
+            <p:ph idx="1"/>
+          </p:nvPr>
+        </p:nvSpPr>
+        <p:spPr/>
+        <p:txBody>
+          <a:bodyPr/>
+          <a:lstStyle/>
+          <a:p>
+            <a:r>
+              <a:rPr lang="en-US" dirty="0" smtClean="0"/>
+              <a:t>Interactions of various parts of the system need to be tested in addition to testing the parts themselves</a:t>
+            </a:r>
+          </a:p>
+          <a:p>
+            <a:r>
+              <a:rPr lang="en-US" dirty="0" smtClean="0"/>
+              <a:t>Importance of the quality of the training and validation system</a:t>
+            </a:r>
+            <a:endParaRPr lang="en-US" dirty="0" smtClean="0"/>
+          </a:p>
+          <a:p>
+            <a:r>
+              <a:rPr lang="en-US" dirty="0" smtClean="0"/>
+              <a:t>Teaching a computer what we understand from visual input is hard!</a:t>
+            </a:r>
+            <a:endParaRPr lang="en-US" dirty="0"/>
+          </a:p>
+        </p:txBody>
+      </p:sp>
+      <p:sp>
+        <p:nvSpPr>
+          <p:cNvPr id="3" name="Title 2"/>
+          <p:cNvSpPr>
+            <a:spLocks noGrp="1"/>
+          </p:cNvSpPr>
+          <p:nvPr>
+            <p:ph type="title"/>
+          </p:nvPr>
+        </p:nvSpPr>
+        <p:spPr/>
+        <p:txBody>
+          <a:bodyPr/>
+          <a:lstStyle/>
+          <a:p>
+            <a:r>
+              <a:rPr lang="en-US" dirty="0" smtClean="0"/>
+              <a:t>Conclusions</a:t>
+            </a:r>
+            <a:endParaRPr lang="en-US" dirty="0"/>
+          </a:p>
+        </p:txBody>
+      </p:sp>
+    </p:spTree>
+    <p:extLst>
+      <p:ext uri="{BB962C8B-B14F-4D97-AF65-F5344CB8AC3E}">
+        <p14:creationId xmlns:p14="http://schemas.microsoft.com/office/powerpoint/2010/main" val="3877536777"/>
+      </p:ext>
+    </p:extLst>
+  </p:cSld>
+  <p:clrMapOvr>
+    <a:masterClrMapping/>
+  </p:clrMapOvr>
+  <p:timing>
+    <p:tnLst>
+      <p:par>
+        <p:cTn id="1" dur="indefinite" restart="never" nodeType="tmRoot"/>
+      </p:par>
+    </p:tnLst>
+  </p:timing>
+</p:sld>
+</file>
+
+<file path=ppt/slides/slide14.xml><?xml version="1.0" encoding="utf-8"?>
 <p:sld xmlns:a="http://schemas.openxmlformats.org/drawingml/2006/main" xmlns:r="http://schemas.openxmlformats.org/officeDocument/2006/relationships" xmlns:p="http://schemas.openxmlformats.org/presentationml/2006/main">
   <p:cSld>
     <p:spTree>
@@ -13027,12 +13623,27 @@
               <a:rPr lang="en-US" dirty="0" smtClean="0"/>
               <a:t>Classification</a:t>
             </a:r>
+            <a:endParaRPr lang="en-US" dirty="0" smtClean="0"/>
+          </a:p>
+          <a:p>
+            <a:r>
+              <a:rPr lang="en-US" dirty="0" smtClean="0"/>
+              <a:t>Image Database</a:t>
+            </a:r>
+            <a:endParaRPr lang="en-US" dirty="0" smtClean="0"/>
           </a:p>
           <a:p>
             <a:r>
               <a:rPr lang="en-US" dirty="0" smtClean="0"/>
               <a:t>Results</a:t>
             </a:r>
+          </a:p>
+          <a:p>
+            <a:r>
+              <a:rPr lang="en-US" dirty="0" smtClean="0"/>
+              <a:t>Discussion and Conclusions</a:t>
+            </a:r>
+            <a:endParaRPr lang="en-US" dirty="0" smtClean="0"/>
           </a:p>
         </p:txBody>
       </p:sp>
@@ -13062,7 +13673,7 @@
     </p:spTree>
     <p:extLst>
       <p:ext uri="{BB962C8B-B14F-4D97-AF65-F5344CB8AC3E}">
-        <p14:creationId xmlns:p14="http://schemas.microsoft.com/office/powerpoint/2010/main" val="3109426433"/>
+        <p14:creationId xmlns:p14="http://schemas.microsoft.com/office/powerpoint/2010/main" val="4169701850"/>
       </p:ext>
     </p:extLst>
   </p:cSld>
@@ -13106,7 +13717,12 @@
             <p:ph idx="1"/>
           </p:nvPr>
         </p:nvSpPr>
-        <p:spPr/>
+        <p:spPr>
+          <a:xfrm>
+            <a:off x="457200" y="1481329"/>
+            <a:ext cx="8229600" cy="957072"/>
+          </a:xfrm>
+        </p:spPr>
         <p:txBody>
           <a:bodyPr/>
           <a:lstStyle/>
@@ -13114,6 +13730,18 @@
             <a:pPr marL="109728" indent="0" algn="ctr">
               <a:buNone/>
             </a:pPr>
+            <a:r>
+              <a:rPr lang="en-US" b="1" dirty="0" smtClean="0"/>
+              <a:t>Develop </a:t>
+            </a:r>
+            <a:r>
+              <a:rPr lang="en-US" b="1" dirty="0"/>
+              <a:t>a software system to automatically recognize typical meals from </a:t>
+            </a:r>
+            <a:r>
+              <a:rPr lang="en-US" b="1" dirty="0" smtClean="0"/>
+              <a:t>images.</a:t>
+            </a:r>
             <a:endParaRPr lang="en-US" b="1" dirty="0" smtClean="0"/>
           </a:p>
         </p:txBody>
@@ -13138,6 +13766,341 @@
               <a:t>Problem</a:t>
             </a:r>
             <a:endParaRPr lang="en-US" dirty="0"/>
+          </a:p>
+        </p:txBody>
+      </p:sp>
+      <p:sp>
+        <p:nvSpPr>
+          <p:cNvPr id="4" name="Content Placeholder 1"/>
+          <p:cNvSpPr txBox="1">
+            <a:spLocks/>
+          </p:cNvSpPr>
+          <p:nvPr/>
+        </p:nvSpPr>
+        <p:spPr>
+          <a:xfrm>
+            <a:off x="1905000" y="2590800"/>
+            <a:ext cx="6381974" cy="3593908"/>
+          </a:xfrm>
+          <a:prstGeom prst="rect">
+            <a:avLst/>
+          </a:prstGeom>
+        </p:spPr>
+        <p:txBody>
+          <a:bodyPr vert="horz" numCol="2">
+            <a:normAutofit/>
+          </a:bodyPr>
+          <a:lstStyle>
+            <a:lvl1pPr marL="365760" indent="-256032" algn="l" rtl="0" eaLnBrk="1" latinLnBrk="0" hangingPunct="1">
+              <a:spcBef>
+                <a:spcPts val="400"/>
+              </a:spcBef>
+              <a:spcAft>
+                <a:spcPts val="0"/>
+              </a:spcAft>
+              <a:buClr>
+                <a:schemeClr val="accent1"/>
+              </a:buClr>
+              <a:buSzPct val="68000"/>
+              <a:buFont typeface="Wingdings 3"/>
+              <a:buChar char=""/>
+              <a:defRPr kumimoji="0" sz="2700" kern="1200">
+                <a:solidFill>
+                  <a:schemeClr val="tx1"/>
+                </a:solidFill>
+                <a:latin typeface="+mn-lt"/>
+                <a:ea typeface="+mn-ea"/>
+                <a:cs typeface="+mn-cs"/>
+              </a:defRPr>
+            </a:lvl1pPr>
+            <a:lvl2pPr marL="621792" indent="-228600" algn="l" rtl="0" eaLnBrk="1" latinLnBrk="0" hangingPunct="1">
+              <a:spcBef>
+                <a:spcPts val="324"/>
+              </a:spcBef>
+              <a:buClr>
+                <a:schemeClr val="accent1"/>
+              </a:buClr>
+              <a:buFont typeface="Verdana"/>
+              <a:buChar char="◦"/>
+              <a:defRPr kumimoji="0" sz="2300" kern="1200">
+                <a:solidFill>
+                  <a:schemeClr val="tx1"/>
+                </a:solidFill>
+                <a:latin typeface="+mn-lt"/>
+                <a:ea typeface="+mn-ea"/>
+                <a:cs typeface="+mn-cs"/>
+              </a:defRPr>
+            </a:lvl2pPr>
+            <a:lvl3pPr marL="859536" indent="-228600" algn="l" rtl="0" eaLnBrk="1" latinLnBrk="0" hangingPunct="1">
+              <a:spcBef>
+                <a:spcPts val="350"/>
+              </a:spcBef>
+              <a:buClr>
+                <a:schemeClr val="accent2"/>
+              </a:buClr>
+              <a:buSzPct val="100000"/>
+              <a:buFont typeface="Wingdings 2"/>
+              <a:buChar char=""/>
+              <a:defRPr kumimoji="0" sz="2100" kern="1200">
+                <a:solidFill>
+                  <a:schemeClr val="tx1"/>
+                </a:solidFill>
+                <a:latin typeface="+mn-lt"/>
+                <a:ea typeface="+mn-ea"/>
+                <a:cs typeface="+mn-cs"/>
+              </a:defRPr>
+            </a:lvl3pPr>
+            <a:lvl4pPr marL="1143000" indent="-228600" algn="l" rtl="0" eaLnBrk="1" latinLnBrk="0" hangingPunct="1">
+              <a:spcBef>
+                <a:spcPts val="350"/>
+              </a:spcBef>
+              <a:buClr>
+                <a:schemeClr val="accent2"/>
+              </a:buClr>
+              <a:buFont typeface="Wingdings 2"/>
+              <a:buChar char=""/>
+              <a:defRPr kumimoji="0" sz="1900" kern="1200">
+                <a:solidFill>
+                  <a:schemeClr val="tx1"/>
+                </a:solidFill>
+                <a:latin typeface="+mn-lt"/>
+                <a:ea typeface="+mn-ea"/>
+                <a:cs typeface="+mn-cs"/>
+              </a:defRPr>
+            </a:lvl4pPr>
+            <a:lvl5pPr marL="1371600" indent="-228600" algn="l" rtl="0" eaLnBrk="1" latinLnBrk="0" hangingPunct="1">
+              <a:spcBef>
+                <a:spcPts val="350"/>
+              </a:spcBef>
+              <a:buClr>
+                <a:schemeClr val="accent2"/>
+              </a:buClr>
+              <a:buFont typeface="Wingdings 2"/>
+              <a:buChar char=""/>
+              <a:defRPr kumimoji="0" sz="1800" kern="1200">
+                <a:solidFill>
+                  <a:schemeClr val="tx1"/>
+                </a:solidFill>
+                <a:latin typeface="+mn-lt"/>
+                <a:ea typeface="+mn-ea"/>
+                <a:cs typeface="+mn-cs"/>
+              </a:defRPr>
+            </a:lvl5pPr>
+            <a:lvl6pPr marL="1600200" indent="-228600" algn="l" rtl="0" eaLnBrk="1" latinLnBrk="0" hangingPunct="1">
+              <a:spcBef>
+                <a:spcPts val="350"/>
+              </a:spcBef>
+              <a:buClr>
+                <a:schemeClr val="accent3"/>
+              </a:buClr>
+              <a:buFont typeface="Wingdings 2"/>
+              <a:buChar char=""/>
+              <a:defRPr kumimoji="0" sz="1800" kern="1200">
+                <a:solidFill>
+                  <a:schemeClr val="tx1"/>
+                </a:solidFill>
+                <a:latin typeface="+mn-lt"/>
+                <a:ea typeface="+mn-ea"/>
+                <a:cs typeface="+mn-cs"/>
+              </a:defRPr>
+            </a:lvl6pPr>
+            <a:lvl7pPr marL="1828800" indent="-228600" algn="l" rtl="0" eaLnBrk="1" latinLnBrk="0" hangingPunct="1">
+              <a:spcBef>
+                <a:spcPts val="350"/>
+              </a:spcBef>
+              <a:buClr>
+                <a:schemeClr val="accent3"/>
+              </a:buClr>
+              <a:buFont typeface="Wingdings 2"/>
+              <a:buChar char=""/>
+              <a:defRPr kumimoji="0" sz="1600" kern="1200">
+                <a:solidFill>
+                  <a:schemeClr val="tx1"/>
+                </a:solidFill>
+                <a:latin typeface="+mn-lt"/>
+                <a:ea typeface="+mn-ea"/>
+                <a:cs typeface="+mn-cs"/>
+              </a:defRPr>
+            </a:lvl7pPr>
+            <a:lvl8pPr marL="2057400" indent="-228600" algn="l" rtl="0" eaLnBrk="1" latinLnBrk="0" hangingPunct="1">
+              <a:spcBef>
+                <a:spcPts val="350"/>
+              </a:spcBef>
+              <a:buClr>
+                <a:schemeClr val="accent3"/>
+              </a:buClr>
+              <a:buFont typeface="Wingdings 2"/>
+              <a:buChar char=""/>
+              <a:defRPr kumimoji="0" sz="1600" kern="1200">
+                <a:solidFill>
+                  <a:schemeClr val="tx1"/>
+                </a:solidFill>
+                <a:latin typeface="+mn-lt"/>
+                <a:ea typeface="+mn-ea"/>
+                <a:cs typeface="+mn-cs"/>
+              </a:defRPr>
+            </a:lvl8pPr>
+            <a:lvl9pPr marL="2286000" indent="-228600" algn="l" rtl="0" eaLnBrk="1" latinLnBrk="0" hangingPunct="1">
+              <a:spcBef>
+                <a:spcPts val="350"/>
+              </a:spcBef>
+              <a:buClr>
+                <a:schemeClr val="accent3"/>
+              </a:buClr>
+              <a:buFont typeface="Wingdings 2"/>
+              <a:buChar char=""/>
+              <a:defRPr kumimoji="0" sz="1600" kern="1200" baseline="0">
+                <a:solidFill>
+                  <a:schemeClr val="tx1"/>
+                </a:solidFill>
+                <a:latin typeface="+mn-lt"/>
+                <a:ea typeface="+mn-ea"/>
+                <a:cs typeface="+mn-cs"/>
+              </a:defRPr>
+            </a:lvl9pPr>
+            <a:extLst/>
+          </a:lstStyle>
+          <a:p>
+            <a:pPr>
+              <a:buFont typeface="Wingdings" panose="05000000000000000000" pitchFamily="2" charset="2"/>
+              <a:buChar char="v"/>
+            </a:pPr>
+            <a:r>
+              <a:rPr lang="en-US" dirty="0" smtClean="0"/>
+              <a:t>Salad</a:t>
+            </a:r>
+          </a:p>
+          <a:p>
+            <a:pPr>
+              <a:buFont typeface="Wingdings" panose="05000000000000000000" pitchFamily="2" charset="2"/>
+              <a:buChar char="v"/>
+            </a:pPr>
+            <a:r>
+              <a:rPr lang="en-US" dirty="0" smtClean="0"/>
+              <a:t>Pasta</a:t>
+            </a:r>
+          </a:p>
+          <a:p>
+            <a:pPr>
+              <a:buFont typeface="Wingdings" panose="05000000000000000000" pitchFamily="2" charset="2"/>
+              <a:buChar char="v"/>
+            </a:pPr>
+            <a:r>
+              <a:rPr lang="en-US" dirty="0" smtClean="0"/>
+              <a:t>Hotdog</a:t>
+            </a:r>
+          </a:p>
+          <a:p>
+            <a:pPr>
+              <a:buFont typeface="Wingdings" panose="05000000000000000000" pitchFamily="2" charset="2"/>
+              <a:buChar char="v"/>
+            </a:pPr>
+            <a:r>
+              <a:rPr lang="en-US" dirty="0" err="1" smtClean="0"/>
+              <a:t>Frenchfry</a:t>
+            </a:r>
+            <a:endParaRPr lang="en-US" dirty="0" smtClean="0"/>
+          </a:p>
+          <a:p>
+            <a:pPr>
+              <a:buFont typeface="Wingdings" panose="05000000000000000000" pitchFamily="2" charset="2"/>
+              <a:buChar char="v"/>
+            </a:pPr>
+            <a:r>
+              <a:rPr lang="en-US" dirty="0" smtClean="0"/>
+              <a:t>Burger</a:t>
+            </a:r>
+          </a:p>
+          <a:p>
+            <a:pPr>
+              <a:buFont typeface="Wingdings" panose="05000000000000000000" pitchFamily="2" charset="2"/>
+              <a:buChar char="v"/>
+            </a:pPr>
+            <a:r>
+              <a:rPr lang="en-US" dirty="0" smtClean="0"/>
+              <a:t>Apple</a:t>
+            </a:r>
+          </a:p>
+          <a:p>
+            <a:pPr>
+              <a:buFont typeface="Wingdings" panose="05000000000000000000" pitchFamily="2" charset="2"/>
+              <a:buChar char="v"/>
+            </a:pPr>
+            <a:r>
+              <a:rPr lang="en-US" dirty="0" smtClean="0"/>
+              <a:t>Banana</a:t>
+            </a:r>
+          </a:p>
+          <a:p>
+            <a:pPr>
+              <a:buFont typeface="Wingdings" panose="05000000000000000000" pitchFamily="2" charset="2"/>
+              <a:buChar char="v"/>
+            </a:pPr>
+            <a:r>
+              <a:rPr lang="en-US" dirty="0" smtClean="0"/>
+              <a:t>Broccoli</a:t>
+            </a:r>
+          </a:p>
+          <a:p>
+            <a:pPr>
+              <a:buFont typeface="Wingdings" panose="05000000000000000000" pitchFamily="2" charset="2"/>
+              <a:buChar char="v"/>
+            </a:pPr>
+            <a:r>
+              <a:rPr lang="en-US" dirty="0" smtClean="0"/>
+              <a:t>Pizza</a:t>
+            </a:r>
+          </a:p>
+          <a:p>
+            <a:pPr>
+              <a:buFont typeface="Wingdings" panose="05000000000000000000" pitchFamily="2" charset="2"/>
+              <a:buChar char="v"/>
+            </a:pPr>
+            <a:r>
+              <a:rPr lang="en-US" dirty="0" smtClean="0"/>
+              <a:t>Egg</a:t>
+            </a:r>
+          </a:p>
+          <a:p>
+            <a:pPr>
+              <a:buFont typeface="Wingdings" panose="05000000000000000000" pitchFamily="2" charset="2"/>
+              <a:buChar char="v"/>
+            </a:pPr>
+            <a:r>
+              <a:rPr lang="en-US" dirty="0" smtClean="0"/>
+              <a:t>Tomato</a:t>
+            </a:r>
+          </a:p>
+          <a:p>
+            <a:pPr>
+              <a:buFont typeface="Wingdings" panose="05000000000000000000" pitchFamily="2" charset="2"/>
+              <a:buChar char="v"/>
+            </a:pPr>
+            <a:r>
+              <a:rPr lang="en-US" dirty="0" smtClean="0"/>
+              <a:t>Rice</a:t>
+            </a:r>
+          </a:p>
+          <a:p>
+            <a:pPr>
+              <a:buFont typeface="Wingdings" panose="05000000000000000000" pitchFamily="2" charset="2"/>
+              <a:buChar char="v"/>
+            </a:pPr>
+            <a:r>
+              <a:rPr lang="en-US" dirty="0" smtClean="0"/>
+              <a:t>Strawberry</a:t>
+            </a:r>
+          </a:p>
+          <a:p>
+            <a:pPr>
+              <a:buFont typeface="Wingdings" panose="05000000000000000000" pitchFamily="2" charset="2"/>
+              <a:buChar char="v"/>
+            </a:pPr>
+            <a:r>
+              <a:rPr lang="en-US" dirty="0" smtClean="0"/>
+              <a:t>Cookie</a:t>
+            </a:r>
+            <a:endParaRPr lang="en-US" dirty="0" smtClean="0"/>
           </a:p>
         </p:txBody>
       </p:sp>
@@ -13577,7 +14540,6 @@
               <a:rPr lang="en-US" dirty="0" smtClean="0"/>
               <a:t>Less weight to colors that are close to black or gray</a:t>
             </a:r>
-            <a:endParaRPr lang="en-US" dirty="0" smtClean="0"/>
           </a:p>
         </p:txBody>
       </p:sp>
@@ -13943,6 +14905,462 @@
           <a:chExt cx="0" cy="0"/>
         </a:xfrm>
       </p:grpSpPr>
+      <p:pic>
+        <p:nvPicPr>
+          <p:cNvPr id="9" name="Content Placeholder 8"/>
+          <p:cNvPicPr>
+            <a:picLocks noGrp="1" noChangeAspect="1"/>
+          </p:cNvPicPr>
+          <p:nvPr>
+            <p:ph idx="1"/>
+          </p:nvPr>
+        </p:nvPicPr>
+        <p:blipFill>
+          <a:blip r:embed="rId3">
+            <a:extLst>
+              <a:ext uri="{28A0092B-C50C-407E-A947-70E740481C1C}">
+                <a14:useLocalDpi xmlns:a14="http://schemas.microsoft.com/office/drawing/2010/main" val="0"/>
+              </a:ext>
+            </a:extLst>
+          </a:blip>
+          <a:stretch>
+            <a:fillRect/>
+          </a:stretch>
+        </p:blipFill>
+        <p:spPr>
+          <a:xfrm>
+            <a:off x="5212274" y="1447800"/>
+            <a:ext cx="1791852" cy="1342159"/>
+          </a:xfrm>
+        </p:spPr>
+      </p:pic>
+      <p:sp>
+        <p:nvSpPr>
+          <p:cNvPr id="3" name="Title 2"/>
+          <p:cNvSpPr>
+            <a:spLocks noGrp="1"/>
+          </p:cNvSpPr>
+          <p:nvPr>
+            <p:ph type="title"/>
+          </p:nvPr>
+        </p:nvSpPr>
+        <p:spPr/>
+        <p:txBody>
+          <a:bodyPr/>
+          <a:lstStyle/>
+          <a:p>
+            <a:r>
+              <a:rPr lang="en-US" dirty="0" smtClean="0"/>
+              <a:t>Methods: Texture</a:t>
+            </a:r>
+            <a:endParaRPr lang="en-US" dirty="0"/>
+          </a:p>
+        </p:txBody>
+      </p:sp>
+      <p:pic>
+        <p:nvPicPr>
+          <p:cNvPr id="10" name="Picture 9"/>
+          <p:cNvPicPr>
+            <a:picLocks noChangeAspect="1"/>
+          </p:cNvPicPr>
+          <p:nvPr/>
+        </p:nvPicPr>
+        <p:blipFill>
+          <a:blip r:embed="rId4" cstate="print">
+            <a:extLst>
+              <a:ext uri="{28A0092B-C50C-407E-A947-70E740481C1C}">
+                <a14:useLocalDpi xmlns:a14="http://schemas.microsoft.com/office/drawing/2010/main" val="0"/>
+              </a:ext>
+            </a:extLst>
+          </a:blip>
+          <a:stretch>
+            <a:fillRect/>
+          </a:stretch>
+        </p:blipFill>
+        <p:spPr>
+          <a:xfrm>
+            <a:off x="5461076" y="2906582"/>
+            <a:ext cx="1543050" cy="1543050"/>
+          </a:xfrm>
+          <a:prstGeom prst="rect">
+            <a:avLst/>
+          </a:prstGeom>
+        </p:spPr>
+      </p:pic>
+      <p:pic>
+        <p:nvPicPr>
+          <p:cNvPr id="11" name="Picture 10"/>
+          <p:cNvPicPr>
+            <a:picLocks noChangeAspect="1"/>
+          </p:cNvPicPr>
+          <p:nvPr/>
+        </p:nvPicPr>
+        <p:blipFill>
+          <a:blip r:embed="rId5">
+            <a:extLst>
+              <a:ext uri="{28A0092B-C50C-407E-A947-70E740481C1C}">
+                <a14:useLocalDpi xmlns:a14="http://schemas.microsoft.com/office/drawing/2010/main" val="0"/>
+              </a:ext>
+            </a:extLst>
+          </a:blip>
+          <a:stretch>
+            <a:fillRect/>
+          </a:stretch>
+        </p:blipFill>
+        <p:spPr>
+          <a:xfrm>
+            <a:off x="5480126" y="4648200"/>
+            <a:ext cx="1524000" cy="1524000"/>
+          </a:xfrm>
+          <a:prstGeom prst="rect">
+            <a:avLst/>
+          </a:prstGeom>
+        </p:spPr>
+      </p:pic>
+      <p:pic>
+        <p:nvPicPr>
+          <p:cNvPr id="12" name="Picture 11"/>
+          <p:cNvPicPr>
+            <a:picLocks noChangeAspect="1"/>
+          </p:cNvPicPr>
+          <p:nvPr/>
+        </p:nvPicPr>
+        <p:blipFill>
+          <a:blip r:embed="rId6"/>
+          <a:stretch>
+            <a:fillRect/>
+          </a:stretch>
+        </p:blipFill>
+        <p:spPr>
+          <a:xfrm>
+            <a:off x="7086600" y="1417637"/>
+            <a:ext cx="1828800" cy="1375795"/>
+          </a:xfrm>
+          <a:prstGeom prst="rect">
+            <a:avLst/>
+          </a:prstGeom>
+        </p:spPr>
+      </p:pic>
+      <p:sp>
+        <p:nvSpPr>
+          <p:cNvPr id="13" name="Content Placeholder 1"/>
+          <p:cNvSpPr txBox="1">
+            <a:spLocks/>
+          </p:cNvSpPr>
+          <p:nvPr/>
+        </p:nvSpPr>
+        <p:spPr>
+          <a:xfrm>
+            <a:off x="457200" y="1481328"/>
+            <a:ext cx="4419600" cy="4525963"/>
+          </a:xfrm>
+          <a:prstGeom prst="rect">
+            <a:avLst/>
+          </a:prstGeom>
+        </p:spPr>
+        <p:txBody>
+          <a:bodyPr vert="horz">
+            <a:normAutofit/>
+          </a:bodyPr>
+          <a:lstStyle>
+            <a:lvl1pPr marL="365760" indent="-256032" algn="l" rtl="0" eaLnBrk="1" latinLnBrk="0" hangingPunct="1">
+              <a:spcBef>
+                <a:spcPts val="400"/>
+              </a:spcBef>
+              <a:spcAft>
+                <a:spcPts val="0"/>
+              </a:spcAft>
+              <a:buClr>
+                <a:schemeClr val="accent1"/>
+              </a:buClr>
+              <a:buSzPct val="68000"/>
+              <a:buFont typeface="Wingdings 3"/>
+              <a:buChar char=""/>
+              <a:defRPr kumimoji="0" sz="2700" kern="1200">
+                <a:solidFill>
+                  <a:schemeClr val="tx1"/>
+                </a:solidFill>
+                <a:latin typeface="+mn-lt"/>
+                <a:ea typeface="+mn-ea"/>
+                <a:cs typeface="+mn-cs"/>
+              </a:defRPr>
+            </a:lvl1pPr>
+            <a:lvl2pPr marL="621792" indent="-228600" algn="l" rtl="0" eaLnBrk="1" latinLnBrk="0" hangingPunct="1">
+              <a:spcBef>
+                <a:spcPts val="324"/>
+              </a:spcBef>
+              <a:buClr>
+                <a:schemeClr val="accent1"/>
+              </a:buClr>
+              <a:buFont typeface="Verdana"/>
+              <a:buChar char="◦"/>
+              <a:defRPr kumimoji="0" sz="2300" kern="1200">
+                <a:solidFill>
+                  <a:schemeClr val="tx1"/>
+                </a:solidFill>
+                <a:latin typeface="+mn-lt"/>
+                <a:ea typeface="+mn-ea"/>
+                <a:cs typeface="+mn-cs"/>
+              </a:defRPr>
+            </a:lvl2pPr>
+            <a:lvl3pPr marL="859536" indent="-228600" algn="l" rtl="0" eaLnBrk="1" latinLnBrk="0" hangingPunct="1">
+              <a:spcBef>
+                <a:spcPts val="350"/>
+              </a:spcBef>
+              <a:buClr>
+                <a:schemeClr val="accent2"/>
+              </a:buClr>
+              <a:buSzPct val="100000"/>
+              <a:buFont typeface="Wingdings 2"/>
+              <a:buChar char=""/>
+              <a:defRPr kumimoji="0" sz="2100" kern="1200">
+                <a:solidFill>
+                  <a:schemeClr val="tx1"/>
+                </a:solidFill>
+                <a:latin typeface="+mn-lt"/>
+                <a:ea typeface="+mn-ea"/>
+                <a:cs typeface="+mn-cs"/>
+              </a:defRPr>
+            </a:lvl3pPr>
+            <a:lvl4pPr marL="1143000" indent="-228600" algn="l" rtl="0" eaLnBrk="1" latinLnBrk="0" hangingPunct="1">
+              <a:spcBef>
+                <a:spcPts val="350"/>
+              </a:spcBef>
+              <a:buClr>
+                <a:schemeClr val="accent2"/>
+              </a:buClr>
+              <a:buFont typeface="Wingdings 2"/>
+              <a:buChar char=""/>
+              <a:defRPr kumimoji="0" sz="1900" kern="1200">
+                <a:solidFill>
+                  <a:schemeClr val="tx1"/>
+                </a:solidFill>
+                <a:latin typeface="+mn-lt"/>
+                <a:ea typeface="+mn-ea"/>
+                <a:cs typeface="+mn-cs"/>
+              </a:defRPr>
+            </a:lvl4pPr>
+            <a:lvl5pPr marL="1371600" indent="-228600" algn="l" rtl="0" eaLnBrk="1" latinLnBrk="0" hangingPunct="1">
+              <a:spcBef>
+                <a:spcPts val="350"/>
+              </a:spcBef>
+              <a:buClr>
+                <a:schemeClr val="accent2"/>
+              </a:buClr>
+              <a:buFont typeface="Wingdings 2"/>
+              <a:buChar char=""/>
+              <a:defRPr kumimoji="0" sz="1800" kern="1200">
+                <a:solidFill>
+                  <a:schemeClr val="tx1"/>
+                </a:solidFill>
+                <a:latin typeface="+mn-lt"/>
+                <a:ea typeface="+mn-ea"/>
+                <a:cs typeface="+mn-cs"/>
+              </a:defRPr>
+            </a:lvl5pPr>
+            <a:lvl6pPr marL="1600200" indent="-228600" algn="l" rtl="0" eaLnBrk="1" latinLnBrk="0" hangingPunct="1">
+              <a:spcBef>
+                <a:spcPts val="350"/>
+              </a:spcBef>
+              <a:buClr>
+                <a:schemeClr val="accent3"/>
+              </a:buClr>
+              <a:buFont typeface="Wingdings 2"/>
+              <a:buChar char=""/>
+              <a:defRPr kumimoji="0" sz="1800" kern="1200">
+                <a:solidFill>
+                  <a:schemeClr val="tx1"/>
+                </a:solidFill>
+                <a:latin typeface="+mn-lt"/>
+                <a:ea typeface="+mn-ea"/>
+                <a:cs typeface="+mn-cs"/>
+              </a:defRPr>
+            </a:lvl6pPr>
+            <a:lvl7pPr marL="1828800" indent="-228600" algn="l" rtl="0" eaLnBrk="1" latinLnBrk="0" hangingPunct="1">
+              <a:spcBef>
+                <a:spcPts val="350"/>
+              </a:spcBef>
+              <a:buClr>
+                <a:schemeClr val="accent3"/>
+              </a:buClr>
+              <a:buFont typeface="Wingdings 2"/>
+              <a:buChar char=""/>
+              <a:defRPr kumimoji="0" sz="1600" kern="1200">
+                <a:solidFill>
+                  <a:schemeClr val="tx1"/>
+                </a:solidFill>
+                <a:latin typeface="+mn-lt"/>
+                <a:ea typeface="+mn-ea"/>
+                <a:cs typeface="+mn-cs"/>
+              </a:defRPr>
+            </a:lvl7pPr>
+            <a:lvl8pPr marL="2057400" indent="-228600" algn="l" rtl="0" eaLnBrk="1" latinLnBrk="0" hangingPunct="1">
+              <a:spcBef>
+                <a:spcPts val="350"/>
+              </a:spcBef>
+              <a:buClr>
+                <a:schemeClr val="accent3"/>
+              </a:buClr>
+              <a:buFont typeface="Wingdings 2"/>
+              <a:buChar char=""/>
+              <a:defRPr kumimoji="0" sz="1600" kern="1200">
+                <a:solidFill>
+                  <a:schemeClr val="tx1"/>
+                </a:solidFill>
+                <a:latin typeface="+mn-lt"/>
+                <a:ea typeface="+mn-ea"/>
+                <a:cs typeface="+mn-cs"/>
+              </a:defRPr>
+            </a:lvl8pPr>
+            <a:lvl9pPr marL="2286000" indent="-228600" algn="l" rtl="0" eaLnBrk="1" latinLnBrk="0" hangingPunct="1">
+              <a:spcBef>
+                <a:spcPts val="350"/>
+              </a:spcBef>
+              <a:buClr>
+                <a:schemeClr val="accent3"/>
+              </a:buClr>
+              <a:buFont typeface="Wingdings 2"/>
+              <a:buChar char=""/>
+              <a:defRPr kumimoji="0" sz="1600" kern="1200" baseline="0">
+                <a:solidFill>
+                  <a:schemeClr val="tx1"/>
+                </a:solidFill>
+                <a:latin typeface="+mn-lt"/>
+                <a:ea typeface="+mn-ea"/>
+                <a:cs typeface="+mn-cs"/>
+              </a:defRPr>
+            </a:lvl9pPr>
+            <a:extLst/>
+          </a:lstStyle>
+          <a:p>
+            <a:r>
+              <a:rPr lang="en-US" dirty="0" smtClean="0"/>
+              <a:t>Input: </a:t>
+            </a:r>
+            <a:endParaRPr lang="en-US" dirty="0"/>
+          </a:p>
+          <a:p>
+            <a:pPr lvl="1"/>
+            <a:r>
+              <a:rPr lang="en-US" dirty="0" smtClean="0"/>
+              <a:t>Foregrounded image </a:t>
+            </a:r>
+          </a:p>
+          <a:p>
+            <a:pPr lvl="1"/>
+            <a:r>
+              <a:rPr lang="en-US" dirty="0" smtClean="0"/>
+              <a:t>Foreground mask</a:t>
+            </a:r>
+          </a:p>
+          <a:p>
+            <a:pPr lvl="1"/>
+            <a:endParaRPr lang="en-US" dirty="0" smtClean="0"/>
+          </a:p>
+          <a:p>
+            <a:r>
+              <a:rPr lang="en-US" dirty="0" smtClean="0"/>
+              <a:t>Output: </a:t>
+            </a:r>
+          </a:p>
+          <a:p>
+            <a:pPr lvl="1"/>
+            <a:r>
+              <a:rPr lang="en-US" dirty="0"/>
+              <a:t>I</a:t>
+            </a:r>
+            <a:r>
+              <a:rPr lang="en-US" dirty="0" smtClean="0"/>
+              <a:t>ntensity per pixel in the food region of the image after application of Matlab’s range filter</a:t>
+            </a:r>
+          </a:p>
+        </p:txBody>
+      </p:sp>
+      <p:pic>
+        <p:nvPicPr>
+          <p:cNvPr id="14" name="Picture 13"/>
+          <p:cNvPicPr>
+            <a:picLocks noChangeAspect="1"/>
+          </p:cNvPicPr>
+          <p:nvPr/>
+        </p:nvPicPr>
+        <p:blipFill>
+          <a:blip r:embed="rId7"/>
+          <a:stretch>
+            <a:fillRect/>
+          </a:stretch>
+        </p:blipFill>
+        <p:spPr>
+          <a:xfrm>
+            <a:off x="7086600" y="2887532"/>
+            <a:ext cx="1567043" cy="1562100"/>
+          </a:xfrm>
+          <a:prstGeom prst="rect">
+            <a:avLst/>
+          </a:prstGeom>
+        </p:spPr>
+      </p:pic>
+      <p:pic>
+        <p:nvPicPr>
+          <p:cNvPr id="15" name="Picture 14"/>
+          <p:cNvPicPr>
+            <a:picLocks noChangeAspect="1"/>
+          </p:cNvPicPr>
+          <p:nvPr/>
+        </p:nvPicPr>
+        <p:blipFill>
+          <a:blip r:embed="rId8"/>
+          <a:stretch>
+            <a:fillRect/>
+          </a:stretch>
+        </p:blipFill>
+        <p:spPr>
+          <a:xfrm>
+            <a:off x="7079428" y="4632311"/>
+            <a:ext cx="1517572" cy="1539889"/>
+          </a:xfrm>
+          <a:prstGeom prst="rect">
+            <a:avLst/>
+          </a:prstGeom>
+        </p:spPr>
+      </p:pic>
+    </p:spTree>
+    <p:extLst>
+      <p:ext uri="{BB962C8B-B14F-4D97-AF65-F5344CB8AC3E}">
+        <p14:creationId xmlns:p14="http://schemas.microsoft.com/office/powerpoint/2010/main" val="1444710660"/>
+      </p:ext>
+    </p:extLst>
+  </p:cSld>
+  <p:clrMapOvr>
+    <a:masterClrMapping/>
+  </p:clrMapOvr>
+  <p:timing>
+    <p:tnLst>
+      <p:par>
+        <p:cTn id="1" dur="indefinite" restart="never" nodeType="tmRoot"/>
+      </p:par>
+    </p:tnLst>
+  </p:timing>
+</p:sld>
+</file>
+
+<file path=ppt/slides/slide7.xml><?xml version="1.0" encoding="utf-8"?>
+<p:sld xmlns:a="http://schemas.openxmlformats.org/drawingml/2006/main" xmlns:r="http://schemas.openxmlformats.org/officeDocument/2006/relationships" xmlns:p="http://schemas.openxmlformats.org/presentationml/2006/main">
+  <p:cSld>
+    <p:spTree>
+      <p:nvGrpSpPr>
+        <p:cNvPr id="1" name=""/>
+        <p:cNvGrpSpPr/>
+        <p:nvPr/>
+      </p:nvGrpSpPr>
+      <p:grpSpPr>
+        <a:xfrm>
+          <a:off x="0" y="0"/>
+          <a:ext cx="0" cy="0"/>
+          <a:chOff x="0" y="0"/>
+          <a:chExt cx="0" cy="0"/>
+        </a:xfrm>
+      </p:grpSpPr>
       <p:sp>
         <p:nvSpPr>
           <p:cNvPr id="2" name="Content Placeholder 1"/>
@@ -13958,7 +15376,48 @@
           <a:bodyPr/>
           <a:lstStyle/>
           <a:p>
-            <a:endParaRPr lang="en-US" dirty="0" smtClean="0"/>
+            <a:r>
+              <a:rPr lang="en-US" dirty="0" smtClean="0"/>
+              <a:t>Alternative Method: </a:t>
+            </a:r>
+            <a:br>
+              <a:rPr lang="en-US" dirty="0" smtClean="0"/>
+            </a:br>
+            <a:r>
+              <a:rPr lang="en-US" dirty="0" smtClean="0"/>
+              <a:t>Law’s Texture Energy Measures</a:t>
+            </a:r>
+          </a:p>
+          <a:p>
+            <a:pPr lvl="1"/>
+            <a:r>
+              <a:rPr lang="en-US" dirty="0" smtClean="0"/>
+              <a:t>Produces 9 energy map features corresponding to the application of filters</a:t>
+            </a:r>
+          </a:p>
+          <a:p>
+            <a:pPr lvl="1"/>
+            <a:r>
+              <a:rPr lang="en-US" dirty="0" smtClean="0"/>
+              <a:t>Intensity per pixel in the food image region used as summarizing statistical for each map</a:t>
+            </a:r>
+          </a:p>
+          <a:p>
+            <a:r>
+              <a:rPr lang="en-US" dirty="0" smtClean="0"/>
+              <a:t>Analyzed interclass and intraclass variation for all 9 features and selected the top 3</a:t>
+            </a:r>
+          </a:p>
+          <a:p>
+            <a:r>
+              <a:rPr lang="en-US" dirty="0" smtClean="0"/>
+              <a:t>Experimental Result: insignificant difference from the original method</a:t>
+            </a:r>
+            <a:endParaRPr lang="en-US" dirty="0"/>
+          </a:p>
+          <a:p>
+            <a:pPr lvl="1"/>
+            <a:endParaRPr lang="en-US" dirty="0"/>
           </a:p>
         </p:txBody>
       </p:sp>
@@ -13979,7 +15438,87 @@
           <a:p>
             <a:r>
               <a:rPr lang="en-US" dirty="0" smtClean="0"/>
-              <a:t>Methods: Texture</a:t>
+              <a:t>Methods: Texture (</a:t>
+            </a:r>
+            <a:r>
+              <a:rPr lang="en-US" dirty="0" err="1" smtClean="0"/>
+              <a:t>con’t</a:t>
+            </a:r>
+            <a:r>
+              <a:rPr lang="en-US" dirty="0" smtClean="0"/>
+              <a:t>)</a:t>
+            </a:r>
+            <a:endParaRPr lang="en-US" dirty="0"/>
+          </a:p>
+        </p:txBody>
+      </p:sp>
+    </p:spTree>
+    <p:extLst>
+      <p:ext uri="{BB962C8B-B14F-4D97-AF65-F5344CB8AC3E}">
+        <p14:creationId xmlns:p14="http://schemas.microsoft.com/office/powerpoint/2010/main" val="3036468877"/>
+      </p:ext>
+    </p:extLst>
+  </p:cSld>
+  <p:clrMapOvr>
+    <a:masterClrMapping/>
+  </p:clrMapOvr>
+</p:sld>
+</file>
+
+<file path=ppt/slides/slide8.xml><?xml version="1.0" encoding="utf-8"?>
+<p:sld xmlns:a="http://schemas.openxmlformats.org/drawingml/2006/main" xmlns:r="http://schemas.openxmlformats.org/officeDocument/2006/relationships" xmlns:p="http://schemas.openxmlformats.org/presentationml/2006/main">
+  <p:cSld>
+    <p:spTree>
+      <p:nvGrpSpPr>
+        <p:cNvPr id="1" name=""/>
+        <p:cNvGrpSpPr/>
+        <p:nvPr/>
+      </p:nvGrpSpPr>
+      <p:grpSpPr>
+        <a:xfrm>
+          <a:off x="0" y="0"/>
+          <a:ext cx="0" cy="0"/>
+          <a:chOff x="0" y="0"/>
+          <a:chExt cx="0" cy="0"/>
+        </a:xfrm>
+      </p:grpSpPr>
+      <p:sp>
+        <p:nvSpPr>
+          <p:cNvPr id="2" name="Content Placeholder 1"/>
+          <p:cNvSpPr>
+            <a:spLocks noGrp="1"/>
+          </p:cNvSpPr>
+          <p:nvPr>
+            <p:ph idx="1"/>
+          </p:nvPr>
+        </p:nvSpPr>
+        <p:spPr/>
+        <p:txBody>
+          <a:bodyPr/>
+          <a:lstStyle/>
+          <a:p>
+            <a:endParaRPr lang="en-US" dirty="0" smtClean="0"/>
+          </a:p>
+        </p:txBody>
+      </p:sp>
+      <p:sp>
+        <p:nvSpPr>
+          <p:cNvPr id="3" name="Title 2"/>
+          <p:cNvSpPr>
+            <a:spLocks noGrp="1"/>
+          </p:cNvSpPr>
+          <p:nvPr>
+            <p:ph type="title"/>
+          </p:nvPr>
+        </p:nvSpPr>
+        <p:spPr/>
+        <p:txBody>
+          <a:bodyPr/>
+          <a:lstStyle/>
+          <a:p>
+            <a:r>
+              <a:rPr lang="en-US" dirty="0" smtClean="0"/>
+              <a:t>Methods: Shape</a:t>
             </a:r>
             <a:endParaRPr lang="en-US" dirty="0"/>
           </a:p>
@@ -14085,166 +15624,7 @@
 </p:sld>
 </file>
 
-<file path=ppt/slides/slide7.xml><?xml version="1.0" encoding="utf-8"?>
-<p:sld xmlns:a="http://schemas.openxmlformats.org/drawingml/2006/main" xmlns:r="http://schemas.openxmlformats.org/officeDocument/2006/relationships" xmlns:p="http://schemas.openxmlformats.org/presentationml/2006/main">
-  <p:cSld>
-    <p:spTree>
-      <p:nvGrpSpPr>
-        <p:cNvPr id="1" name=""/>
-        <p:cNvGrpSpPr/>
-        <p:nvPr/>
-      </p:nvGrpSpPr>
-      <p:grpSpPr>
-        <a:xfrm>
-          <a:off x="0" y="0"/>
-          <a:ext cx="0" cy="0"/>
-          <a:chOff x="0" y="0"/>
-          <a:chExt cx="0" cy="0"/>
-        </a:xfrm>
-      </p:grpSpPr>
-      <p:sp>
-        <p:nvSpPr>
-          <p:cNvPr id="2" name="Content Placeholder 1"/>
-          <p:cNvSpPr>
-            <a:spLocks noGrp="1"/>
-          </p:cNvSpPr>
-          <p:nvPr>
-            <p:ph idx="1"/>
-          </p:nvPr>
-        </p:nvSpPr>
-        <p:spPr/>
-        <p:txBody>
-          <a:bodyPr/>
-          <a:lstStyle/>
-          <a:p>
-            <a:endParaRPr lang="en-US" dirty="0" smtClean="0"/>
-          </a:p>
-        </p:txBody>
-      </p:sp>
-      <p:sp>
-        <p:nvSpPr>
-          <p:cNvPr id="3" name="Title 2"/>
-          <p:cNvSpPr>
-            <a:spLocks noGrp="1"/>
-          </p:cNvSpPr>
-          <p:nvPr>
-            <p:ph type="title"/>
-          </p:nvPr>
-        </p:nvSpPr>
-        <p:spPr/>
-        <p:txBody>
-          <a:bodyPr/>
-          <a:lstStyle/>
-          <a:p>
-            <a:r>
-              <a:rPr lang="en-US" dirty="0" smtClean="0"/>
-              <a:t>Methods: Shape</a:t>
-            </a:r>
-            <a:endParaRPr lang="en-US" dirty="0"/>
-          </a:p>
-        </p:txBody>
-      </p:sp>
-    </p:spTree>
-    <p:extLst>
-      <p:ext uri="{BB962C8B-B14F-4D97-AF65-F5344CB8AC3E}">
-        <p14:creationId xmlns:p14="http://schemas.microsoft.com/office/powerpoint/2010/main" val="2548635361"/>
-      </p:ext>
-    </p:extLst>
-  </p:cSld>
-  <p:clrMapOvr>
-    <a:masterClrMapping/>
-  </p:clrMapOvr>
-  <p:timing>
-    <p:tnLst>
-      <p:par>
-        <p:cTn id="1" dur="indefinite" restart="never" nodeType="tmRoot">
-          <p:childTnLst>
-            <p:seq concurrent="1" nextAc="seek">
-              <p:cTn id="2" dur="indefinite" nodeType="mainSeq">
-                <p:childTnLst>
-                  <p:par>
-                    <p:cTn id="3" fill="hold">
-                      <p:stCondLst>
-                        <p:cond delay="indefinite"/>
-                      </p:stCondLst>
-                      <p:childTnLst>
-                        <p:par>
-                          <p:cTn id="4" fill="hold">
-                            <p:stCondLst>
-                              <p:cond delay="0"/>
-                            </p:stCondLst>
-                            <p:childTnLst>
-                              <p:par>
-                                <p:cTn id="5" presetID="1" presetClass="entr" presetSubtype="0" fill="hold" grpId="0" nodeType="clickEffect" nodePh="1">
-                                  <p:stCondLst>
-                                    <p:cond delay="0"/>
-                                  </p:stCondLst>
-                                  <p:endCondLst>
-                                    <p:cond evt="begin" delay="0">
-                                      <p:tn val="5"/>
-                                    </p:cond>
-                                  </p:endCondLst>
-                                  <p:childTnLst>
-                                    <p:set>
-                                      <p:cBhvr>
-                                        <p:cTn id="6" dur="1" fill="hold">
-                                          <p:stCondLst>
-                                            <p:cond delay="0"/>
-                                          </p:stCondLst>
-                                        </p:cTn>
-                                        <p:tgtEl>
-                                          <p:spTgt spid="2">
-                                            <p:txEl>
-                                              <p:pRg st="0" end="0"/>
-                                            </p:txEl>
-                                          </p:spTgt>
-                                        </p:tgtEl>
-                                        <p:attrNameLst>
-                                          <p:attrName>style.visibility</p:attrName>
-                                        </p:attrNameLst>
-                                      </p:cBhvr>
-                                      <p:to>
-                                        <p:strVal val="visible"/>
-                                      </p:to>
-                                    </p:set>
-                                  </p:childTnLst>
-                                </p:cTn>
-                              </p:par>
-                            </p:childTnLst>
-                          </p:cTn>
-                        </p:par>
-                      </p:childTnLst>
-                    </p:cTn>
-                  </p:par>
-                </p:childTnLst>
-              </p:cTn>
-              <p:prevCondLst>
-                <p:cond evt="onPrev" delay="0">
-                  <p:tgtEl>
-                    <p:sldTgt/>
-                  </p:tgtEl>
-                </p:cond>
-              </p:prevCondLst>
-              <p:nextCondLst>
-                <p:cond evt="onNext" delay="0">
-                  <p:tgtEl>
-                    <p:sldTgt/>
-                  </p:tgtEl>
-                </p:cond>
-              </p:nextCondLst>
-            </p:seq>
-          </p:childTnLst>
-        </p:cTn>
-      </p:par>
-    </p:tnLst>
-    <p:bldLst>
-      <p:bldP spid="2" grpId="0" build="p"/>
-    </p:bldLst>
-  </p:timing>
-</p:sld>
-</file>
-
-<file path=ppt/slides/slide8.xml><?xml version="1.0" encoding="utf-8"?>
+<file path=ppt/slides/slide9.xml><?xml version="1.0" encoding="utf-8"?>
 <p:sld xmlns:a="http://schemas.openxmlformats.org/drawingml/2006/main" xmlns:r="http://schemas.openxmlformats.org/officeDocument/2006/relationships" xmlns:p="http://schemas.openxmlformats.org/presentationml/2006/main">
   <p:cSld>
     <p:spTree>
@@ -14313,104 +15693,6 @@
     <p:extLst>
       <p:ext uri="{BB962C8B-B14F-4D97-AF65-F5344CB8AC3E}">
         <p14:creationId xmlns:p14="http://schemas.microsoft.com/office/powerpoint/2010/main" val="2548635361"/>
-      </p:ext>
-    </p:extLst>
-  </p:cSld>
-  <p:clrMapOvr>
-    <a:masterClrMapping/>
-  </p:clrMapOvr>
-  <p:timing>
-    <p:tnLst>
-      <p:par>
-        <p:cTn id="1" dur="indefinite" restart="never" nodeType="tmRoot"/>
-      </p:par>
-    </p:tnLst>
-  </p:timing>
-</p:sld>
-</file>
-
-<file path=ppt/slides/slide9.xml><?xml version="1.0" encoding="utf-8"?>
-<p:sld xmlns:a="http://schemas.openxmlformats.org/drawingml/2006/main" xmlns:r="http://schemas.openxmlformats.org/officeDocument/2006/relationships" xmlns:p="http://schemas.openxmlformats.org/presentationml/2006/main">
-  <p:cSld>
-    <p:spTree>
-      <p:nvGrpSpPr>
-        <p:cNvPr id="1" name=""/>
-        <p:cNvGrpSpPr/>
-        <p:nvPr/>
-      </p:nvGrpSpPr>
-      <p:grpSpPr>
-        <a:xfrm>
-          <a:off x="0" y="0"/>
-          <a:ext cx="0" cy="0"/>
-          <a:chOff x="0" y="0"/>
-          <a:chExt cx="0" cy="0"/>
-        </a:xfrm>
-      </p:grpSpPr>
-      <p:sp>
-        <p:nvSpPr>
-          <p:cNvPr id="2" name="Content Placeholder 1"/>
-          <p:cNvSpPr>
-            <a:spLocks noGrp="1"/>
-          </p:cNvSpPr>
-          <p:nvPr>
-            <p:ph idx="1"/>
-          </p:nvPr>
-        </p:nvSpPr>
-        <p:spPr>
-          <a:xfrm>
-            <a:off x="457200" y="1481328"/>
-            <a:ext cx="8229600" cy="4843272"/>
-          </a:xfrm>
-        </p:spPr>
-        <p:txBody>
-          <a:bodyPr>
-            <a:normAutofit/>
-          </a:bodyPr>
-          <a:lstStyle/>
-          <a:p>
-            <a:endParaRPr lang="en-US" i="1" dirty="0" smtClean="0"/>
-          </a:p>
-          <a:p>
-            <a:pPr marL="393192" lvl="1" indent="0">
-              <a:buNone/>
-            </a:pPr>
-            <a:endParaRPr lang="en-US" i="1" dirty="0"/>
-          </a:p>
-          <a:p>
-            <a:pPr marL="393192" lvl="1" indent="0">
-              <a:buNone/>
-            </a:pPr>
-            <a:endParaRPr lang="en-US" i="1" dirty="0" smtClean="0"/>
-          </a:p>
-        </p:txBody>
-      </p:sp>
-      <p:sp>
-        <p:nvSpPr>
-          <p:cNvPr id="3" name="Title 2"/>
-          <p:cNvSpPr>
-            <a:spLocks noGrp="1"/>
-          </p:cNvSpPr>
-          <p:nvPr>
-            <p:ph type="title"/>
-          </p:nvPr>
-        </p:nvSpPr>
-        <p:spPr/>
-        <p:txBody>
-          <a:bodyPr/>
-          <a:lstStyle/>
-          <a:p>
-            <a:r>
-              <a:rPr lang="en-US" dirty="0" smtClean="0"/>
-              <a:t>Results</a:t>
-            </a:r>
-            <a:endParaRPr lang="en-US" dirty="0"/>
-          </a:p>
-        </p:txBody>
-      </p:sp>
-    </p:spTree>
-    <p:extLst>
-      <p:ext uri="{BB962C8B-B14F-4D97-AF65-F5344CB8AC3E}">
-        <p14:creationId xmlns:p14="http://schemas.microsoft.com/office/powerpoint/2010/main" val="2077121703"/>
       </p:ext>
     </p:extLst>
   </p:cSld>

</xml_diff>

<commit_message>
Apparently the document wasn't saved when I committed...
</commit_message>
<xml_diff>
--- a/documents/830_Presentation_Fasburg_Thomas_Reiff.pptx
+++ b/documents/830_Presentation_Fasburg_Thomas_Reiff.pptx
@@ -13093,10 +13093,10 @@
           <a:lstStyle/>
           <a:p>
             <a:r>
-              <a:rPr lang="en-US" smtClean="0"/>
+              <a:rPr lang="en-US" dirty="0" smtClean="0"/>
               <a:t>Image Database</a:t>
             </a:r>
-            <a:endParaRPr lang="en-US"/>
+            <a:endParaRPr lang="en-US" dirty="0"/>
           </a:p>
         </p:txBody>
       </p:sp>

</xml_diff>

<commit_message>
fixed test in PP
</commit_message>
<xml_diff>
--- a/documents/830_Presentation_Fasburg_Thomas_Reiff.pptx
+++ b/documents/830_Presentation_Fasburg_Thomas_Reiff.pptx
@@ -5,10 +5,10 @@
     <p:sldMasterId id="2147483761" r:id="rId1"/>
   </p:sldMasterIdLst>
   <p:notesMasterIdLst>
-    <p:notesMasterId r:id="rId16"/>
+    <p:notesMasterId r:id="rId17"/>
   </p:notesMasterIdLst>
   <p:handoutMasterIdLst>
-    <p:handoutMasterId r:id="rId17"/>
+    <p:handoutMasterId r:id="rId18"/>
   </p:handoutMasterIdLst>
   <p:sldIdLst>
     <p:sldId id="256" r:id="rId2"/>
@@ -19,12 +19,13 @@
     <p:sldId id="299" r:id="rId7"/>
     <p:sldId id="300" r:id="rId8"/>
     <p:sldId id="295" r:id="rId9"/>
-    <p:sldId id="296" r:id="rId10"/>
-    <p:sldId id="305" r:id="rId11"/>
-    <p:sldId id="280" r:id="rId12"/>
-    <p:sldId id="303" r:id="rId13"/>
-    <p:sldId id="304" r:id="rId14"/>
-    <p:sldId id="292" r:id="rId15"/>
+    <p:sldId id="306" r:id="rId10"/>
+    <p:sldId id="296" r:id="rId11"/>
+    <p:sldId id="305" r:id="rId12"/>
+    <p:sldId id="280" r:id="rId13"/>
+    <p:sldId id="303" r:id="rId14"/>
+    <p:sldId id="304" r:id="rId15"/>
+    <p:sldId id="292" r:id="rId16"/>
   </p:sldIdLst>
   <p:sldSz cx="9144000" cy="6858000" type="screen4x3"/>
   <p:notesSz cx="9144000" cy="6858000"/>
@@ -1659,14 +1660,23 @@
         <a:p>
           <a:pPr rtl="0"/>
           <a:r>
-            <a:rPr lang="en-US" dirty="0" smtClean="0"/>
+            <a:rPr lang="en-US" dirty="0" smtClean="0">
+              <a:latin typeface="Arial" panose="020B0604020202020204" pitchFamily="34" charset="0"/>
+              <a:cs typeface="Arial" panose="020B0604020202020204" pitchFamily="34" charset="0"/>
+            </a:rPr>
             <a:t>Use R, B, or G as gray image based on largest </a:t>
           </a:r>
           <a:r>
-            <a:rPr lang="el-GR" dirty="0" smtClean="0"/>
+            <a:rPr lang="el-GR" dirty="0" smtClean="0">
+              <a:latin typeface="Arial" panose="020B0604020202020204" pitchFamily="34" charset="0"/>
+              <a:cs typeface="Arial" panose="020B0604020202020204" pitchFamily="34" charset="0"/>
+            </a:rPr>
             <a:t>σ</a:t>
           </a:r>
-          <a:endParaRPr lang="en-US" dirty="0"/>
+          <a:endParaRPr lang="en-US" dirty="0">
+            <a:latin typeface="Arial" panose="020B0604020202020204" pitchFamily="34" charset="0"/>
+            <a:cs typeface="Arial" panose="020B0604020202020204" pitchFamily="34" charset="0"/>
+          </a:endParaRPr>
         </a:p>
       </dgm:t>
     </dgm:pt>
@@ -1701,10 +1711,16 @@
         <a:p>
           <a:pPr rtl="0"/>
           <a:r>
-            <a:rPr lang="en-US" dirty="0" smtClean="0"/>
+            <a:rPr lang="en-US" dirty="0" smtClean="0">
+              <a:latin typeface="Arial" panose="020B0604020202020204" pitchFamily="34" charset="0"/>
+              <a:cs typeface="Arial" panose="020B0604020202020204" pitchFamily="34" charset="0"/>
+            </a:rPr>
             <a:t>Create intensity histogram H, and smooth</a:t>
           </a:r>
-          <a:endParaRPr lang="en-US" dirty="0"/>
+          <a:endParaRPr lang="en-US" dirty="0">
+            <a:latin typeface="Arial" panose="020B0604020202020204" pitchFamily="34" charset="0"/>
+            <a:cs typeface="Arial" panose="020B0604020202020204" pitchFamily="34" charset="0"/>
+          </a:endParaRPr>
         </a:p>
       </dgm:t>
     </dgm:pt>
@@ -1739,10 +1755,16 @@
         <a:p>
           <a:pPr rtl="0"/>
           <a:r>
-            <a:rPr lang="en-US" smtClean="0"/>
+            <a:rPr lang="en-US" dirty="0" smtClean="0">
+              <a:latin typeface="Arial" panose="020B0604020202020204" pitchFamily="34" charset="0"/>
+              <a:cs typeface="Arial" panose="020B0604020202020204" pitchFamily="34" charset="0"/>
+            </a:rPr>
             <a:t>Threshold based on lowest trough in H</a:t>
           </a:r>
-          <a:endParaRPr lang="en-US"/>
+          <a:endParaRPr lang="en-US" dirty="0">
+            <a:latin typeface="Arial" panose="020B0604020202020204" pitchFamily="34" charset="0"/>
+            <a:cs typeface="Arial" panose="020B0604020202020204" pitchFamily="34" charset="0"/>
+          </a:endParaRPr>
         </a:p>
       </dgm:t>
     </dgm:pt>
@@ -1777,34 +1799,58 @@
         <a:p>
           <a:pPr rtl="0"/>
           <a:r>
-            <a:rPr lang="en-US" dirty="0" smtClean="0"/>
+            <a:rPr lang="en-US" dirty="0" smtClean="0">
+              <a:latin typeface="Arial" panose="020B0604020202020204" pitchFamily="34" charset="0"/>
+              <a:cs typeface="Arial" panose="020B0604020202020204" pitchFamily="34" charset="0"/>
+            </a:rPr>
             <a:t>Region with larger </a:t>
           </a:r>
           <a:r>
-            <a:rPr lang="el-GR" dirty="0" smtClean="0"/>
+            <a:rPr lang="el-GR" dirty="0" smtClean="0">
+              <a:latin typeface="Arial" panose="020B0604020202020204" pitchFamily="34" charset="0"/>
+              <a:cs typeface="Arial" panose="020B0604020202020204" pitchFamily="34" charset="0"/>
+            </a:rPr>
             <a:t>μ</a:t>
           </a:r>
           <a:r>
-            <a:rPr lang="en-US" baseline="-25000" dirty="0" err="1" smtClean="0"/>
+            <a:rPr lang="en-US" baseline="-25000" dirty="0" err="1" smtClean="0">
+              <a:latin typeface="Arial" panose="020B0604020202020204" pitchFamily="34" charset="0"/>
+              <a:cs typeface="Arial" panose="020B0604020202020204" pitchFamily="34" charset="0"/>
+            </a:rPr>
             <a:t>rr</a:t>
           </a:r>
           <a:r>
-            <a:rPr lang="en-US" dirty="0" smtClean="0"/>
+            <a:rPr lang="en-US" dirty="0" smtClean="0">
+              <a:latin typeface="Arial" panose="020B0604020202020204" pitchFamily="34" charset="0"/>
+              <a:cs typeface="Arial" panose="020B0604020202020204" pitchFamily="34" charset="0"/>
+            </a:rPr>
             <a:t> + </a:t>
           </a:r>
           <a:r>
-            <a:rPr lang="el-GR" dirty="0" smtClean="0"/>
+            <a:rPr lang="el-GR" dirty="0" smtClean="0">
+              <a:latin typeface="Arial" panose="020B0604020202020204" pitchFamily="34" charset="0"/>
+              <a:cs typeface="Arial" panose="020B0604020202020204" pitchFamily="34" charset="0"/>
+            </a:rPr>
             <a:t>μ</a:t>
           </a:r>
           <a:r>
-            <a:rPr lang="en-US" baseline="-25000" dirty="0" smtClean="0"/>
+            <a:rPr lang="en-US" baseline="-25000" dirty="0" smtClean="0">
+              <a:latin typeface="Arial" panose="020B0604020202020204" pitchFamily="34" charset="0"/>
+              <a:cs typeface="Arial" panose="020B0604020202020204" pitchFamily="34" charset="0"/>
+            </a:rPr>
             <a:t>cc</a:t>
           </a:r>
           <a:r>
-            <a:rPr lang="en-US" dirty="0" smtClean="0"/>
+            <a:rPr lang="en-US" dirty="0" smtClean="0">
+              <a:latin typeface="Arial" panose="020B0604020202020204" pitchFamily="34" charset="0"/>
+              <a:cs typeface="Arial" panose="020B0604020202020204" pitchFamily="34" charset="0"/>
+            </a:rPr>
             <a:t> is background</a:t>
           </a:r>
-          <a:endParaRPr lang="en-US" dirty="0"/>
+          <a:endParaRPr lang="en-US" dirty="0">
+            <a:latin typeface="Arial" panose="020B0604020202020204" pitchFamily="34" charset="0"/>
+            <a:cs typeface="Arial" panose="020B0604020202020204" pitchFamily="34" charset="0"/>
+          </a:endParaRPr>
         </a:p>
       </dgm:t>
     </dgm:pt>
@@ -2082,10 +2128,16 @@
         <a:p>
           <a:pPr rtl="0"/>
           <a:r>
-            <a:rPr lang="en-US" smtClean="0"/>
+            <a:rPr lang="en-US" smtClean="0">
+              <a:latin typeface="Arial" panose="020B0604020202020204" pitchFamily="34" charset="0"/>
+              <a:cs typeface="Arial" panose="020B0604020202020204" pitchFamily="34" charset="0"/>
+            </a:rPr>
             <a:t>Training</a:t>
           </a:r>
-          <a:endParaRPr lang="en-US"/>
+          <a:endParaRPr lang="en-US">
+            <a:latin typeface="Arial" panose="020B0604020202020204" pitchFamily="34" charset="0"/>
+            <a:cs typeface="Arial" panose="020B0604020202020204" pitchFamily="34" charset="0"/>
+          </a:endParaRPr>
         </a:p>
       </dgm:t>
     </dgm:pt>
@@ -2120,10 +2172,16 @@
         <a:p>
           <a:pPr rtl="0"/>
           <a:r>
-            <a:rPr lang="en-US" smtClean="0"/>
+            <a:rPr lang="en-US" dirty="0" smtClean="0">
+              <a:latin typeface="Arial" panose="020B0604020202020204" pitchFamily="34" charset="0"/>
+              <a:cs typeface="Arial" panose="020B0604020202020204" pitchFamily="34" charset="0"/>
+            </a:rPr>
             <a:t>Find N-dimensional mean of each class</a:t>
           </a:r>
-          <a:endParaRPr lang="en-US"/>
+          <a:endParaRPr lang="en-US" dirty="0">
+            <a:latin typeface="Arial" panose="020B0604020202020204" pitchFamily="34" charset="0"/>
+            <a:cs typeface="Arial" panose="020B0604020202020204" pitchFamily="34" charset="0"/>
+          </a:endParaRPr>
         </a:p>
       </dgm:t>
     </dgm:pt>
@@ -2158,10 +2216,16 @@
         <a:p>
           <a:pPr rtl="0"/>
           <a:r>
-            <a:rPr lang="en-US" smtClean="0"/>
+            <a:rPr lang="en-US" smtClean="0">
+              <a:latin typeface="Arial" panose="020B0604020202020204" pitchFamily="34" charset="0"/>
+              <a:cs typeface="Arial" panose="020B0604020202020204" pitchFamily="34" charset="0"/>
+            </a:rPr>
             <a:t>Testing</a:t>
           </a:r>
-          <a:endParaRPr lang="en-US"/>
+          <a:endParaRPr lang="en-US">
+            <a:latin typeface="Arial" panose="020B0604020202020204" pitchFamily="34" charset="0"/>
+            <a:cs typeface="Arial" panose="020B0604020202020204" pitchFamily="34" charset="0"/>
+          </a:endParaRPr>
         </a:p>
       </dgm:t>
     </dgm:pt>
@@ -2196,10 +2260,16 @@
         <a:p>
           <a:pPr rtl="0"/>
           <a:r>
-            <a:rPr lang="en-US" smtClean="0"/>
+            <a:rPr lang="en-US" smtClean="0">
+              <a:latin typeface="Arial" panose="020B0604020202020204" pitchFamily="34" charset="0"/>
+              <a:cs typeface="Arial" panose="020B0604020202020204" pitchFamily="34" charset="0"/>
+            </a:rPr>
             <a:t>K-Means Clustering</a:t>
           </a:r>
-          <a:endParaRPr lang="en-US"/>
+          <a:endParaRPr lang="en-US">
+            <a:latin typeface="Arial" panose="020B0604020202020204" pitchFamily="34" charset="0"/>
+            <a:cs typeface="Arial" panose="020B0604020202020204" pitchFamily="34" charset="0"/>
+          </a:endParaRPr>
         </a:p>
       </dgm:t>
     </dgm:pt>
@@ -2234,10 +2304,16 @@
         <a:p>
           <a:pPr rtl="0"/>
           <a:r>
-            <a:rPr lang="en-US" smtClean="0"/>
+            <a:rPr lang="en-US" smtClean="0">
+              <a:latin typeface="Arial" panose="020B0604020202020204" pitchFamily="34" charset="0"/>
+              <a:cs typeface="Arial" panose="020B0604020202020204" pitchFamily="34" charset="0"/>
+            </a:rPr>
             <a:t>Dist scaled by std dev of each dimension</a:t>
           </a:r>
-          <a:endParaRPr lang="en-US"/>
+          <a:endParaRPr lang="en-US">
+            <a:latin typeface="Arial" panose="020B0604020202020204" pitchFamily="34" charset="0"/>
+            <a:cs typeface="Arial" panose="020B0604020202020204" pitchFamily="34" charset="0"/>
+          </a:endParaRPr>
         </a:p>
       </dgm:t>
     </dgm:pt>
@@ -2272,10 +2348,23 @@
         <a:p>
           <a:pPr rtl="0"/>
           <a:r>
-            <a:rPr lang="en-US" smtClean="0"/>
-            <a:t>Dist scaled to normalize dimension ranges</a:t>
+            <a:rPr lang="en-US" dirty="0" err="1" smtClean="0">
+              <a:latin typeface="Arial" panose="020B0604020202020204" pitchFamily="34" charset="0"/>
+              <a:cs typeface="Arial" panose="020B0604020202020204" pitchFamily="34" charset="0"/>
+            </a:rPr>
+            <a:t>Dist</a:t>
           </a:r>
-          <a:endParaRPr lang="en-US"/>
+          <a:r>
+            <a:rPr lang="en-US" dirty="0" smtClean="0">
+              <a:latin typeface="Arial" panose="020B0604020202020204" pitchFamily="34" charset="0"/>
+              <a:cs typeface="Arial" panose="020B0604020202020204" pitchFamily="34" charset="0"/>
+            </a:rPr>
+            <a:t> scaled to normalize dimension ranges</a:t>
+          </a:r>
+          <a:endParaRPr lang="en-US" dirty="0">
+            <a:latin typeface="Arial" panose="020B0604020202020204" pitchFamily="34" charset="0"/>
+            <a:cs typeface="Arial" panose="020B0604020202020204" pitchFamily="34" charset="0"/>
+          </a:endParaRPr>
         </a:p>
       </dgm:t>
     </dgm:pt>
@@ -2310,10 +2399,16 @@
         <a:p>
           <a:pPr rtl="0"/>
           <a:r>
-            <a:rPr lang="en-US" smtClean="0"/>
+            <a:rPr lang="en-US" smtClean="0">
+              <a:latin typeface="Arial" panose="020B0604020202020204" pitchFamily="34" charset="0"/>
+              <a:cs typeface="Arial" panose="020B0604020202020204" pitchFamily="34" charset="0"/>
+            </a:rPr>
             <a:t>Manually tuned weights by feature</a:t>
           </a:r>
-          <a:endParaRPr lang="en-US"/>
+          <a:endParaRPr lang="en-US">
+            <a:latin typeface="Arial" panose="020B0604020202020204" pitchFamily="34" charset="0"/>
+            <a:cs typeface="Arial" panose="020B0604020202020204" pitchFamily="34" charset="0"/>
+          </a:endParaRPr>
         </a:p>
       </dgm:t>
     </dgm:pt>
@@ -2348,10 +2443,16 @@
         <a:p>
           <a:pPr rtl="0"/>
           <a:r>
-            <a:rPr lang="en-US" smtClean="0"/>
+            <a:rPr lang="en-US" dirty="0" smtClean="0">
+              <a:latin typeface="Arial" panose="020B0604020202020204" pitchFamily="34" charset="0"/>
+              <a:cs typeface="Arial" panose="020B0604020202020204" pitchFamily="34" charset="0"/>
+            </a:rPr>
             <a:t>More weight to more important features</a:t>
           </a:r>
-          <a:endParaRPr lang="en-US"/>
+          <a:endParaRPr lang="en-US" dirty="0">
+            <a:latin typeface="Arial" panose="020B0604020202020204" pitchFamily="34" charset="0"/>
+            <a:cs typeface="Arial" panose="020B0604020202020204" pitchFamily="34" charset="0"/>
+          </a:endParaRPr>
         </a:p>
       </dgm:t>
     </dgm:pt>
@@ -2548,12 +2649,12 @@
         </a:fontRef>
       </dsp:style>
       <dsp:txBody>
-        <a:bodyPr spcFirstLastPara="0" vert="horz" wrap="square" lIns="72390" tIns="72390" rIns="72390" bIns="72390" numCol="1" spcCol="1270" anchor="ctr" anchorCtr="0">
+        <a:bodyPr spcFirstLastPara="0" vert="horz" wrap="square" lIns="76200" tIns="76200" rIns="76200" bIns="76200" numCol="1" spcCol="1270" anchor="ctr" anchorCtr="0">
           <a:noAutofit/>
         </a:bodyPr>
         <a:lstStyle/>
         <a:p>
-          <a:pPr lvl="0" algn="l" defTabSz="844550" rtl="0">
+          <a:pPr lvl="0" algn="l" defTabSz="889000" rtl="0">
             <a:lnSpc>
               <a:spcPct val="90000"/>
             </a:lnSpc>
@@ -2565,14 +2666,23 @@
             </a:spcAft>
           </a:pPr>
           <a:r>
-            <a:rPr lang="en-US" sz="1900" kern="1200" dirty="0" smtClean="0"/>
+            <a:rPr lang="en-US" sz="2000" kern="1200" dirty="0" smtClean="0">
+              <a:latin typeface="Arial" panose="020B0604020202020204" pitchFamily="34" charset="0"/>
+              <a:cs typeface="Arial" panose="020B0604020202020204" pitchFamily="34" charset="0"/>
+            </a:rPr>
             <a:t>Use R, B, or G as gray image based on largest </a:t>
           </a:r>
           <a:r>
-            <a:rPr lang="el-GR" sz="1900" kern="1200" dirty="0" smtClean="0"/>
+            <a:rPr lang="el-GR" sz="2000" kern="1200" dirty="0" smtClean="0">
+              <a:latin typeface="Arial" panose="020B0604020202020204" pitchFamily="34" charset="0"/>
+              <a:cs typeface="Arial" panose="020B0604020202020204" pitchFamily="34" charset="0"/>
+            </a:rPr>
             <a:t>σ</a:t>
           </a:r>
-          <a:endParaRPr lang="en-US" sz="1900" kern="1200" dirty="0"/>
+          <a:endParaRPr lang="en-US" sz="2000" kern="1200" dirty="0">
+            <a:latin typeface="Arial" panose="020B0604020202020204" pitchFamily="34" charset="0"/>
+            <a:cs typeface="Arial" panose="020B0604020202020204" pitchFamily="34" charset="0"/>
+          </a:endParaRPr>
         </a:p>
       </dsp:txBody>
       <dsp:txXfrm>
@@ -2631,12 +2741,12 @@
         </a:fontRef>
       </dsp:style>
       <dsp:txBody>
-        <a:bodyPr spcFirstLastPara="0" vert="horz" wrap="square" lIns="72390" tIns="72390" rIns="72390" bIns="72390" numCol="1" spcCol="1270" anchor="ctr" anchorCtr="0">
+        <a:bodyPr spcFirstLastPara="0" vert="horz" wrap="square" lIns="76200" tIns="76200" rIns="76200" bIns="76200" numCol="1" spcCol="1270" anchor="ctr" anchorCtr="0">
           <a:noAutofit/>
         </a:bodyPr>
         <a:lstStyle/>
         <a:p>
-          <a:pPr lvl="0" algn="l" defTabSz="844550" rtl="0">
+          <a:pPr lvl="0" algn="l" defTabSz="889000" rtl="0">
             <a:lnSpc>
               <a:spcPct val="90000"/>
             </a:lnSpc>
@@ -2648,10 +2758,16 @@
             </a:spcAft>
           </a:pPr>
           <a:r>
-            <a:rPr lang="en-US" sz="1900" kern="1200" dirty="0" smtClean="0"/>
+            <a:rPr lang="en-US" sz="2000" kern="1200" dirty="0" smtClean="0">
+              <a:latin typeface="Arial" panose="020B0604020202020204" pitchFamily="34" charset="0"/>
+              <a:cs typeface="Arial" panose="020B0604020202020204" pitchFamily="34" charset="0"/>
+            </a:rPr>
             <a:t>Create intensity histogram H, and smooth</a:t>
           </a:r>
-          <a:endParaRPr lang="en-US" sz="1900" kern="1200" dirty="0"/>
+          <a:endParaRPr lang="en-US" sz="2000" kern="1200" dirty="0">
+            <a:latin typeface="Arial" panose="020B0604020202020204" pitchFamily="34" charset="0"/>
+            <a:cs typeface="Arial" panose="020B0604020202020204" pitchFamily="34" charset="0"/>
+          </a:endParaRPr>
         </a:p>
       </dsp:txBody>
       <dsp:txXfrm>
@@ -2710,12 +2826,12 @@
         </a:fontRef>
       </dsp:style>
       <dsp:txBody>
-        <a:bodyPr spcFirstLastPara="0" vert="horz" wrap="square" lIns="72390" tIns="72390" rIns="72390" bIns="72390" numCol="1" spcCol="1270" anchor="ctr" anchorCtr="0">
+        <a:bodyPr spcFirstLastPara="0" vert="horz" wrap="square" lIns="76200" tIns="76200" rIns="76200" bIns="76200" numCol="1" spcCol="1270" anchor="ctr" anchorCtr="0">
           <a:noAutofit/>
         </a:bodyPr>
         <a:lstStyle/>
         <a:p>
-          <a:pPr lvl="0" algn="l" defTabSz="844550" rtl="0">
+          <a:pPr lvl="0" algn="l" defTabSz="889000" rtl="0">
             <a:lnSpc>
               <a:spcPct val="90000"/>
             </a:lnSpc>
@@ -2727,10 +2843,16 @@
             </a:spcAft>
           </a:pPr>
           <a:r>
-            <a:rPr lang="en-US" sz="1900" kern="1200" smtClean="0"/>
+            <a:rPr lang="en-US" sz="2000" kern="1200" dirty="0" smtClean="0">
+              <a:latin typeface="Arial" panose="020B0604020202020204" pitchFamily="34" charset="0"/>
+              <a:cs typeface="Arial" panose="020B0604020202020204" pitchFamily="34" charset="0"/>
+            </a:rPr>
             <a:t>Threshold based on lowest trough in H</a:t>
           </a:r>
-          <a:endParaRPr lang="en-US" sz="1900" kern="1200"/>
+          <a:endParaRPr lang="en-US" sz="2000" kern="1200" dirty="0">
+            <a:latin typeface="Arial" panose="020B0604020202020204" pitchFamily="34" charset="0"/>
+            <a:cs typeface="Arial" panose="020B0604020202020204" pitchFamily="34" charset="0"/>
+          </a:endParaRPr>
         </a:p>
       </dsp:txBody>
       <dsp:txXfrm>
@@ -2789,12 +2911,12 @@
         </a:fontRef>
       </dsp:style>
       <dsp:txBody>
-        <a:bodyPr spcFirstLastPara="0" vert="horz" wrap="square" lIns="72390" tIns="72390" rIns="72390" bIns="72390" numCol="1" spcCol="1270" anchor="ctr" anchorCtr="0">
+        <a:bodyPr spcFirstLastPara="0" vert="horz" wrap="square" lIns="76200" tIns="76200" rIns="76200" bIns="76200" numCol="1" spcCol="1270" anchor="ctr" anchorCtr="0">
           <a:noAutofit/>
         </a:bodyPr>
         <a:lstStyle/>
         <a:p>
-          <a:pPr lvl="0" algn="l" defTabSz="844550" rtl="0">
+          <a:pPr lvl="0" algn="l" defTabSz="889000" rtl="0">
             <a:lnSpc>
               <a:spcPct val="90000"/>
             </a:lnSpc>
@@ -2806,34 +2928,58 @@
             </a:spcAft>
           </a:pPr>
           <a:r>
-            <a:rPr lang="en-US" sz="1900" kern="1200" dirty="0" smtClean="0"/>
+            <a:rPr lang="en-US" sz="2000" kern="1200" dirty="0" smtClean="0">
+              <a:latin typeface="Arial" panose="020B0604020202020204" pitchFamily="34" charset="0"/>
+              <a:cs typeface="Arial" panose="020B0604020202020204" pitchFamily="34" charset="0"/>
+            </a:rPr>
             <a:t>Region with larger </a:t>
           </a:r>
           <a:r>
-            <a:rPr lang="el-GR" sz="1900" kern="1200" dirty="0" smtClean="0"/>
+            <a:rPr lang="el-GR" sz="2000" kern="1200" dirty="0" smtClean="0">
+              <a:latin typeface="Arial" panose="020B0604020202020204" pitchFamily="34" charset="0"/>
+              <a:cs typeface="Arial" panose="020B0604020202020204" pitchFamily="34" charset="0"/>
+            </a:rPr>
             <a:t>μ</a:t>
           </a:r>
           <a:r>
-            <a:rPr lang="en-US" sz="1900" kern="1200" baseline="-25000" dirty="0" err="1" smtClean="0"/>
+            <a:rPr lang="en-US" sz="2000" kern="1200" baseline="-25000" dirty="0" err="1" smtClean="0">
+              <a:latin typeface="Arial" panose="020B0604020202020204" pitchFamily="34" charset="0"/>
+              <a:cs typeface="Arial" panose="020B0604020202020204" pitchFamily="34" charset="0"/>
+            </a:rPr>
             <a:t>rr</a:t>
           </a:r>
           <a:r>
-            <a:rPr lang="en-US" sz="1900" kern="1200" dirty="0" smtClean="0"/>
+            <a:rPr lang="en-US" sz="2000" kern="1200" dirty="0" smtClean="0">
+              <a:latin typeface="Arial" panose="020B0604020202020204" pitchFamily="34" charset="0"/>
+              <a:cs typeface="Arial" panose="020B0604020202020204" pitchFamily="34" charset="0"/>
+            </a:rPr>
             <a:t> + </a:t>
           </a:r>
           <a:r>
-            <a:rPr lang="el-GR" sz="1900" kern="1200" dirty="0" smtClean="0"/>
+            <a:rPr lang="el-GR" sz="2000" kern="1200" dirty="0" smtClean="0">
+              <a:latin typeface="Arial" panose="020B0604020202020204" pitchFamily="34" charset="0"/>
+              <a:cs typeface="Arial" panose="020B0604020202020204" pitchFamily="34" charset="0"/>
+            </a:rPr>
             <a:t>μ</a:t>
           </a:r>
           <a:r>
-            <a:rPr lang="en-US" sz="1900" kern="1200" baseline="-25000" dirty="0" smtClean="0"/>
+            <a:rPr lang="en-US" sz="2000" kern="1200" baseline="-25000" dirty="0" smtClean="0">
+              <a:latin typeface="Arial" panose="020B0604020202020204" pitchFamily="34" charset="0"/>
+              <a:cs typeface="Arial" panose="020B0604020202020204" pitchFamily="34" charset="0"/>
+            </a:rPr>
             <a:t>cc</a:t>
           </a:r>
           <a:r>
-            <a:rPr lang="en-US" sz="1900" kern="1200" dirty="0" smtClean="0"/>
+            <a:rPr lang="en-US" sz="2000" kern="1200" dirty="0" smtClean="0">
+              <a:latin typeface="Arial" panose="020B0604020202020204" pitchFamily="34" charset="0"/>
+              <a:cs typeface="Arial" panose="020B0604020202020204" pitchFamily="34" charset="0"/>
+            </a:rPr>
             <a:t> is background</a:t>
           </a:r>
-          <a:endParaRPr lang="en-US" sz="1900" kern="1200" dirty="0"/>
+          <a:endParaRPr lang="en-US" sz="2000" kern="1200" dirty="0">
+            <a:latin typeface="Arial" panose="020B0604020202020204" pitchFamily="34" charset="0"/>
+            <a:cs typeface="Arial" panose="020B0604020202020204" pitchFamily="34" charset="0"/>
+          </a:endParaRPr>
         </a:p>
       </dsp:txBody>
       <dsp:txXfrm>
@@ -3094,8 +3240,8 @@
       </dsp:nvSpPr>
       <dsp:spPr>
         <a:xfrm>
-          <a:off x="0" y="24906"/>
-          <a:ext cx="8229600" cy="810809"/>
+          <a:off x="0" y="49319"/>
+          <a:ext cx="8229600" cy="818999"/>
         </a:xfrm>
         <a:prstGeom prst="roundRect">
           <a:avLst/>
@@ -3136,12 +3282,12 @@
         </a:fontRef>
       </dsp:style>
       <dsp:txBody>
-        <a:bodyPr spcFirstLastPara="0" vert="horz" wrap="square" lIns="106680" tIns="106680" rIns="106680" bIns="106680" numCol="1" spcCol="1270" anchor="ctr" anchorCtr="0">
+        <a:bodyPr spcFirstLastPara="0" vert="horz" wrap="square" lIns="133350" tIns="133350" rIns="133350" bIns="133350" numCol="1" spcCol="1270" anchor="ctr" anchorCtr="0">
           <a:noAutofit/>
         </a:bodyPr>
         <a:lstStyle/>
         <a:p>
-          <a:pPr lvl="0" algn="l" defTabSz="1244600" rtl="0">
+          <a:pPr lvl="0" algn="l" defTabSz="1555750" rtl="0">
             <a:lnSpc>
               <a:spcPct val="90000"/>
             </a:lnSpc>
@@ -3153,15 +3299,21 @@
             </a:spcAft>
           </a:pPr>
           <a:r>
-            <a:rPr lang="en-US" sz="2800" kern="1200" smtClean="0"/>
+            <a:rPr lang="en-US" sz="3500" kern="1200" smtClean="0">
+              <a:latin typeface="Arial" panose="020B0604020202020204" pitchFamily="34" charset="0"/>
+              <a:cs typeface="Arial" panose="020B0604020202020204" pitchFamily="34" charset="0"/>
+            </a:rPr>
             <a:t>Training</a:t>
           </a:r>
-          <a:endParaRPr lang="en-US" sz="2800" kern="1200"/>
+          <a:endParaRPr lang="en-US" sz="3500" kern="1200">
+            <a:latin typeface="Arial" panose="020B0604020202020204" pitchFamily="34" charset="0"/>
+            <a:cs typeface="Arial" panose="020B0604020202020204" pitchFamily="34" charset="0"/>
+          </a:endParaRPr>
         </a:p>
       </dsp:txBody>
       <dsp:txXfrm>
-        <a:off x="39580" y="64486"/>
-        <a:ext cx="8150440" cy="731649"/>
+        <a:off x="39980" y="89299"/>
+        <a:ext cx="8149640" cy="739039"/>
       </dsp:txXfrm>
     </dsp:sp>
     <dsp:sp modelId="{09BB81D5-4EF3-4B5E-A23A-812D61905779}">
@@ -3171,8 +3323,8 @@
       </dsp:nvSpPr>
       <dsp:spPr>
         <a:xfrm>
-          <a:off x="0" y="835716"/>
-          <a:ext cx="8229600" cy="478170"/>
+          <a:off x="0" y="868319"/>
+          <a:ext cx="8229600" cy="579600"/>
         </a:xfrm>
         <a:prstGeom prst="rect">
           <a:avLst/>
@@ -3196,12 +3348,12 @@
         <a:fontRef idx="minor"/>
       </dsp:style>
       <dsp:txBody>
-        <a:bodyPr spcFirstLastPara="0" vert="horz" wrap="square" lIns="261290" tIns="35560" rIns="199136" bIns="35560" numCol="1" spcCol="1270" anchor="t" anchorCtr="0">
+        <a:bodyPr spcFirstLastPara="0" vert="horz" wrap="square" lIns="261290" tIns="44450" rIns="248920" bIns="44450" numCol="1" spcCol="1270" anchor="t" anchorCtr="0">
           <a:noAutofit/>
         </a:bodyPr>
         <a:lstStyle/>
         <a:p>
-          <a:pPr marL="228600" lvl="1" indent="-228600" algn="l" defTabSz="977900" rtl="0">
+          <a:pPr marL="228600" lvl="1" indent="-228600" algn="l" defTabSz="1200150" rtl="0">
             <a:lnSpc>
               <a:spcPct val="90000"/>
             </a:lnSpc>
@@ -3214,15 +3366,21 @@
             <a:buChar char="••"/>
           </a:pPr>
           <a:r>
-            <a:rPr lang="en-US" sz="2200" kern="1200" smtClean="0"/>
+            <a:rPr lang="en-US" sz="2700" kern="1200" dirty="0" smtClean="0">
+              <a:latin typeface="Arial" panose="020B0604020202020204" pitchFamily="34" charset="0"/>
+              <a:cs typeface="Arial" panose="020B0604020202020204" pitchFamily="34" charset="0"/>
+            </a:rPr>
             <a:t>Find N-dimensional mean of each class</a:t>
           </a:r>
-          <a:endParaRPr lang="en-US" sz="2200" kern="1200"/>
+          <a:endParaRPr lang="en-US" sz="2700" kern="1200" dirty="0">
+            <a:latin typeface="Arial" panose="020B0604020202020204" pitchFamily="34" charset="0"/>
+            <a:cs typeface="Arial" panose="020B0604020202020204" pitchFamily="34" charset="0"/>
+          </a:endParaRPr>
         </a:p>
       </dsp:txBody>
       <dsp:txXfrm>
-        <a:off x="0" y="835716"/>
-        <a:ext cx="8229600" cy="478170"/>
+        <a:off x="0" y="868319"/>
+        <a:ext cx="8229600" cy="579600"/>
       </dsp:txXfrm>
     </dsp:sp>
     <dsp:sp modelId="{ADF7AE22-5AB6-4652-9D04-B2F8740234A9}">
@@ -3232,8 +3390,8 @@
       </dsp:nvSpPr>
       <dsp:spPr>
         <a:xfrm>
-          <a:off x="0" y="1313886"/>
-          <a:ext cx="8229600" cy="810809"/>
+          <a:off x="0" y="1447918"/>
+          <a:ext cx="8229600" cy="818999"/>
         </a:xfrm>
         <a:prstGeom prst="roundRect">
           <a:avLst/>
@@ -3274,12 +3432,12 @@
         </a:fontRef>
       </dsp:style>
       <dsp:txBody>
-        <a:bodyPr spcFirstLastPara="0" vert="horz" wrap="square" lIns="106680" tIns="106680" rIns="106680" bIns="106680" numCol="1" spcCol="1270" anchor="ctr" anchorCtr="0">
+        <a:bodyPr spcFirstLastPara="0" vert="horz" wrap="square" lIns="133350" tIns="133350" rIns="133350" bIns="133350" numCol="1" spcCol="1270" anchor="ctr" anchorCtr="0">
           <a:noAutofit/>
         </a:bodyPr>
         <a:lstStyle/>
         <a:p>
-          <a:pPr lvl="0" algn="l" defTabSz="1244600" rtl="0">
+          <a:pPr lvl="0" algn="l" defTabSz="1555750" rtl="0">
             <a:lnSpc>
               <a:spcPct val="90000"/>
             </a:lnSpc>
@@ -3291,15 +3449,21 @@
             </a:spcAft>
           </a:pPr>
           <a:r>
-            <a:rPr lang="en-US" sz="2800" kern="1200" smtClean="0"/>
+            <a:rPr lang="en-US" sz="3500" kern="1200" smtClean="0">
+              <a:latin typeface="Arial" panose="020B0604020202020204" pitchFamily="34" charset="0"/>
+              <a:cs typeface="Arial" panose="020B0604020202020204" pitchFamily="34" charset="0"/>
+            </a:rPr>
             <a:t>Testing</a:t>
           </a:r>
-          <a:endParaRPr lang="en-US" sz="2800" kern="1200"/>
+          <a:endParaRPr lang="en-US" sz="3500" kern="1200">
+            <a:latin typeface="Arial" panose="020B0604020202020204" pitchFamily="34" charset="0"/>
+            <a:cs typeface="Arial" panose="020B0604020202020204" pitchFamily="34" charset="0"/>
+          </a:endParaRPr>
         </a:p>
       </dsp:txBody>
       <dsp:txXfrm>
-        <a:off x="39580" y="1353466"/>
-        <a:ext cx="8150440" cy="731649"/>
+        <a:off x="39980" y="1487898"/>
+        <a:ext cx="8149640" cy="739039"/>
       </dsp:txXfrm>
     </dsp:sp>
     <dsp:sp modelId="{23655599-5F59-49D3-B74B-3CFA1652679D}">
@@ -3309,8 +3473,8 @@
       </dsp:nvSpPr>
       <dsp:spPr>
         <a:xfrm>
-          <a:off x="0" y="2124696"/>
-          <a:ext cx="8229600" cy="2376360"/>
+          <a:off x="0" y="2266919"/>
+          <a:ext cx="8229600" cy="2209725"/>
         </a:xfrm>
         <a:prstGeom prst="rect">
           <a:avLst/>
@@ -3334,12 +3498,12 @@
         <a:fontRef idx="minor"/>
       </dsp:style>
       <dsp:txBody>
-        <a:bodyPr spcFirstLastPara="0" vert="horz" wrap="square" lIns="261290" tIns="35560" rIns="199136" bIns="35560" numCol="1" spcCol="1270" anchor="t" anchorCtr="0">
+        <a:bodyPr spcFirstLastPara="0" vert="horz" wrap="square" lIns="261290" tIns="44450" rIns="248920" bIns="44450" numCol="1" spcCol="1270" anchor="t" anchorCtr="0">
           <a:noAutofit/>
         </a:bodyPr>
         <a:lstStyle/>
         <a:p>
-          <a:pPr marL="228600" lvl="1" indent="-228600" algn="l" defTabSz="977900" rtl="0">
+          <a:pPr marL="228600" lvl="1" indent="-228600" algn="l" defTabSz="1200150" rtl="0">
             <a:lnSpc>
               <a:spcPct val="90000"/>
             </a:lnSpc>
@@ -3352,13 +3516,19 @@
             <a:buChar char="••"/>
           </a:pPr>
           <a:r>
-            <a:rPr lang="en-US" sz="2200" kern="1200" smtClean="0"/>
+            <a:rPr lang="en-US" sz="2700" kern="1200" smtClean="0">
+              <a:latin typeface="Arial" panose="020B0604020202020204" pitchFamily="34" charset="0"/>
+              <a:cs typeface="Arial" panose="020B0604020202020204" pitchFamily="34" charset="0"/>
+            </a:rPr>
             <a:t>K-Means Clustering</a:t>
           </a:r>
-          <a:endParaRPr lang="en-US" sz="2200" kern="1200"/>
+          <a:endParaRPr lang="en-US" sz="2700" kern="1200">
+            <a:latin typeface="Arial" panose="020B0604020202020204" pitchFamily="34" charset="0"/>
+            <a:cs typeface="Arial" panose="020B0604020202020204" pitchFamily="34" charset="0"/>
+          </a:endParaRPr>
         </a:p>
         <a:p>
-          <a:pPr marL="457200" lvl="2" indent="-228600" algn="l" defTabSz="977900" rtl="0">
+          <a:pPr marL="457200" lvl="2" indent="-228600" algn="l" defTabSz="1200150" rtl="0">
             <a:lnSpc>
               <a:spcPct val="90000"/>
             </a:lnSpc>
@@ -3371,13 +3541,19 @@
             <a:buChar char="••"/>
           </a:pPr>
           <a:r>
-            <a:rPr lang="en-US" sz="2200" kern="1200" smtClean="0"/>
+            <a:rPr lang="en-US" sz="2700" kern="1200" smtClean="0">
+              <a:latin typeface="Arial" panose="020B0604020202020204" pitchFamily="34" charset="0"/>
+              <a:cs typeface="Arial" panose="020B0604020202020204" pitchFamily="34" charset="0"/>
+            </a:rPr>
             <a:t>Dist scaled by std dev of each dimension</a:t>
           </a:r>
-          <a:endParaRPr lang="en-US" sz="2200" kern="1200"/>
+          <a:endParaRPr lang="en-US" sz="2700" kern="1200">
+            <a:latin typeface="Arial" panose="020B0604020202020204" pitchFamily="34" charset="0"/>
+            <a:cs typeface="Arial" panose="020B0604020202020204" pitchFamily="34" charset="0"/>
+          </a:endParaRPr>
         </a:p>
         <a:p>
-          <a:pPr marL="457200" lvl="2" indent="-228600" algn="l" defTabSz="977900" rtl="0">
+          <a:pPr marL="457200" lvl="2" indent="-228600" algn="l" defTabSz="1200150" rtl="0">
             <a:lnSpc>
               <a:spcPct val="90000"/>
             </a:lnSpc>
@@ -3390,13 +3566,26 @@
             <a:buChar char="••"/>
           </a:pPr>
           <a:r>
-            <a:rPr lang="en-US" sz="2200" kern="1200" smtClean="0"/>
-            <a:t>Dist scaled to normalize dimension ranges</a:t>
+            <a:rPr lang="en-US" sz="2700" kern="1200" dirty="0" err="1" smtClean="0">
+              <a:latin typeface="Arial" panose="020B0604020202020204" pitchFamily="34" charset="0"/>
+              <a:cs typeface="Arial" panose="020B0604020202020204" pitchFamily="34" charset="0"/>
+            </a:rPr>
+            <a:t>Dist</a:t>
           </a:r>
-          <a:endParaRPr lang="en-US" sz="2200" kern="1200"/>
+          <a:r>
+            <a:rPr lang="en-US" sz="2700" kern="1200" dirty="0" smtClean="0">
+              <a:latin typeface="Arial" panose="020B0604020202020204" pitchFamily="34" charset="0"/>
+              <a:cs typeface="Arial" panose="020B0604020202020204" pitchFamily="34" charset="0"/>
+            </a:rPr>
+            <a:t> scaled to normalize dimension ranges</a:t>
+          </a:r>
+          <a:endParaRPr lang="en-US" sz="2700" kern="1200" dirty="0">
+            <a:latin typeface="Arial" panose="020B0604020202020204" pitchFamily="34" charset="0"/>
+            <a:cs typeface="Arial" panose="020B0604020202020204" pitchFamily="34" charset="0"/>
+          </a:endParaRPr>
         </a:p>
         <a:p>
-          <a:pPr marL="228600" lvl="1" indent="-228600" algn="l" defTabSz="977900" rtl="0">
+          <a:pPr marL="228600" lvl="1" indent="-228600" algn="l" defTabSz="1200150" rtl="0">
             <a:lnSpc>
               <a:spcPct val="90000"/>
             </a:lnSpc>
@@ -3409,13 +3598,19 @@
             <a:buChar char="••"/>
           </a:pPr>
           <a:r>
-            <a:rPr lang="en-US" sz="2200" kern="1200" smtClean="0"/>
+            <a:rPr lang="en-US" sz="2700" kern="1200" smtClean="0">
+              <a:latin typeface="Arial" panose="020B0604020202020204" pitchFamily="34" charset="0"/>
+              <a:cs typeface="Arial" panose="020B0604020202020204" pitchFamily="34" charset="0"/>
+            </a:rPr>
             <a:t>Manually tuned weights by feature</a:t>
           </a:r>
-          <a:endParaRPr lang="en-US" sz="2200" kern="1200"/>
+          <a:endParaRPr lang="en-US" sz="2700" kern="1200">
+            <a:latin typeface="Arial" panose="020B0604020202020204" pitchFamily="34" charset="0"/>
+            <a:cs typeface="Arial" panose="020B0604020202020204" pitchFamily="34" charset="0"/>
+          </a:endParaRPr>
         </a:p>
         <a:p>
-          <a:pPr marL="457200" lvl="2" indent="-228600" algn="l" defTabSz="977900" rtl="0">
+          <a:pPr marL="457200" lvl="2" indent="-228600" algn="l" defTabSz="1200150" rtl="0">
             <a:lnSpc>
               <a:spcPct val="90000"/>
             </a:lnSpc>
@@ -3428,15 +3623,21 @@
             <a:buChar char="••"/>
           </a:pPr>
           <a:r>
-            <a:rPr lang="en-US" sz="2200" kern="1200" smtClean="0"/>
+            <a:rPr lang="en-US" sz="2700" kern="1200" dirty="0" smtClean="0">
+              <a:latin typeface="Arial" panose="020B0604020202020204" pitchFamily="34" charset="0"/>
+              <a:cs typeface="Arial" panose="020B0604020202020204" pitchFamily="34" charset="0"/>
+            </a:rPr>
             <a:t>More weight to more important features</a:t>
           </a:r>
-          <a:endParaRPr lang="en-US" sz="2200" kern="1200"/>
+          <a:endParaRPr lang="en-US" sz="2700" kern="1200" dirty="0">
+            <a:latin typeface="Arial" panose="020B0604020202020204" pitchFamily="34" charset="0"/>
+            <a:cs typeface="Arial" panose="020B0604020202020204" pitchFamily="34" charset="0"/>
+          </a:endParaRPr>
         </a:p>
       </dsp:txBody>
       <dsp:txXfrm>
-        <a:off x="0" y="2124696"/>
-        <a:ext cx="8229600" cy="2376360"/>
+        <a:off x="0" y="2266919"/>
+        <a:ext cx="8229600" cy="2209725"/>
       </dsp:txXfrm>
     </dsp:sp>
   </dsp:spTree>
@@ -7568,7 +7769,7 @@
           <a:p>
             <a:fld id="{B8B3BC3C-0900-4ACD-9030-5BE6C2442A68}" type="slidenum">
               <a:rPr lang="en-US" smtClean="0"/>
-              <a:t>11</a:t>
+              <a:t>10</a:t>
             </a:fld>
             <a:endParaRPr lang="en-US" dirty="0"/>
           </a:p>
@@ -7577,7 +7778,7 @@
     </p:spTree>
     <p:extLst>
       <p:ext uri="{BB962C8B-B14F-4D97-AF65-F5344CB8AC3E}">
-        <p14:creationId xmlns:p14="http://schemas.microsoft.com/office/powerpoint/2010/main" val="1971904817"/>
+        <p14:creationId xmlns:p14="http://schemas.microsoft.com/office/powerpoint/2010/main" val="3762026629"/>
       </p:ext>
     </p:extLst>
   </p:cSld>
@@ -7631,6 +7832,90 @@
           <a:bodyPr/>
           <a:lstStyle/>
           <a:p>
+            <a:endParaRPr lang="en-US" dirty="0"/>
+          </a:p>
+        </p:txBody>
+      </p:sp>
+      <p:sp>
+        <p:nvSpPr>
+          <p:cNvPr id="4" name="Slide Number Placeholder 3"/>
+          <p:cNvSpPr>
+            <a:spLocks noGrp="1"/>
+          </p:cNvSpPr>
+          <p:nvPr>
+            <p:ph type="sldNum" sz="quarter" idx="10"/>
+          </p:nvPr>
+        </p:nvSpPr>
+        <p:spPr/>
+        <p:txBody>
+          <a:bodyPr/>
+          <a:lstStyle/>
+          <a:p>
+            <a:fld id="{B8B3BC3C-0900-4ACD-9030-5BE6C2442A68}" type="slidenum">
+              <a:rPr lang="en-US" smtClean="0"/>
+              <a:t>12</a:t>
+            </a:fld>
+            <a:endParaRPr lang="en-US" dirty="0"/>
+          </a:p>
+        </p:txBody>
+      </p:sp>
+    </p:spTree>
+    <p:extLst>
+      <p:ext uri="{BB962C8B-B14F-4D97-AF65-F5344CB8AC3E}">
+        <p14:creationId xmlns:p14="http://schemas.microsoft.com/office/powerpoint/2010/main" val="1971904817"/>
+      </p:ext>
+    </p:extLst>
+  </p:cSld>
+  <p:clrMapOvr>
+    <a:masterClrMapping/>
+  </p:clrMapOvr>
+</p:notes>
+</file>
+
+<file path=ppt/notesSlides/notesSlide12.xml><?xml version="1.0" encoding="utf-8"?>
+<p:notes xmlns:a="http://schemas.openxmlformats.org/drawingml/2006/main" xmlns:r="http://schemas.openxmlformats.org/officeDocument/2006/relationships" xmlns:p="http://schemas.openxmlformats.org/presentationml/2006/main">
+  <p:cSld>
+    <p:spTree>
+      <p:nvGrpSpPr>
+        <p:cNvPr id="1" name=""/>
+        <p:cNvGrpSpPr/>
+        <p:nvPr/>
+      </p:nvGrpSpPr>
+      <p:grpSpPr>
+        <a:xfrm>
+          <a:off x="0" y="0"/>
+          <a:ext cx="0" cy="0"/>
+          <a:chOff x="0" y="0"/>
+          <a:chExt cx="0" cy="0"/>
+        </a:xfrm>
+      </p:grpSpPr>
+      <p:sp>
+        <p:nvSpPr>
+          <p:cNvPr id="2" name="Slide Image Placeholder 1"/>
+          <p:cNvSpPr>
+            <a:spLocks noGrp="1" noRot="1" noChangeAspect="1"/>
+          </p:cNvSpPr>
+          <p:nvPr>
+            <p:ph type="sldImg"/>
+          </p:nvPr>
+        </p:nvSpPr>
+        <p:spPr/>
+      </p:sp>
+      <p:sp>
+        <p:nvSpPr>
+          <p:cNvPr id="3" name="Notes Placeholder 2"/>
+          <p:cNvSpPr>
+            <a:spLocks noGrp="1"/>
+          </p:cNvSpPr>
+          <p:nvPr>
+            <p:ph type="body" idx="1"/>
+          </p:nvPr>
+        </p:nvSpPr>
+        <p:spPr/>
+        <p:txBody>
+          <a:bodyPr/>
+          <a:lstStyle/>
+          <a:p>
             <a:pPr marL="171450" indent="-171450">
               <a:buFont typeface="Arial" panose="020B0604020202020204" pitchFamily="34" charset="0"/>
               <a:buChar char="•"/>
@@ -7678,7 +7963,7 @@
           <a:p>
             <a:fld id="{B8B3BC3C-0900-4ACD-9030-5BE6C2442A68}" type="slidenum">
               <a:rPr lang="en-US" smtClean="0"/>
-              <a:t>13</a:t>
+              <a:t>14</a:t>
             </a:fld>
             <a:endParaRPr lang="en-US" dirty="0"/>
           </a:p>
@@ -12971,10 +13256,16 @@
           <a:p>
             <a:pPr algn="ctr"/>
             <a:r>
-              <a:rPr lang="en-US" sz="2800" dirty="0" smtClean="0"/>
+              <a:rPr lang="en-US" sz="2800" dirty="0" smtClean="0">
+                <a:latin typeface="Arial" panose="020B0604020202020204" pitchFamily="34" charset="0"/>
+                <a:cs typeface="Arial" panose="020B0604020202020204" pitchFamily="34" charset="0"/>
+              </a:rPr>
               <a:t>CSE 803: Meal Recognition Project</a:t>
             </a:r>
-            <a:endParaRPr lang="en-US" sz="2800" dirty="0"/>
+            <a:endParaRPr lang="en-US" sz="2800" dirty="0">
+              <a:latin typeface="Arial" panose="020B0604020202020204" pitchFamily="34" charset="0"/>
+              <a:cs typeface="Arial" panose="020B0604020202020204" pitchFamily="34" charset="0"/>
+            </a:endParaRPr>
           </a:p>
         </p:txBody>
       </p:sp>
@@ -13000,24 +13291,56 @@
           </a:bodyPr>
           <a:lstStyle/>
           <a:p>
-            <a:pPr algn="l"/>
+            <a:pPr algn="ctr"/>
             <a:r>
-              <a:rPr lang="en-US" sz="2000" dirty="0" smtClean="0"/>
+              <a:rPr lang="en-US" sz="2000" dirty="0" smtClean="0">
+                <a:latin typeface="Arial" panose="020B0604020202020204" pitchFamily="34" charset="0"/>
+                <a:cs typeface="Arial" panose="020B0604020202020204" pitchFamily="34" charset="0"/>
+              </a:rPr>
               <a:t>Presentation by: Vince </a:t>
             </a:r>
             <a:r>
-              <a:rPr lang="en-US" sz="2000" dirty="0" smtClean="0"/>
+              <a:rPr lang="en-US" sz="2000" dirty="0" smtClean="0">
+                <a:latin typeface="Arial" panose="020B0604020202020204" pitchFamily="34" charset="0"/>
+                <a:cs typeface="Arial" panose="020B0604020202020204" pitchFamily="34" charset="0"/>
+              </a:rPr>
               <a:t>Fasburg, </a:t>
             </a:r>
             <a:r>
-              <a:rPr lang="en-US" sz="2000" dirty="0" smtClean="0"/>
+              <a:rPr lang="en-US" sz="2000" dirty="0" smtClean="0">
+                <a:latin typeface="Arial" panose="020B0604020202020204" pitchFamily="34" charset="0"/>
+                <a:cs typeface="Arial" panose="020B0604020202020204" pitchFamily="34" charset="0"/>
+              </a:rPr>
               <a:t>Bonnie </a:t>
             </a:r>
             <a:r>
-              <a:rPr lang="en-US" sz="2000" dirty="0" smtClean="0"/>
+              <a:rPr lang="en-US" sz="2000" dirty="0" smtClean="0">
+                <a:latin typeface="Arial" panose="020B0604020202020204" pitchFamily="34" charset="0"/>
+                <a:cs typeface="Arial" panose="020B0604020202020204" pitchFamily="34" charset="0"/>
+              </a:rPr>
               <a:t>Reiff, and Josh Thomas</a:t>
             </a:r>
-            <a:endParaRPr lang="en-US" sz="2000" dirty="0"/>
+          </a:p>
+          <a:p>
+            <a:pPr algn="ctr"/>
+            <a:endParaRPr lang="en-US" sz="2000" dirty="0">
+              <a:latin typeface="Arial" panose="020B0604020202020204" pitchFamily="34" charset="0"/>
+              <a:cs typeface="Arial" panose="020B0604020202020204" pitchFamily="34" charset="0"/>
+            </a:endParaRPr>
+          </a:p>
+          <a:p>
+            <a:pPr algn="ctr"/>
+            <a:r>
+              <a:rPr lang="en-US" sz="2000" dirty="0" smtClean="0">
+                <a:latin typeface="Arial" panose="020B0604020202020204" pitchFamily="34" charset="0"/>
+                <a:cs typeface="Arial" panose="020B0604020202020204" pitchFamily="34" charset="0"/>
+              </a:rPr>
+              <a:t>December 7, 2015</a:t>
+            </a:r>
+            <a:endParaRPr lang="en-US" sz="2000" dirty="0">
+              <a:latin typeface="Arial" panose="020B0604020202020204" pitchFamily="34" charset="0"/>
+              <a:cs typeface="Arial" panose="020B0604020202020204" pitchFamily="34" charset="0"/>
+            </a:endParaRPr>
           </a:p>
         </p:txBody>
       </p:sp>
@@ -13058,6 +13381,97 @@
           <a:chExt cx="0" cy="0"/>
         </a:xfrm>
       </p:grpSpPr>
+      <p:graphicFrame>
+        <p:nvGraphicFramePr>
+          <p:cNvPr id="4" name="Content Placeholder 3"/>
+          <p:cNvGraphicFramePr>
+            <a:graphicFrameLocks noGrp="1"/>
+          </p:cNvGraphicFramePr>
+          <p:nvPr>
+            <p:ph idx="1"/>
+            <p:extLst>
+              <p:ext uri="{D42A27DB-BD31-4B8C-83A1-F6EECF244321}">
+                <p14:modId xmlns:p14="http://schemas.microsoft.com/office/powerpoint/2010/main" val="2290513897"/>
+              </p:ext>
+            </p:extLst>
+          </p:nvPr>
+        </p:nvGraphicFramePr>
+        <p:xfrm>
+          <a:off x="457200" y="1481328"/>
+          <a:ext cx="8229600" cy="4525963"/>
+        </p:xfrm>
+        <a:graphic>
+          <a:graphicData uri="http://schemas.openxmlformats.org/drawingml/2006/diagram">
+            <dgm:relIds xmlns:dgm="http://schemas.openxmlformats.org/drawingml/2006/diagram" xmlns:r="http://schemas.openxmlformats.org/officeDocument/2006/relationships" r:dm="rId3" r:lo="rId4" r:qs="rId5" r:cs="rId6"/>
+          </a:graphicData>
+        </a:graphic>
+      </p:graphicFrame>
+      <p:sp>
+        <p:nvSpPr>
+          <p:cNvPr id="3" name="Title 2"/>
+          <p:cNvSpPr>
+            <a:spLocks noGrp="1"/>
+          </p:cNvSpPr>
+          <p:nvPr>
+            <p:ph type="title"/>
+          </p:nvPr>
+        </p:nvSpPr>
+        <p:spPr/>
+        <p:txBody>
+          <a:bodyPr/>
+          <a:lstStyle/>
+          <a:p>
+            <a:r>
+              <a:rPr lang="en-US" dirty="0" smtClean="0">
+                <a:latin typeface="Arial" panose="020B0604020202020204" pitchFamily="34" charset="0"/>
+                <a:cs typeface="Arial" panose="020B0604020202020204" pitchFamily="34" charset="0"/>
+              </a:rPr>
+              <a:t>Methods: Classification</a:t>
+            </a:r>
+            <a:endParaRPr lang="en-US" dirty="0">
+              <a:latin typeface="Arial" panose="020B0604020202020204" pitchFamily="34" charset="0"/>
+              <a:cs typeface="Arial" panose="020B0604020202020204" pitchFamily="34" charset="0"/>
+            </a:endParaRPr>
+          </a:p>
+        </p:txBody>
+      </p:sp>
+    </p:spTree>
+    <p:extLst>
+      <p:ext uri="{BB962C8B-B14F-4D97-AF65-F5344CB8AC3E}">
+        <p14:creationId xmlns:p14="http://schemas.microsoft.com/office/powerpoint/2010/main" val="2548635361"/>
+      </p:ext>
+    </p:extLst>
+  </p:cSld>
+  <p:clrMapOvr>
+    <a:masterClrMapping/>
+  </p:clrMapOvr>
+  <p:timing>
+    <p:tnLst>
+      <p:par>
+        <p:cTn id="1" dur="indefinite" restart="never" nodeType="tmRoot"/>
+      </p:par>
+    </p:tnLst>
+  </p:timing>
+</p:sld>
+</file>
+
+<file path=ppt/slides/slide11.xml><?xml version="1.0" encoding="utf-8"?>
+<p:sld xmlns:a="http://schemas.openxmlformats.org/drawingml/2006/main" xmlns:r="http://schemas.openxmlformats.org/officeDocument/2006/relationships" xmlns:p="http://schemas.openxmlformats.org/presentationml/2006/main">
+  <p:cSld>
+    <p:spTree>
+      <p:nvGrpSpPr>
+        <p:cNvPr id="1" name=""/>
+        <p:cNvGrpSpPr/>
+        <p:nvPr/>
+      </p:nvGrpSpPr>
+      <p:grpSpPr>
+        <a:xfrm>
+          <a:off x="0" y="0"/>
+          <a:ext cx="0" cy="0"/>
+          <a:chOff x="0" y="0"/>
+          <a:chExt cx="0" cy="0"/>
+        </a:xfrm>
+      </p:grpSpPr>
       <p:sp>
         <p:nvSpPr>
           <p:cNvPr id="2" name="Content Placeholder 1"/>
@@ -13076,47 +13490,83 @@
           <a:lstStyle/>
           <a:p>
             <a:r>
-              <a:rPr lang="en-US" sz="2300" dirty="0" smtClean="0"/>
+              <a:rPr lang="en-US" sz="2300" dirty="0" smtClean="0">
+                <a:latin typeface="Arial" panose="020B0604020202020204" pitchFamily="34" charset="0"/>
+                <a:cs typeface="Arial" panose="020B0604020202020204" pitchFamily="34" charset="0"/>
+              </a:rPr>
               <a:t>Images from Google Image search and image-net.org</a:t>
             </a:r>
-            <a:endParaRPr lang="en-US" sz="2300" dirty="0"/>
+            <a:endParaRPr lang="en-US" sz="2300" dirty="0">
+              <a:latin typeface="Arial" panose="020B0604020202020204" pitchFamily="34" charset="0"/>
+              <a:cs typeface="Arial" panose="020B0604020202020204" pitchFamily="34" charset="0"/>
+            </a:endParaRPr>
           </a:p>
           <a:p>
             <a:r>
-              <a:rPr lang="en-US" sz="2300" dirty="0" smtClean="0"/>
+              <a:rPr lang="en-US" sz="2300" dirty="0" smtClean="0">
+                <a:latin typeface="Arial" panose="020B0604020202020204" pitchFamily="34" charset="0"/>
+                <a:cs typeface="Arial" panose="020B0604020202020204" pitchFamily="34" charset="0"/>
+              </a:rPr>
               <a:t>Training Images – Simple backgrounds to ensure features of objects were captured well</a:t>
             </a:r>
           </a:p>
           <a:p>
             <a:pPr lvl="1"/>
             <a:r>
-              <a:rPr lang="en-US" sz="1900" dirty="0" smtClean="0"/>
+              <a:rPr lang="en-US" sz="1900" dirty="0" smtClean="0">
+                <a:latin typeface="Arial" panose="020B0604020202020204" pitchFamily="34" charset="0"/>
+                <a:cs typeface="Arial" panose="020B0604020202020204" pitchFamily="34" charset="0"/>
+              </a:rPr>
               <a:t>Minimum of 20 images per class</a:t>
             </a:r>
-            <a:endParaRPr lang="en-US" sz="1900" dirty="0" smtClean="0"/>
-          </a:p>
-          <a:p>
-            <a:endParaRPr lang="en-US" sz="2300" dirty="0" smtClean="0"/>
-          </a:p>
-          <a:p>
-            <a:endParaRPr lang="en-US" sz="2300" dirty="0" smtClean="0"/>
-          </a:p>
-          <a:p>
-            <a:endParaRPr lang="en-US" sz="2300" dirty="0"/>
-          </a:p>
-          <a:p>
-            <a:endParaRPr lang="en-US" sz="2300" dirty="0"/>
+            <a:endParaRPr lang="en-US" sz="1900" dirty="0" smtClean="0">
+              <a:latin typeface="Arial" panose="020B0604020202020204" pitchFamily="34" charset="0"/>
+              <a:cs typeface="Arial" panose="020B0604020202020204" pitchFamily="34" charset="0"/>
+            </a:endParaRPr>
+          </a:p>
+          <a:p>
+            <a:endParaRPr lang="en-US" sz="2300" dirty="0" smtClean="0">
+              <a:latin typeface="Arial" panose="020B0604020202020204" pitchFamily="34" charset="0"/>
+              <a:cs typeface="Arial" panose="020B0604020202020204" pitchFamily="34" charset="0"/>
+            </a:endParaRPr>
+          </a:p>
+          <a:p>
+            <a:endParaRPr lang="en-US" sz="2300" dirty="0" smtClean="0">
+              <a:latin typeface="Arial" panose="020B0604020202020204" pitchFamily="34" charset="0"/>
+              <a:cs typeface="Arial" panose="020B0604020202020204" pitchFamily="34" charset="0"/>
+            </a:endParaRPr>
+          </a:p>
+          <a:p>
+            <a:endParaRPr lang="en-US" sz="2300" dirty="0">
+              <a:latin typeface="Arial" panose="020B0604020202020204" pitchFamily="34" charset="0"/>
+              <a:cs typeface="Arial" panose="020B0604020202020204" pitchFamily="34" charset="0"/>
+            </a:endParaRPr>
+          </a:p>
+          <a:p>
+            <a:endParaRPr lang="en-US" sz="2300" dirty="0">
+              <a:latin typeface="Arial" panose="020B0604020202020204" pitchFamily="34" charset="0"/>
+              <a:cs typeface="Arial" panose="020B0604020202020204" pitchFamily="34" charset="0"/>
+            </a:endParaRPr>
           </a:p>
           <a:p>
             <a:r>
-              <a:rPr lang="en-US" sz="2300" dirty="0" smtClean="0"/>
+              <a:rPr lang="en-US" sz="2300" dirty="0" smtClean="0">
+                <a:latin typeface="Arial" panose="020B0604020202020204" pitchFamily="34" charset="0"/>
+                <a:cs typeface="Arial" panose="020B0604020202020204" pitchFamily="34" charset="0"/>
+              </a:rPr>
               <a:t>Testing Images – More complicated backgrounds, shadows, multiple objects, </a:t>
             </a:r>
             <a:r>
-              <a:rPr lang="en-US" sz="2300" dirty="0" err="1" smtClean="0"/>
+              <a:rPr lang="en-US" sz="2300" dirty="0" err="1" smtClean="0">
+                <a:latin typeface="Arial" panose="020B0604020202020204" pitchFamily="34" charset="0"/>
+                <a:cs typeface="Arial" panose="020B0604020202020204" pitchFamily="34" charset="0"/>
+              </a:rPr>
               <a:t>etc</a:t>
             </a:r>
-            <a:endParaRPr lang="en-US" sz="2300" dirty="0"/>
+            <a:endParaRPr lang="en-US" sz="2300" dirty="0">
+              <a:latin typeface="Arial" panose="020B0604020202020204" pitchFamily="34" charset="0"/>
+              <a:cs typeface="Arial" panose="020B0604020202020204" pitchFamily="34" charset="0"/>
+            </a:endParaRPr>
           </a:p>
         </p:txBody>
       </p:sp>
@@ -13136,10 +13586,16 @@
           <a:lstStyle/>
           <a:p>
             <a:r>
-              <a:rPr lang="en-US" dirty="0" smtClean="0"/>
+              <a:rPr lang="en-US" dirty="0" smtClean="0">
+                <a:latin typeface="Arial" panose="020B0604020202020204" pitchFamily="34" charset="0"/>
+                <a:cs typeface="Arial" panose="020B0604020202020204" pitchFamily="34" charset="0"/>
+              </a:rPr>
               <a:t>Image Database</a:t>
             </a:r>
-            <a:endParaRPr lang="en-US" dirty="0"/>
+            <a:endParaRPr lang="en-US" dirty="0">
+              <a:latin typeface="Arial" panose="020B0604020202020204" pitchFamily="34" charset="0"/>
+              <a:cs typeface="Arial" panose="020B0604020202020204" pitchFamily="34" charset="0"/>
+            </a:endParaRPr>
           </a:p>
         </p:txBody>
       </p:sp>
@@ -13495,14 +13951,23 @@
           <a:p>
             <a:pPr algn="ctr"/>
             <a:r>
-              <a:rPr lang="en-US" sz="1400" dirty="0"/>
+              <a:rPr lang="en-US" sz="1400" dirty="0">
+                <a:latin typeface="Arial" panose="020B0604020202020204" pitchFamily="34" charset="0"/>
+                <a:cs typeface="Arial" panose="020B0604020202020204" pitchFamily="34" charset="0"/>
+              </a:rPr>
               <a:t>t</a:t>
             </a:r>
             <a:r>
-              <a:rPr lang="en-US" sz="1400" dirty="0" smtClean="0"/>
+              <a:rPr lang="en-US" sz="1400" dirty="0" smtClean="0">
+                <a:latin typeface="Arial" panose="020B0604020202020204" pitchFamily="34" charset="0"/>
+                <a:cs typeface="Arial" panose="020B0604020202020204" pitchFamily="34" charset="0"/>
+              </a:rPr>
               <a:t>rain_applegreen_4</a:t>
             </a:r>
-            <a:endParaRPr lang="en-US" sz="1400" dirty="0"/>
+            <a:endParaRPr lang="en-US" sz="1400" dirty="0">
+              <a:latin typeface="Arial" panose="020B0604020202020204" pitchFamily="34" charset="0"/>
+              <a:cs typeface="Arial" panose="020B0604020202020204" pitchFamily="34" charset="0"/>
+            </a:endParaRPr>
           </a:p>
         </p:txBody>
       </p:sp>
@@ -13530,10 +13995,16 @@
           <a:p>
             <a:pPr algn="ctr"/>
             <a:r>
-              <a:rPr lang="en-US" sz="1400" dirty="0" smtClean="0"/>
+              <a:rPr lang="en-US" sz="1400" dirty="0" smtClean="0">
+                <a:latin typeface="Arial" panose="020B0604020202020204" pitchFamily="34" charset="0"/>
+                <a:cs typeface="Arial" panose="020B0604020202020204" pitchFamily="34" charset="0"/>
+              </a:rPr>
               <a:t>train_pizza_7</a:t>
             </a:r>
-            <a:endParaRPr lang="en-US" sz="1400" dirty="0"/>
+            <a:endParaRPr lang="en-US" sz="1400" dirty="0">
+              <a:latin typeface="Arial" panose="020B0604020202020204" pitchFamily="34" charset="0"/>
+              <a:cs typeface="Arial" panose="020B0604020202020204" pitchFamily="34" charset="0"/>
+            </a:endParaRPr>
           </a:p>
         </p:txBody>
       </p:sp>
@@ -13561,10 +14032,16 @@
           <a:p>
             <a:pPr algn="ctr"/>
             <a:r>
-              <a:rPr lang="en-US" sz="1400" dirty="0" smtClean="0"/>
+              <a:rPr lang="en-US" sz="1400" dirty="0" smtClean="0">
+                <a:latin typeface="Arial" panose="020B0604020202020204" pitchFamily="34" charset="0"/>
+                <a:cs typeface="Arial" panose="020B0604020202020204" pitchFamily="34" charset="0"/>
+              </a:rPr>
               <a:t>train_banana_19</a:t>
             </a:r>
-            <a:endParaRPr lang="en-US" sz="1400" dirty="0"/>
+            <a:endParaRPr lang="en-US" sz="1400" dirty="0">
+              <a:latin typeface="Arial" panose="020B0604020202020204" pitchFamily="34" charset="0"/>
+              <a:cs typeface="Arial" panose="020B0604020202020204" pitchFamily="34" charset="0"/>
+            </a:endParaRPr>
           </a:p>
         </p:txBody>
       </p:sp>
@@ -13824,10 +14301,17 @@
   <p:clrMapOvr>
     <a:masterClrMapping/>
   </p:clrMapOvr>
+  <p:timing>
+    <p:tnLst>
+      <p:par>
+        <p:cTn id="1" dur="indefinite" restart="never" nodeType="tmRoot"/>
+      </p:par>
+    </p:tnLst>
+  </p:timing>
 </p:sld>
 </file>
 
-<file path=ppt/slides/slide11.xml><?xml version="1.0" encoding="utf-8"?>
+<file path=ppt/slides/slide12.xml><?xml version="1.0" encoding="utf-8"?>
 <p:sld xmlns:a="http://schemas.openxmlformats.org/drawingml/2006/main" xmlns:r="http://schemas.openxmlformats.org/officeDocument/2006/relationships" xmlns:p="http://schemas.openxmlformats.org/presentationml/2006/main">
   <p:cSld>
     <p:spTree>
@@ -13866,19 +14350,28 @@
           </a:bodyPr>
           <a:lstStyle/>
           <a:p>
-            <a:endParaRPr lang="en-US" i="1" dirty="0" smtClean="0"/>
+            <a:endParaRPr lang="en-US" i="1" dirty="0" smtClean="0">
+              <a:latin typeface="Arial" panose="020B0604020202020204" pitchFamily="34" charset="0"/>
+              <a:cs typeface="Arial" panose="020B0604020202020204" pitchFamily="34" charset="0"/>
+            </a:endParaRPr>
           </a:p>
           <a:p>
             <a:pPr marL="393192" lvl="1" indent="0">
               <a:buNone/>
             </a:pPr>
-            <a:endParaRPr lang="en-US" i="1" dirty="0"/>
+            <a:endParaRPr lang="en-US" i="1" dirty="0">
+              <a:latin typeface="Arial" panose="020B0604020202020204" pitchFamily="34" charset="0"/>
+              <a:cs typeface="Arial" panose="020B0604020202020204" pitchFamily="34" charset="0"/>
+            </a:endParaRPr>
           </a:p>
           <a:p>
             <a:pPr marL="393192" lvl="1" indent="0">
               <a:buNone/>
             </a:pPr>
-            <a:endParaRPr lang="en-US" i="1" dirty="0" smtClean="0"/>
+            <a:endParaRPr lang="en-US" i="1" dirty="0" smtClean="0">
+              <a:latin typeface="Arial" panose="020B0604020202020204" pitchFamily="34" charset="0"/>
+              <a:cs typeface="Arial" panose="020B0604020202020204" pitchFamily="34" charset="0"/>
+            </a:endParaRPr>
           </a:p>
         </p:txBody>
       </p:sp>
@@ -13898,10 +14391,16 @@
           <a:lstStyle/>
           <a:p>
             <a:r>
-              <a:rPr lang="en-US" dirty="0" smtClean="0"/>
+              <a:rPr lang="en-US" dirty="0" smtClean="0">
+                <a:latin typeface="Arial" panose="020B0604020202020204" pitchFamily="34" charset="0"/>
+                <a:cs typeface="Arial" panose="020B0604020202020204" pitchFamily="34" charset="0"/>
+              </a:rPr>
               <a:t>Results</a:t>
             </a:r>
-            <a:endParaRPr lang="en-US" dirty="0"/>
+            <a:endParaRPr lang="en-US" dirty="0">
+              <a:latin typeface="Arial" panose="020B0604020202020204" pitchFamily="34" charset="0"/>
+              <a:cs typeface="Arial" panose="020B0604020202020204" pitchFamily="34" charset="0"/>
+            </a:endParaRPr>
           </a:p>
         </p:txBody>
       </p:sp>
@@ -13922,109 +14421,6 @@
       </p:par>
     </p:tnLst>
   </p:timing>
-</p:sld>
-</file>
-
-<file path=ppt/slides/slide12.xml><?xml version="1.0" encoding="utf-8"?>
-<p:sld xmlns:a="http://schemas.openxmlformats.org/drawingml/2006/main" xmlns:r="http://schemas.openxmlformats.org/officeDocument/2006/relationships" xmlns:p="http://schemas.openxmlformats.org/presentationml/2006/main">
-  <p:cSld>
-    <p:spTree>
-      <p:nvGrpSpPr>
-        <p:cNvPr id="1" name=""/>
-        <p:cNvGrpSpPr/>
-        <p:nvPr/>
-      </p:nvGrpSpPr>
-      <p:grpSpPr>
-        <a:xfrm>
-          <a:off x="0" y="0"/>
-          <a:ext cx="0" cy="0"/>
-          <a:chOff x="0" y="0"/>
-          <a:chExt cx="0" cy="0"/>
-        </a:xfrm>
-      </p:grpSpPr>
-      <p:sp>
-        <p:nvSpPr>
-          <p:cNvPr id="2" name="Content Placeholder 1"/>
-          <p:cNvSpPr>
-            <a:spLocks noGrp="1"/>
-          </p:cNvSpPr>
-          <p:nvPr>
-            <p:ph idx="1"/>
-          </p:nvPr>
-        </p:nvSpPr>
-        <p:spPr/>
-        <p:txBody>
-          <a:bodyPr/>
-          <a:lstStyle/>
-          <a:p>
-            <a:r>
-              <a:rPr lang="en-US" dirty="0"/>
-              <a:t>Performance of feature calculations limited by foreground </a:t>
-            </a:r>
-            <a:r>
-              <a:rPr lang="en-US" dirty="0" smtClean="0"/>
-              <a:t>calculations</a:t>
-            </a:r>
-          </a:p>
-          <a:p>
-            <a:endParaRPr lang="en-US" dirty="0"/>
-          </a:p>
-          <a:p>
-            <a:r>
-              <a:rPr lang="en-US" dirty="0" smtClean="0"/>
-              <a:t>Potential to improve the classification system:</a:t>
-            </a:r>
-          </a:p>
-          <a:p>
-            <a:pPr lvl="1"/>
-            <a:r>
-              <a:rPr lang="en-US" dirty="0" smtClean="0"/>
-              <a:t>Decision tree-like structure instead of using means and standard deviations of image classes from training</a:t>
-            </a:r>
-          </a:p>
-          <a:p>
-            <a:pPr lvl="1"/>
-            <a:r>
-              <a:rPr lang="en-US" dirty="0" smtClean="0"/>
-              <a:t>Addition of a reject class</a:t>
-            </a:r>
-            <a:endParaRPr lang="en-US" dirty="0"/>
-          </a:p>
-        </p:txBody>
-      </p:sp>
-      <p:sp>
-        <p:nvSpPr>
-          <p:cNvPr id="3" name="Title 2"/>
-          <p:cNvSpPr>
-            <a:spLocks noGrp="1"/>
-          </p:cNvSpPr>
-          <p:nvPr>
-            <p:ph type="title"/>
-          </p:nvPr>
-        </p:nvSpPr>
-        <p:spPr/>
-        <p:txBody>
-          <a:bodyPr/>
-          <a:lstStyle/>
-          <a:p>
-            <a:r>
-              <a:rPr lang="en-US" dirty="0" smtClean="0"/>
-              <a:t>Limitations and Improvements</a:t>
-            </a:r>
-            <a:endParaRPr lang="en-US" dirty="0"/>
-          </a:p>
-        </p:txBody>
-      </p:sp>
-    </p:spTree>
-    <p:extLst>
-      <p:ext uri="{BB962C8B-B14F-4D97-AF65-F5344CB8AC3E}">
-        <p14:creationId xmlns:p14="http://schemas.microsoft.com/office/powerpoint/2010/main" val="1213478019"/>
-      </p:ext>
-    </p:extLst>
-  </p:cSld>
-  <p:clrMapOvr>
-    <a:masterClrMapping/>
-  </p:clrMapOvr>
 </p:sld>
 </file>
 
@@ -14061,22 +14457,58 @@
           <a:lstStyle/>
           <a:p>
             <a:r>
-              <a:rPr lang="en-US" dirty="0" smtClean="0"/>
-              <a:t>Interactions of various parts of the system need to be tested in addition to testing the parts themselves</a:t>
+              <a:rPr lang="en-US" dirty="0">
+                <a:latin typeface="Arial" panose="020B0604020202020204" pitchFamily="34" charset="0"/>
+                <a:cs typeface="Arial" panose="020B0604020202020204" pitchFamily="34" charset="0"/>
+              </a:rPr>
+              <a:t>Performance of feature calculations limited by foreground </a:t>
             </a:r>
-          </a:p>
-          <a:p>
             <a:r>
-              <a:rPr lang="en-US" dirty="0" smtClean="0"/>
-              <a:t>Importance of the quality of the training and validation system</a:t>
+              <a:rPr lang="en-US" dirty="0" smtClean="0">
+                <a:latin typeface="Arial" panose="020B0604020202020204" pitchFamily="34" charset="0"/>
+                <a:cs typeface="Arial" panose="020B0604020202020204" pitchFamily="34" charset="0"/>
+              </a:rPr>
+              <a:t>calculations</a:t>
             </a:r>
           </a:p>
           <a:p>
+            <a:endParaRPr lang="en-US" dirty="0">
+              <a:latin typeface="Arial" panose="020B0604020202020204" pitchFamily="34" charset="0"/>
+              <a:cs typeface="Arial" panose="020B0604020202020204" pitchFamily="34" charset="0"/>
+            </a:endParaRPr>
+          </a:p>
+          <a:p>
             <a:r>
-              <a:rPr lang="en-US" dirty="0" smtClean="0"/>
-              <a:t>Teaching a computer what we understand from visual input is hard!</a:t>
+              <a:rPr lang="en-US" dirty="0" smtClean="0">
+                <a:latin typeface="Arial" panose="020B0604020202020204" pitchFamily="34" charset="0"/>
+                <a:cs typeface="Arial" panose="020B0604020202020204" pitchFamily="34" charset="0"/>
+              </a:rPr>
+              <a:t>Potential to improve the classification system:</a:t>
             </a:r>
-            <a:endParaRPr lang="en-US" dirty="0"/>
+          </a:p>
+          <a:p>
+            <a:pPr lvl="1"/>
+            <a:r>
+              <a:rPr lang="en-US" dirty="0" smtClean="0">
+                <a:latin typeface="Arial" panose="020B0604020202020204" pitchFamily="34" charset="0"/>
+                <a:cs typeface="Arial" panose="020B0604020202020204" pitchFamily="34" charset="0"/>
+              </a:rPr>
+              <a:t>Decision tree-like structure instead of using means and standard deviations of image classes from training</a:t>
+            </a:r>
+          </a:p>
+          <a:p>
+            <a:pPr lvl="1"/>
+            <a:r>
+              <a:rPr lang="en-US" dirty="0" smtClean="0">
+                <a:latin typeface="Arial" panose="020B0604020202020204" pitchFamily="34" charset="0"/>
+                <a:cs typeface="Arial" panose="020B0604020202020204" pitchFamily="34" charset="0"/>
+              </a:rPr>
+              <a:t>Addition of a reject class</a:t>
+            </a:r>
+            <a:endParaRPr lang="en-US" dirty="0">
+              <a:latin typeface="Arial" panose="020B0604020202020204" pitchFamily="34" charset="0"/>
+              <a:cs typeface="Arial" panose="020B0604020202020204" pitchFamily="34" charset="0"/>
+            </a:endParaRPr>
           </a:p>
         </p:txBody>
       </p:sp>
@@ -14096,10 +14528,122 @@
           <a:lstStyle/>
           <a:p>
             <a:r>
-              <a:rPr lang="en-US" dirty="0" smtClean="0"/>
+              <a:rPr lang="en-US" dirty="0" smtClean="0">
+                <a:latin typeface="Arial" panose="020B0604020202020204" pitchFamily="34" charset="0"/>
+                <a:cs typeface="Arial" panose="020B0604020202020204" pitchFamily="34" charset="0"/>
+              </a:rPr>
+              <a:t>Limitations and Improvements</a:t>
+            </a:r>
+            <a:endParaRPr lang="en-US" dirty="0">
+              <a:latin typeface="Arial" panose="020B0604020202020204" pitchFamily="34" charset="0"/>
+              <a:cs typeface="Arial" panose="020B0604020202020204" pitchFamily="34" charset="0"/>
+            </a:endParaRPr>
+          </a:p>
+        </p:txBody>
+      </p:sp>
+    </p:spTree>
+    <p:extLst>
+      <p:ext uri="{BB962C8B-B14F-4D97-AF65-F5344CB8AC3E}">
+        <p14:creationId xmlns:p14="http://schemas.microsoft.com/office/powerpoint/2010/main" val="1213478019"/>
+      </p:ext>
+    </p:extLst>
+  </p:cSld>
+  <p:clrMapOvr>
+    <a:masterClrMapping/>
+  </p:clrMapOvr>
+</p:sld>
+</file>
+
+<file path=ppt/slides/slide14.xml><?xml version="1.0" encoding="utf-8"?>
+<p:sld xmlns:a="http://schemas.openxmlformats.org/drawingml/2006/main" xmlns:r="http://schemas.openxmlformats.org/officeDocument/2006/relationships" xmlns:p="http://schemas.openxmlformats.org/presentationml/2006/main">
+  <p:cSld>
+    <p:spTree>
+      <p:nvGrpSpPr>
+        <p:cNvPr id="1" name=""/>
+        <p:cNvGrpSpPr/>
+        <p:nvPr/>
+      </p:nvGrpSpPr>
+      <p:grpSpPr>
+        <a:xfrm>
+          <a:off x="0" y="0"/>
+          <a:ext cx="0" cy="0"/>
+          <a:chOff x="0" y="0"/>
+          <a:chExt cx="0" cy="0"/>
+        </a:xfrm>
+      </p:grpSpPr>
+      <p:sp>
+        <p:nvSpPr>
+          <p:cNvPr id="2" name="Content Placeholder 1"/>
+          <p:cNvSpPr>
+            <a:spLocks noGrp="1"/>
+          </p:cNvSpPr>
+          <p:nvPr>
+            <p:ph idx="1"/>
+          </p:nvPr>
+        </p:nvSpPr>
+        <p:spPr/>
+        <p:txBody>
+          <a:bodyPr/>
+          <a:lstStyle/>
+          <a:p>
+            <a:r>
+              <a:rPr lang="en-US" dirty="0" smtClean="0">
+                <a:latin typeface="Arial" panose="020B0604020202020204" pitchFamily="34" charset="0"/>
+                <a:cs typeface="Arial" panose="020B0604020202020204" pitchFamily="34" charset="0"/>
+              </a:rPr>
+              <a:t>Interactions of various parts of the system need to be tested in addition to testing the parts themselves</a:t>
+            </a:r>
+          </a:p>
+          <a:p>
+            <a:r>
+              <a:rPr lang="en-US" dirty="0" smtClean="0">
+                <a:latin typeface="Arial" panose="020B0604020202020204" pitchFamily="34" charset="0"/>
+                <a:cs typeface="Arial" panose="020B0604020202020204" pitchFamily="34" charset="0"/>
+              </a:rPr>
+              <a:t>Importance of the quality of the training and validation system</a:t>
+            </a:r>
+          </a:p>
+          <a:p>
+            <a:r>
+              <a:rPr lang="en-US" dirty="0" smtClean="0">
+                <a:latin typeface="Arial" panose="020B0604020202020204" pitchFamily="34" charset="0"/>
+                <a:cs typeface="Arial" panose="020B0604020202020204" pitchFamily="34" charset="0"/>
+              </a:rPr>
+              <a:t>Teaching a computer what we understand from visual input is hard!</a:t>
+            </a:r>
+            <a:endParaRPr lang="en-US" dirty="0">
+              <a:latin typeface="Arial" panose="020B0604020202020204" pitchFamily="34" charset="0"/>
+              <a:cs typeface="Arial" panose="020B0604020202020204" pitchFamily="34" charset="0"/>
+            </a:endParaRPr>
+          </a:p>
+        </p:txBody>
+      </p:sp>
+      <p:sp>
+        <p:nvSpPr>
+          <p:cNvPr id="3" name="Title 2"/>
+          <p:cNvSpPr>
+            <a:spLocks noGrp="1"/>
+          </p:cNvSpPr>
+          <p:nvPr>
+            <p:ph type="title"/>
+          </p:nvPr>
+        </p:nvSpPr>
+        <p:spPr/>
+        <p:txBody>
+          <a:bodyPr/>
+          <a:lstStyle/>
+          <a:p>
+            <a:r>
+              <a:rPr lang="en-US" dirty="0" smtClean="0">
+                <a:latin typeface="Arial" panose="020B0604020202020204" pitchFamily="34" charset="0"/>
+                <a:cs typeface="Arial" panose="020B0604020202020204" pitchFamily="34" charset="0"/>
+              </a:rPr>
               <a:t>Conclusions</a:t>
             </a:r>
-            <a:endParaRPr lang="en-US" dirty="0"/>
+            <a:endParaRPr lang="en-US" dirty="0">
+              <a:latin typeface="Arial" panose="020B0604020202020204" pitchFamily="34" charset="0"/>
+              <a:cs typeface="Arial" panose="020B0604020202020204" pitchFamily="34" charset="0"/>
+            </a:endParaRPr>
           </a:p>
         </p:txBody>
       </p:sp>
@@ -14123,7 +14667,7 @@
 </p:sld>
 </file>
 
-<file path=ppt/slides/slide14.xml><?xml version="1.0" encoding="utf-8"?>
+<file path=ppt/slides/slide15.xml><?xml version="1.0" encoding="utf-8"?>
 <p:sld xmlns:a="http://schemas.openxmlformats.org/drawingml/2006/main" xmlns:r="http://schemas.openxmlformats.org/officeDocument/2006/relationships" xmlns:p="http://schemas.openxmlformats.org/presentationml/2006/main">
   <p:cSld>
     <p:spTree>
@@ -14230,10 +14774,16 @@
           <a:p>
             <a:pPr algn="ctr"/>
             <a:r>
-              <a:rPr lang="en-US" dirty="0" smtClean="0"/>
+              <a:rPr lang="en-US" dirty="0" smtClean="0">
+                <a:latin typeface="Arial" panose="020B0604020202020204" pitchFamily="34" charset="0"/>
+                <a:cs typeface="Arial" panose="020B0604020202020204" pitchFamily="34" charset="0"/>
+              </a:rPr>
               <a:t>Questions?</a:t>
             </a:r>
-            <a:endParaRPr lang="en-US" dirty="0"/>
+            <a:endParaRPr lang="en-US" dirty="0">
+              <a:latin typeface="Arial" panose="020B0604020202020204" pitchFamily="34" charset="0"/>
+              <a:cs typeface="Arial" panose="020B0604020202020204" pitchFamily="34" charset="0"/>
+            </a:endParaRPr>
           </a:p>
         </p:txBody>
       </p:sp>
@@ -14292,66 +14842,96 @@
           <a:lstStyle/>
           <a:p>
             <a:r>
-              <a:rPr lang="en-US" dirty="0" smtClean="0"/>
+              <a:rPr lang="en-US" dirty="0" smtClean="0">
+                <a:latin typeface="Arial" panose="020B0604020202020204" pitchFamily="34" charset="0"/>
+                <a:cs typeface="Arial" panose="020B0604020202020204" pitchFamily="34" charset="0"/>
+              </a:rPr>
               <a:t>Problem</a:t>
             </a:r>
           </a:p>
           <a:p>
             <a:r>
-              <a:rPr lang="en-US" dirty="0" smtClean="0"/>
+              <a:rPr lang="en-US" dirty="0" smtClean="0">
+                <a:latin typeface="Arial" panose="020B0604020202020204" pitchFamily="34" charset="0"/>
+                <a:cs typeface="Arial" panose="020B0604020202020204" pitchFamily="34" charset="0"/>
+              </a:rPr>
               <a:t>Methods</a:t>
             </a:r>
           </a:p>
           <a:p>
             <a:pPr lvl="1"/>
             <a:r>
-              <a:rPr lang="en-US" dirty="0" smtClean="0"/>
+              <a:rPr lang="en-US" dirty="0" smtClean="0">
+                <a:latin typeface="Arial" panose="020B0604020202020204" pitchFamily="34" charset="0"/>
+                <a:cs typeface="Arial" panose="020B0604020202020204" pitchFamily="34" charset="0"/>
+              </a:rPr>
               <a:t>Foreground Detection</a:t>
             </a:r>
           </a:p>
           <a:p>
             <a:pPr lvl="1"/>
             <a:r>
-              <a:rPr lang="en-US" dirty="0" smtClean="0"/>
+              <a:rPr lang="en-US" dirty="0" smtClean="0">
+                <a:latin typeface="Arial" panose="020B0604020202020204" pitchFamily="34" charset="0"/>
+                <a:cs typeface="Arial" panose="020B0604020202020204" pitchFamily="34" charset="0"/>
+              </a:rPr>
               <a:t>Color</a:t>
             </a:r>
           </a:p>
           <a:p>
             <a:pPr lvl="1"/>
             <a:r>
-              <a:rPr lang="en-US" dirty="0" smtClean="0"/>
+              <a:rPr lang="en-US" dirty="0" smtClean="0">
+                <a:latin typeface="Arial" panose="020B0604020202020204" pitchFamily="34" charset="0"/>
+                <a:cs typeface="Arial" panose="020B0604020202020204" pitchFamily="34" charset="0"/>
+              </a:rPr>
               <a:t>Texture</a:t>
             </a:r>
           </a:p>
           <a:p>
             <a:pPr lvl="1"/>
             <a:r>
-              <a:rPr lang="en-US" dirty="0" smtClean="0"/>
+              <a:rPr lang="en-US" dirty="0" smtClean="0">
+                <a:latin typeface="Arial" panose="020B0604020202020204" pitchFamily="34" charset="0"/>
+                <a:cs typeface="Arial" panose="020B0604020202020204" pitchFamily="34" charset="0"/>
+              </a:rPr>
               <a:t>Shape</a:t>
             </a:r>
           </a:p>
           <a:p>
             <a:pPr lvl="1"/>
             <a:r>
-              <a:rPr lang="en-US" dirty="0" smtClean="0"/>
+              <a:rPr lang="en-US" dirty="0" smtClean="0">
+                <a:latin typeface="Arial" panose="020B0604020202020204" pitchFamily="34" charset="0"/>
+                <a:cs typeface="Arial" panose="020B0604020202020204" pitchFamily="34" charset="0"/>
+              </a:rPr>
               <a:t>Classification</a:t>
             </a:r>
           </a:p>
           <a:p>
             <a:r>
-              <a:rPr lang="en-US" dirty="0" smtClean="0"/>
+              <a:rPr lang="en-US" dirty="0" smtClean="0">
+                <a:latin typeface="Arial" panose="020B0604020202020204" pitchFamily="34" charset="0"/>
+                <a:cs typeface="Arial" panose="020B0604020202020204" pitchFamily="34" charset="0"/>
+              </a:rPr>
               <a:t>Image Database</a:t>
             </a:r>
           </a:p>
           <a:p>
             <a:r>
-              <a:rPr lang="en-US" dirty="0" smtClean="0"/>
+              <a:rPr lang="en-US" dirty="0" smtClean="0">
+                <a:latin typeface="Arial" panose="020B0604020202020204" pitchFamily="34" charset="0"/>
+                <a:cs typeface="Arial" panose="020B0604020202020204" pitchFamily="34" charset="0"/>
+              </a:rPr>
               <a:t>Results</a:t>
             </a:r>
           </a:p>
           <a:p>
             <a:r>
-              <a:rPr lang="en-US" dirty="0" smtClean="0"/>
+              <a:rPr lang="en-US" dirty="0" smtClean="0">
+                <a:latin typeface="Arial" panose="020B0604020202020204" pitchFamily="34" charset="0"/>
+                <a:cs typeface="Arial" panose="020B0604020202020204" pitchFamily="34" charset="0"/>
+              </a:rPr>
               <a:t>Discussion and Conclusions</a:t>
             </a:r>
           </a:p>
@@ -14373,10 +14953,16 @@
           <a:lstStyle/>
           <a:p>
             <a:r>
-              <a:rPr lang="en-US" dirty="0" smtClean="0"/>
+              <a:rPr lang="en-US" dirty="0" smtClean="0">
+                <a:latin typeface="Arial" panose="020B0604020202020204" pitchFamily="34" charset="0"/>
+                <a:cs typeface="Arial" panose="020B0604020202020204" pitchFamily="34" charset="0"/>
+              </a:rPr>
               <a:t>Overview</a:t>
             </a:r>
-            <a:endParaRPr lang="en-US" dirty="0"/>
+            <a:endParaRPr lang="en-US" dirty="0">
+              <a:latin typeface="Arial" panose="020B0604020202020204" pitchFamily="34" charset="0"/>
+              <a:cs typeface="Arial" panose="020B0604020202020204" pitchFamily="34" charset="0"/>
+            </a:endParaRPr>
           </a:p>
         </p:txBody>
       </p:sp>
@@ -14441,15 +15027,24 @@
               <a:buNone/>
             </a:pPr>
             <a:r>
-              <a:rPr lang="en-US" b="1" dirty="0" smtClean="0"/>
+              <a:rPr lang="en-US" b="1" dirty="0" smtClean="0">
+                <a:latin typeface="Arial" panose="020B0604020202020204" pitchFamily="34" charset="0"/>
+                <a:cs typeface="Arial" panose="020B0604020202020204" pitchFamily="34" charset="0"/>
+              </a:rPr>
               <a:t>Develop </a:t>
             </a:r>
             <a:r>
-              <a:rPr lang="en-US" b="1" dirty="0"/>
+              <a:rPr lang="en-US" b="1" dirty="0">
+                <a:latin typeface="Arial" panose="020B0604020202020204" pitchFamily="34" charset="0"/>
+                <a:cs typeface="Arial" panose="020B0604020202020204" pitchFamily="34" charset="0"/>
+              </a:rPr>
               <a:t>a software system to automatically recognize typical meals from </a:t>
             </a:r>
             <a:r>
-              <a:rPr lang="en-US" b="1" dirty="0" smtClean="0"/>
+              <a:rPr lang="en-US" b="1" dirty="0" smtClean="0">
+                <a:latin typeface="Arial" panose="020B0604020202020204" pitchFamily="34" charset="0"/>
+                <a:cs typeface="Arial" panose="020B0604020202020204" pitchFamily="34" charset="0"/>
+              </a:rPr>
               <a:t>images.</a:t>
             </a:r>
           </a:p>
@@ -14471,10 +15066,16 @@
           <a:lstStyle/>
           <a:p>
             <a:r>
-              <a:rPr lang="en-US" dirty="0" smtClean="0"/>
+              <a:rPr lang="en-US" dirty="0" smtClean="0">
+                <a:latin typeface="Arial" panose="020B0604020202020204" pitchFamily="34" charset="0"/>
+                <a:cs typeface="Arial" panose="020B0604020202020204" pitchFamily="34" charset="0"/>
+              </a:rPr>
               <a:t>Problem</a:t>
             </a:r>
-            <a:endParaRPr lang="en-US" dirty="0"/>
+            <a:endParaRPr lang="en-US" dirty="0">
+              <a:latin typeface="Arial" panose="020B0604020202020204" pitchFamily="34" charset="0"/>
+              <a:cs typeface="Arial" panose="020B0604020202020204" pitchFamily="34" charset="0"/>
+            </a:endParaRPr>
           </a:p>
         </p:txBody>
       </p:sp>
@@ -14675,7 +15276,10 @@
               <a:buChar char="v"/>
             </a:pPr>
             <a:r>
-              <a:rPr lang="en-US" dirty="0" smtClean="0"/>
+              <a:rPr lang="en-US" dirty="0" smtClean="0">
+                <a:latin typeface="Arial" panose="020B0604020202020204" pitchFamily="34" charset="0"/>
+                <a:cs typeface="Arial" panose="020B0604020202020204" pitchFamily="34" charset="0"/>
+              </a:rPr>
               <a:t>Salad</a:t>
             </a:r>
           </a:p>
@@ -14685,7 +15289,10 @@
               <a:buChar char="v"/>
             </a:pPr>
             <a:r>
-              <a:rPr lang="en-US" dirty="0" smtClean="0"/>
+              <a:rPr lang="en-US" dirty="0" smtClean="0">
+                <a:latin typeface="Arial" panose="020B0604020202020204" pitchFamily="34" charset="0"/>
+                <a:cs typeface="Arial" panose="020B0604020202020204" pitchFamily="34" charset="0"/>
+              </a:rPr>
               <a:t>Pasta</a:t>
             </a:r>
           </a:p>
@@ -14695,7 +15302,10 @@
               <a:buChar char="v"/>
             </a:pPr>
             <a:r>
-              <a:rPr lang="en-US" dirty="0" smtClean="0"/>
+              <a:rPr lang="en-US" dirty="0" smtClean="0">
+                <a:latin typeface="Arial" panose="020B0604020202020204" pitchFamily="34" charset="0"/>
+                <a:cs typeface="Arial" panose="020B0604020202020204" pitchFamily="34" charset="0"/>
+              </a:rPr>
               <a:t>Hotdog</a:t>
             </a:r>
           </a:p>
@@ -14705,10 +15315,16 @@
               <a:buChar char="v"/>
             </a:pPr>
             <a:r>
-              <a:rPr lang="en-US" dirty="0" err="1" smtClean="0"/>
-              <a:t>Frenchfry</a:t>
+              <a:rPr lang="en-US" dirty="0" smtClean="0">
+                <a:latin typeface="Arial" panose="020B0604020202020204" pitchFamily="34" charset="0"/>
+                <a:cs typeface="Arial" panose="020B0604020202020204" pitchFamily="34" charset="0"/>
+              </a:rPr>
+              <a:t>French Fry</a:t>
             </a:r>
-            <a:endParaRPr lang="en-US" dirty="0" smtClean="0"/>
+            <a:endParaRPr lang="en-US" dirty="0" smtClean="0">
+              <a:latin typeface="Arial" panose="020B0604020202020204" pitchFamily="34" charset="0"/>
+              <a:cs typeface="Arial" panose="020B0604020202020204" pitchFamily="34" charset="0"/>
+            </a:endParaRPr>
           </a:p>
           <a:p>
             <a:pPr>
@@ -14716,7 +15332,10 @@
               <a:buChar char="v"/>
             </a:pPr>
             <a:r>
-              <a:rPr lang="en-US" dirty="0" smtClean="0"/>
+              <a:rPr lang="en-US" dirty="0" smtClean="0">
+                <a:latin typeface="Arial" panose="020B0604020202020204" pitchFamily="34" charset="0"/>
+                <a:cs typeface="Arial" panose="020B0604020202020204" pitchFamily="34" charset="0"/>
+              </a:rPr>
               <a:t>Burger</a:t>
             </a:r>
           </a:p>
@@ -14726,7 +15345,10 @@
               <a:buChar char="v"/>
             </a:pPr>
             <a:r>
-              <a:rPr lang="en-US" dirty="0" smtClean="0"/>
+              <a:rPr lang="en-US" dirty="0" smtClean="0">
+                <a:latin typeface="Arial" panose="020B0604020202020204" pitchFamily="34" charset="0"/>
+                <a:cs typeface="Arial" panose="020B0604020202020204" pitchFamily="34" charset="0"/>
+              </a:rPr>
               <a:t>Apple</a:t>
             </a:r>
           </a:p>
@@ -14736,7 +15358,10 @@
               <a:buChar char="v"/>
             </a:pPr>
             <a:r>
-              <a:rPr lang="en-US" dirty="0" smtClean="0"/>
+              <a:rPr lang="en-US" dirty="0" smtClean="0">
+                <a:latin typeface="Arial" panose="020B0604020202020204" pitchFamily="34" charset="0"/>
+                <a:cs typeface="Arial" panose="020B0604020202020204" pitchFamily="34" charset="0"/>
+              </a:rPr>
               <a:t>Banana</a:t>
             </a:r>
           </a:p>
@@ -14746,7 +15371,10 @@
               <a:buChar char="v"/>
             </a:pPr>
             <a:r>
-              <a:rPr lang="en-US" dirty="0" smtClean="0"/>
+              <a:rPr lang="en-US" dirty="0" smtClean="0">
+                <a:latin typeface="Arial" panose="020B0604020202020204" pitchFamily="34" charset="0"/>
+                <a:cs typeface="Arial" panose="020B0604020202020204" pitchFamily="34" charset="0"/>
+              </a:rPr>
               <a:t>Broccoli</a:t>
             </a:r>
           </a:p>
@@ -14756,7 +15384,10 @@
               <a:buChar char="v"/>
             </a:pPr>
             <a:r>
-              <a:rPr lang="en-US" dirty="0" smtClean="0"/>
+              <a:rPr lang="en-US" dirty="0" smtClean="0">
+                <a:latin typeface="Arial" panose="020B0604020202020204" pitchFamily="34" charset="0"/>
+                <a:cs typeface="Arial" panose="020B0604020202020204" pitchFamily="34" charset="0"/>
+              </a:rPr>
               <a:t>Pizza</a:t>
             </a:r>
           </a:p>
@@ -14766,7 +15397,10 @@
               <a:buChar char="v"/>
             </a:pPr>
             <a:r>
-              <a:rPr lang="en-US" dirty="0" smtClean="0"/>
+              <a:rPr lang="en-US" dirty="0" smtClean="0">
+                <a:latin typeface="Arial" panose="020B0604020202020204" pitchFamily="34" charset="0"/>
+                <a:cs typeface="Arial" panose="020B0604020202020204" pitchFamily="34" charset="0"/>
+              </a:rPr>
               <a:t>Egg</a:t>
             </a:r>
           </a:p>
@@ -14776,7 +15410,10 @@
               <a:buChar char="v"/>
             </a:pPr>
             <a:r>
-              <a:rPr lang="en-US" dirty="0" smtClean="0"/>
+              <a:rPr lang="en-US" dirty="0" smtClean="0">
+                <a:latin typeface="Arial" panose="020B0604020202020204" pitchFamily="34" charset="0"/>
+                <a:cs typeface="Arial" panose="020B0604020202020204" pitchFamily="34" charset="0"/>
+              </a:rPr>
               <a:t>Tomato</a:t>
             </a:r>
           </a:p>
@@ -14786,7 +15423,10 @@
               <a:buChar char="v"/>
             </a:pPr>
             <a:r>
-              <a:rPr lang="en-US" dirty="0" smtClean="0"/>
+              <a:rPr lang="en-US" dirty="0" smtClean="0">
+                <a:latin typeface="Arial" panose="020B0604020202020204" pitchFamily="34" charset="0"/>
+                <a:cs typeface="Arial" panose="020B0604020202020204" pitchFamily="34" charset="0"/>
+              </a:rPr>
               <a:t>Rice</a:t>
             </a:r>
           </a:p>
@@ -14796,7 +15436,10 @@
               <a:buChar char="v"/>
             </a:pPr>
             <a:r>
-              <a:rPr lang="en-US" dirty="0" smtClean="0"/>
+              <a:rPr lang="en-US" dirty="0" smtClean="0">
+                <a:latin typeface="Arial" panose="020B0604020202020204" pitchFamily="34" charset="0"/>
+                <a:cs typeface="Arial" panose="020B0604020202020204" pitchFamily="34" charset="0"/>
+              </a:rPr>
               <a:t>Strawberry</a:t>
             </a:r>
           </a:p>
@@ -14806,7 +15449,10 @@
               <a:buChar char="v"/>
             </a:pPr>
             <a:r>
-              <a:rPr lang="en-US" dirty="0" smtClean="0"/>
+              <a:rPr lang="en-US" dirty="0" smtClean="0">
+                <a:latin typeface="Arial" panose="020B0604020202020204" pitchFamily="34" charset="0"/>
+                <a:cs typeface="Arial" panose="020B0604020202020204" pitchFamily="34" charset="0"/>
+              </a:rPr>
               <a:t>Cookie</a:t>
             </a:r>
           </a:p>
@@ -14859,7 +15505,7 @@
             <p:ph idx="1"/>
             <p:extLst>
               <p:ext uri="{D42A27DB-BD31-4B8C-83A1-F6EECF244321}">
-                <p14:modId xmlns:p14="http://schemas.microsoft.com/office/powerpoint/2010/main" val="3889926142"/>
+                <p14:modId xmlns:p14="http://schemas.microsoft.com/office/powerpoint/2010/main" val="4032948862"/>
               </p:ext>
             </p:extLst>
           </p:nvPr>
@@ -14890,10 +15536,16 @@
           <a:lstStyle/>
           <a:p>
             <a:r>
-              <a:rPr lang="en-US" dirty="0" smtClean="0"/>
+              <a:rPr lang="en-US" dirty="0" smtClean="0">
+                <a:latin typeface="Arial" panose="020B0604020202020204" pitchFamily="34" charset="0"/>
+                <a:cs typeface="Arial" panose="020B0604020202020204" pitchFamily="34" charset="0"/>
+              </a:rPr>
               <a:t>Methods: Foreground Detection</a:t>
             </a:r>
-            <a:endParaRPr lang="en-US" dirty="0"/>
+            <a:endParaRPr lang="en-US" dirty="0">
+              <a:latin typeface="Arial" panose="020B0604020202020204" pitchFamily="34" charset="0"/>
+              <a:cs typeface="Arial" panose="020B0604020202020204" pitchFamily="34" charset="0"/>
+            </a:endParaRPr>
           </a:p>
         </p:txBody>
       </p:sp>
@@ -15205,47 +15857,71 @@
           <a:lstStyle/>
           <a:p>
             <a:r>
-              <a:rPr lang="en-US" dirty="0" smtClean="0"/>
+              <a:rPr lang="en-US" dirty="0" smtClean="0">
+                <a:latin typeface="Arial" panose="020B0604020202020204" pitchFamily="34" charset="0"/>
+                <a:cs typeface="Arial" panose="020B0604020202020204" pitchFamily="34" charset="0"/>
+              </a:rPr>
               <a:t>6 bit histogram from 2 MSBs of R, G, and B</a:t>
             </a:r>
           </a:p>
           <a:p>
             <a:r>
-              <a:rPr lang="en-US" dirty="0" smtClean="0"/>
+              <a:rPr lang="en-US" dirty="0" smtClean="0">
+                <a:latin typeface="Arial" panose="020B0604020202020204" pitchFamily="34" charset="0"/>
+                <a:cs typeface="Arial" panose="020B0604020202020204" pitchFamily="34" charset="0"/>
+              </a:rPr>
               <a:t>Value of all 64 bins in feature vector</a:t>
             </a:r>
           </a:p>
           <a:p>
-            <a:endParaRPr lang="en-US" dirty="0" smtClean="0"/>
-          </a:p>
-          <a:p>
-            <a:endParaRPr lang="en-US" dirty="0"/>
+            <a:endParaRPr lang="en-US" dirty="0" smtClean="0">
+              <a:latin typeface="Arial" panose="020B0604020202020204" pitchFamily="34" charset="0"/>
+              <a:cs typeface="Arial" panose="020B0604020202020204" pitchFamily="34" charset="0"/>
+            </a:endParaRPr>
+          </a:p>
+          <a:p>
+            <a:endParaRPr lang="en-US" dirty="0">
+              <a:latin typeface="Arial" panose="020B0604020202020204" pitchFamily="34" charset="0"/>
+              <a:cs typeface="Arial" panose="020B0604020202020204" pitchFamily="34" charset="0"/>
+            </a:endParaRPr>
           </a:p>
           <a:p>
             <a:pPr marL="109728" indent="0">
               <a:buNone/>
             </a:pPr>
             <a:r>
-              <a:rPr lang="en-US" dirty="0" smtClean="0"/>
+              <a:rPr lang="en-US" dirty="0" smtClean="0">
+                <a:latin typeface="Arial" panose="020B0604020202020204" pitchFamily="34" charset="0"/>
+                <a:cs typeface="Arial" panose="020B0604020202020204" pitchFamily="34" charset="0"/>
+              </a:rPr>
               <a:t>Alternative Method:</a:t>
             </a:r>
           </a:p>
           <a:p>
             <a:r>
-              <a:rPr lang="en-US" dirty="0" smtClean="0"/>
+              <a:rPr lang="en-US" dirty="0" smtClean="0">
+                <a:latin typeface="Arial" panose="020B0604020202020204" pitchFamily="34" charset="0"/>
+                <a:cs typeface="Arial" panose="020B0604020202020204" pitchFamily="34" charset="0"/>
+              </a:rPr>
               <a:t>Histogram binned by I values from HSI image</a:t>
             </a:r>
           </a:p>
           <a:p>
             <a:r>
-              <a:rPr lang="en-US" dirty="0" smtClean="0"/>
+              <a:rPr lang="en-US" dirty="0" smtClean="0">
+                <a:latin typeface="Arial" panose="020B0604020202020204" pitchFamily="34" charset="0"/>
+                <a:cs typeface="Arial" panose="020B0604020202020204" pitchFamily="34" charset="0"/>
+              </a:rPr>
               <a:t>Each pixel adds value (H * S) to histogram</a:t>
             </a:r>
           </a:p>
           <a:p>
             <a:pPr lvl="1"/>
             <a:r>
-              <a:rPr lang="en-US" dirty="0" smtClean="0"/>
+              <a:rPr lang="en-US" dirty="0" smtClean="0">
+                <a:latin typeface="Arial" panose="020B0604020202020204" pitchFamily="34" charset="0"/>
+                <a:cs typeface="Arial" panose="020B0604020202020204" pitchFamily="34" charset="0"/>
+              </a:rPr>
               <a:t>Less weight to colors that are close to black or gray</a:t>
             </a:r>
           </a:p>
@@ -15267,10 +15943,16 @@
           <a:lstStyle/>
           <a:p>
             <a:r>
-              <a:rPr lang="en-US" dirty="0" smtClean="0"/>
+              <a:rPr lang="en-US" dirty="0" smtClean="0">
+                <a:latin typeface="Arial" panose="020B0604020202020204" pitchFamily="34" charset="0"/>
+                <a:cs typeface="Arial" panose="020B0604020202020204" pitchFamily="34" charset="0"/>
+              </a:rPr>
               <a:t>Methods: Color</a:t>
             </a:r>
-            <a:endParaRPr lang="en-US" dirty="0"/>
+            <a:endParaRPr lang="en-US" dirty="0">
+              <a:latin typeface="Arial" panose="020B0604020202020204" pitchFamily="34" charset="0"/>
+              <a:cs typeface="Arial" panose="020B0604020202020204" pitchFamily="34" charset="0"/>
+            </a:endParaRPr>
           </a:p>
         </p:txBody>
       </p:sp>
@@ -15658,10 +16340,16 @@
           <a:lstStyle/>
           <a:p>
             <a:r>
-              <a:rPr lang="en-US" dirty="0" smtClean="0"/>
+              <a:rPr lang="en-US" dirty="0" smtClean="0">
+                <a:latin typeface="Arial" panose="020B0604020202020204" pitchFamily="34" charset="0"/>
+                <a:cs typeface="Arial" panose="020B0604020202020204" pitchFamily="34" charset="0"/>
+              </a:rPr>
               <a:t>Methods: Texture</a:t>
             </a:r>
-            <a:endParaRPr lang="en-US" dirty="0"/>
+            <a:endParaRPr lang="en-US" dirty="0">
+              <a:latin typeface="Arial" panose="020B0604020202020204" pitchFamily="34" charset="0"/>
+              <a:cs typeface="Arial" panose="020B0604020202020204" pitchFamily="34" charset="0"/>
+            </a:endParaRPr>
           </a:p>
         </p:txBody>
       </p:sp>
@@ -15942,43 +16630,67 @@
           </a:lstStyle>
           <a:p>
             <a:r>
-              <a:rPr lang="en-US" dirty="0" smtClean="0"/>
+              <a:rPr lang="en-US" dirty="0" smtClean="0">
+                <a:latin typeface="Arial" panose="020B0604020202020204" pitchFamily="34" charset="0"/>
+                <a:cs typeface="Arial" panose="020B0604020202020204" pitchFamily="34" charset="0"/>
+              </a:rPr>
               <a:t>Input: </a:t>
             </a:r>
-            <a:endParaRPr lang="en-US" dirty="0"/>
+            <a:endParaRPr lang="en-US" dirty="0">
+              <a:latin typeface="Arial" panose="020B0604020202020204" pitchFamily="34" charset="0"/>
+              <a:cs typeface="Arial" panose="020B0604020202020204" pitchFamily="34" charset="0"/>
+            </a:endParaRPr>
           </a:p>
           <a:p>
             <a:pPr lvl="1"/>
             <a:r>
-              <a:rPr lang="en-US" dirty="0" smtClean="0"/>
+              <a:rPr lang="en-US" dirty="0" smtClean="0">
+                <a:latin typeface="Arial" panose="020B0604020202020204" pitchFamily="34" charset="0"/>
+                <a:cs typeface="Arial" panose="020B0604020202020204" pitchFamily="34" charset="0"/>
+              </a:rPr>
               <a:t>Foregrounded image </a:t>
             </a:r>
           </a:p>
           <a:p>
             <a:pPr lvl="1"/>
             <a:r>
-              <a:rPr lang="en-US" dirty="0" smtClean="0"/>
+              <a:rPr lang="en-US" dirty="0" smtClean="0">
+                <a:latin typeface="Arial" panose="020B0604020202020204" pitchFamily="34" charset="0"/>
+                <a:cs typeface="Arial" panose="020B0604020202020204" pitchFamily="34" charset="0"/>
+              </a:rPr>
               <a:t>Foreground mask</a:t>
             </a:r>
           </a:p>
           <a:p>
             <a:pPr lvl="1"/>
-            <a:endParaRPr lang="en-US" dirty="0" smtClean="0"/>
+            <a:endParaRPr lang="en-US" dirty="0" smtClean="0">
+              <a:latin typeface="Arial" panose="020B0604020202020204" pitchFamily="34" charset="0"/>
+              <a:cs typeface="Arial" panose="020B0604020202020204" pitchFamily="34" charset="0"/>
+            </a:endParaRPr>
           </a:p>
           <a:p>
             <a:r>
-              <a:rPr lang="en-US" dirty="0" smtClean="0"/>
+              <a:rPr lang="en-US" dirty="0" smtClean="0">
+                <a:latin typeface="Arial" panose="020B0604020202020204" pitchFamily="34" charset="0"/>
+                <a:cs typeface="Arial" panose="020B0604020202020204" pitchFamily="34" charset="0"/>
+              </a:rPr>
               <a:t>Output: </a:t>
             </a:r>
           </a:p>
           <a:p>
             <a:pPr lvl="1"/>
             <a:r>
-              <a:rPr lang="en-US" dirty="0"/>
+              <a:rPr lang="en-US" dirty="0">
+                <a:latin typeface="Arial" panose="020B0604020202020204" pitchFamily="34" charset="0"/>
+                <a:cs typeface="Arial" panose="020B0604020202020204" pitchFamily="34" charset="0"/>
+              </a:rPr>
               <a:t>I</a:t>
             </a:r>
             <a:r>
-              <a:rPr lang="en-US" dirty="0" smtClean="0"/>
+              <a:rPr lang="en-US" dirty="0" smtClean="0">
+                <a:latin typeface="Arial" panose="020B0604020202020204" pitchFamily="34" charset="0"/>
+                <a:cs typeface="Arial" panose="020B0604020202020204" pitchFamily="34" charset="0"/>
+              </a:rPr>
               <a:t>ntensity per pixel in the food region of the image after application of Matlab’s range filter</a:t>
             </a:r>
           </a:p>
@@ -16085,47 +16797,74 @@
           <a:lstStyle/>
           <a:p>
             <a:r>
-              <a:rPr lang="en-US" dirty="0" smtClean="0"/>
+              <a:rPr lang="en-US" dirty="0" smtClean="0">
+                <a:latin typeface="Arial" panose="020B0604020202020204" pitchFamily="34" charset="0"/>
+                <a:cs typeface="Arial" panose="020B0604020202020204" pitchFamily="34" charset="0"/>
+              </a:rPr>
               <a:t>Alternative Method: </a:t>
             </a:r>
             <a:br>
-              <a:rPr lang="en-US" dirty="0" smtClean="0"/>
+              <a:rPr lang="en-US" dirty="0" smtClean="0">
+                <a:latin typeface="Arial" panose="020B0604020202020204" pitchFamily="34" charset="0"/>
+                <a:cs typeface="Arial" panose="020B0604020202020204" pitchFamily="34" charset="0"/>
+              </a:rPr>
             </a:br>
             <a:r>
-              <a:rPr lang="en-US" dirty="0" smtClean="0"/>
+              <a:rPr lang="en-US" dirty="0" smtClean="0">
+                <a:latin typeface="Arial" panose="020B0604020202020204" pitchFamily="34" charset="0"/>
+                <a:cs typeface="Arial" panose="020B0604020202020204" pitchFamily="34" charset="0"/>
+              </a:rPr>
               <a:t>Law’s Texture Energy Measures</a:t>
             </a:r>
           </a:p>
           <a:p>
             <a:pPr lvl="1"/>
             <a:r>
-              <a:rPr lang="en-US" dirty="0" smtClean="0"/>
+              <a:rPr lang="en-US" dirty="0" smtClean="0">
+                <a:latin typeface="Arial" panose="020B0604020202020204" pitchFamily="34" charset="0"/>
+                <a:cs typeface="Arial" panose="020B0604020202020204" pitchFamily="34" charset="0"/>
+              </a:rPr>
               <a:t>Produces 9 energy map features corresponding to the application of filters</a:t>
             </a:r>
           </a:p>
           <a:p>
             <a:pPr lvl="1"/>
             <a:r>
-              <a:rPr lang="en-US" dirty="0" smtClean="0"/>
+              <a:rPr lang="en-US" dirty="0" smtClean="0">
+                <a:latin typeface="Arial" panose="020B0604020202020204" pitchFamily="34" charset="0"/>
+                <a:cs typeface="Arial" panose="020B0604020202020204" pitchFamily="34" charset="0"/>
+              </a:rPr>
               <a:t>Intensity per pixel in the food image region used as summarizing statistical for each map</a:t>
             </a:r>
           </a:p>
           <a:p>
             <a:r>
-              <a:rPr lang="en-US" dirty="0" smtClean="0"/>
+              <a:rPr lang="en-US" dirty="0" smtClean="0">
+                <a:latin typeface="Arial" panose="020B0604020202020204" pitchFamily="34" charset="0"/>
+                <a:cs typeface="Arial" panose="020B0604020202020204" pitchFamily="34" charset="0"/>
+              </a:rPr>
               <a:t>Analyzed interclass and intraclass variation for all 9 features and selected the top 3</a:t>
             </a:r>
           </a:p>
           <a:p>
             <a:r>
-              <a:rPr lang="en-US" dirty="0" smtClean="0"/>
+              <a:rPr lang="en-US" dirty="0" smtClean="0">
+                <a:latin typeface="Arial" panose="020B0604020202020204" pitchFamily="34" charset="0"/>
+                <a:cs typeface="Arial" panose="020B0604020202020204" pitchFamily="34" charset="0"/>
+              </a:rPr>
               <a:t>Experimental Result: insignificant difference from the original method</a:t>
             </a:r>
-            <a:endParaRPr lang="en-US" dirty="0"/>
+            <a:endParaRPr lang="en-US" dirty="0">
+              <a:latin typeface="Arial" panose="020B0604020202020204" pitchFamily="34" charset="0"/>
+              <a:cs typeface="Arial" panose="020B0604020202020204" pitchFamily="34" charset="0"/>
+            </a:endParaRPr>
           </a:p>
           <a:p>
             <a:pPr lvl="1"/>
-            <a:endParaRPr lang="en-US" dirty="0"/>
+            <a:endParaRPr lang="en-US" dirty="0">
+              <a:latin typeface="Arial" panose="020B0604020202020204" pitchFamily="34" charset="0"/>
+              <a:cs typeface="Arial" panose="020B0604020202020204" pitchFamily="34" charset="0"/>
+            </a:endParaRPr>
           </a:p>
         </p:txBody>
       </p:sp>
@@ -16145,14 +16884,23 @@
           <a:lstStyle/>
           <a:p>
             <a:r>
-              <a:rPr lang="en-US" dirty="0" smtClean="0"/>
+              <a:rPr lang="en-US" dirty="0" smtClean="0">
+                <a:latin typeface="Arial" panose="020B0604020202020204" pitchFamily="34" charset="0"/>
+                <a:cs typeface="Arial" panose="020B0604020202020204" pitchFamily="34" charset="0"/>
+              </a:rPr>
               <a:t>Methods: </a:t>
             </a:r>
             <a:r>
-              <a:rPr lang="en-US" dirty="0" smtClean="0"/>
+              <a:rPr lang="en-US" dirty="0" smtClean="0">
+                <a:latin typeface="Arial" panose="020B0604020202020204" pitchFamily="34" charset="0"/>
+                <a:cs typeface="Arial" panose="020B0604020202020204" pitchFamily="34" charset="0"/>
+              </a:rPr>
               <a:t>Texture</a:t>
             </a:r>
-            <a:endParaRPr lang="en-US" dirty="0"/>
+            <a:endParaRPr lang="en-US" dirty="0">
+              <a:latin typeface="Arial" panose="020B0604020202020204" pitchFamily="34" charset="0"/>
+              <a:cs typeface="Arial" panose="020B0604020202020204" pitchFamily="34" charset="0"/>
+            </a:endParaRPr>
           </a:p>
         </p:txBody>
       </p:sp>
@@ -16207,38 +16955,49 @@
           <a:lstStyle/>
           <a:p>
             <a:r>
-              <a:rPr lang="en-US" dirty="0" smtClean="0"/>
+              <a:rPr lang="en-US" dirty="0" smtClean="0">
+                <a:latin typeface="Arial" panose="020B0604020202020204" pitchFamily="34" charset="0"/>
+                <a:cs typeface="Arial" panose="020B0604020202020204" pitchFamily="34" charset="0"/>
+              </a:rPr>
               <a:t>Circularity</a:t>
             </a:r>
           </a:p>
           <a:p>
             <a:pPr lvl="1"/>
             <a:r>
-              <a:rPr lang="en-US" dirty="0"/>
+              <a:rPr lang="en-US" dirty="0">
+                <a:latin typeface="Arial" panose="020B0604020202020204" pitchFamily="34" charset="0"/>
+                <a:cs typeface="Arial" panose="020B0604020202020204" pitchFamily="34" charset="0"/>
+              </a:rPr>
               <a:t>B</a:t>
             </a:r>
             <a:r>
-              <a:rPr lang="en-US" dirty="0" smtClean="0"/>
+              <a:rPr lang="en-US" dirty="0" smtClean="0">
+                <a:latin typeface="Arial" panose="020B0604020202020204" pitchFamily="34" charset="0"/>
+                <a:cs typeface="Arial" panose="020B0604020202020204" pitchFamily="34" charset="0"/>
+              </a:rPr>
               <a:t>order from erosion</a:t>
             </a:r>
           </a:p>
           <a:p>
             <a:pPr lvl="1"/>
             <a:r>
-              <a:rPr lang="en-US" dirty="0" smtClean="0"/>
+              <a:rPr lang="en-US" dirty="0" smtClean="0">
+                <a:latin typeface="Arial" panose="020B0604020202020204" pitchFamily="34" charset="0"/>
+                <a:cs typeface="Arial" panose="020B0604020202020204" pitchFamily="34" charset="0"/>
+              </a:rPr>
               <a:t>Good for single objects</a:t>
             </a:r>
           </a:p>
           <a:p>
             <a:pPr lvl="1"/>
             <a:r>
-              <a:rPr lang="en-US" dirty="0" smtClean="0"/>
+              <a:rPr lang="en-US" dirty="0" smtClean="0">
+                <a:latin typeface="Arial" panose="020B0604020202020204" pitchFamily="34" charset="0"/>
+                <a:cs typeface="Arial" panose="020B0604020202020204" pitchFamily="34" charset="0"/>
+              </a:rPr>
               <a:t>Sensitive to angle</a:t>
             </a:r>
-          </a:p>
-          <a:p>
-            <a:pPr lvl="1"/>
-            <a:endParaRPr lang="en-US" dirty="0" smtClean="0"/>
           </a:p>
         </p:txBody>
       </p:sp>
@@ -16258,10 +17017,16 @@
           <a:lstStyle/>
           <a:p>
             <a:r>
-              <a:rPr lang="en-US" dirty="0" smtClean="0"/>
+              <a:rPr lang="en-US" dirty="0" smtClean="0">
+                <a:latin typeface="Arial" panose="020B0604020202020204" pitchFamily="34" charset="0"/>
+                <a:cs typeface="Arial" panose="020B0604020202020204" pitchFamily="34" charset="0"/>
+              </a:rPr>
               <a:t>Methods: Shape</a:t>
             </a:r>
-            <a:endParaRPr lang="en-US" dirty="0"/>
+            <a:endParaRPr lang="en-US" dirty="0">
+              <a:latin typeface="Arial" panose="020B0604020202020204" pitchFamily="34" charset="0"/>
+              <a:cs typeface="Arial" panose="020B0604020202020204" pitchFamily="34" charset="0"/>
+            </a:endParaRPr>
           </a:p>
         </p:txBody>
       </p:sp>
@@ -16795,10 +17560,16 @@
           <a:p>
             <a:pPr algn="ctr"/>
             <a:r>
-              <a:rPr lang="en-US" dirty="0" smtClean="0"/>
+              <a:rPr lang="en-US" dirty="0" smtClean="0">
+                <a:latin typeface="Arial" panose="020B0604020202020204" pitchFamily="34" charset="0"/>
+                <a:cs typeface="Arial" panose="020B0604020202020204" pitchFamily="34" charset="0"/>
+              </a:rPr>
               <a:t>Circularity</a:t>
             </a:r>
-            <a:endParaRPr lang="en-US" dirty="0"/>
+            <a:endParaRPr lang="en-US" dirty="0">
+              <a:latin typeface="Arial" panose="020B0604020202020204" pitchFamily="34" charset="0"/>
+              <a:cs typeface="Arial" panose="020B0604020202020204" pitchFamily="34" charset="0"/>
+            </a:endParaRPr>
           </a:p>
         </p:txBody>
       </p:sp>
@@ -16826,10 +17597,16 @@
           <a:p>
             <a:pPr algn="ctr"/>
             <a:r>
-              <a:rPr lang="en-US" dirty="0" smtClean="0"/>
+              <a:rPr lang="en-US" dirty="0" smtClean="0">
+                <a:latin typeface="Arial" panose="020B0604020202020204" pitchFamily="34" charset="0"/>
+                <a:cs typeface="Arial" panose="020B0604020202020204" pitchFamily="34" charset="0"/>
+              </a:rPr>
               <a:t>89.7</a:t>
             </a:r>
-            <a:endParaRPr lang="en-US" dirty="0"/>
+            <a:endParaRPr lang="en-US" dirty="0">
+              <a:latin typeface="Arial" panose="020B0604020202020204" pitchFamily="34" charset="0"/>
+              <a:cs typeface="Arial" panose="020B0604020202020204" pitchFamily="34" charset="0"/>
+            </a:endParaRPr>
           </a:p>
         </p:txBody>
       </p:sp>
@@ -16857,10 +17634,16 @@
           <a:p>
             <a:pPr algn="ctr"/>
             <a:r>
-              <a:rPr lang="en-US" dirty="0" smtClean="0"/>
+              <a:rPr lang="en-US" dirty="0" smtClean="0">
+                <a:latin typeface="Arial" panose="020B0604020202020204" pitchFamily="34" charset="0"/>
+                <a:cs typeface="Arial" panose="020B0604020202020204" pitchFamily="34" charset="0"/>
+              </a:rPr>
               <a:t>17.7</a:t>
             </a:r>
-            <a:endParaRPr lang="en-US" dirty="0"/>
+            <a:endParaRPr lang="en-US" dirty="0">
+              <a:latin typeface="Arial" panose="020B0604020202020204" pitchFamily="34" charset="0"/>
+              <a:cs typeface="Arial" panose="020B0604020202020204" pitchFamily="34" charset="0"/>
+            </a:endParaRPr>
           </a:p>
         </p:txBody>
       </p:sp>
@@ -16888,10 +17671,16 @@
           <a:p>
             <a:pPr algn="ctr"/>
             <a:r>
-              <a:rPr lang="en-US" dirty="0" smtClean="0"/>
+              <a:rPr lang="en-US" dirty="0" smtClean="0">
+                <a:latin typeface="Arial" panose="020B0604020202020204" pitchFamily="34" charset="0"/>
+                <a:cs typeface="Arial" panose="020B0604020202020204" pitchFamily="34" charset="0"/>
+              </a:rPr>
               <a:t>2.4</a:t>
             </a:r>
-            <a:endParaRPr lang="en-US" dirty="0"/>
+            <a:endParaRPr lang="en-US" dirty="0">
+              <a:latin typeface="Arial" panose="020B0604020202020204" pitchFamily="34" charset="0"/>
+              <a:cs typeface="Arial" panose="020B0604020202020204" pitchFamily="34" charset="0"/>
+            </a:endParaRPr>
           </a:p>
         </p:txBody>
       </p:sp>
@@ -16919,10 +17708,16 @@
           <a:p>
             <a:pPr algn="ctr"/>
             <a:r>
-              <a:rPr lang="en-US" dirty="0" smtClean="0"/>
+              <a:rPr lang="en-US" dirty="0" smtClean="0">
+                <a:latin typeface="Arial" panose="020B0604020202020204" pitchFamily="34" charset="0"/>
+                <a:cs typeface="Arial" panose="020B0604020202020204" pitchFamily="34" charset="0"/>
+              </a:rPr>
               <a:t>6.4</a:t>
             </a:r>
-            <a:endParaRPr lang="en-US" dirty="0"/>
+            <a:endParaRPr lang="en-US" dirty="0">
+              <a:latin typeface="Arial" panose="020B0604020202020204" pitchFamily="34" charset="0"/>
+              <a:cs typeface="Arial" panose="020B0604020202020204" pitchFamily="34" charset="0"/>
+            </a:endParaRPr>
           </a:p>
         </p:txBody>
       </p:sp>
@@ -17030,10 +17825,16 @@
           <a:p>
             <a:pPr algn="ctr"/>
             <a:r>
-              <a:rPr lang="en-US" dirty="0" smtClean="0"/>
+              <a:rPr lang="en-US" dirty="0" smtClean="0">
+                <a:latin typeface="Arial" panose="020B0604020202020204" pitchFamily="34" charset="0"/>
+                <a:cs typeface="Arial" panose="020B0604020202020204" pitchFamily="34" charset="0"/>
+              </a:rPr>
               <a:t>Cookie on Angle</a:t>
             </a:r>
-            <a:endParaRPr lang="en-US" dirty="0"/>
+            <a:endParaRPr lang="en-US" dirty="0">
+              <a:latin typeface="Arial" panose="020B0604020202020204" pitchFamily="34" charset="0"/>
+              <a:cs typeface="Arial" panose="020B0604020202020204" pitchFamily="34" charset="0"/>
+            </a:endParaRPr>
           </a:p>
         </p:txBody>
       </p:sp>
@@ -17061,10 +17862,16 @@
           <a:p>
             <a:pPr algn="ctr"/>
             <a:r>
-              <a:rPr lang="en-US" dirty="0" smtClean="0"/>
+              <a:rPr lang="en-US" dirty="0" smtClean="0">
+                <a:latin typeface="Arial" panose="020B0604020202020204" pitchFamily="34" charset="0"/>
+                <a:cs typeface="Arial" panose="020B0604020202020204" pitchFamily="34" charset="0"/>
+              </a:rPr>
               <a:t>Multiple Objects</a:t>
             </a:r>
-            <a:endParaRPr lang="en-US" dirty="0"/>
+            <a:endParaRPr lang="en-US" dirty="0">
+              <a:latin typeface="Arial" panose="020B0604020202020204" pitchFamily="34" charset="0"/>
+              <a:cs typeface="Arial" panose="020B0604020202020204" pitchFamily="34" charset="0"/>
+            </a:endParaRPr>
           </a:p>
         </p:txBody>
       </p:sp>
@@ -17314,31 +18121,6 @@
           <a:chExt cx="0" cy="0"/>
         </a:xfrm>
       </p:grpSpPr>
-      <p:graphicFrame>
-        <p:nvGraphicFramePr>
-          <p:cNvPr id="4" name="Content Placeholder 3"/>
-          <p:cNvGraphicFramePr>
-            <a:graphicFrameLocks noGrp="1"/>
-          </p:cNvGraphicFramePr>
-          <p:nvPr>
-            <p:ph idx="1"/>
-            <p:extLst>
-              <p:ext uri="{D42A27DB-BD31-4B8C-83A1-F6EECF244321}">
-                <p14:modId xmlns:p14="http://schemas.microsoft.com/office/powerpoint/2010/main" val="608806703"/>
-              </p:ext>
-            </p:extLst>
-          </p:nvPr>
-        </p:nvGraphicFramePr>
-        <p:xfrm>
-          <a:off x="457200" y="1481328"/>
-          <a:ext cx="8229600" cy="4525963"/>
-        </p:xfrm>
-        <a:graphic>
-          <a:graphicData uri="http://schemas.openxmlformats.org/drawingml/2006/diagram">
-            <dgm:relIds xmlns:dgm="http://schemas.openxmlformats.org/drawingml/2006/diagram" xmlns:r="http://schemas.openxmlformats.org/officeDocument/2006/relationships" r:dm="rId3" r:lo="rId4" r:qs="rId5" r:cs="rId6"/>
-          </a:graphicData>
-        </a:graphic>
-      </p:graphicFrame>
       <p:sp>
         <p:nvSpPr>
           <p:cNvPr id="3" name="Title 2"/>
@@ -17355,17 +18137,545 @@
           <a:lstStyle/>
           <a:p>
             <a:r>
-              <a:rPr lang="en-US" dirty="0" smtClean="0"/>
-              <a:t>Methods: Classification</a:t>
+              <a:rPr lang="en-US" dirty="0" smtClean="0">
+                <a:latin typeface="Arial" panose="020B0604020202020204" pitchFamily="34" charset="0"/>
+                <a:cs typeface="Arial" panose="020B0604020202020204" pitchFamily="34" charset="0"/>
+              </a:rPr>
+              <a:t>Methods: Shape</a:t>
             </a:r>
-            <a:endParaRPr lang="en-US" dirty="0"/>
+            <a:endParaRPr lang="en-US" dirty="0">
+              <a:latin typeface="Arial" panose="020B0604020202020204" pitchFamily="34" charset="0"/>
+              <a:cs typeface="Arial" panose="020B0604020202020204" pitchFamily="34" charset="0"/>
+            </a:endParaRPr>
           </a:p>
         </p:txBody>
       </p:sp>
+      <p:sp>
+        <p:nvSpPr>
+          <p:cNvPr id="27" name="Content Placeholder 1"/>
+          <p:cNvSpPr txBox="1">
+            <a:spLocks/>
+          </p:cNvSpPr>
+          <p:nvPr/>
+        </p:nvSpPr>
+        <p:spPr>
+          <a:xfrm>
+            <a:off x="457200" y="1481328"/>
+            <a:ext cx="8229600" cy="4843272"/>
+          </a:xfrm>
+          <a:prstGeom prst="rect">
+            <a:avLst/>
+          </a:prstGeom>
+        </p:spPr>
+        <p:txBody>
+          <a:bodyPr vert="horz">
+            <a:normAutofit/>
+          </a:bodyPr>
+          <a:lstStyle>
+            <a:lvl1pPr marL="365760" indent="-256032" algn="l" rtl="0" eaLnBrk="1" latinLnBrk="0" hangingPunct="1">
+              <a:spcBef>
+                <a:spcPts val="400"/>
+              </a:spcBef>
+              <a:spcAft>
+                <a:spcPts val="0"/>
+              </a:spcAft>
+              <a:buClr>
+                <a:schemeClr val="accent1"/>
+              </a:buClr>
+              <a:buSzPct val="68000"/>
+              <a:buFont typeface="Wingdings 3"/>
+              <a:buChar char=""/>
+              <a:defRPr kumimoji="0" sz="2700" kern="1200">
+                <a:solidFill>
+                  <a:schemeClr val="tx1"/>
+                </a:solidFill>
+                <a:latin typeface="+mn-lt"/>
+                <a:ea typeface="+mn-ea"/>
+                <a:cs typeface="+mn-cs"/>
+              </a:defRPr>
+            </a:lvl1pPr>
+            <a:lvl2pPr marL="621792" indent="-228600" algn="l" rtl="0" eaLnBrk="1" latinLnBrk="0" hangingPunct="1">
+              <a:spcBef>
+                <a:spcPts val="324"/>
+              </a:spcBef>
+              <a:buClr>
+                <a:schemeClr val="accent1"/>
+              </a:buClr>
+              <a:buFont typeface="Verdana"/>
+              <a:buChar char="◦"/>
+              <a:defRPr kumimoji="0" sz="2300" kern="1200">
+                <a:solidFill>
+                  <a:schemeClr val="tx1"/>
+                </a:solidFill>
+                <a:latin typeface="+mn-lt"/>
+                <a:ea typeface="+mn-ea"/>
+                <a:cs typeface="+mn-cs"/>
+              </a:defRPr>
+            </a:lvl2pPr>
+            <a:lvl3pPr marL="859536" indent="-228600" algn="l" rtl="0" eaLnBrk="1" latinLnBrk="0" hangingPunct="1">
+              <a:spcBef>
+                <a:spcPts val="350"/>
+              </a:spcBef>
+              <a:buClr>
+                <a:schemeClr val="accent2"/>
+              </a:buClr>
+              <a:buSzPct val="100000"/>
+              <a:buFont typeface="Wingdings 2"/>
+              <a:buChar char=""/>
+              <a:defRPr kumimoji="0" sz="2100" kern="1200">
+                <a:solidFill>
+                  <a:schemeClr val="tx1"/>
+                </a:solidFill>
+                <a:latin typeface="+mn-lt"/>
+                <a:ea typeface="+mn-ea"/>
+                <a:cs typeface="+mn-cs"/>
+              </a:defRPr>
+            </a:lvl3pPr>
+            <a:lvl4pPr marL="1143000" indent="-228600" algn="l" rtl="0" eaLnBrk="1" latinLnBrk="0" hangingPunct="1">
+              <a:spcBef>
+                <a:spcPts val="350"/>
+              </a:spcBef>
+              <a:buClr>
+                <a:schemeClr val="accent2"/>
+              </a:buClr>
+              <a:buFont typeface="Wingdings 2"/>
+              <a:buChar char=""/>
+              <a:defRPr kumimoji="0" sz="1900" kern="1200">
+                <a:solidFill>
+                  <a:schemeClr val="tx1"/>
+                </a:solidFill>
+                <a:latin typeface="+mn-lt"/>
+                <a:ea typeface="+mn-ea"/>
+                <a:cs typeface="+mn-cs"/>
+              </a:defRPr>
+            </a:lvl4pPr>
+            <a:lvl5pPr marL="1371600" indent="-228600" algn="l" rtl="0" eaLnBrk="1" latinLnBrk="0" hangingPunct="1">
+              <a:spcBef>
+                <a:spcPts val="350"/>
+              </a:spcBef>
+              <a:buClr>
+                <a:schemeClr val="accent2"/>
+              </a:buClr>
+              <a:buFont typeface="Wingdings 2"/>
+              <a:buChar char=""/>
+              <a:defRPr kumimoji="0" sz="1800" kern="1200">
+                <a:solidFill>
+                  <a:schemeClr val="tx1"/>
+                </a:solidFill>
+                <a:latin typeface="+mn-lt"/>
+                <a:ea typeface="+mn-ea"/>
+                <a:cs typeface="+mn-cs"/>
+              </a:defRPr>
+            </a:lvl5pPr>
+            <a:lvl6pPr marL="1600200" indent="-228600" algn="l" rtl="0" eaLnBrk="1" latinLnBrk="0" hangingPunct="1">
+              <a:spcBef>
+                <a:spcPts val="350"/>
+              </a:spcBef>
+              <a:buClr>
+                <a:schemeClr val="accent3"/>
+              </a:buClr>
+              <a:buFont typeface="Wingdings 2"/>
+              <a:buChar char=""/>
+              <a:defRPr kumimoji="0" sz="1800" kern="1200">
+                <a:solidFill>
+                  <a:schemeClr val="tx1"/>
+                </a:solidFill>
+                <a:latin typeface="+mn-lt"/>
+                <a:ea typeface="+mn-ea"/>
+                <a:cs typeface="+mn-cs"/>
+              </a:defRPr>
+            </a:lvl6pPr>
+            <a:lvl7pPr marL="1828800" indent="-228600" algn="l" rtl="0" eaLnBrk="1" latinLnBrk="0" hangingPunct="1">
+              <a:spcBef>
+                <a:spcPts val="350"/>
+              </a:spcBef>
+              <a:buClr>
+                <a:schemeClr val="accent3"/>
+              </a:buClr>
+              <a:buFont typeface="Wingdings 2"/>
+              <a:buChar char=""/>
+              <a:defRPr kumimoji="0" sz="1600" kern="1200">
+                <a:solidFill>
+                  <a:schemeClr val="tx1"/>
+                </a:solidFill>
+                <a:latin typeface="+mn-lt"/>
+                <a:ea typeface="+mn-ea"/>
+                <a:cs typeface="+mn-cs"/>
+              </a:defRPr>
+            </a:lvl7pPr>
+            <a:lvl8pPr marL="2057400" indent="-228600" algn="l" rtl="0" eaLnBrk="1" latinLnBrk="0" hangingPunct="1">
+              <a:spcBef>
+                <a:spcPts val="350"/>
+              </a:spcBef>
+              <a:buClr>
+                <a:schemeClr val="accent3"/>
+              </a:buClr>
+              <a:buFont typeface="Wingdings 2"/>
+              <a:buChar char=""/>
+              <a:defRPr kumimoji="0" sz="1600" kern="1200">
+                <a:solidFill>
+                  <a:schemeClr val="tx1"/>
+                </a:solidFill>
+                <a:latin typeface="+mn-lt"/>
+                <a:ea typeface="+mn-ea"/>
+                <a:cs typeface="+mn-cs"/>
+              </a:defRPr>
+            </a:lvl8pPr>
+            <a:lvl9pPr marL="2286000" indent="-228600" algn="l" rtl="0" eaLnBrk="1" latinLnBrk="0" hangingPunct="1">
+              <a:spcBef>
+                <a:spcPts val="350"/>
+              </a:spcBef>
+              <a:buClr>
+                <a:schemeClr val="accent3"/>
+              </a:buClr>
+              <a:buFont typeface="Wingdings 2"/>
+              <a:buChar char=""/>
+              <a:defRPr kumimoji="0" sz="1600" kern="1200" baseline="0">
+                <a:solidFill>
+                  <a:schemeClr val="tx1"/>
+                </a:solidFill>
+                <a:latin typeface="+mn-lt"/>
+                <a:ea typeface="+mn-ea"/>
+                <a:cs typeface="+mn-cs"/>
+              </a:defRPr>
+            </a:lvl9pPr>
+            <a:extLst/>
+          </a:lstStyle>
+          <a:p>
+            <a:endParaRPr lang="en-US" i="1" smtClean="0"/>
+          </a:p>
+          <a:p>
+            <a:pPr marL="393192" lvl="1" indent="0">
+              <a:buFont typeface="Verdana"/>
+              <a:buNone/>
+            </a:pPr>
+            <a:endParaRPr lang="en-US" i="1" smtClean="0"/>
+          </a:p>
+          <a:p>
+            <a:pPr marL="393192" lvl="1" indent="0">
+              <a:buFont typeface="Verdana"/>
+              <a:buNone/>
+            </a:pPr>
+            <a:endParaRPr lang="en-US" i="1" dirty="0" smtClean="0"/>
+          </a:p>
+        </p:txBody>
+      </p:sp>
+      <p:sp>
+        <p:nvSpPr>
+          <p:cNvPr id="4" name="Content Placeholder 3"/>
+          <p:cNvSpPr>
+            <a:spLocks noGrp="1"/>
+          </p:cNvSpPr>
+          <p:nvPr>
+            <p:ph idx="1"/>
+          </p:nvPr>
+        </p:nvSpPr>
+        <p:spPr>
+          <a:xfrm>
+            <a:off x="304800" y="1371600"/>
+            <a:ext cx="8382000" cy="4525963"/>
+          </a:xfrm>
+        </p:spPr>
+        <p:txBody>
+          <a:bodyPr/>
+          <a:lstStyle/>
+          <a:p>
+            <a:r>
+              <a:rPr lang="en-US" dirty="0" smtClean="0">
+                <a:latin typeface="Arial" panose="020B0604020202020204" pitchFamily="34" charset="0"/>
+                <a:cs typeface="Arial" panose="020B0604020202020204" pitchFamily="34" charset="0"/>
+              </a:rPr>
+              <a:t>Alternative Method:</a:t>
+            </a:r>
+          </a:p>
+          <a:p>
+            <a:pPr marL="393192" lvl="1" indent="0">
+              <a:buNone/>
+            </a:pPr>
+            <a:r>
+              <a:rPr lang="en-US" sz="2700" dirty="0" smtClean="0">
+                <a:latin typeface="Arial" panose="020B0604020202020204" pitchFamily="34" charset="0"/>
+                <a:cs typeface="Arial" panose="020B0604020202020204" pitchFamily="34" charset="0"/>
+              </a:rPr>
+              <a:t>Tangent Angle Histograms</a:t>
+            </a:r>
+          </a:p>
+          <a:p>
+            <a:pPr lvl="1"/>
+            <a:r>
+              <a:rPr lang="en-US" dirty="0" smtClean="0">
+                <a:latin typeface="Arial" panose="020B0604020202020204" pitchFamily="34" charset="0"/>
+                <a:cs typeface="Arial" panose="020B0604020202020204" pitchFamily="34" charset="0"/>
+              </a:rPr>
+              <a:t>Made some classifications worse</a:t>
+            </a:r>
+          </a:p>
+          <a:p>
+            <a:pPr lvl="2"/>
+            <a:r>
+              <a:rPr lang="en-US" dirty="0" smtClean="0">
+                <a:latin typeface="Arial" panose="020B0604020202020204" pitchFamily="34" charset="0"/>
+                <a:cs typeface="Arial" panose="020B0604020202020204" pitchFamily="34" charset="0"/>
+              </a:rPr>
+              <a:t>Could be due to foreground/background segmentation</a:t>
+            </a:r>
+          </a:p>
+        </p:txBody>
+      </p:sp>
+      <p:pic>
+        <p:nvPicPr>
+          <p:cNvPr id="3074" name="Picture 2"/>
+          <p:cNvPicPr>
+            <a:picLocks noChangeAspect="1" noChangeArrowheads="1"/>
+          </p:cNvPicPr>
+          <p:nvPr/>
+        </p:nvPicPr>
+        <p:blipFill rotWithShape="1">
+          <a:blip r:embed="rId3">
+            <a:extLst>
+              <a:ext uri="{28A0092B-C50C-407E-A947-70E740481C1C}">
+                <a14:useLocalDpi xmlns:a14="http://schemas.microsoft.com/office/drawing/2010/main" val="0"/>
+              </a:ext>
+            </a:extLst>
+          </a:blip>
+          <a:srcRect l="4081" r="6735"/>
+          <a:stretch/>
+        </p:blipFill>
+        <p:spPr bwMode="auto">
+          <a:xfrm>
+            <a:off x="4833800" y="4658834"/>
+            <a:ext cx="4234000" cy="1598650"/>
+          </a:xfrm>
+          <a:prstGeom prst="rect">
+            <a:avLst/>
+          </a:prstGeom>
+          <a:noFill/>
+          <a:ln>
+            <a:noFill/>
+          </a:ln>
+          <a:effectLst/>
+          <a:extLst>
+            <a:ext uri="{909E8E84-426E-40DD-AFC4-6F175D3DCCD1}">
+              <a14:hiddenFill xmlns:a14="http://schemas.microsoft.com/office/drawing/2010/main">
+                <a:solidFill>
+                  <a:schemeClr val="accent1"/>
+                </a:solidFill>
+              </a14:hiddenFill>
+            </a:ext>
+            <a:ext uri="{91240B29-F687-4F45-9708-019B960494DF}">
+              <a14:hiddenLine xmlns:a14="http://schemas.microsoft.com/office/drawing/2010/main" w="9525">
+                <a:solidFill>
+                  <a:schemeClr val="tx1"/>
+                </a:solidFill>
+                <a:miter lim="800000"/>
+                <a:headEnd/>
+                <a:tailEnd/>
+              </a14:hiddenLine>
+            </a:ext>
+            <a:ext uri="{AF507438-7753-43E0-B8FC-AC1667EBCBE1}">
+              <a14:hiddenEffects xmlns:a14="http://schemas.microsoft.com/office/drawing/2010/main">
+                <a:effectLst>
+                  <a:outerShdw dist="35921" dir="2700000" algn="ctr" rotWithShape="0">
+                    <a:schemeClr val="bg2"/>
+                  </a:outerShdw>
+                </a:effectLst>
+              </a14:hiddenEffects>
+            </a:ext>
+          </a:extLst>
+        </p:spPr>
+      </p:pic>
+      <p:pic>
+        <p:nvPicPr>
+          <p:cNvPr id="3075" name="Picture 3"/>
+          <p:cNvPicPr>
+            <a:picLocks noChangeAspect="1" noChangeArrowheads="1"/>
+          </p:cNvPicPr>
+          <p:nvPr/>
+        </p:nvPicPr>
+        <p:blipFill rotWithShape="1">
+          <a:blip r:embed="rId4">
+            <a:extLst>
+              <a:ext uri="{28A0092B-C50C-407E-A947-70E740481C1C}">
+                <a14:useLocalDpi xmlns:a14="http://schemas.microsoft.com/office/drawing/2010/main" val="0"/>
+              </a:ext>
+            </a:extLst>
+          </a:blip>
+          <a:srcRect l="3061" r="6736"/>
+          <a:stretch/>
+        </p:blipFill>
+        <p:spPr bwMode="auto">
+          <a:xfrm>
+            <a:off x="285404" y="4648200"/>
+            <a:ext cx="4286596" cy="1600200"/>
+          </a:xfrm>
+          <a:prstGeom prst="rect">
+            <a:avLst/>
+          </a:prstGeom>
+          <a:noFill/>
+          <a:ln>
+            <a:noFill/>
+          </a:ln>
+          <a:effectLst/>
+          <a:extLst>
+            <a:ext uri="{909E8E84-426E-40DD-AFC4-6F175D3DCCD1}">
+              <a14:hiddenFill xmlns:a14="http://schemas.microsoft.com/office/drawing/2010/main">
+                <a:solidFill>
+                  <a:schemeClr val="accent1"/>
+                </a:solidFill>
+              </a14:hiddenFill>
+            </a:ext>
+            <a:ext uri="{91240B29-F687-4F45-9708-019B960494DF}">
+              <a14:hiddenLine xmlns:a14="http://schemas.microsoft.com/office/drawing/2010/main" w="9525">
+                <a:solidFill>
+                  <a:schemeClr val="tx1"/>
+                </a:solidFill>
+                <a:miter lim="800000"/>
+                <a:headEnd/>
+                <a:tailEnd/>
+              </a14:hiddenLine>
+            </a:ext>
+            <a:ext uri="{AF507438-7753-43E0-B8FC-AC1667EBCBE1}">
+              <a14:hiddenEffects xmlns:a14="http://schemas.microsoft.com/office/drawing/2010/main">
+                <a:effectLst>
+                  <a:outerShdw dist="35921" dir="2700000" algn="ctr" rotWithShape="0">
+                    <a:schemeClr val="bg2"/>
+                  </a:outerShdw>
+                </a:effectLst>
+              </a14:hiddenEffects>
+            </a:ext>
+          </a:extLst>
+        </p:spPr>
+      </p:pic>
+      <p:pic>
+        <p:nvPicPr>
+          <p:cNvPr id="3076" name="Picture 4"/>
+          <p:cNvPicPr>
+            <a:picLocks noChangeAspect="1" noChangeArrowheads="1"/>
+          </p:cNvPicPr>
+          <p:nvPr/>
+        </p:nvPicPr>
+        <p:blipFill rotWithShape="1">
+          <a:blip r:embed="rId5" cstate="print">
+            <a:extLst>
+              <a:ext uri="{28A0092B-C50C-407E-A947-70E740481C1C}">
+                <a14:useLocalDpi xmlns:a14="http://schemas.microsoft.com/office/drawing/2010/main" val="0"/>
+              </a:ext>
+            </a:extLst>
+          </a:blip>
+          <a:srcRect l="22494" r="22543"/>
+          <a:stretch/>
+        </p:blipFill>
+        <p:spPr bwMode="auto">
+          <a:xfrm flipV="1">
+            <a:off x="6553200" y="3429000"/>
+            <a:ext cx="1051560" cy="1075884"/>
+          </a:xfrm>
+          <a:prstGeom prst="rect">
+            <a:avLst/>
+          </a:prstGeom>
+          <a:noFill/>
+          <a:ln>
+            <a:noFill/>
+          </a:ln>
+          <a:effectLst/>
+          <a:extLst>
+            <a:ext uri="{909E8E84-426E-40DD-AFC4-6F175D3DCCD1}">
+              <a14:hiddenFill xmlns:a14="http://schemas.microsoft.com/office/drawing/2010/main">
+                <a:solidFill>
+                  <a:schemeClr val="accent1"/>
+                </a:solidFill>
+              </a14:hiddenFill>
+            </a:ext>
+            <a:ext uri="{91240B29-F687-4F45-9708-019B960494DF}">
+              <a14:hiddenLine xmlns:a14="http://schemas.microsoft.com/office/drawing/2010/main" w="9525">
+                <a:solidFill>
+                  <a:schemeClr val="tx1"/>
+                </a:solidFill>
+                <a:miter lim="800000"/>
+                <a:headEnd/>
+                <a:tailEnd/>
+              </a14:hiddenLine>
+            </a:ext>
+            <a:ext uri="{AF507438-7753-43E0-B8FC-AC1667EBCBE1}">
+              <a14:hiddenEffects xmlns:a14="http://schemas.microsoft.com/office/drawing/2010/main">
+                <a:effectLst>
+                  <a:outerShdw dist="35921" dir="2700000" algn="ctr" rotWithShape="0">
+                    <a:schemeClr val="bg2"/>
+                  </a:outerShdw>
+                </a:effectLst>
+              </a14:hiddenEffects>
+            </a:ext>
+          </a:extLst>
+        </p:spPr>
+      </p:pic>
+      <p:pic>
+        <p:nvPicPr>
+          <p:cNvPr id="3077" name="Picture 5"/>
+          <p:cNvPicPr>
+            <a:picLocks noChangeAspect="1" noChangeArrowheads="1"/>
+          </p:cNvPicPr>
+          <p:nvPr/>
+        </p:nvPicPr>
+        <p:blipFill>
+          <a:blip r:embed="rId6" cstate="print">
+            <a:extLst>
+              <a:ext uri="{28A0092B-C50C-407E-A947-70E740481C1C}">
+                <a14:useLocalDpi xmlns:a14="http://schemas.microsoft.com/office/drawing/2010/main" val="0"/>
+              </a:ext>
+            </a:extLst>
+          </a:blip>
+          <a:srcRect/>
+          <a:stretch>
+            <a:fillRect/>
+          </a:stretch>
+        </p:blipFill>
+        <p:spPr bwMode="auto">
+          <a:xfrm>
+            <a:off x="1676400" y="3581400"/>
+            <a:ext cx="1629272" cy="916216"/>
+          </a:xfrm>
+          <a:prstGeom prst="rect">
+            <a:avLst/>
+          </a:prstGeom>
+          <a:noFill/>
+          <a:ln>
+            <a:noFill/>
+          </a:ln>
+          <a:effectLst/>
+          <a:extLst>
+            <a:ext uri="{909E8E84-426E-40DD-AFC4-6F175D3DCCD1}">
+              <a14:hiddenFill xmlns:a14="http://schemas.microsoft.com/office/drawing/2010/main">
+                <a:solidFill>
+                  <a:schemeClr val="accent1"/>
+                </a:solidFill>
+              </a14:hiddenFill>
+            </a:ext>
+            <a:ext uri="{91240B29-F687-4F45-9708-019B960494DF}">
+              <a14:hiddenLine xmlns:a14="http://schemas.microsoft.com/office/drawing/2010/main" w="9525">
+                <a:solidFill>
+                  <a:schemeClr val="tx1"/>
+                </a:solidFill>
+                <a:miter lim="800000"/>
+                <a:headEnd/>
+                <a:tailEnd/>
+              </a14:hiddenLine>
+            </a:ext>
+            <a:ext uri="{AF507438-7753-43E0-B8FC-AC1667EBCBE1}">
+              <a14:hiddenEffects xmlns:a14="http://schemas.microsoft.com/office/drawing/2010/main">
+                <a:effectLst>
+                  <a:outerShdw dist="35921" dir="2700000" algn="ctr" rotWithShape="0">
+                    <a:schemeClr val="bg2"/>
+                  </a:outerShdw>
+                </a:effectLst>
+              </a14:hiddenEffects>
+            </a:ext>
+          </a:extLst>
+        </p:spPr>
+      </p:pic>
     </p:spTree>
     <p:extLst>
       <p:ext uri="{BB962C8B-B14F-4D97-AF65-F5344CB8AC3E}">
-        <p14:creationId xmlns:p14="http://schemas.microsoft.com/office/powerpoint/2010/main" val="2548635361"/>
+        <p14:creationId xmlns:p14="http://schemas.microsoft.com/office/powerpoint/2010/main" val="1359370635"/>
       </p:ext>
     </p:extLst>
   </p:cSld>

</xml_diff>

<commit_message>
Updated my PPT slides.
</commit_message>
<xml_diff>
--- a/documents/830_Presentation_Fasburg_Thomas_Reiff.pptx
+++ b/documents/830_Presentation_Fasburg_Thomas_Reiff.pptx
@@ -126,7 +126,7 @@
   </p:defaultTextStyle>
   <p:extLst>
     <p:ext uri="{EFAFB233-063F-42B5-8137-9DF3F51BA10A}">
-      <p15:sldGuideLst xmlns:p15="http://schemas.microsoft.com/office/powerpoint/2012/main" xmlns="">
+      <p15:sldGuideLst xmlns:p15="http://schemas.microsoft.com/office/powerpoint/2012/main">
         <p15:guide id="1" orient="horz" pos="2160">
           <p15:clr>
             <a:srgbClr val="A4A3A4"/>
@@ -2598,629 +2598,6 @@
       <dsp:cNvGrpSpPr/>
     </dsp:nvGrpSpPr>
     <dsp:grpSpPr/>
-    <dsp:sp modelId="{CA4F0969-CDAB-40EE-B404-498D81FF95F0}">
-      <dsp:nvSpPr>
-        <dsp:cNvPr id="0" name=""/>
-        <dsp:cNvSpPr/>
-      </dsp:nvSpPr>
-      <dsp:spPr>
-        <a:xfrm>
-          <a:off x="0" y="0"/>
-          <a:ext cx="4267200" cy="964935"/>
-        </a:xfrm>
-        <a:prstGeom prst="roundRect">
-          <a:avLst>
-            <a:gd name="adj" fmla="val 10000"/>
-          </a:avLst>
-        </a:prstGeom>
-        <a:solidFill>
-          <a:schemeClr val="accent1">
-            <a:hueOff val="0"/>
-            <a:satOff val="0"/>
-            <a:lumOff val="0"/>
-            <a:alphaOff val="0"/>
-          </a:schemeClr>
-        </a:solidFill>
-        <a:ln w="55000" cap="flat" cmpd="thickThin" algn="ctr">
-          <a:solidFill>
-            <a:schemeClr val="lt1">
-              <a:hueOff val="0"/>
-              <a:satOff val="0"/>
-              <a:lumOff val="0"/>
-              <a:alphaOff val="0"/>
-            </a:schemeClr>
-          </a:solidFill>
-          <a:prstDash val="solid"/>
-        </a:ln>
-        <a:effectLst/>
-      </dsp:spPr>
-      <dsp:style>
-        <a:lnRef idx="2">
-          <a:scrgbClr r="0" g="0" b="0"/>
-        </a:lnRef>
-        <a:fillRef idx="1">
-          <a:scrgbClr r="0" g="0" b="0"/>
-        </a:fillRef>
-        <a:effectRef idx="0">
-          <a:scrgbClr r="0" g="0" b="0"/>
-        </a:effectRef>
-        <a:fontRef idx="minor">
-          <a:schemeClr val="lt1"/>
-        </a:fontRef>
-      </dsp:style>
-      <dsp:txBody>
-        <a:bodyPr spcFirstLastPara="0" vert="horz" wrap="square" lIns="76200" tIns="76200" rIns="76200" bIns="76200" numCol="1" spcCol="1270" anchor="ctr" anchorCtr="0">
-          <a:noAutofit/>
-        </a:bodyPr>
-        <a:lstStyle/>
-        <a:p>
-          <a:pPr lvl="0" algn="l" defTabSz="889000" rtl="0">
-            <a:lnSpc>
-              <a:spcPct val="90000"/>
-            </a:lnSpc>
-            <a:spcBef>
-              <a:spcPct val="0"/>
-            </a:spcBef>
-            <a:spcAft>
-              <a:spcPct val="35000"/>
-            </a:spcAft>
-          </a:pPr>
-          <a:r>
-            <a:rPr lang="en-US" sz="2000" kern="1200" dirty="0" smtClean="0">
-              <a:latin typeface="Arial" panose="020B0604020202020204" pitchFamily="34" charset="0"/>
-              <a:cs typeface="Arial" panose="020B0604020202020204" pitchFamily="34" charset="0"/>
-            </a:rPr>
-            <a:t>Use R, B, or G as gray image based on largest </a:t>
-          </a:r>
-          <a:r>
-            <a:rPr lang="el-GR" sz="2000" kern="1200" dirty="0" smtClean="0">
-              <a:latin typeface="Arial" panose="020B0604020202020204" pitchFamily="34" charset="0"/>
-              <a:cs typeface="Arial" panose="020B0604020202020204" pitchFamily="34" charset="0"/>
-            </a:rPr>
-            <a:t>σ</a:t>
-          </a:r>
-          <a:endParaRPr lang="en-US" sz="2000" kern="1200" dirty="0">
-            <a:latin typeface="Arial" panose="020B0604020202020204" pitchFamily="34" charset="0"/>
-            <a:cs typeface="Arial" panose="020B0604020202020204" pitchFamily="34" charset="0"/>
-          </a:endParaRPr>
-        </a:p>
-      </dsp:txBody>
-      <dsp:txXfrm>
-        <a:off x="28262" y="28262"/>
-        <a:ext cx="3144422" cy="908411"/>
-      </dsp:txXfrm>
-    </dsp:sp>
-    <dsp:sp modelId="{E9907399-643A-4492-BBA8-BC8B4F473561}">
-      <dsp:nvSpPr>
-        <dsp:cNvPr id="0" name=""/>
-        <dsp:cNvSpPr/>
-      </dsp:nvSpPr>
-      <dsp:spPr>
-        <a:xfrm>
-          <a:off x="357377" y="1140378"/>
-          <a:ext cx="4267200" cy="964935"/>
-        </a:xfrm>
-        <a:prstGeom prst="roundRect">
-          <a:avLst>
-            <a:gd name="adj" fmla="val 10000"/>
-          </a:avLst>
-        </a:prstGeom>
-        <a:solidFill>
-          <a:schemeClr val="accent1">
-            <a:hueOff val="0"/>
-            <a:satOff val="0"/>
-            <a:lumOff val="0"/>
-            <a:alphaOff val="0"/>
-          </a:schemeClr>
-        </a:solidFill>
-        <a:ln w="55000" cap="flat" cmpd="thickThin" algn="ctr">
-          <a:solidFill>
-            <a:schemeClr val="lt1">
-              <a:hueOff val="0"/>
-              <a:satOff val="0"/>
-              <a:lumOff val="0"/>
-              <a:alphaOff val="0"/>
-            </a:schemeClr>
-          </a:solidFill>
-          <a:prstDash val="solid"/>
-        </a:ln>
-        <a:effectLst/>
-      </dsp:spPr>
-      <dsp:style>
-        <a:lnRef idx="2">
-          <a:scrgbClr r="0" g="0" b="0"/>
-        </a:lnRef>
-        <a:fillRef idx="1">
-          <a:scrgbClr r="0" g="0" b="0"/>
-        </a:fillRef>
-        <a:effectRef idx="0">
-          <a:scrgbClr r="0" g="0" b="0"/>
-        </a:effectRef>
-        <a:fontRef idx="minor">
-          <a:schemeClr val="lt1"/>
-        </a:fontRef>
-      </dsp:style>
-      <dsp:txBody>
-        <a:bodyPr spcFirstLastPara="0" vert="horz" wrap="square" lIns="76200" tIns="76200" rIns="76200" bIns="76200" numCol="1" spcCol="1270" anchor="ctr" anchorCtr="0">
-          <a:noAutofit/>
-        </a:bodyPr>
-        <a:lstStyle/>
-        <a:p>
-          <a:pPr lvl="0" algn="l" defTabSz="889000" rtl="0">
-            <a:lnSpc>
-              <a:spcPct val="90000"/>
-            </a:lnSpc>
-            <a:spcBef>
-              <a:spcPct val="0"/>
-            </a:spcBef>
-            <a:spcAft>
-              <a:spcPct val="35000"/>
-            </a:spcAft>
-          </a:pPr>
-          <a:r>
-            <a:rPr lang="en-US" sz="2000" kern="1200" dirty="0" smtClean="0">
-              <a:latin typeface="Arial" panose="020B0604020202020204" pitchFamily="34" charset="0"/>
-              <a:cs typeface="Arial" panose="020B0604020202020204" pitchFamily="34" charset="0"/>
-            </a:rPr>
-            <a:t>Create intensity histogram H, and smooth</a:t>
-          </a:r>
-          <a:endParaRPr lang="en-US" sz="2000" kern="1200" dirty="0">
-            <a:latin typeface="Arial" panose="020B0604020202020204" pitchFamily="34" charset="0"/>
-            <a:cs typeface="Arial" panose="020B0604020202020204" pitchFamily="34" charset="0"/>
-          </a:endParaRPr>
-        </a:p>
-      </dsp:txBody>
-      <dsp:txXfrm>
-        <a:off x="385639" y="1168640"/>
-        <a:ext cx="3226089" cy="908411"/>
-      </dsp:txXfrm>
-    </dsp:sp>
-    <dsp:sp modelId="{3C0DA63A-76CB-46F1-ABD8-60529721F922}">
-      <dsp:nvSpPr>
-        <dsp:cNvPr id="0" name=""/>
-        <dsp:cNvSpPr/>
-      </dsp:nvSpPr>
-      <dsp:spPr>
-        <a:xfrm>
-          <a:off x="709421" y="2280756"/>
-          <a:ext cx="4267200" cy="964935"/>
-        </a:xfrm>
-        <a:prstGeom prst="roundRect">
-          <a:avLst>
-            <a:gd name="adj" fmla="val 10000"/>
-          </a:avLst>
-        </a:prstGeom>
-        <a:solidFill>
-          <a:schemeClr val="accent1">
-            <a:hueOff val="0"/>
-            <a:satOff val="0"/>
-            <a:lumOff val="0"/>
-            <a:alphaOff val="0"/>
-          </a:schemeClr>
-        </a:solidFill>
-        <a:ln w="55000" cap="flat" cmpd="thickThin" algn="ctr">
-          <a:solidFill>
-            <a:schemeClr val="lt1">
-              <a:hueOff val="0"/>
-              <a:satOff val="0"/>
-              <a:lumOff val="0"/>
-              <a:alphaOff val="0"/>
-            </a:schemeClr>
-          </a:solidFill>
-          <a:prstDash val="solid"/>
-        </a:ln>
-        <a:effectLst/>
-      </dsp:spPr>
-      <dsp:style>
-        <a:lnRef idx="2">
-          <a:scrgbClr r="0" g="0" b="0"/>
-        </a:lnRef>
-        <a:fillRef idx="1">
-          <a:scrgbClr r="0" g="0" b="0"/>
-        </a:fillRef>
-        <a:effectRef idx="0">
-          <a:scrgbClr r="0" g="0" b="0"/>
-        </a:effectRef>
-        <a:fontRef idx="minor">
-          <a:schemeClr val="lt1"/>
-        </a:fontRef>
-      </dsp:style>
-      <dsp:txBody>
-        <a:bodyPr spcFirstLastPara="0" vert="horz" wrap="square" lIns="76200" tIns="76200" rIns="76200" bIns="76200" numCol="1" spcCol="1270" anchor="ctr" anchorCtr="0">
-          <a:noAutofit/>
-        </a:bodyPr>
-        <a:lstStyle/>
-        <a:p>
-          <a:pPr lvl="0" algn="l" defTabSz="889000" rtl="0">
-            <a:lnSpc>
-              <a:spcPct val="90000"/>
-            </a:lnSpc>
-            <a:spcBef>
-              <a:spcPct val="0"/>
-            </a:spcBef>
-            <a:spcAft>
-              <a:spcPct val="35000"/>
-            </a:spcAft>
-          </a:pPr>
-          <a:r>
-            <a:rPr lang="en-US" sz="2000" kern="1200" dirty="0" smtClean="0">
-              <a:latin typeface="Arial" panose="020B0604020202020204" pitchFamily="34" charset="0"/>
-              <a:cs typeface="Arial" panose="020B0604020202020204" pitchFamily="34" charset="0"/>
-            </a:rPr>
-            <a:t>Threshold based on lowest trough in H</a:t>
-          </a:r>
-          <a:endParaRPr lang="en-US" sz="2000" kern="1200" dirty="0">
-            <a:latin typeface="Arial" panose="020B0604020202020204" pitchFamily="34" charset="0"/>
-            <a:cs typeface="Arial" panose="020B0604020202020204" pitchFamily="34" charset="0"/>
-          </a:endParaRPr>
-        </a:p>
-      </dsp:txBody>
-      <dsp:txXfrm>
-        <a:off x="737683" y="2309018"/>
-        <a:ext cx="3231423" cy="908411"/>
-      </dsp:txXfrm>
-    </dsp:sp>
-    <dsp:sp modelId="{431E7DF2-929C-4265-8080-7AF997DAB656}">
-      <dsp:nvSpPr>
-        <dsp:cNvPr id="0" name=""/>
-        <dsp:cNvSpPr/>
-      </dsp:nvSpPr>
-      <dsp:spPr>
-        <a:xfrm>
-          <a:off x="1066799" y="3421135"/>
-          <a:ext cx="4267200" cy="964935"/>
-        </a:xfrm>
-        <a:prstGeom prst="roundRect">
-          <a:avLst>
-            <a:gd name="adj" fmla="val 10000"/>
-          </a:avLst>
-        </a:prstGeom>
-        <a:solidFill>
-          <a:schemeClr val="accent1">
-            <a:hueOff val="0"/>
-            <a:satOff val="0"/>
-            <a:lumOff val="0"/>
-            <a:alphaOff val="0"/>
-          </a:schemeClr>
-        </a:solidFill>
-        <a:ln w="55000" cap="flat" cmpd="thickThin" algn="ctr">
-          <a:solidFill>
-            <a:schemeClr val="lt1">
-              <a:hueOff val="0"/>
-              <a:satOff val="0"/>
-              <a:lumOff val="0"/>
-              <a:alphaOff val="0"/>
-            </a:schemeClr>
-          </a:solidFill>
-          <a:prstDash val="solid"/>
-        </a:ln>
-        <a:effectLst/>
-      </dsp:spPr>
-      <dsp:style>
-        <a:lnRef idx="2">
-          <a:scrgbClr r="0" g="0" b="0"/>
-        </a:lnRef>
-        <a:fillRef idx="1">
-          <a:scrgbClr r="0" g="0" b="0"/>
-        </a:fillRef>
-        <a:effectRef idx="0">
-          <a:scrgbClr r="0" g="0" b="0"/>
-        </a:effectRef>
-        <a:fontRef idx="minor">
-          <a:schemeClr val="lt1"/>
-        </a:fontRef>
-      </dsp:style>
-      <dsp:txBody>
-        <a:bodyPr spcFirstLastPara="0" vert="horz" wrap="square" lIns="76200" tIns="76200" rIns="76200" bIns="76200" numCol="1" spcCol="1270" anchor="ctr" anchorCtr="0">
-          <a:noAutofit/>
-        </a:bodyPr>
-        <a:lstStyle/>
-        <a:p>
-          <a:pPr lvl="0" algn="l" defTabSz="889000" rtl="0">
-            <a:lnSpc>
-              <a:spcPct val="90000"/>
-            </a:lnSpc>
-            <a:spcBef>
-              <a:spcPct val="0"/>
-            </a:spcBef>
-            <a:spcAft>
-              <a:spcPct val="35000"/>
-            </a:spcAft>
-          </a:pPr>
-          <a:r>
-            <a:rPr lang="en-US" sz="2000" kern="1200" dirty="0" smtClean="0">
-              <a:latin typeface="Arial" panose="020B0604020202020204" pitchFamily="34" charset="0"/>
-              <a:cs typeface="Arial" panose="020B0604020202020204" pitchFamily="34" charset="0"/>
-            </a:rPr>
-            <a:t>Region with larger </a:t>
-          </a:r>
-          <a:r>
-            <a:rPr lang="el-GR" sz="2000" kern="1200" dirty="0" smtClean="0">
-              <a:latin typeface="Arial" panose="020B0604020202020204" pitchFamily="34" charset="0"/>
-              <a:cs typeface="Arial" panose="020B0604020202020204" pitchFamily="34" charset="0"/>
-            </a:rPr>
-            <a:t>μ</a:t>
-          </a:r>
-          <a:r>
-            <a:rPr lang="en-US" sz="2000" kern="1200" baseline="-25000" dirty="0" err="1" smtClean="0">
-              <a:latin typeface="Arial" panose="020B0604020202020204" pitchFamily="34" charset="0"/>
-              <a:cs typeface="Arial" panose="020B0604020202020204" pitchFamily="34" charset="0"/>
-            </a:rPr>
-            <a:t>rr</a:t>
-          </a:r>
-          <a:r>
-            <a:rPr lang="en-US" sz="2000" kern="1200" dirty="0" smtClean="0">
-              <a:latin typeface="Arial" panose="020B0604020202020204" pitchFamily="34" charset="0"/>
-              <a:cs typeface="Arial" panose="020B0604020202020204" pitchFamily="34" charset="0"/>
-            </a:rPr>
-            <a:t> + </a:t>
-          </a:r>
-          <a:r>
-            <a:rPr lang="el-GR" sz="2000" kern="1200" dirty="0" smtClean="0">
-              <a:latin typeface="Arial" panose="020B0604020202020204" pitchFamily="34" charset="0"/>
-              <a:cs typeface="Arial" panose="020B0604020202020204" pitchFamily="34" charset="0"/>
-            </a:rPr>
-            <a:t>μ</a:t>
-          </a:r>
-          <a:r>
-            <a:rPr lang="en-US" sz="2000" kern="1200" baseline="-25000" dirty="0" smtClean="0">
-              <a:latin typeface="Arial" panose="020B0604020202020204" pitchFamily="34" charset="0"/>
-              <a:cs typeface="Arial" panose="020B0604020202020204" pitchFamily="34" charset="0"/>
-            </a:rPr>
-            <a:t>cc</a:t>
-          </a:r>
-          <a:r>
-            <a:rPr lang="en-US" sz="2000" kern="1200" dirty="0" smtClean="0">
-              <a:latin typeface="Arial" panose="020B0604020202020204" pitchFamily="34" charset="0"/>
-              <a:cs typeface="Arial" panose="020B0604020202020204" pitchFamily="34" charset="0"/>
-            </a:rPr>
-            <a:t> is background</a:t>
-          </a:r>
-          <a:endParaRPr lang="en-US" sz="2000" kern="1200" dirty="0">
-            <a:latin typeface="Arial" panose="020B0604020202020204" pitchFamily="34" charset="0"/>
-            <a:cs typeface="Arial" panose="020B0604020202020204" pitchFamily="34" charset="0"/>
-          </a:endParaRPr>
-        </a:p>
-      </dsp:txBody>
-      <dsp:txXfrm>
-        <a:off x="1095061" y="3449397"/>
-        <a:ext cx="3226089" cy="908411"/>
-      </dsp:txXfrm>
-    </dsp:sp>
-    <dsp:sp modelId="{473B2F42-9235-48D2-80E1-AD557D0740D0}">
-      <dsp:nvSpPr>
-        <dsp:cNvPr id="0" name=""/>
-        <dsp:cNvSpPr/>
-      </dsp:nvSpPr>
-      <dsp:spPr>
-        <a:xfrm>
-          <a:off x="3639991" y="739052"/>
-          <a:ext cx="627208" cy="627208"/>
-        </a:xfrm>
-        <a:prstGeom prst="downArrow">
-          <a:avLst>
-            <a:gd name="adj1" fmla="val 55000"/>
-            <a:gd name="adj2" fmla="val 45000"/>
-          </a:avLst>
-        </a:prstGeom>
-        <a:solidFill>
-          <a:schemeClr val="accent1">
-            <a:alpha val="90000"/>
-            <a:tint val="40000"/>
-            <a:hueOff val="0"/>
-            <a:satOff val="0"/>
-            <a:lumOff val="0"/>
-            <a:alphaOff val="0"/>
-          </a:schemeClr>
-        </a:solidFill>
-        <a:ln w="55000" cap="flat" cmpd="thickThin" algn="ctr">
-          <a:solidFill>
-            <a:schemeClr val="accent1">
-              <a:alpha val="90000"/>
-              <a:tint val="40000"/>
-              <a:hueOff val="0"/>
-              <a:satOff val="0"/>
-              <a:lumOff val="0"/>
-              <a:alphaOff val="0"/>
-            </a:schemeClr>
-          </a:solidFill>
-          <a:prstDash val="solid"/>
-        </a:ln>
-        <a:effectLst/>
-      </dsp:spPr>
-      <dsp:style>
-        <a:lnRef idx="2">
-          <a:scrgbClr r="0" g="0" b="0"/>
-        </a:lnRef>
-        <a:fillRef idx="1">
-          <a:scrgbClr r="0" g="0" b="0"/>
-        </a:fillRef>
-        <a:effectRef idx="0">
-          <a:scrgbClr r="0" g="0" b="0"/>
-        </a:effectRef>
-        <a:fontRef idx="minor"/>
-      </dsp:style>
-      <dsp:txBody>
-        <a:bodyPr spcFirstLastPara="0" vert="horz" wrap="square" lIns="27940" tIns="27940" rIns="27940" bIns="27940" numCol="1" spcCol="1270" anchor="ctr" anchorCtr="0">
-          <a:noAutofit/>
-        </a:bodyPr>
-        <a:lstStyle/>
-        <a:p>
-          <a:pPr lvl="0" algn="ctr" defTabSz="977900">
-            <a:lnSpc>
-              <a:spcPct val="90000"/>
-            </a:lnSpc>
-            <a:spcBef>
-              <a:spcPct val="0"/>
-            </a:spcBef>
-            <a:spcAft>
-              <a:spcPct val="35000"/>
-            </a:spcAft>
-          </a:pPr>
-          <a:endParaRPr lang="en-US" sz="2200" kern="1200"/>
-        </a:p>
-      </dsp:txBody>
-      <dsp:txXfrm>
-        <a:off x="3781113" y="739052"/>
-        <a:ext cx="344964" cy="471974"/>
-      </dsp:txXfrm>
-    </dsp:sp>
-    <dsp:sp modelId="{5EFC5DF3-E8F2-4B15-81D8-6CD78CE0D6F7}">
-      <dsp:nvSpPr>
-        <dsp:cNvPr id="0" name=""/>
-        <dsp:cNvSpPr/>
-      </dsp:nvSpPr>
-      <dsp:spPr>
-        <a:xfrm>
-          <a:off x="3997369" y="1879431"/>
-          <a:ext cx="627208" cy="627208"/>
-        </a:xfrm>
-        <a:prstGeom prst="downArrow">
-          <a:avLst>
-            <a:gd name="adj1" fmla="val 55000"/>
-            <a:gd name="adj2" fmla="val 45000"/>
-          </a:avLst>
-        </a:prstGeom>
-        <a:solidFill>
-          <a:schemeClr val="accent1">
-            <a:alpha val="90000"/>
-            <a:tint val="40000"/>
-            <a:hueOff val="0"/>
-            <a:satOff val="0"/>
-            <a:lumOff val="0"/>
-            <a:alphaOff val="0"/>
-          </a:schemeClr>
-        </a:solidFill>
-        <a:ln w="55000" cap="flat" cmpd="thickThin" algn="ctr">
-          <a:solidFill>
-            <a:schemeClr val="accent1">
-              <a:alpha val="90000"/>
-              <a:tint val="40000"/>
-              <a:hueOff val="0"/>
-              <a:satOff val="0"/>
-              <a:lumOff val="0"/>
-              <a:alphaOff val="0"/>
-            </a:schemeClr>
-          </a:solidFill>
-          <a:prstDash val="solid"/>
-        </a:ln>
-        <a:effectLst/>
-      </dsp:spPr>
-      <dsp:style>
-        <a:lnRef idx="2">
-          <a:scrgbClr r="0" g="0" b="0"/>
-        </a:lnRef>
-        <a:fillRef idx="1">
-          <a:scrgbClr r="0" g="0" b="0"/>
-        </a:fillRef>
-        <a:effectRef idx="0">
-          <a:scrgbClr r="0" g="0" b="0"/>
-        </a:effectRef>
-        <a:fontRef idx="minor"/>
-      </dsp:style>
-      <dsp:txBody>
-        <a:bodyPr spcFirstLastPara="0" vert="horz" wrap="square" lIns="27940" tIns="27940" rIns="27940" bIns="27940" numCol="1" spcCol="1270" anchor="ctr" anchorCtr="0">
-          <a:noAutofit/>
-        </a:bodyPr>
-        <a:lstStyle/>
-        <a:p>
-          <a:pPr lvl="0" algn="ctr" defTabSz="977900">
-            <a:lnSpc>
-              <a:spcPct val="90000"/>
-            </a:lnSpc>
-            <a:spcBef>
-              <a:spcPct val="0"/>
-            </a:spcBef>
-            <a:spcAft>
-              <a:spcPct val="35000"/>
-            </a:spcAft>
-          </a:pPr>
-          <a:endParaRPr lang="en-US" sz="2200" kern="1200"/>
-        </a:p>
-      </dsp:txBody>
-      <dsp:txXfrm>
-        <a:off x="4138491" y="1879431"/>
-        <a:ext cx="344964" cy="471974"/>
-      </dsp:txXfrm>
-    </dsp:sp>
-    <dsp:sp modelId="{2A5D6562-E979-4639-BFB8-6C5E617CDE45}">
-      <dsp:nvSpPr>
-        <dsp:cNvPr id="0" name=""/>
-        <dsp:cNvSpPr/>
-      </dsp:nvSpPr>
-      <dsp:spPr>
-        <a:xfrm>
-          <a:off x="4349413" y="3019809"/>
-          <a:ext cx="627208" cy="627208"/>
-        </a:xfrm>
-        <a:prstGeom prst="downArrow">
-          <a:avLst>
-            <a:gd name="adj1" fmla="val 55000"/>
-            <a:gd name="adj2" fmla="val 45000"/>
-          </a:avLst>
-        </a:prstGeom>
-        <a:solidFill>
-          <a:schemeClr val="accent1">
-            <a:alpha val="90000"/>
-            <a:tint val="40000"/>
-            <a:hueOff val="0"/>
-            <a:satOff val="0"/>
-            <a:lumOff val="0"/>
-            <a:alphaOff val="0"/>
-          </a:schemeClr>
-        </a:solidFill>
-        <a:ln w="55000" cap="flat" cmpd="thickThin" algn="ctr">
-          <a:solidFill>
-            <a:schemeClr val="accent1">
-              <a:alpha val="90000"/>
-              <a:tint val="40000"/>
-              <a:hueOff val="0"/>
-              <a:satOff val="0"/>
-              <a:lumOff val="0"/>
-              <a:alphaOff val="0"/>
-            </a:schemeClr>
-          </a:solidFill>
-          <a:prstDash val="solid"/>
-        </a:ln>
-        <a:effectLst/>
-      </dsp:spPr>
-      <dsp:style>
-        <a:lnRef idx="2">
-          <a:scrgbClr r="0" g="0" b="0"/>
-        </a:lnRef>
-        <a:fillRef idx="1">
-          <a:scrgbClr r="0" g="0" b="0"/>
-        </a:fillRef>
-        <a:effectRef idx="0">
-          <a:scrgbClr r="0" g="0" b="0"/>
-        </a:effectRef>
-        <a:fontRef idx="minor"/>
-      </dsp:style>
-      <dsp:txBody>
-        <a:bodyPr spcFirstLastPara="0" vert="horz" wrap="square" lIns="27940" tIns="27940" rIns="27940" bIns="27940" numCol="1" spcCol="1270" anchor="ctr" anchorCtr="0">
-          <a:noAutofit/>
-        </a:bodyPr>
-        <a:lstStyle/>
-        <a:p>
-          <a:pPr lvl="0" algn="ctr" defTabSz="977900">
-            <a:lnSpc>
-              <a:spcPct val="90000"/>
-            </a:lnSpc>
-            <a:spcBef>
-              <a:spcPct val="0"/>
-            </a:spcBef>
-            <a:spcAft>
-              <a:spcPct val="35000"/>
-            </a:spcAft>
-          </a:pPr>
-          <a:endParaRPr lang="en-US" sz="2200" kern="1200"/>
-        </a:p>
-      </dsp:txBody>
-      <dsp:txXfrm>
-        <a:off x="4490535" y="3019809"/>
-        <a:ext cx="344964" cy="471974"/>
-      </dsp:txXfrm>
-    </dsp:sp>
   </dsp:spTree>
 </dsp:drawing>
 </file>
@@ -3233,413 +2610,6 @@
       <dsp:cNvGrpSpPr/>
     </dsp:nvGrpSpPr>
     <dsp:grpSpPr/>
-    <dsp:sp modelId="{6009FFD0-D222-4B03-9EA9-C92471BCD9DC}">
-      <dsp:nvSpPr>
-        <dsp:cNvPr id="0" name=""/>
-        <dsp:cNvSpPr/>
-      </dsp:nvSpPr>
-      <dsp:spPr>
-        <a:xfrm>
-          <a:off x="0" y="49319"/>
-          <a:ext cx="8229600" cy="818999"/>
-        </a:xfrm>
-        <a:prstGeom prst="roundRect">
-          <a:avLst/>
-        </a:prstGeom>
-        <a:solidFill>
-          <a:schemeClr val="accent1">
-            <a:hueOff val="0"/>
-            <a:satOff val="0"/>
-            <a:lumOff val="0"/>
-            <a:alphaOff val="0"/>
-          </a:schemeClr>
-        </a:solidFill>
-        <a:ln w="55000" cap="flat" cmpd="thickThin" algn="ctr">
-          <a:solidFill>
-            <a:schemeClr val="lt1">
-              <a:hueOff val="0"/>
-              <a:satOff val="0"/>
-              <a:lumOff val="0"/>
-              <a:alphaOff val="0"/>
-            </a:schemeClr>
-          </a:solidFill>
-          <a:prstDash val="solid"/>
-        </a:ln>
-        <a:effectLst/>
-      </dsp:spPr>
-      <dsp:style>
-        <a:lnRef idx="2">
-          <a:scrgbClr r="0" g="0" b="0"/>
-        </a:lnRef>
-        <a:fillRef idx="1">
-          <a:scrgbClr r="0" g="0" b="0"/>
-        </a:fillRef>
-        <a:effectRef idx="0">
-          <a:scrgbClr r="0" g="0" b="0"/>
-        </a:effectRef>
-        <a:fontRef idx="minor">
-          <a:schemeClr val="lt1"/>
-        </a:fontRef>
-      </dsp:style>
-      <dsp:txBody>
-        <a:bodyPr spcFirstLastPara="0" vert="horz" wrap="square" lIns="133350" tIns="133350" rIns="133350" bIns="133350" numCol="1" spcCol="1270" anchor="ctr" anchorCtr="0">
-          <a:noAutofit/>
-        </a:bodyPr>
-        <a:lstStyle/>
-        <a:p>
-          <a:pPr lvl="0" algn="l" defTabSz="1555750" rtl="0">
-            <a:lnSpc>
-              <a:spcPct val="90000"/>
-            </a:lnSpc>
-            <a:spcBef>
-              <a:spcPct val="0"/>
-            </a:spcBef>
-            <a:spcAft>
-              <a:spcPct val="35000"/>
-            </a:spcAft>
-          </a:pPr>
-          <a:r>
-            <a:rPr lang="en-US" sz="3500" kern="1200" smtClean="0">
-              <a:latin typeface="Arial" panose="020B0604020202020204" pitchFamily="34" charset="0"/>
-              <a:cs typeface="Arial" panose="020B0604020202020204" pitchFamily="34" charset="0"/>
-            </a:rPr>
-            <a:t>Training</a:t>
-          </a:r>
-          <a:endParaRPr lang="en-US" sz="3500" kern="1200">
-            <a:latin typeface="Arial" panose="020B0604020202020204" pitchFamily="34" charset="0"/>
-            <a:cs typeface="Arial" panose="020B0604020202020204" pitchFamily="34" charset="0"/>
-          </a:endParaRPr>
-        </a:p>
-      </dsp:txBody>
-      <dsp:txXfrm>
-        <a:off x="39980" y="89299"/>
-        <a:ext cx="8149640" cy="739039"/>
-      </dsp:txXfrm>
-    </dsp:sp>
-    <dsp:sp modelId="{09BB81D5-4EF3-4B5E-A23A-812D61905779}">
-      <dsp:nvSpPr>
-        <dsp:cNvPr id="0" name=""/>
-        <dsp:cNvSpPr/>
-      </dsp:nvSpPr>
-      <dsp:spPr>
-        <a:xfrm>
-          <a:off x="0" y="868319"/>
-          <a:ext cx="8229600" cy="579600"/>
-        </a:xfrm>
-        <a:prstGeom prst="rect">
-          <a:avLst/>
-        </a:prstGeom>
-        <a:noFill/>
-        <a:ln>
-          <a:noFill/>
-        </a:ln>
-        <a:effectLst/>
-      </dsp:spPr>
-      <dsp:style>
-        <a:lnRef idx="0">
-          <a:scrgbClr r="0" g="0" b="0"/>
-        </a:lnRef>
-        <a:fillRef idx="0">
-          <a:scrgbClr r="0" g="0" b="0"/>
-        </a:fillRef>
-        <a:effectRef idx="0">
-          <a:scrgbClr r="0" g="0" b="0"/>
-        </a:effectRef>
-        <a:fontRef idx="minor"/>
-      </dsp:style>
-      <dsp:txBody>
-        <a:bodyPr spcFirstLastPara="0" vert="horz" wrap="square" lIns="261290" tIns="44450" rIns="248920" bIns="44450" numCol="1" spcCol="1270" anchor="t" anchorCtr="0">
-          <a:noAutofit/>
-        </a:bodyPr>
-        <a:lstStyle/>
-        <a:p>
-          <a:pPr marL="228600" lvl="1" indent="-228600" algn="l" defTabSz="1200150" rtl="0">
-            <a:lnSpc>
-              <a:spcPct val="90000"/>
-            </a:lnSpc>
-            <a:spcBef>
-              <a:spcPct val="0"/>
-            </a:spcBef>
-            <a:spcAft>
-              <a:spcPct val="20000"/>
-            </a:spcAft>
-            <a:buChar char="••"/>
-          </a:pPr>
-          <a:r>
-            <a:rPr lang="en-US" sz="2700" kern="1200" dirty="0" smtClean="0">
-              <a:latin typeface="Arial" panose="020B0604020202020204" pitchFamily="34" charset="0"/>
-              <a:cs typeface="Arial" panose="020B0604020202020204" pitchFamily="34" charset="0"/>
-            </a:rPr>
-            <a:t>Find N-dimensional mean of each class</a:t>
-          </a:r>
-          <a:endParaRPr lang="en-US" sz="2700" kern="1200" dirty="0">
-            <a:latin typeface="Arial" panose="020B0604020202020204" pitchFamily="34" charset="0"/>
-            <a:cs typeface="Arial" panose="020B0604020202020204" pitchFamily="34" charset="0"/>
-          </a:endParaRPr>
-        </a:p>
-      </dsp:txBody>
-      <dsp:txXfrm>
-        <a:off x="0" y="868319"/>
-        <a:ext cx="8229600" cy="579600"/>
-      </dsp:txXfrm>
-    </dsp:sp>
-    <dsp:sp modelId="{ADF7AE22-5AB6-4652-9D04-B2F8740234A9}">
-      <dsp:nvSpPr>
-        <dsp:cNvPr id="0" name=""/>
-        <dsp:cNvSpPr/>
-      </dsp:nvSpPr>
-      <dsp:spPr>
-        <a:xfrm>
-          <a:off x="0" y="1447918"/>
-          <a:ext cx="8229600" cy="818999"/>
-        </a:xfrm>
-        <a:prstGeom prst="roundRect">
-          <a:avLst/>
-        </a:prstGeom>
-        <a:solidFill>
-          <a:schemeClr val="accent1">
-            <a:hueOff val="0"/>
-            <a:satOff val="0"/>
-            <a:lumOff val="0"/>
-            <a:alphaOff val="0"/>
-          </a:schemeClr>
-        </a:solidFill>
-        <a:ln w="55000" cap="flat" cmpd="thickThin" algn="ctr">
-          <a:solidFill>
-            <a:schemeClr val="lt1">
-              <a:hueOff val="0"/>
-              <a:satOff val="0"/>
-              <a:lumOff val="0"/>
-              <a:alphaOff val="0"/>
-            </a:schemeClr>
-          </a:solidFill>
-          <a:prstDash val="solid"/>
-        </a:ln>
-        <a:effectLst/>
-      </dsp:spPr>
-      <dsp:style>
-        <a:lnRef idx="2">
-          <a:scrgbClr r="0" g="0" b="0"/>
-        </a:lnRef>
-        <a:fillRef idx="1">
-          <a:scrgbClr r="0" g="0" b="0"/>
-        </a:fillRef>
-        <a:effectRef idx="0">
-          <a:scrgbClr r="0" g="0" b="0"/>
-        </a:effectRef>
-        <a:fontRef idx="minor">
-          <a:schemeClr val="lt1"/>
-        </a:fontRef>
-      </dsp:style>
-      <dsp:txBody>
-        <a:bodyPr spcFirstLastPara="0" vert="horz" wrap="square" lIns="133350" tIns="133350" rIns="133350" bIns="133350" numCol="1" spcCol="1270" anchor="ctr" anchorCtr="0">
-          <a:noAutofit/>
-        </a:bodyPr>
-        <a:lstStyle/>
-        <a:p>
-          <a:pPr lvl="0" algn="l" defTabSz="1555750" rtl="0">
-            <a:lnSpc>
-              <a:spcPct val="90000"/>
-            </a:lnSpc>
-            <a:spcBef>
-              <a:spcPct val="0"/>
-            </a:spcBef>
-            <a:spcAft>
-              <a:spcPct val="35000"/>
-            </a:spcAft>
-          </a:pPr>
-          <a:r>
-            <a:rPr lang="en-US" sz="3500" kern="1200" smtClean="0">
-              <a:latin typeface="Arial" panose="020B0604020202020204" pitchFamily="34" charset="0"/>
-              <a:cs typeface="Arial" panose="020B0604020202020204" pitchFamily="34" charset="0"/>
-            </a:rPr>
-            <a:t>Testing</a:t>
-          </a:r>
-          <a:endParaRPr lang="en-US" sz="3500" kern="1200">
-            <a:latin typeface="Arial" panose="020B0604020202020204" pitchFamily="34" charset="0"/>
-            <a:cs typeface="Arial" panose="020B0604020202020204" pitchFamily="34" charset="0"/>
-          </a:endParaRPr>
-        </a:p>
-      </dsp:txBody>
-      <dsp:txXfrm>
-        <a:off x="39980" y="1487898"/>
-        <a:ext cx="8149640" cy="739039"/>
-      </dsp:txXfrm>
-    </dsp:sp>
-    <dsp:sp modelId="{23655599-5F59-49D3-B74B-3CFA1652679D}">
-      <dsp:nvSpPr>
-        <dsp:cNvPr id="0" name=""/>
-        <dsp:cNvSpPr/>
-      </dsp:nvSpPr>
-      <dsp:spPr>
-        <a:xfrm>
-          <a:off x="0" y="2266919"/>
-          <a:ext cx="8229600" cy="2209725"/>
-        </a:xfrm>
-        <a:prstGeom prst="rect">
-          <a:avLst/>
-        </a:prstGeom>
-        <a:noFill/>
-        <a:ln>
-          <a:noFill/>
-        </a:ln>
-        <a:effectLst/>
-      </dsp:spPr>
-      <dsp:style>
-        <a:lnRef idx="0">
-          <a:scrgbClr r="0" g="0" b="0"/>
-        </a:lnRef>
-        <a:fillRef idx="0">
-          <a:scrgbClr r="0" g="0" b="0"/>
-        </a:fillRef>
-        <a:effectRef idx="0">
-          <a:scrgbClr r="0" g="0" b="0"/>
-        </a:effectRef>
-        <a:fontRef idx="minor"/>
-      </dsp:style>
-      <dsp:txBody>
-        <a:bodyPr spcFirstLastPara="0" vert="horz" wrap="square" lIns="261290" tIns="44450" rIns="248920" bIns="44450" numCol="1" spcCol="1270" anchor="t" anchorCtr="0">
-          <a:noAutofit/>
-        </a:bodyPr>
-        <a:lstStyle/>
-        <a:p>
-          <a:pPr marL="228600" lvl="1" indent="-228600" algn="l" defTabSz="1200150" rtl="0">
-            <a:lnSpc>
-              <a:spcPct val="90000"/>
-            </a:lnSpc>
-            <a:spcBef>
-              <a:spcPct val="0"/>
-            </a:spcBef>
-            <a:spcAft>
-              <a:spcPct val="20000"/>
-            </a:spcAft>
-            <a:buChar char="••"/>
-          </a:pPr>
-          <a:r>
-            <a:rPr lang="en-US" sz="2700" kern="1200" smtClean="0">
-              <a:latin typeface="Arial" panose="020B0604020202020204" pitchFamily="34" charset="0"/>
-              <a:cs typeface="Arial" panose="020B0604020202020204" pitchFamily="34" charset="0"/>
-            </a:rPr>
-            <a:t>K-Means Clustering</a:t>
-          </a:r>
-          <a:endParaRPr lang="en-US" sz="2700" kern="1200">
-            <a:latin typeface="Arial" panose="020B0604020202020204" pitchFamily="34" charset="0"/>
-            <a:cs typeface="Arial" panose="020B0604020202020204" pitchFamily="34" charset="0"/>
-          </a:endParaRPr>
-        </a:p>
-        <a:p>
-          <a:pPr marL="457200" lvl="2" indent="-228600" algn="l" defTabSz="1200150" rtl="0">
-            <a:lnSpc>
-              <a:spcPct val="90000"/>
-            </a:lnSpc>
-            <a:spcBef>
-              <a:spcPct val="0"/>
-            </a:spcBef>
-            <a:spcAft>
-              <a:spcPct val="20000"/>
-            </a:spcAft>
-            <a:buChar char="••"/>
-          </a:pPr>
-          <a:r>
-            <a:rPr lang="en-US" sz="2700" kern="1200" smtClean="0">
-              <a:latin typeface="Arial" panose="020B0604020202020204" pitchFamily="34" charset="0"/>
-              <a:cs typeface="Arial" panose="020B0604020202020204" pitchFamily="34" charset="0"/>
-            </a:rPr>
-            <a:t>Dist scaled by std dev of each dimension</a:t>
-          </a:r>
-          <a:endParaRPr lang="en-US" sz="2700" kern="1200">
-            <a:latin typeface="Arial" panose="020B0604020202020204" pitchFamily="34" charset="0"/>
-            <a:cs typeface="Arial" panose="020B0604020202020204" pitchFamily="34" charset="0"/>
-          </a:endParaRPr>
-        </a:p>
-        <a:p>
-          <a:pPr marL="457200" lvl="2" indent="-228600" algn="l" defTabSz="1200150" rtl="0">
-            <a:lnSpc>
-              <a:spcPct val="90000"/>
-            </a:lnSpc>
-            <a:spcBef>
-              <a:spcPct val="0"/>
-            </a:spcBef>
-            <a:spcAft>
-              <a:spcPct val="20000"/>
-            </a:spcAft>
-            <a:buChar char="••"/>
-          </a:pPr>
-          <a:r>
-            <a:rPr lang="en-US" sz="2700" kern="1200" dirty="0" err="1" smtClean="0">
-              <a:latin typeface="Arial" panose="020B0604020202020204" pitchFamily="34" charset="0"/>
-              <a:cs typeface="Arial" panose="020B0604020202020204" pitchFamily="34" charset="0"/>
-            </a:rPr>
-            <a:t>Dist</a:t>
-          </a:r>
-          <a:r>
-            <a:rPr lang="en-US" sz="2700" kern="1200" dirty="0" smtClean="0">
-              <a:latin typeface="Arial" panose="020B0604020202020204" pitchFamily="34" charset="0"/>
-              <a:cs typeface="Arial" panose="020B0604020202020204" pitchFamily="34" charset="0"/>
-            </a:rPr>
-            <a:t> scaled to normalize dimension ranges</a:t>
-          </a:r>
-          <a:endParaRPr lang="en-US" sz="2700" kern="1200" dirty="0">
-            <a:latin typeface="Arial" panose="020B0604020202020204" pitchFamily="34" charset="0"/>
-            <a:cs typeface="Arial" panose="020B0604020202020204" pitchFamily="34" charset="0"/>
-          </a:endParaRPr>
-        </a:p>
-        <a:p>
-          <a:pPr marL="228600" lvl="1" indent="-228600" algn="l" defTabSz="1200150" rtl="0">
-            <a:lnSpc>
-              <a:spcPct val="90000"/>
-            </a:lnSpc>
-            <a:spcBef>
-              <a:spcPct val="0"/>
-            </a:spcBef>
-            <a:spcAft>
-              <a:spcPct val="20000"/>
-            </a:spcAft>
-            <a:buChar char="••"/>
-          </a:pPr>
-          <a:r>
-            <a:rPr lang="en-US" sz="2700" kern="1200" smtClean="0">
-              <a:latin typeface="Arial" panose="020B0604020202020204" pitchFamily="34" charset="0"/>
-              <a:cs typeface="Arial" panose="020B0604020202020204" pitchFamily="34" charset="0"/>
-            </a:rPr>
-            <a:t>Manually tuned weights by feature</a:t>
-          </a:r>
-          <a:endParaRPr lang="en-US" sz="2700" kern="1200">
-            <a:latin typeface="Arial" panose="020B0604020202020204" pitchFamily="34" charset="0"/>
-            <a:cs typeface="Arial" panose="020B0604020202020204" pitchFamily="34" charset="0"/>
-          </a:endParaRPr>
-        </a:p>
-        <a:p>
-          <a:pPr marL="457200" lvl="2" indent="-228600" algn="l" defTabSz="1200150" rtl="0">
-            <a:lnSpc>
-              <a:spcPct val="90000"/>
-            </a:lnSpc>
-            <a:spcBef>
-              <a:spcPct val="0"/>
-            </a:spcBef>
-            <a:spcAft>
-              <a:spcPct val="20000"/>
-            </a:spcAft>
-            <a:buChar char="••"/>
-          </a:pPr>
-          <a:r>
-            <a:rPr lang="en-US" sz="2700" kern="1200" dirty="0" smtClean="0">
-              <a:latin typeface="Arial" panose="020B0604020202020204" pitchFamily="34" charset="0"/>
-              <a:cs typeface="Arial" panose="020B0604020202020204" pitchFamily="34" charset="0"/>
-            </a:rPr>
-            <a:t>More weight to more important features</a:t>
-          </a:r>
-          <a:endParaRPr lang="en-US" sz="2700" kern="1200" dirty="0">
-            <a:latin typeface="Arial" panose="020B0604020202020204" pitchFamily="34" charset="0"/>
-            <a:cs typeface="Arial" panose="020B0604020202020204" pitchFamily="34" charset="0"/>
-          </a:endParaRPr>
-        </a:p>
-      </dsp:txBody>
-      <dsp:txXfrm>
-        <a:off x="0" y="2266919"/>
-        <a:ext cx="8229600" cy="2209725"/>
-      </dsp:txXfrm>
-    </dsp:sp>
   </dsp:spTree>
 </dsp:drawing>
 </file>
@@ -7187,7 +6157,7 @@
           <a:p>
             <a:fld id="{95D363F8-FFE5-4BF3-A041-C591F6C11BBD}" type="datetimeFigureOut">
               <a:rPr lang="en-US" smtClean="0"/>
-              <a:t>12/3/2015</a:t>
+              <a:t>12/4/2015</a:t>
             </a:fld>
             <a:endParaRPr lang="en-US"/>
           </a:p>
@@ -7352,7 +6322,7 @@
           <a:p>
             <a:fld id="{A63B8CFC-D614-4432-A7DB-A65856E85B43}" type="datetimeFigureOut">
               <a:rPr lang="en-US" smtClean="0"/>
-              <a:t>12/3/2015</a:t>
+              <a:t>12/4/2015</a:t>
             </a:fld>
             <a:endParaRPr lang="en-US" dirty="0"/>
           </a:p>
@@ -7916,6 +6886,134 @@
           <a:bodyPr/>
           <a:lstStyle/>
           <a:p>
+            <a:pPr marL="171450" marR="0" indent="-171450" algn="l" defTabSz="914400" rtl="0" eaLnBrk="1" fontAlgn="auto" latinLnBrk="0" hangingPunct="1">
+              <a:lnSpc>
+                <a:spcPct val="100000"/>
+              </a:lnSpc>
+              <a:spcBef>
+                <a:spcPts val="0"/>
+              </a:spcBef>
+              <a:spcAft>
+                <a:spcPts val="0"/>
+              </a:spcAft>
+              <a:buClrTx/>
+              <a:buSzTx/>
+              <a:buFont typeface="Arial" panose="020B0604020202020204" pitchFamily="34" charset="0"/>
+              <a:buChar char="•"/>
+              <a:tabLst/>
+              <a:defRPr/>
+            </a:pPr>
+            <a:r>
+              <a:rPr lang="en-US" dirty="0" smtClean="0"/>
+              <a:t>Bullet</a:t>
+            </a:r>
+            <a:r>
+              <a:rPr lang="en-US" baseline="0" dirty="0" smtClean="0"/>
+              <a:t> #1: this is specifically in reference to the limited performance of the shape classifier based on the detected foreground</a:t>
+            </a:r>
+          </a:p>
+          <a:p>
+            <a:pPr marL="0" marR="0" indent="0" algn="l" defTabSz="914400" rtl="0" eaLnBrk="1" fontAlgn="auto" latinLnBrk="0" hangingPunct="1">
+              <a:lnSpc>
+                <a:spcPct val="100000"/>
+              </a:lnSpc>
+              <a:spcBef>
+                <a:spcPts val="0"/>
+              </a:spcBef>
+              <a:spcAft>
+                <a:spcPts val="0"/>
+              </a:spcAft>
+              <a:buClrTx/>
+              <a:buSzTx/>
+              <a:buFont typeface="Arial" panose="020B0604020202020204" pitchFamily="34" charset="0"/>
+              <a:buNone/>
+              <a:tabLst/>
+              <a:defRPr/>
+            </a:pPr>
+            <a:endParaRPr lang="en-US" dirty="0" smtClean="0"/>
+          </a:p>
+        </p:txBody>
+      </p:sp>
+      <p:sp>
+        <p:nvSpPr>
+          <p:cNvPr id="4" name="Slide Number Placeholder 3"/>
+          <p:cNvSpPr>
+            <a:spLocks noGrp="1"/>
+          </p:cNvSpPr>
+          <p:nvPr>
+            <p:ph type="sldNum" sz="quarter" idx="10"/>
+          </p:nvPr>
+        </p:nvSpPr>
+        <p:spPr/>
+        <p:txBody>
+          <a:bodyPr/>
+          <a:lstStyle/>
+          <a:p>
+            <a:fld id="{B8B3BC3C-0900-4ACD-9030-5BE6C2442A68}" type="slidenum">
+              <a:rPr lang="en-US" smtClean="0"/>
+              <a:t>13</a:t>
+            </a:fld>
+            <a:endParaRPr lang="en-US" dirty="0"/>
+          </a:p>
+        </p:txBody>
+      </p:sp>
+    </p:spTree>
+    <p:extLst>
+      <p:ext uri="{BB962C8B-B14F-4D97-AF65-F5344CB8AC3E}">
+        <p14:creationId xmlns:p14="http://schemas.microsoft.com/office/powerpoint/2010/main" val="661729458"/>
+      </p:ext>
+    </p:extLst>
+  </p:cSld>
+  <p:clrMapOvr>
+    <a:masterClrMapping/>
+  </p:clrMapOvr>
+</p:notes>
+</file>
+
+<file path=ppt/notesSlides/notesSlide13.xml><?xml version="1.0" encoding="utf-8"?>
+<p:notes xmlns:a="http://schemas.openxmlformats.org/drawingml/2006/main" xmlns:r="http://schemas.openxmlformats.org/officeDocument/2006/relationships" xmlns:p="http://schemas.openxmlformats.org/presentationml/2006/main">
+  <p:cSld>
+    <p:spTree>
+      <p:nvGrpSpPr>
+        <p:cNvPr id="1" name=""/>
+        <p:cNvGrpSpPr/>
+        <p:nvPr/>
+      </p:nvGrpSpPr>
+      <p:grpSpPr>
+        <a:xfrm>
+          <a:off x="0" y="0"/>
+          <a:ext cx="0" cy="0"/>
+          <a:chOff x="0" y="0"/>
+          <a:chExt cx="0" cy="0"/>
+        </a:xfrm>
+      </p:grpSpPr>
+      <p:sp>
+        <p:nvSpPr>
+          <p:cNvPr id="2" name="Slide Image Placeholder 1"/>
+          <p:cNvSpPr>
+            <a:spLocks noGrp="1" noRot="1" noChangeAspect="1"/>
+          </p:cNvSpPr>
+          <p:nvPr>
+            <p:ph type="sldImg"/>
+          </p:nvPr>
+        </p:nvSpPr>
+        <p:spPr/>
+      </p:sp>
+      <p:sp>
+        <p:nvSpPr>
+          <p:cNvPr id="3" name="Notes Placeholder 2"/>
+          <p:cNvSpPr>
+            <a:spLocks noGrp="1"/>
+          </p:cNvSpPr>
+          <p:nvPr>
+            <p:ph type="body" idx="1"/>
+          </p:nvPr>
+        </p:nvSpPr>
+        <p:spPr/>
+        <p:txBody>
+          <a:bodyPr/>
+          <a:lstStyle/>
+          <a:p>
             <a:pPr marL="171450" indent="-171450">
               <a:buFont typeface="Arial" panose="020B0604020202020204" pitchFamily="34" charset="0"/>
               <a:buChar char="•"/>
@@ -7930,7 +7028,15 @@
             </a:r>
             <a:r>
               <a:rPr lang="en-US" baseline="0" dirty="0" smtClean="0"/>
-              <a:t> referencing interactions between various parts of the system is meant to refer to the fact that we found that a feature may do a good job classifying the images, but when combined with the other features may actually be detrimental to the performance of the system</a:t>
+              <a:t> </a:t>
+            </a:r>
+            <a:r>
+              <a:rPr lang="en-US" baseline="0" dirty="0" smtClean="0"/>
+              <a:t>this refers </a:t>
+            </a:r>
+            <a:r>
+              <a:rPr lang="en-US" baseline="0" dirty="0" smtClean="0"/>
+              <a:t>to the fact that we found that a feature may do a good job classifying the images, but when combined with the other features may actually be detrimental to the performance of the system</a:t>
             </a:r>
           </a:p>
           <a:p>
@@ -8110,6 +7216,52 @@
           <a:bodyPr/>
           <a:lstStyle/>
           <a:p>
+            <a:r>
+              <a:rPr lang="en-US" baseline="0" dirty="0" smtClean="0"/>
+              <a:t>Three highlighted tasks: </a:t>
+            </a:r>
+          </a:p>
+          <a:p>
+            <a:pPr marL="171450" indent="-171450">
+              <a:buFont typeface="Arial" panose="020B0604020202020204" pitchFamily="34" charset="0"/>
+              <a:buChar char="•"/>
+            </a:pPr>
+            <a:r>
+              <a:rPr lang="en-US" baseline="0" dirty="0" smtClean="0"/>
+              <a:t>Manual collection and labeling for the image databases (training and validation)</a:t>
+            </a:r>
+          </a:p>
+          <a:p>
+            <a:pPr marL="171450" indent="-171450">
+              <a:buFont typeface="Arial" panose="020B0604020202020204" pitchFamily="34" charset="0"/>
+              <a:buChar char="•"/>
+            </a:pPr>
+            <a:r>
+              <a:rPr lang="en-US" baseline="0" dirty="0" smtClean="0"/>
+              <a:t>Identification and implementation of differentiating feature detection</a:t>
+            </a:r>
+          </a:p>
+          <a:p>
+            <a:pPr marL="171450" indent="-171450">
+              <a:buFont typeface="Arial" panose="020B0604020202020204" pitchFamily="34" charset="0"/>
+              <a:buChar char="•"/>
+            </a:pPr>
+            <a:r>
+              <a:rPr lang="en-US" baseline="0" dirty="0" smtClean="0"/>
+              <a:t>Design and implementation of a classification system</a:t>
+            </a:r>
+          </a:p>
+          <a:p>
+            <a:pPr marL="0" indent="0">
+              <a:buFont typeface="Arial" panose="020B0604020202020204" pitchFamily="34" charset="0"/>
+              <a:buNone/>
+            </a:pPr>
+            <a:r>
+              <a:rPr lang="en-US" baseline="0" dirty="0" smtClean="0"/>
+              <a:t>Resulting system: (after training) outputs a class label (from the 14 on the slide) given an unlabeled input test image</a:t>
+            </a:r>
+          </a:p>
+          <a:p>
             <a:endParaRPr lang="en-US" dirty="0"/>
           </a:p>
         </p:txBody>
@@ -8374,7 +7526,15 @@
           <a:p>
             <a:r>
               <a:rPr lang="en-US" baseline="0" dirty="0" smtClean="0"/>
-              <a:t>Note: filter applied to a grayscale version of the foregrounded image</a:t>
+              <a:t>(filter </a:t>
+            </a:r>
+            <a:r>
+              <a:rPr lang="en-US" baseline="0" dirty="0" smtClean="0"/>
+              <a:t>applied to a grayscale version of the foregrounded </a:t>
+            </a:r>
+            <a:r>
+              <a:rPr lang="en-US" baseline="0" dirty="0" smtClean="0"/>
+              <a:t>image)</a:t>
             </a:r>
             <a:endParaRPr lang="en-US" dirty="0" smtClean="0"/>
           </a:p>
@@ -8400,8 +7560,41 @@
           <a:p>
             <a:r>
               <a:rPr lang="en-US" baseline="0" dirty="0" smtClean="0"/>
-              <a:t>Value returned for the strawberry image = 952773 / 12306 = 77.4235</a:t>
-            </a:r>
+              <a:t>Value returned for the strawberry image = 952773 / 12306 = </a:t>
+            </a:r>
+            <a:r>
+              <a:rPr lang="en-US" baseline="0" dirty="0" smtClean="0"/>
+              <a:t>77.4235</a:t>
+            </a:r>
+          </a:p>
+          <a:p>
+            <a:endParaRPr lang="en-US" baseline="0" dirty="0" smtClean="0"/>
+          </a:p>
+          <a:p>
+            <a:pPr marL="0" marR="0" indent="0" algn="l" defTabSz="914400" rtl="0" eaLnBrk="1" fontAlgn="auto" latinLnBrk="0" hangingPunct="1">
+              <a:lnSpc>
+                <a:spcPct val="100000"/>
+              </a:lnSpc>
+              <a:spcBef>
+                <a:spcPts val="0"/>
+              </a:spcBef>
+              <a:spcAft>
+                <a:spcPts val="0"/>
+              </a:spcAft>
+              <a:buClrTx/>
+              <a:buSzTx/>
+              <a:buFontTx/>
+              <a:buNone/>
+              <a:tabLst/>
+              <a:defRPr/>
+            </a:pPr>
+            <a:r>
+              <a:rPr lang="en-US" baseline="0" dirty="0" smtClean="0"/>
+              <a:t>Note: this feature is affected by the illumination of the image (as seen in the strawberry picture)</a:t>
+            </a:r>
+            <a:endParaRPr lang="en-US" dirty="0" smtClean="0"/>
+          </a:p>
+          <a:p>
             <a:endParaRPr lang="en-US" dirty="0"/>
           </a:p>
         </p:txBody>
@@ -8502,7 +7695,19 @@
             </a:pPr>
             <a:r>
               <a:rPr lang="en-US" baseline="0" dirty="0" smtClean="0"/>
-              <a:t>Goal of the variation analysis: high interclass variation and low intraclass variation</a:t>
+              <a:t>Goal of the variation analysis: </a:t>
+            </a:r>
+            <a:r>
+              <a:rPr lang="en-US" baseline="0" dirty="0" smtClean="0"/>
+              <a:t>high interclass variation (high standard deviations of means) and low </a:t>
+            </a:r>
+            <a:r>
+              <a:rPr lang="en-US" baseline="0" dirty="0" err="1" smtClean="0"/>
+              <a:t>intraclass</a:t>
+            </a:r>
+            <a:r>
+              <a:rPr lang="en-US" baseline="0" dirty="0" smtClean="0"/>
+              <a:t> variation (low mean of standard deviations) for a feature among all classes</a:t>
             </a:r>
           </a:p>
           <a:p>
@@ -8512,7 +7717,11 @@
             </a:pPr>
             <a:r>
               <a:rPr lang="en-US" baseline="0" dirty="0" smtClean="0"/>
-              <a:t>Previously explained method is more efficient and was thus chosen because Laws did not provide any advantage</a:t>
+              <a:t>Previously </a:t>
+            </a:r>
+            <a:r>
+              <a:rPr lang="en-US" baseline="0" dirty="0" smtClean="0"/>
+              <a:t>explained method is more efficient and was thus chosen because Laws did not provide any advantage</a:t>
             </a:r>
           </a:p>
           <a:p>
@@ -9353,7 +8562,7 @@
           <a:p>
             <a:fld id="{ADE5661A-BDAA-4579-B2F5-AA9011776D83}" type="datetimeFigureOut">
               <a:rPr lang="en-US" smtClean="0"/>
-              <a:t>12/3/2015</a:t>
+              <a:t>12/4/2015</a:t>
             </a:fld>
             <a:endParaRPr lang="en-US" dirty="0"/>
           </a:p>
@@ -9551,7 +8760,7 @@
             <a:fld id="{1D8BD707-D9CF-40AE-B4C6-C98DA3205C09}" type="datetimeFigureOut">
               <a:rPr lang="en-US" smtClean="0"/>
               <a:pPr/>
-              <a:t>12/3/2015</a:t>
+              <a:t>12/4/2015</a:t>
             </a:fld>
             <a:endParaRPr lang="en-US" dirty="0"/>
           </a:p>
@@ -9738,7 +8947,7 @@
             <a:fld id="{1D8BD707-D9CF-40AE-B4C6-C98DA3205C09}" type="datetimeFigureOut">
               <a:rPr lang="en-US" smtClean="0"/>
               <a:pPr/>
-              <a:t>12/3/2015</a:t>
+              <a:t>12/4/2015</a:t>
             </a:fld>
             <a:endParaRPr lang="en-US" dirty="0"/>
           </a:p>
@@ -9890,7 +9099,7 @@
             <a:fld id="{1D8BD707-D9CF-40AE-B4C6-C98DA3205C09}" type="datetimeFigureOut">
               <a:rPr lang="en-US" smtClean="0"/>
               <a:pPr/>
-              <a:t>12/3/2015</a:t>
+              <a:t>12/4/2015</a:t>
             </a:fld>
             <a:endParaRPr lang="en-US" dirty="0"/>
           </a:p>
@@ -10146,7 +9355,7 @@
           <a:p>
             <a:fld id="{7D698992-9F5B-4E9D-871D-4517B2EC8643}" type="datetimeFigureOut">
               <a:rPr lang="en-US" smtClean="0"/>
-              <a:t>12/3/2015</a:t>
+              <a:t>12/4/2015</a:t>
             </a:fld>
             <a:endParaRPr lang="en-US" dirty="0"/>
           </a:p>
@@ -10556,7 +9765,7 @@
             <a:fld id="{1D8BD707-D9CF-40AE-B4C6-C98DA3205C09}" type="datetimeFigureOut">
               <a:rPr lang="en-US" smtClean="0"/>
               <a:pPr/>
-              <a:t>12/3/2015</a:t>
+              <a:t>12/4/2015</a:t>
             </a:fld>
             <a:endParaRPr lang="en-US" dirty="0"/>
           </a:p>
@@ -11004,7 +10213,7 @@
             <a:fld id="{1D8BD707-D9CF-40AE-B4C6-C98DA3205C09}" type="datetimeFigureOut">
               <a:rPr lang="en-US" smtClean="0"/>
               <a:pPr/>
-              <a:t>12/3/2015</a:t>
+              <a:t>12/4/2015</a:t>
             </a:fld>
             <a:endParaRPr lang="en-US" dirty="0"/>
           </a:p>
@@ -11107,7 +10316,7 @@
             <a:fld id="{1D8BD707-D9CF-40AE-B4C6-C98DA3205C09}" type="datetimeFigureOut">
               <a:rPr lang="en-US" smtClean="0"/>
               <a:pPr/>
-              <a:t>12/3/2015</a:t>
+              <a:t>12/4/2015</a:t>
             </a:fld>
             <a:endParaRPr lang="en-US" dirty="0"/>
           </a:p>
@@ -11230,7 +10439,7 @@
             <a:fld id="{1D8BD707-D9CF-40AE-B4C6-C98DA3205C09}" type="datetimeFigureOut">
               <a:rPr lang="en-US" smtClean="0"/>
               <a:pPr/>
-              <a:t>12/3/2015</a:t>
+              <a:t>12/4/2015</a:t>
             </a:fld>
             <a:endParaRPr lang="en-US" dirty="0"/>
           </a:p>
@@ -11506,7 +10715,7 @@
             <a:fld id="{1D8BD707-D9CF-40AE-B4C6-C98DA3205C09}" type="datetimeFigureOut">
               <a:rPr lang="en-US" smtClean="0"/>
               <a:pPr/>
-              <a:t>12/3/2015</a:t>
+              <a:t>12/4/2015</a:t>
             </a:fld>
             <a:endParaRPr lang="en-US" dirty="0"/>
           </a:p>
@@ -11713,7 +10922,7 @@
             <a:fld id="{1D8BD707-D9CF-40AE-B4C6-C98DA3205C09}" type="datetimeFigureOut">
               <a:rPr lang="en-US" smtClean="0"/>
               <a:pPr/>
-              <a:t>12/3/2015</a:t>
+              <a:t>12/4/2015</a:t>
             </a:fld>
             <a:endParaRPr lang="en-US" dirty="0"/>
           </a:p>
@@ -12824,7 +12033,7 @@
             <a:fld id="{1D8BD707-D9CF-40AE-B4C6-C98DA3205C09}" type="datetimeFigureOut">
               <a:rPr lang="en-US" smtClean="0"/>
               <a:pPr/>
-              <a:t>12/3/2015</a:t>
+              <a:t>12/4/2015</a:t>
             </a:fld>
             <a:endParaRPr lang="en-US" dirty="0"/>
           </a:p>
@@ -13297,28 +12506,7 @@
                 <a:latin typeface="Arial" panose="020B0604020202020204" pitchFamily="34" charset="0"/>
                 <a:cs typeface="Arial" panose="020B0604020202020204" pitchFamily="34" charset="0"/>
               </a:rPr>
-              <a:t>Presentation by: Vince </a:t>
-            </a:r>
-            <a:r>
-              <a:rPr lang="en-US" sz="2000" dirty="0" smtClean="0">
-                <a:latin typeface="Arial" panose="020B0604020202020204" pitchFamily="34" charset="0"/>
-                <a:cs typeface="Arial" panose="020B0604020202020204" pitchFamily="34" charset="0"/>
-              </a:rPr>
-              <a:t>Fasburg, </a:t>
-            </a:r>
-            <a:r>
-              <a:rPr lang="en-US" sz="2000" dirty="0" smtClean="0">
-                <a:latin typeface="Arial" panose="020B0604020202020204" pitchFamily="34" charset="0"/>
-                <a:cs typeface="Arial" panose="020B0604020202020204" pitchFamily="34" charset="0"/>
-              </a:rPr>
-              <a:t>Bonnie </a:t>
-            </a:r>
-            <a:r>
-              <a:rPr lang="en-US" sz="2000" dirty="0" smtClean="0">
-                <a:latin typeface="Arial" panose="020B0604020202020204" pitchFamily="34" charset="0"/>
-                <a:cs typeface="Arial" panose="020B0604020202020204" pitchFamily="34" charset="0"/>
-              </a:rPr>
-              <a:t>Reiff, and Josh Thomas</a:t>
+              <a:t>Presentation by: Vince Fasburg, Bonnie Reiff, and Josh Thomas</a:t>
             </a:r>
           </a:p>
           <a:p>
@@ -13519,10 +12707,6 @@
               </a:rPr>
               <a:t>Minimum of 20 images per class</a:t>
             </a:r>
-            <a:endParaRPr lang="en-US" sz="1900" dirty="0" smtClean="0">
-              <a:latin typeface="Arial" panose="020B0604020202020204" pitchFamily="34" charset="0"/>
-              <a:cs typeface="Arial" panose="020B0604020202020204" pitchFamily="34" charset="0"/>
-            </a:endParaRPr>
           </a:p>
           <a:p>
             <a:endParaRPr lang="en-US" sz="2300" dirty="0" smtClean="0">
@@ -14503,7 +13687,14 @@
                 <a:latin typeface="Arial" panose="020B0604020202020204" pitchFamily="34" charset="0"/>
                 <a:cs typeface="Arial" panose="020B0604020202020204" pitchFamily="34" charset="0"/>
               </a:rPr>
-              <a:t>Addition of a reject class</a:t>
+              <a:t>Addition of a reject </a:t>
+            </a:r>
+            <a:r>
+              <a:rPr lang="en-US" dirty="0" smtClean="0">
+                <a:latin typeface="Arial" panose="020B0604020202020204" pitchFamily="34" charset="0"/>
+                <a:cs typeface="Arial" panose="020B0604020202020204" pitchFamily="34" charset="0"/>
+              </a:rPr>
+              <a:t>class for images determined to not belong to any of the recognized classes</a:t>
             </a:r>
             <a:endParaRPr lang="en-US" dirty="0">
               <a:latin typeface="Arial" panose="020B0604020202020204" pitchFamily="34" charset="0"/>
@@ -15321,10 +14512,6 @@
               </a:rPr>
               <a:t>French Fry</a:t>
             </a:r>
-            <a:endParaRPr lang="en-US" dirty="0" smtClean="0">
-              <a:latin typeface="Arial" panose="020B0604020202020204" pitchFamily="34" charset="0"/>
-              <a:cs typeface="Arial" panose="020B0604020202020204" pitchFamily="34" charset="0"/>
-            </a:endParaRPr>
           </a:p>
           <a:p>
             <a:pPr>
@@ -16448,7 +15635,7 @@
         <p:spPr>
           <a:xfrm>
             <a:off x="457200" y="1481328"/>
-            <a:ext cx="4419600" cy="4525963"/>
+            <a:ext cx="4267200" cy="4525963"/>
           </a:xfrm>
           <a:prstGeom prst="rect">
             <a:avLst/>
@@ -16834,7 +16021,21 @@
                 <a:latin typeface="Arial" panose="020B0604020202020204" pitchFamily="34" charset="0"/>
                 <a:cs typeface="Arial" panose="020B0604020202020204" pitchFamily="34" charset="0"/>
               </a:rPr>
-              <a:t>Intensity per pixel in the food image region used as summarizing statistical for each map</a:t>
+              <a:t>Intensity per pixel in the food image region used as summarizing </a:t>
+            </a:r>
+            <a:r>
+              <a:rPr lang="en-US" dirty="0" smtClean="0">
+                <a:latin typeface="Arial" panose="020B0604020202020204" pitchFamily="34" charset="0"/>
+                <a:cs typeface="Arial" panose="020B0604020202020204" pitchFamily="34" charset="0"/>
+              </a:rPr>
+              <a:t>statistic </a:t>
+            </a:r>
+            <a:r>
+              <a:rPr lang="en-US" dirty="0" smtClean="0">
+                <a:latin typeface="Arial" panose="020B0604020202020204" pitchFamily="34" charset="0"/>
+                <a:cs typeface="Arial" panose="020B0604020202020204" pitchFamily="34" charset="0"/>
+              </a:rPr>
+              <a:t>for each map</a:t>
             </a:r>
           </a:p>
           <a:p>
@@ -16888,14 +16089,7 @@
                 <a:latin typeface="Arial" panose="020B0604020202020204" pitchFamily="34" charset="0"/>
                 <a:cs typeface="Arial" panose="020B0604020202020204" pitchFamily="34" charset="0"/>
               </a:rPr>
-              <a:t>Methods: </a:t>
-            </a:r>
-            <a:r>
-              <a:rPr lang="en-US" dirty="0" smtClean="0">
-                <a:latin typeface="Arial" panose="020B0604020202020204" pitchFamily="34" charset="0"/>
-                <a:cs typeface="Arial" panose="020B0604020202020204" pitchFamily="34" charset="0"/>
-              </a:rPr>
-              <a:t>Texture</a:t>
+              <a:t>Methods: Texture</a:t>
             </a:r>
             <a:endParaRPr lang="en-US" dirty="0">
               <a:latin typeface="Arial" panose="020B0604020202020204" pitchFamily="34" charset="0"/>

</xml_diff>

<commit_message>
Added Results to Powerpoint
</commit_message>
<xml_diff>
--- a/documents/830_Presentation_Fasburg_Thomas_Reiff.pptx
+++ b/documents/830_Presentation_Fasburg_Thomas_Reiff.pptx
@@ -126,7 +126,7 @@
   </p:defaultTextStyle>
   <p:extLst>
     <p:ext uri="{EFAFB233-063F-42B5-8137-9DF3F51BA10A}">
-      <p15:sldGuideLst xmlns:p15="http://schemas.microsoft.com/office/powerpoint/2012/main">
+      <p15:sldGuideLst xmlns:p15="http://schemas.microsoft.com/office/powerpoint/2012/main" xmlns="">
         <p15:guide id="1" orient="horz" pos="2160">
           <p15:clr>
             <a:srgbClr val="A4A3A4"/>
@@ -2598,6 +2598,629 @@
       <dsp:cNvGrpSpPr/>
     </dsp:nvGrpSpPr>
     <dsp:grpSpPr/>
+    <dsp:sp modelId="{CA4F0969-CDAB-40EE-B404-498D81FF95F0}">
+      <dsp:nvSpPr>
+        <dsp:cNvPr id="0" name=""/>
+        <dsp:cNvSpPr/>
+      </dsp:nvSpPr>
+      <dsp:spPr>
+        <a:xfrm>
+          <a:off x="0" y="0"/>
+          <a:ext cx="4267200" cy="964935"/>
+        </a:xfrm>
+        <a:prstGeom prst="roundRect">
+          <a:avLst>
+            <a:gd name="adj" fmla="val 10000"/>
+          </a:avLst>
+        </a:prstGeom>
+        <a:solidFill>
+          <a:schemeClr val="accent1">
+            <a:hueOff val="0"/>
+            <a:satOff val="0"/>
+            <a:lumOff val="0"/>
+            <a:alphaOff val="0"/>
+          </a:schemeClr>
+        </a:solidFill>
+        <a:ln w="55000" cap="flat" cmpd="thickThin" algn="ctr">
+          <a:solidFill>
+            <a:schemeClr val="lt1">
+              <a:hueOff val="0"/>
+              <a:satOff val="0"/>
+              <a:lumOff val="0"/>
+              <a:alphaOff val="0"/>
+            </a:schemeClr>
+          </a:solidFill>
+          <a:prstDash val="solid"/>
+        </a:ln>
+        <a:effectLst/>
+      </dsp:spPr>
+      <dsp:style>
+        <a:lnRef idx="2">
+          <a:scrgbClr r="0" g="0" b="0"/>
+        </a:lnRef>
+        <a:fillRef idx="1">
+          <a:scrgbClr r="0" g="0" b="0"/>
+        </a:fillRef>
+        <a:effectRef idx="0">
+          <a:scrgbClr r="0" g="0" b="0"/>
+        </a:effectRef>
+        <a:fontRef idx="minor">
+          <a:schemeClr val="lt1"/>
+        </a:fontRef>
+      </dsp:style>
+      <dsp:txBody>
+        <a:bodyPr spcFirstLastPara="0" vert="horz" wrap="square" lIns="76200" tIns="76200" rIns="76200" bIns="76200" numCol="1" spcCol="1270" anchor="ctr" anchorCtr="0">
+          <a:noAutofit/>
+        </a:bodyPr>
+        <a:lstStyle/>
+        <a:p>
+          <a:pPr lvl="0" algn="l" defTabSz="889000" rtl="0">
+            <a:lnSpc>
+              <a:spcPct val="90000"/>
+            </a:lnSpc>
+            <a:spcBef>
+              <a:spcPct val="0"/>
+            </a:spcBef>
+            <a:spcAft>
+              <a:spcPct val="35000"/>
+            </a:spcAft>
+          </a:pPr>
+          <a:r>
+            <a:rPr lang="en-US" sz="2000" kern="1200" dirty="0" smtClean="0">
+              <a:latin typeface="Arial" panose="020B0604020202020204" pitchFamily="34" charset="0"/>
+              <a:cs typeface="Arial" panose="020B0604020202020204" pitchFamily="34" charset="0"/>
+            </a:rPr>
+            <a:t>Use R, B, or G as gray image based on largest </a:t>
+          </a:r>
+          <a:r>
+            <a:rPr lang="el-GR" sz="2000" kern="1200" dirty="0" smtClean="0">
+              <a:latin typeface="Arial" panose="020B0604020202020204" pitchFamily="34" charset="0"/>
+              <a:cs typeface="Arial" panose="020B0604020202020204" pitchFamily="34" charset="0"/>
+            </a:rPr>
+            <a:t>σ</a:t>
+          </a:r>
+          <a:endParaRPr lang="en-US" sz="2000" kern="1200" dirty="0">
+            <a:latin typeface="Arial" panose="020B0604020202020204" pitchFamily="34" charset="0"/>
+            <a:cs typeface="Arial" panose="020B0604020202020204" pitchFamily="34" charset="0"/>
+          </a:endParaRPr>
+        </a:p>
+      </dsp:txBody>
+      <dsp:txXfrm>
+        <a:off x="28262" y="28262"/>
+        <a:ext cx="3144422" cy="908411"/>
+      </dsp:txXfrm>
+    </dsp:sp>
+    <dsp:sp modelId="{E9907399-643A-4492-BBA8-BC8B4F473561}">
+      <dsp:nvSpPr>
+        <dsp:cNvPr id="0" name=""/>
+        <dsp:cNvSpPr/>
+      </dsp:nvSpPr>
+      <dsp:spPr>
+        <a:xfrm>
+          <a:off x="357377" y="1140378"/>
+          <a:ext cx="4267200" cy="964935"/>
+        </a:xfrm>
+        <a:prstGeom prst="roundRect">
+          <a:avLst>
+            <a:gd name="adj" fmla="val 10000"/>
+          </a:avLst>
+        </a:prstGeom>
+        <a:solidFill>
+          <a:schemeClr val="accent1">
+            <a:hueOff val="0"/>
+            <a:satOff val="0"/>
+            <a:lumOff val="0"/>
+            <a:alphaOff val="0"/>
+          </a:schemeClr>
+        </a:solidFill>
+        <a:ln w="55000" cap="flat" cmpd="thickThin" algn="ctr">
+          <a:solidFill>
+            <a:schemeClr val="lt1">
+              <a:hueOff val="0"/>
+              <a:satOff val="0"/>
+              <a:lumOff val="0"/>
+              <a:alphaOff val="0"/>
+            </a:schemeClr>
+          </a:solidFill>
+          <a:prstDash val="solid"/>
+        </a:ln>
+        <a:effectLst/>
+      </dsp:spPr>
+      <dsp:style>
+        <a:lnRef idx="2">
+          <a:scrgbClr r="0" g="0" b="0"/>
+        </a:lnRef>
+        <a:fillRef idx="1">
+          <a:scrgbClr r="0" g="0" b="0"/>
+        </a:fillRef>
+        <a:effectRef idx="0">
+          <a:scrgbClr r="0" g="0" b="0"/>
+        </a:effectRef>
+        <a:fontRef idx="minor">
+          <a:schemeClr val="lt1"/>
+        </a:fontRef>
+      </dsp:style>
+      <dsp:txBody>
+        <a:bodyPr spcFirstLastPara="0" vert="horz" wrap="square" lIns="76200" tIns="76200" rIns="76200" bIns="76200" numCol="1" spcCol="1270" anchor="ctr" anchorCtr="0">
+          <a:noAutofit/>
+        </a:bodyPr>
+        <a:lstStyle/>
+        <a:p>
+          <a:pPr lvl="0" algn="l" defTabSz="889000" rtl="0">
+            <a:lnSpc>
+              <a:spcPct val="90000"/>
+            </a:lnSpc>
+            <a:spcBef>
+              <a:spcPct val="0"/>
+            </a:spcBef>
+            <a:spcAft>
+              <a:spcPct val="35000"/>
+            </a:spcAft>
+          </a:pPr>
+          <a:r>
+            <a:rPr lang="en-US" sz="2000" kern="1200" dirty="0" smtClean="0">
+              <a:latin typeface="Arial" panose="020B0604020202020204" pitchFamily="34" charset="0"/>
+              <a:cs typeface="Arial" panose="020B0604020202020204" pitchFamily="34" charset="0"/>
+            </a:rPr>
+            <a:t>Create intensity histogram H, and smooth</a:t>
+          </a:r>
+          <a:endParaRPr lang="en-US" sz="2000" kern="1200" dirty="0">
+            <a:latin typeface="Arial" panose="020B0604020202020204" pitchFamily="34" charset="0"/>
+            <a:cs typeface="Arial" panose="020B0604020202020204" pitchFamily="34" charset="0"/>
+          </a:endParaRPr>
+        </a:p>
+      </dsp:txBody>
+      <dsp:txXfrm>
+        <a:off x="385639" y="1168640"/>
+        <a:ext cx="3226089" cy="908411"/>
+      </dsp:txXfrm>
+    </dsp:sp>
+    <dsp:sp modelId="{3C0DA63A-76CB-46F1-ABD8-60529721F922}">
+      <dsp:nvSpPr>
+        <dsp:cNvPr id="0" name=""/>
+        <dsp:cNvSpPr/>
+      </dsp:nvSpPr>
+      <dsp:spPr>
+        <a:xfrm>
+          <a:off x="709421" y="2280756"/>
+          <a:ext cx="4267200" cy="964935"/>
+        </a:xfrm>
+        <a:prstGeom prst="roundRect">
+          <a:avLst>
+            <a:gd name="adj" fmla="val 10000"/>
+          </a:avLst>
+        </a:prstGeom>
+        <a:solidFill>
+          <a:schemeClr val="accent1">
+            <a:hueOff val="0"/>
+            <a:satOff val="0"/>
+            <a:lumOff val="0"/>
+            <a:alphaOff val="0"/>
+          </a:schemeClr>
+        </a:solidFill>
+        <a:ln w="55000" cap="flat" cmpd="thickThin" algn="ctr">
+          <a:solidFill>
+            <a:schemeClr val="lt1">
+              <a:hueOff val="0"/>
+              <a:satOff val="0"/>
+              <a:lumOff val="0"/>
+              <a:alphaOff val="0"/>
+            </a:schemeClr>
+          </a:solidFill>
+          <a:prstDash val="solid"/>
+        </a:ln>
+        <a:effectLst/>
+      </dsp:spPr>
+      <dsp:style>
+        <a:lnRef idx="2">
+          <a:scrgbClr r="0" g="0" b="0"/>
+        </a:lnRef>
+        <a:fillRef idx="1">
+          <a:scrgbClr r="0" g="0" b="0"/>
+        </a:fillRef>
+        <a:effectRef idx="0">
+          <a:scrgbClr r="0" g="0" b="0"/>
+        </a:effectRef>
+        <a:fontRef idx="minor">
+          <a:schemeClr val="lt1"/>
+        </a:fontRef>
+      </dsp:style>
+      <dsp:txBody>
+        <a:bodyPr spcFirstLastPara="0" vert="horz" wrap="square" lIns="76200" tIns="76200" rIns="76200" bIns="76200" numCol="1" spcCol="1270" anchor="ctr" anchorCtr="0">
+          <a:noAutofit/>
+        </a:bodyPr>
+        <a:lstStyle/>
+        <a:p>
+          <a:pPr lvl="0" algn="l" defTabSz="889000" rtl="0">
+            <a:lnSpc>
+              <a:spcPct val="90000"/>
+            </a:lnSpc>
+            <a:spcBef>
+              <a:spcPct val="0"/>
+            </a:spcBef>
+            <a:spcAft>
+              <a:spcPct val="35000"/>
+            </a:spcAft>
+          </a:pPr>
+          <a:r>
+            <a:rPr lang="en-US" sz="2000" kern="1200" dirty="0" smtClean="0">
+              <a:latin typeface="Arial" panose="020B0604020202020204" pitchFamily="34" charset="0"/>
+              <a:cs typeface="Arial" panose="020B0604020202020204" pitchFamily="34" charset="0"/>
+            </a:rPr>
+            <a:t>Threshold based on lowest trough in H</a:t>
+          </a:r>
+          <a:endParaRPr lang="en-US" sz="2000" kern="1200" dirty="0">
+            <a:latin typeface="Arial" panose="020B0604020202020204" pitchFamily="34" charset="0"/>
+            <a:cs typeface="Arial" panose="020B0604020202020204" pitchFamily="34" charset="0"/>
+          </a:endParaRPr>
+        </a:p>
+      </dsp:txBody>
+      <dsp:txXfrm>
+        <a:off x="737683" y="2309018"/>
+        <a:ext cx="3231423" cy="908411"/>
+      </dsp:txXfrm>
+    </dsp:sp>
+    <dsp:sp modelId="{431E7DF2-929C-4265-8080-7AF997DAB656}">
+      <dsp:nvSpPr>
+        <dsp:cNvPr id="0" name=""/>
+        <dsp:cNvSpPr/>
+      </dsp:nvSpPr>
+      <dsp:spPr>
+        <a:xfrm>
+          <a:off x="1066799" y="3421135"/>
+          <a:ext cx="4267200" cy="964935"/>
+        </a:xfrm>
+        <a:prstGeom prst="roundRect">
+          <a:avLst>
+            <a:gd name="adj" fmla="val 10000"/>
+          </a:avLst>
+        </a:prstGeom>
+        <a:solidFill>
+          <a:schemeClr val="accent1">
+            <a:hueOff val="0"/>
+            <a:satOff val="0"/>
+            <a:lumOff val="0"/>
+            <a:alphaOff val="0"/>
+          </a:schemeClr>
+        </a:solidFill>
+        <a:ln w="55000" cap="flat" cmpd="thickThin" algn="ctr">
+          <a:solidFill>
+            <a:schemeClr val="lt1">
+              <a:hueOff val="0"/>
+              <a:satOff val="0"/>
+              <a:lumOff val="0"/>
+              <a:alphaOff val="0"/>
+            </a:schemeClr>
+          </a:solidFill>
+          <a:prstDash val="solid"/>
+        </a:ln>
+        <a:effectLst/>
+      </dsp:spPr>
+      <dsp:style>
+        <a:lnRef idx="2">
+          <a:scrgbClr r="0" g="0" b="0"/>
+        </a:lnRef>
+        <a:fillRef idx="1">
+          <a:scrgbClr r="0" g="0" b="0"/>
+        </a:fillRef>
+        <a:effectRef idx="0">
+          <a:scrgbClr r="0" g="0" b="0"/>
+        </a:effectRef>
+        <a:fontRef idx="minor">
+          <a:schemeClr val="lt1"/>
+        </a:fontRef>
+      </dsp:style>
+      <dsp:txBody>
+        <a:bodyPr spcFirstLastPara="0" vert="horz" wrap="square" lIns="76200" tIns="76200" rIns="76200" bIns="76200" numCol="1" spcCol="1270" anchor="ctr" anchorCtr="0">
+          <a:noAutofit/>
+        </a:bodyPr>
+        <a:lstStyle/>
+        <a:p>
+          <a:pPr lvl="0" algn="l" defTabSz="889000" rtl="0">
+            <a:lnSpc>
+              <a:spcPct val="90000"/>
+            </a:lnSpc>
+            <a:spcBef>
+              <a:spcPct val="0"/>
+            </a:spcBef>
+            <a:spcAft>
+              <a:spcPct val="35000"/>
+            </a:spcAft>
+          </a:pPr>
+          <a:r>
+            <a:rPr lang="en-US" sz="2000" kern="1200" dirty="0" smtClean="0">
+              <a:latin typeface="Arial" panose="020B0604020202020204" pitchFamily="34" charset="0"/>
+              <a:cs typeface="Arial" panose="020B0604020202020204" pitchFamily="34" charset="0"/>
+            </a:rPr>
+            <a:t>Region with larger </a:t>
+          </a:r>
+          <a:r>
+            <a:rPr lang="el-GR" sz="2000" kern="1200" dirty="0" smtClean="0">
+              <a:latin typeface="Arial" panose="020B0604020202020204" pitchFamily="34" charset="0"/>
+              <a:cs typeface="Arial" panose="020B0604020202020204" pitchFamily="34" charset="0"/>
+            </a:rPr>
+            <a:t>μ</a:t>
+          </a:r>
+          <a:r>
+            <a:rPr lang="en-US" sz="2000" kern="1200" baseline="-25000" dirty="0" err="1" smtClean="0">
+              <a:latin typeface="Arial" panose="020B0604020202020204" pitchFamily="34" charset="0"/>
+              <a:cs typeface="Arial" panose="020B0604020202020204" pitchFamily="34" charset="0"/>
+            </a:rPr>
+            <a:t>rr</a:t>
+          </a:r>
+          <a:r>
+            <a:rPr lang="en-US" sz="2000" kern="1200" dirty="0" smtClean="0">
+              <a:latin typeface="Arial" panose="020B0604020202020204" pitchFamily="34" charset="0"/>
+              <a:cs typeface="Arial" panose="020B0604020202020204" pitchFamily="34" charset="0"/>
+            </a:rPr>
+            <a:t> + </a:t>
+          </a:r>
+          <a:r>
+            <a:rPr lang="el-GR" sz="2000" kern="1200" dirty="0" smtClean="0">
+              <a:latin typeface="Arial" panose="020B0604020202020204" pitchFamily="34" charset="0"/>
+              <a:cs typeface="Arial" panose="020B0604020202020204" pitchFamily="34" charset="0"/>
+            </a:rPr>
+            <a:t>μ</a:t>
+          </a:r>
+          <a:r>
+            <a:rPr lang="en-US" sz="2000" kern="1200" baseline="-25000" dirty="0" smtClean="0">
+              <a:latin typeface="Arial" panose="020B0604020202020204" pitchFamily="34" charset="0"/>
+              <a:cs typeface="Arial" panose="020B0604020202020204" pitchFamily="34" charset="0"/>
+            </a:rPr>
+            <a:t>cc</a:t>
+          </a:r>
+          <a:r>
+            <a:rPr lang="en-US" sz="2000" kern="1200" dirty="0" smtClean="0">
+              <a:latin typeface="Arial" panose="020B0604020202020204" pitchFamily="34" charset="0"/>
+              <a:cs typeface="Arial" panose="020B0604020202020204" pitchFamily="34" charset="0"/>
+            </a:rPr>
+            <a:t> is background</a:t>
+          </a:r>
+          <a:endParaRPr lang="en-US" sz="2000" kern="1200" dirty="0">
+            <a:latin typeface="Arial" panose="020B0604020202020204" pitchFamily="34" charset="0"/>
+            <a:cs typeface="Arial" panose="020B0604020202020204" pitchFamily="34" charset="0"/>
+          </a:endParaRPr>
+        </a:p>
+      </dsp:txBody>
+      <dsp:txXfrm>
+        <a:off x="1095061" y="3449397"/>
+        <a:ext cx="3226089" cy="908411"/>
+      </dsp:txXfrm>
+    </dsp:sp>
+    <dsp:sp modelId="{473B2F42-9235-48D2-80E1-AD557D0740D0}">
+      <dsp:nvSpPr>
+        <dsp:cNvPr id="0" name=""/>
+        <dsp:cNvSpPr/>
+      </dsp:nvSpPr>
+      <dsp:spPr>
+        <a:xfrm>
+          <a:off x="3639991" y="739052"/>
+          <a:ext cx="627208" cy="627208"/>
+        </a:xfrm>
+        <a:prstGeom prst="downArrow">
+          <a:avLst>
+            <a:gd name="adj1" fmla="val 55000"/>
+            <a:gd name="adj2" fmla="val 45000"/>
+          </a:avLst>
+        </a:prstGeom>
+        <a:solidFill>
+          <a:schemeClr val="accent1">
+            <a:alpha val="90000"/>
+            <a:tint val="40000"/>
+            <a:hueOff val="0"/>
+            <a:satOff val="0"/>
+            <a:lumOff val="0"/>
+            <a:alphaOff val="0"/>
+          </a:schemeClr>
+        </a:solidFill>
+        <a:ln w="55000" cap="flat" cmpd="thickThin" algn="ctr">
+          <a:solidFill>
+            <a:schemeClr val="accent1">
+              <a:alpha val="90000"/>
+              <a:tint val="40000"/>
+              <a:hueOff val="0"/>
+              <a:satOff val="0"/>
+              <a:lumOff val="0"/>
+              <a:alphaOff val="0"/>
+            </a:schemeClr>
+          </a:solidFill>
+          <a:prstDash val="solid"/>
+        </a:ln>
+        <a:effectLst/>
+      </dsp:spPr>
+      <dsp:style>
+        <a:lnRef idx="2">
+          <a:scrgbClr r="0" g="0" b="0"/>
+        </a:lnRef>
+        <a:fillRef idx="1">
+          <a:scrgbClr r="0" g="0" b="0"/>
+        </a:fillRef>
+        <a:effectRef idx="0">
+          <a:scrgbClr r="0" g="0" b="0"/>
+        </a:effectRef>
+        <a:fontRef idx="minor"/>
+      </dsp:style>
+      <dsp:txBody>
+        <a:bodyPr spcFirstLastPara="0" vert="horz" wrap="square" lIns="27940" tIns="27940" rIns="27940" bIns="27940" numCol="1" spcCol="1270" anchor="ctr" anchorCtr="0">
+          <a:noAutofit/>
+        </a:bodyPr>
+        <a:lstStyle/>
+        <a:p>
+          <a:pPr lvl="0" algn="ctr" defTabSz="977900">
+            <a:lnSpc>
+              <a:spcPct val="90000"/>
+            </a:lnSpc>
+            <a:spcBef>
+              <a:spcPct val="0"/>
+            </a:spcBef>
+            <a:spcAft>
+              <a:spcPct val="35000"/>
+            </a:spcAft>
+          </a:pPr>
+          <a:endParaRPr lang="en-US" sz="2200" kern="1200"/>
+        </a:p>
+      </dsp:txBody>
+      <dsp:txXfrm>
+        <a:off x="3781113" y="739052"/>
+        <a:ext cx="344964" cy="471974"/>
+      </dsp:txXfrm>
+    </dsp:sp>
+    <dsp:sp modelId="{5EFC5DF3-E8F2-4B15-81D8-6CD78CE0D6F7}">
+      <dsp:nvSpPr>
+        <dsp:cNvPr id="0" name=""/>
+        <dsp:cNvSpPr/>
+      </dsp:nvSpPr>
+      <dsp:spPr>
+        <a:xfrm>
+          <a:off x="3997369" y="1879431"/>
+          <a:ext cx="627208" cy="627208"/>
+        </a:xfrm>
+        <a:prstGeom prst="downArrow">
+          <a:avLst>
+            <a:gd name="adj1" fmla="val 55000"/>
+            <a:gd name="adj2" fmla="val 45000"/>
+          </a:avLst>
+        </a:prstGeom>
+        <a:solidFill>
+          <a:schemeClr val="accent1">
+            <a:alpha val="90000"/>
+            <a:tint val="40000"/>
+            <a:hueOff val="0"/>
+            <a:satOff val="0"/>
+            <a:lumOff val="0"/>
+            <a:alphaOff val="0"/>
+          </a:schemeClr>
+        </a:solidFill>
+        <a:ln w="55000" cap="flat" cmpd="thickThin" algn="ctr">
+          <a:solidFill>
+            <a:schemeClr val="accent1">
+              <a:alpha val="90000"/>
+              <a:tint val="40000"/>
+              <a:hueOff val="0"/>
+              <a:satOff val="0"/>
+              <a:lumOff val="0"/>
+              <a:alphaOff val="0"/>
+            </a:schemeClr>
+          </a:solidFill>
+          <a:prstDash val="solid"/>
+        </a:ln>
+        <a:effectLst/>
+      </dsp:spPr>
+      <dsp:style>
+        <a:lnRef idx="2">
+          <a:scrgbClr r="0" g="0" b="0"/>
+        </a:lnRef>
+        <a:fillRef idx="1">
+          <a:scrgbClr r="0" g="0" b="0"/>
+        </a:fillRef>
+        <a:effectRef idx="0">
+          <a:scrgbClr r="0" g="0" b="0"/>
+        </a:effectRef>
+        <a:fontRef idx="minor"/>
+      </dsp:style>
+      <dsp:txBody>
+        <a:bodyPr spcFirstLastPara="0" vert="horz" wrap="square" lIns="27940" tIns="27940" rIns="27940" bIns="27940" numCol="1" spcCol="1270" anchor="ctr" anchorCtr="0">
+          <a:noAutofit/>
+        </a:bodyPr>
+        <a:lstStyle/>
+        <a:p>
+          <a:pPr lvl="0" algn="ctr" defTabSz="977900">
+            <a:lnSpc>
+              <a:spcPct val="90000"/>
+            </a:lnSpc>
+            <a:spcBef>
+              <a:spcPct val="0"/>
+            </a:spcBef>
+            <a:spcAft>
+              <a:spcPct val="35000"/>
+            </a:spcAft>
+          </a:pPr>
+          <a:endParaRPr lang="en-US" sz="2200" kern="1200"/>
+        </a:p>
+      </dsp:txBody>
+      <dsp:txXfrm>
+        <a:off x="4138491" y="1879431"/>
+        <a:ext cx="344964" cy="471974"/>
+      </dsp:txXfrm>
+    </dsp:sp>
+    <dsp:sp modelId="{2A5D6562-E979-4639-BFB8-6C5E617CDE45}">
+      <dsp:nvSpPr>
+        <dsp:cNvPr id="0" name=""/>
+        <dsp:cNvSpPr/>
+      </dsp:nvSpPr>
+      <dsp:spPr>
+        <a:xfrm>
+          <a:off x="4349413" y="3019809"/>
+          <a:ext cx="627208" cy="627208"/>
+        </a:xfrm>
+        <a:prstGeom prst="downArrow">
+          <a:avLst>
+            <a:gd name="adj1" fmla="val 55000"/>
+            <a:gd name="adj2" fmla="val 45000"/>
+          </a:avLst>
+        </a:prstGeom>
+        <a:solidFill>
+          <a:schemeClr val="accent1">
+            <a:alpha val="90000"/>
+            <a:tint val="40000"/>
+            <a:hueOff val="0"/>
+            <a:satOff val="0"/>
+            <a:lumOff val="0"/>
+            <a:alphaOff val="0"/>
+          </a:schemeClr>
+        </a:solidFill>
+        <a:ln w="55000" cap="flat" cmpd="thickThin" algn="ctr">
+          <a:solidFill>
+            <a:schemeClr val="accent1">
+              <a:alpha val="90000"/>
+              <a:tint val="40000"/>
+              <a:hueOff val="0"/>
+              <a:satOff val="0"/>
+              <a:lumOff val="0"/>
+              <a:alphaOff val="0"/>
+            </a:schemeClr>
+          </a:solidFill>
+          <a:prstDash val="solid"/>
+        </a:ln>
+        <a:effectLst/>
+      </dsp:spPr>
+      <dsp:style>
+        <a:lnRef idx="2">
+          <a:scrgbClr r="0" g="0" b="0"/>
+        </a:lnRef>
+        <a:fillRef idx="1">
+          <a:scrgbClr r="0" g="0" b="0"/>
+        </a:fillRef>
+        <a:effectRef idx="0">
+          <a:scrgbClr r="0" g="0" b="0"/>
+        </a:effectRef>
+        <a:fontRef idx="minor"/>
+      </dsp:style>
+      <dsp:txBody>
+        <a:bodyPr spcFirstLastPara="0" vert="horz" wrap="square" lIns="27940" tIns="27940" rIns="27940" bIns="27940" numCol="1" spcCol="1270" anchor="ctr" anchorCtr="0">
+          <a:noAutofit/>
+        </a:bodyPr>
+        <a:lstStyle/>
+        <a:p>
+          <a:pPr lvl="0" algn="ctr" defTabSz="977900">
+            <a:lnSpc>
+              <a:spcPct val="90000"/>
+            </a:lnSpc>
+            <a:spcBef>
+              <a:spcPct val="0"/>
+            </a:spcBef>
+            <a:spcAft>
+              <a:spcPct val="35000"/>
+            </a:spcAft>
+          </a:pPr>
+          <a:endParaRPr lang="en-US" sz="2200" kern="1200"/>
+        </a:p>
+      </dsp:txBody>
+      <dsp:txXfrm>
+        <a:off x="4490535" y="3019809"/>
+        <a:ext cx="344964" cy="471974"/>
+      </dsp:txXfrm>
+    </dsp:sp>
   </dsp:spTree>
 </dsp:drawing>
 </file>
@@ -2610,6 +3233,413 @@
       <dsp:cNvGrpSpPr/>
     </dsp:nvGrpSpPr>
     <dsp:grpSpPr/>
+    <dsp:sp modelId="{6009FFD0-D222-4B03-9EA9-C92471BCD9DC}">
+      <dsp:nvSpPr>
+        <dsp:cNvPr id="0" name=""/>
+        <dsp:cNvSpPr/>
+      </dsp:nvSpPr>
+      <dsp:spPr>
+        <a:xfrm>
+          <a:off x="0" y="49319"/>
+          <a:ext cx="8229600" cy="818999"/>
+        </a:xfrm>
+        <a:prstGeom prst="roundRect">
+          <a:avLst/>
+        </a:prstGeom>
+        <a:solidFill>
+          <a:schemeClr val="accent1">
+            <a:hueOff val="0"/>
+            <a:satOff val="0"/>
+            <a:lumOff val="0"/>
+            <a:alphaOff val="0"/>
+          </a:schemeClr>
+        </a:solidFill>
+        <a:ln w="55000" cap="flat" cmpd="thickThin" algn="ctr">
+          <a:solidFill>
+            <a:schemeClr val="lt1">
+              <a:hueOff val="0"/>
+              <a:satOff val="0"/>
+              <a:lumOff val="0"/>
+              <a:alphaOff val="0"/>
+            </a:schemeClr>
+          </a:solidFill>
+          <a:prstDash val="solid"/>
+        </a:ln>
+        <a:effectLst/>
+      </dsp:spPr>
+      <dsp:style>
+        <a:lnRef idx="2">
+          <a:scrgbClr r="0" g="0" b="0"/>
+        </a:lnRef>
+        <a:fillRef idx="1">
+          <a:scrgbClr r="0" g="0" b="0"/>
+        </a:fillRef>
+        <a:effectRef idx="0">
+          <a:scrgbClr r="0" g="0" b="0"/>
+        </a:effectRef>
+        <a:fontRef idx="minor">
+          <a:schemeClr val="lt1"/>
+        </a:fontRef>
+      </dsp:style>
+      <dsp:txBody>
+        <a:bodyPr spcFirstLastPara="0" vert="horz" wrap="square" lIns="133350" tIns="133350" rIns="133350" bIns="133350" numCol="1" spcCol="1270" anchor="ctr" anchorCtr="0">
+          <a:noAutofit/>
+        </a:bodyPr>
+        <a:lstStyle/>
+        <a:p>
+          <a:pPr lvl="0" algn="l" defTabSz="1555750" rtl="0">
+            <a:lnSpc>
+              <a:spcPct val="90000"/>
+            </a:lnSpc>
+            <a:spcBef>
+              <a:spcPct val="0"/>
+            </a:spcBef>
+            <a:spcAft>
+              <a:spcPct val="35000"/>
+            </a:spcAft>
+          </a:pPr>
+          <a:r>
+            <a:rPr lang="en-US" sz="3500" kern="1200" smtClean="0">
+              <a:latin typeface="Arial" panose="020B0604020202020204" pitchFamily="34" charset="0"/>
+              <a:cs typeface="Arial" panose="020B0604020202020204" pitchFamily="34" charset="0"/>
+            </a:rPr>
+            <a:t>Training</a:t>
+          </a:r>
+          <a:endParaRPr lang="en-US" sz="3500" kern="1200">
+            <a:latin typeface="Arial" panose="020B0604020202020204" pitchFamily="34" charset="0"/>
+            <a:cs typeface="Arial" panose="020B0604020202020204" pitchFamily="34" charset="0"/>
+          </a:endParaRPr>
+        </a:p>
+      </dsp:txBody>
+      <dsp:txXfrm>
+        <a:off x="39980" y="89299"/>
+        <a:ext cx="8149640" cy="739039"/>
+      </dsp:txXfrm>
+    </dsp:sp>
+    <dsp:sp modelId="{09BB81D5-4EF3-4B5E-A23A-812D61905779}">
+      <dsp:nvSpPr>
+        <dsp:cNvPr id="0" name=""/>
+        <dsp:cNvSpPr/>
+      </dsp:nvSpPr>
+      <dsp:spPr>
+        <a:xfrm>
+          <a:off x="0" y="868319"/>
+          <a:ext cx="8229600" cy="579600"/>
+        </a:xfrm>
+        <a:prstGeom prst="rect">
+          <a:avLst/>
+        </a:prstGeom>
+        <a:noFill/>
+        <a:ln>
+          <a:noFill/>
+        </a:ln>
+        <a:effectLst/>
+      </dsp:spPr>
+      <dsp:style>
+        <a:lnRef idx="0">
+          <a:scrgbClr r="0" g="0" b="0"/>
+        </a:lnRef>
+        <a:fillRef idx="0">
+          <a:scrgbClr r="0" g="0" b="0"/>
+        </a:fillRef>
+        <a:effectRef idx="0">
+          <a:scrgbClr r="0" g="0" b="0"/>
+        </a:effectRef>
+        <a:fontRef idx="minor"/>
+      </dsp:style>
+      <dsp:txBody>
+        <a:bodyPr spcFirstLastPara="0" vert="horz" wrap="square" lIns="261290" tIns="44450" rIns="248920" bIns="44450" numCol="1" spcCol="1270" anchor="t" anchorCtr="0">
+          <a:noAutofit/>
+        </a:bodyPr>
+        <a:lstStyle/>
+        <a:p>
+          <a:pPr marL="228600" lvl="1" indent="-228600" algn="l" defTabSz="1200150" rtl="0">
+            <a:lnSpc>
+              <a:spcPct val="90000"/>
+            </a:lnSpc>
+            <a:spcBef>
+              <a:spcPct val="0"/>
+            </a:spcBef>
+            <a:spcAft>
+              <a:spcPct val="20000"/>
+            </a:spcAft>
+            <a:buChar char="••"/>
+          </a:pPr>
+          <a:r>
+            <a:rPr lang="en-US" sz="2700" kern="1200" dirty="0" smtClean="0">
+              <a:latin typeface="Arial" panose="020B0604020202020204" pitchFamily="34" charset="0"/>
+              <a:cs typeface="Arial" panose="020B0604020202020204" pitchFamily="34" charset="0"/>
+            </a:rPr>
+            <a:t>Find N-dimensional mean of each class</a:t>
+          </a:r>
+          <a:endParaRPr lang="en-US" sz="2700" kern="1200" dirty="0">
+            <a:latin typeface="Arial" panose="020B0604020202020204" pitchFamily="34" charset="0"/>
+            <a:cs typeface="Arial" panose="020B0604020202020204" pitchFamily="34" charset="0"/>
+          </a:endParaRPr>
+        </a:p>
+      </dsp:txBody>
+      <dsp:txXfrm>
+        <a:off x="0" y="868319"/>
+        <a:ext cx="8229600" cy="579600"/>
+      </dsp:txXfrm>
+    </dsp:sp>
+    <dsp:sp modelId="{ADF7AE22-5AB6-4652-9D04-B2F8740234A9}">
+      <dsp:nvSpPr>
+        <dsp:cNvPr id="0" name=""/>
+        <dsp:cNvSpPr/>
+      </dsp:nvSpPr>
+      <dsp:spPr>
+        <a:xfrm>
+          <a:off x="0" y="1447918"/>
+          <a:ext cx="8229600" cy="818999"/>
+        </a:xfrm>
+        <a:prstGeom prst="roundRect">
+          <a:avLst/>
+        </a:prstGeom>
+        <a:solidFill>
+          <a:schemeClr val="accent1">
+            <a:hueOff val="0"/>
+            <a:satOff val="0"/>
+            <a:lumOff val="0"/>
+            <a:alphaOff val="0"/>
+          </a:schemeClr>
+        </a:solidFill>
+        <a:ln w="55000" cap="flat" cmpd="thickThin" algn="ctr">
+          <a:solidFill>
+            <a:schemeClr val="lt1">
+              <a:hueOff val="0"/>
+              <a:satOff val="0"/>
+              <a:lumOff val="0"/>
+              <a:alphaOff val="0"/>
+            </a:schemeClr>
+          </a:solidFill>
+          <a:prstDash val="solid"/>
+        </a:ln>
+        <a:effectLst/>
+      </dsp:spPr>
+      <dsp:style>
+        <a:lnRef idx="2">
+          <a:scrgbClr r="0" g="0" b="0"/>
+        </a:lnRef>
+        <a:fillRef idx="1">
+          <a:scrgbClr r="0" g="0" b="0"/>
+        </a:fillRef>
+        <a:effectRef idx="0">
+          <a:scrgbClr r="0" g="0" b="0"/>
+        </a:effectRef>
+        <a:fontRef idx="minor">
+          <a:schemeClr val="lt1"/>
+        </a:fontRef>
+      </dsp:style>
+      <dsp:txBody>
+        <a:bodyPr spcFirstLastPara="0" vert="horz" wrap="square" lIns="133350" tIns="133350" rIns="133350" bIns="133350" numCol="1" spcCol="1270" anchor="ctr" anchorCtr="0">
+          <a:noAutofit/>
+        </a:bodyPr>
+        <a:lstStyle/>
+        <a:p>
+          <a:pPr lvl="0" algn="l" defTabSz="1555750" rtl="0">
+            <a:lnSpc>
+              <a:spcPct val="90000"/>
+            </a:lnSpc>
+            <a:spcBef>
+              <a:spcPct val="0"/>
+            </a:spcBef>
+            <a:spcAft>
+              <a:spcPct val="35000"/>
+            </a:spcAft>
+          </a:pPr>
+          <a:r>
+            <a:rPr lang="en-US" sz="3500" kern="1200" smtClean="0">
+              <a:latin typeface="Arial" panose="020B0604020202020204" pitchFamily="34" charset="0"/>
+              <a:cs typeface="Arial" panose="020B0604020202020204" pitchFamily="34" charset="0"/>
+            </a:rPr>
+            <a:t>Testing</a:t>
+          </a:r>
+          <a:endParaRPr lang="en-US" sz="3500" kern="1200">
+            <a:latin typeface="Arial" panose="020B0604020202020204" pitchFamily="34" charset="0"/>
+            <a:cs typeface="Arial" panose="020B0604020202020204" pitchFamily="34" charset="0"/>
+          </a:endParaRPr>
+        </a:p>
+      </dsp:txBody>
+      <dsp:txXfrm>
+        <a:off x="39980" y="1487898"/>
+        <a:ext cx="8149640" cy="739039"/>
+      </dsp:txXfrm>
+    </dsp:sp>
+    <dsp:sp modelId="{23655599-5F59-49D3-B74B-3CFA1652679D}">
+      <dsp:nvSpPr>
+        <dsp:cNvPr id="0" name=""/>
+        <dsp:cNvSpPr/>
+      </dsp:nvSpPr>
+      <dsp:spPr>
+        <a:xfrm>
+          <a:off x="0" y="2266919"/>
+          <a:ext cx="8229600" cy="2209725"/>
+        </a:xfrm>
+        <a:prstGeom prst="rect">
+          <a:avLst/>
+        </a:prstGeom>
+        <a:noFill/>
+        <a:ln>
+          <a:noFill/>
+        </a:ln>
+        <a:effectLst/>
+      </dsp:spPr>
+      <dsp:style>
+        <a:lnRef idx="0">
+          <a:scrgbClr r="0" g="0" b="0"/>
+        </a:lnRef>
+        <a:fillRef idx="0">
+          <a:scrgbClr r="0" g="0" b="0"/>
+        </a:fillRef>
+        <a:effectRef idx="0">
+          <a:scrgbClr r="0" g="0" b="0"/>
+        </a:effectRef>
+        <a:fontRef idx="minor"/>
+      </dsp:style>
+      <dsp:txBody>
+        <a:bodyPr spcFirstLastPara="0" vert="horz" wrap="square" lIns="261290" tIns="44450" rIns="248920" bIns="44450" numCol="1" spcCol="1270" anchor="t" anchorCtr="0">
+          <a:noAutofit/>
+        </a:bodyPr>
+        <a:lstStyle/>
+        <a:p>
+          <a:pPr marL="228600" lvl="1" indent="-228600" algn="l" defTabSz="1200150" rtl="0">
+            <a:lnSpc>
+              <a:spcPct val="90000"/>
+            </a:lnSpc>
+            <a:spcBef>
+              <a:spcPct val="0"/>
+            </a:spcBef>
+            <a:spcAft>
+              <a:spcPct val="20000"/>
+            </a:spcAft>
+            <a:buChar char="••"/>
+          </a:pPr>
+          <a:r>
+            <a:rPr lang="en-US" sz="2700" kern="1200" smtClean="0">
+              <a:latin typeface="Arial" panose="020B0604020202020204" pitchFamily="34" charset="0"/>
+              <a:cs typeface="Arial" panose="020B0604020202020204" pitchFamily="34" charset="0"/>
+            </a:rPr>
+            <a:t>K-Means Clustering</a:t>
+          </a:r>
+          <a:endParaRPr lang="en-US" sz="2700" kern="1200">
+            <a:latin typeface="Arial" panose="020B0604020202020204" pitchFamily="34" charset="0"/>
+            <a:cs typeface="Arial" panose="020B0604020202020204" pitchFamily="34" charset="0"/>
+          </a:endParaRPr>
+        </a:p>
+        <a:p>
+          <a:pPr marL="457200" lvl="2" indent="-228600" algn="l" defTabSz="1200150" rtl="0">
+            <a:lnSpc>
+              <a:spcPct val="90000"/>
+            </a:lnSpc>
+            <a:spcBef>
+              <a:spcPct val="0"/>
+            </a:spcBef>
+            <a:spcAft>
+              <a:spcPct val="20000"/>
+            </a:spcAft>
+            <a:buChar char="••"/>
+          </a:pPr>
+          <a:r>
+            <a:rPr lang="en-US" sz="2700" kern="1200" smtClean="0">
+              <a:latin typeface="Arial" panose="020B0604020202020204" pitchFamily="34" charset="0"/>
+              <a:cs typeface="Arial" panose="020B0604020202020204" pitchFamily="34" charset="0"/>
+            </a:rPr>
+            <a:t>Dist scaled by std dev of each dimension</a:t>
+          </a:r>
+          <a:endParaRPr lang="en-US" sz="2700" kern="1200">
+            <a:latin typeface="Arial" panose="020B0604020202020204" pitchFamily="34" charset="0"/>
+            <a:cs typeface="Arial" panose="020B0604020202020204" pitchFamily="34" charset="0"/>
+          </a:endParaRPr>
+        </a:p>
+        <a:p>
+          <a:pPr marL="457200" lvl="2" indent="-228600" algn="l" defTabSz="1200150" rtl="0">
+            <a:lnSpc>
+              <a:spcPct val="90000"/>
+            </a:lnSpc>
+            <a:spcBef>
+              <a:spcPct val="0"/>
+            </a:spcBef>
+            <a:spcAft>
+              <a:spcPct val="20000"/>
+            </a:spcAft>
+            <a:buChar char="••"/>
+          </a:pPr>
+          <a:r>
+            <a:rPr lang="en-US" sz="2700" kern="1200" dirty="0" err="1" smtClean="0">
+              <a:latin typeface="Arial" panose="020B0604020202020204" pitchFamily="34" charset="0"/>
+              <a:cs typeface="Arial" panose="020B0604020202020204" pitchFamily="34" charset="0"/>
+            </a:rPr>
+            <a:t>Dist</a:t>
+          </a:r>
+          <a:r>
+            <a:rPr lang="en-US" sz="2700" kern="1200" dirty="0" smtClean="0">
+              <a:latin typeface="Arial" panose="020B0604020202020204" pitchFamily="34" charset="0"/>
+              <a:cs typeface="Arial" panose="020B0604020202020204" pitchFamily="34" charset="0"/>
+            </a:rPr>
+            <a:t> scaled to normalize dimension ranges</a:t>
+          </a:r>
+          <a:endParaRPr lang="en-US" sz="2700" kern="1200" dirty="0">
+            <a:latin typeface="Arial" panose="020B0604020202020204" pitchFamily="34" charset="0"/>
+            <a:cs typeface="Arial" panose="020B0604020202020204" pitchFamily="34" charset="0"/>
+          </a:endParaRPr>
+        </a:p>
+        <a:p>
+          <a:pPr marL="228600" lvl="1" indent="-228600" algn="l" defTabSz="1200150" rtl="0">
+            <a:lnSpc>
+              <a:spcPct val="90000"/>
+            </a:lnSpc>
+            <a:spcBef>
+              <a:spcPct val="0"/>
+            </a:spcBef>
+            <a:spcAft>
+              <a:spcPct val="20000"/>
+            </a:spcAft>
+            <a:buChar char="••"/>
+          </a:pPr>
+          <a:r>
+            <a:rPr lang="en-US" sz="2700" kern="1200" smtClean="0">
+              <a:latin typeface="Arial" panose="020B0604020202020204" pitchFamily="34" charset="0"/>
+              <a:cs typeface="Arial" panose="020B0604020202020204" pitchFamily="34" charset="0"/>
+            </a:rPr>
+            <a:t>Manually tuned weights by feature</a:t>
+          </a:r>
+          <a:endParaRPr lang="en-US" sz="2700" kern="1200">
+            <a:latin typeface="Arial" panose="020B0604020202020204" pitchFamily="34" charset="0"/>
+            <a:cs typeface="Arial" panose="020B0604020202020204" pitchFamily="34" charset="0"/>
+          </a:endParaRPr>
+        </a:p>
+        <a:p>
+          <a:pPr marL="457200" lvl="2" indent="-228600" algn="l" defTabSz="1200150" rtl="0">
+            <a:lnSpc>
+              <a:spcPct val="90000"/>
+            </a:lnSpc>
+            <a:spcBef>
+              <a:spcPct val="0"/>
+            </a:spcBef>
+            <a:spcAft>
+              <a:spcPct val="20000"/>
+            </a:spcAft>
+            <a:buChar char="••"/>
+          </a:pPr>
+          <a:r>
+            <a:rPr lang="en-US" sz="2700" kern="1200" dirty="0" smtClean="0">
+              <a:latin typeface="Arial" panose="020B0604020202020204" pitchFamily="34" charset="0"/>
+              <a:cs typeface="Arial" panose="020B0604020202020204" pitchFamily="34" charset="0"/>
+            </a:rPr>
+            <a:t>More weight to more important features</a:t>
+          </a:r>
+          <a:endParaRPr lang="en-US" sz="2700" kern="1200" dirty="0">
+            <a:latin typeface="Arial" panose="020B0604020202020204" pitchFamily="34" charset="0"/>
+            <a:cs typeface="Arial" panose="020B0604020202020204" pitchFamily="34" charset="0"/>
+          </a:endParaRPr>
+        </a:p>
+      </dsp:txBody>
+      <dsp:txXfrm>
+        <a:off x="0" y="2266919"/>
+        <a:ext cx="8229600" cy="2209725"/>
+      </dsp:txXfrm>
+    </dsp:sp>
   </dsp:spTree>
 </dsp:drawing>
 </file>
@@ -7028,15 +8058,7 @@
             </a:r>
             <a:r>
               <a:rPr lang="en-US" baseline="0" dirty="0" smtClean="0"/>
-              <a:t> </a:t>
-            </a:r>
-            <a:r>
-              <a:rPr lang="en-US" baseline="0" dirty="0" smtClean="0"/>
-              <a:t>this refers </a:t>
-            </a:r>
-            <a:r>
-              <a:rPr lang="en-US" baseline="0" dirty="0" smtClean="0"/>
-              <a:t>to the fact that we found that a feature may do a good job classifying the images, but when combined with the other features may actually be detrimental to the performance of the system</a:t>
+              <a:t> this refers to the fact that we found that a feature may do a good job classifying the images, but when combined with the other features may actually be detrimental to the performance of the system</a:t>
             </a:r>
           </a:p>
           <a:p>
@@ -7526,15 +8548,7 @@
           <a:p>
             <a:r>
               <a:rPr lang="en-US" baseline="0" dirty="0" smtClean="0"/>
-              <a:t>(filter </a:t>
-            </a:r>
-            <a:r>
-              <a:rPr lang="en-US" baseline="0" dirty="0" smtClean="0"/>
-              <a:t>applied to a grayscale version of the foregrounded </a:t>
-            </a:r>
-            <a:r>
-              <a:rPr lang="en-US" baseline="0" dirty="0" smtClean="0"/>
-              <a:t>image)</a:t>
+              <a:t>(filter applied to a grayscale version of the foregrounded image)</a:t>
             </a:r>
             <a:endParaRPr lang="en-US" dirty="0" smtClean="0"/>
           </a:p>
@@ -7560,11 +8574,7 @@
           <a:p>
             <a:r>
               <a:rPr lang="en-US" baseline="0" dirty="0" smtClean="0"/>
-              <a:t>Value returned for the strawberry image = 952773 / 12306 = </a:t>
-            </a:r>
-            <a:r>
-              <a:rPr lang="en-US" baseline="0" dirty="0" smtClean="0"/>
-              <a:t>77.4235</a:t>
+              <a:t>Value returned for the strawberry image = 952773 / 12306 = 77.4235</a:t>
             </a:r>
           </a:p>
           <a:p>
@@ -7695,11 +8705,7 @@
             </a:pPr>
             <a:r>
               <a:rPr lang="en-US" baseline="0" dirty="0" smtClean="0"/>
-              <a:t>Goal of the variation analysis: </a:t>
-            </a:r>
-            <a:r>
-              <a:rPr lang="en-US" baseline="0" dirty="0" smtClean="0"/>
-              <a:t>high interclass variation (high standard deviations of means) and low </a:t>
+              <a:t>Goal of the variation analysis: high interclass variation (high standard deviations of means) and low </a:t>
             </a:r>
             <a:r>
               <a:rPr lang="en-US" baseline="0" dirty="0" err="1" smtClean="0"/>
@@ -7717,11 +8723,7 @@
             </a:pPr>
             <a:r>
               <a:rPr lang="en-US" baseline="0" dirty="0" smtClean="0"/>
-              <a:t>Previously </a:t>
-            </a:r>
-            <a:r>
-              <a:rPr lang="en-US" baseline="0" dirty="0" smtClean="0"/>
-              <a:t>explained method is more efficient and was thus chosen because Laws did not provide any advantage</a:t>
+              <a:t>Previously explained method is more efficient and was thus chosen because Laws did not provide any advantage</a:t>
             </a:r>
           </a:p>
           <a:p>
@@ -13588,6 +14590,1377 @@
           </a:p>
         </p:txBody>
       </p:sp>
+      <p:graphicFrame>
+        <p:nvGraphicFramePr>
+          <p:cNvPr id="4" name="Table 3"/>
+          <p:cNvGraphicFramePr>
+            <a:graphicFrameLocks noGrp="1"/>
+          </p:cNvGraphicFramePr>
+          <p:nvPr>
+            <p:extLst>
+              <p:ext uri="{D42A27DB-BD31-4B8C-83A1-F6EECF244321}">
+                <p14:modId xmlns:p14="http://schemas.microsoft.com/office/powerpoint/2010/main" val="2068856893"/>
+              </p:ext>
+            </p:extLst>
+          </p:nvPr>
+        </p:nvGraphicFramePr>
+        <p:xfrm>
+          <a:off x="2667000" y="609600"/>
+          <a:ext cx="5715000" cy="5632470"/>
+        </p:xfrm>
+        <a:graphic>
+          <a:graphicData uri="http://schemas.openxmlformats.org/drawingml/2006/table">
+            <a:tbl>
+              <a:tblPr firstRow="1" bandRow="1">
+                <a:tableStyleId>{5C22544A-7EE6-4342-B048-85BDC9FD1C3A}</a:tableStyleId>
+              </a:tblPr>
+              <a:tblGrid>
+                <a:gridCol w="1428750"/>
+                <a:gridCol w="1428750"/>
+                <a:gridCol w="1428750"/>
+                <a:gridCol w="1428750"/>
+              </a:tblGrid>
+              <a:tr h="342203">
+                <a:tc>
+                  <a:txBody>
+                    <a:bodyPr/>
+                    <a:lstStyle/>
+                    <a:p>
+                      <a:r>
+                        <a:rPr lang="en-US" dirty="0" smtClean="0"/>
+                        <a:t>Class</a:t>
+                      </a:r>
+                      <a:endParaRPr lang="en-US" dirty="0"/>
+                    </a:p>
+                  </a:txBody>
+                  <a:tcPr/>
+                </a:tc>
+                <a:tc>
+                  <a:txBody>
+                    <a:bodyPr/>
+                    <a:lstStyle/>
+                    <a:p>
+                      <a:r>
+                        <a:rPr lang="en-US" dirty="0" smtClean="0"/>
+                        <a:t>Accepted</a:t>
+                      </a:r>
+                      <a:endParaRPr lang="en-US" dirty="0"/>
+                    </a:p>
+                  </a:txBody>
+                  <a:tcPr/>
+                </a:tc>
+                <a:tc>
+                  <a:txBody>
+                    <a:bodyPr/>
+                    <a:lstStyle/>
+                    <a:p>
+                      <a:r>
+                        <a:rPr lang="en-US" dirty="0" smtClean="0"/>
+                        <a:t>Rejected</a:t>
+                      </a:r>
+                      <a:endParaRPr lang="en-US" dirty="0"/>
+                    </a:p>
+                  </a:txBody>
+                  <a:tcPr/>
+                </a:tc>
+                <a:tc>
+                  <a:txBody>
+                    <a:bodyPr/>
+                    <a:lstStyle/>
+                    <a:p>
+                      <a:r>
+                        <a:rPr lang="en-US" dirty="0" smtClean="0"/>
+                        <a:t>Average</a:t>
+                      </a:r>
+                      <a:endParaRPr lang="en-US" dirty="0"/>
+                    </a:p>
+                  </a:txBody>
+                  <a:tcPr/>
+                </a:tc>
+              </a:tr>
+              <a:tr h="351114">
+                <a:tc>
+                  <a:txBody>
+                    <a:bodyPr/>
+                    <a:lstStyle/>
+                    <a:p>
+                      <a:pPr algn="l" fontAlgn="b"/>
+                      <a:r>
+                        <a:rPr lang="en-US" sz="2000" b="0" i="0" u="none" strike="noStrike">
+                          <a:solidFill>
+                            <a:srgbClr val="000000"/>
+                          </a:solidFill>
+                          <a:effectLst/>
+                          <a:latin typeface="Calibri"/>
+                        </a:rPr>
+                        <a:t> apple </a:t>
+                      </a:r>
+                    </a:p>
+                  </a:txBody>
+                  <a:tcPr marL="9525" marR="9525" marT="9525" marB="0" anchor="b"/>
+                </a:tc>
+                <a:tc>
+                  <a:txBody>
+                    <a:bodyPr/>
+                    <a:lstStyle/>
+                    <a:p>
+                      <a:pPr algn="r" fontAlgn="b"/>
+                      <a:r>
+                        <a:rPr lang="en-US" sz="2000" b="0" i="0" u="none" strike="noStrike" dirty="0">
+                          <a:solidFill>
+                            <a:srgbClr val="000000"/>
+                          </a:solidFill>
+                          <a:effectLst/>
+                          <a:latin typeface="Calibri"/>
+                        </a:rPr>
+                        <a:t>40.91</a:t>
+                      </a:r>
+                    </a:p>
+                  </a:txBody>
+                  <a:tcPr marL="9525" marR="9525" marT="9525" marB="0" anchor="b"/>
+                </a:tc>
+                <a:tc>
+                  <a:txBody>
+                    <a:bodyPr/>
+                    <a:lstStyle/>
+                    <a:p>
+                      <a:pPr algn="r" fontAlgn="b"/>
+                      <a:r>
+                        <a:rPr lang="en-US" sz="2000" b="0" i="0" u="none" strike="noStrike">
+                          <a:solidFill>
+                            <a:srgbClr val="000000"/>
+                          </a:solidFill>
+                          <a:effectLst/>
+                          <a:latin typeface="Calibri"/>
+                        </a:rPr>
+                        <a:t>83.68</a:t>
+                      </a:r>
+                    </a:p>
+                  </a:txBody>
+                  <a:tcPr marL="9525" marR="9525" marT="9525" marB="0" anchor="b"/>
+                </a:tc>
+                <a:tc>
+                  <a:txBody>
+                    <a:bodyPr/>
+                    <a:lstStyle/>
+                    <a:p>
+                      <a:pPr algn="r" fontAlgn="b"/>
+                      <a:r>
+                        <a:rPr lang="en-US" sz="2000" b="0" i="0" u="none" strike="noStrike">
+                          <a:solidFill>
+                            <a:srgbClr val="000000"/>
+                          </a:solidFill>
+                          <a:effectLst/>
+                          <a:latin typeface="Calibri"/>
+                        </a:rPr>
+                        <a:t>62.30</a:t>
+                      </a:r>
+                    </a:p>
+                  </a:txBody>
+                  <a:tcPr marL="9525" marR="9525" marT="9525" marB="0" anchor="b"/>
+                </a:tc>
+              </a:tr>
+              <a:tr h="351114">
+                <a:tc>
+                  <a:txBody>
+                    <a:bodyPr/>
+                    <a:lstStyle/>
+                    <a:p>
+                      <a:pPr algn="l" fontAlgn="b"/>
+                      <a:r>
+                        <a:rPr lang="en-US" sz="2000" b="0" i="0" u="none" strike="noStrike">
+                          <a:solidFill>
+                            <a:srgbClr val="000000"/>
+                          </a:solidFill>
+                          <a:effectLst/>
+                          <a:latin typeface="Calibri"/>
+                        </a:rPr>
+                        <a:t> banana </a:t>
+                      </a:r>
+                    </a:p>
+                  </a:txBody>
+                  <a:tcPr marL="9525" marR="9525" marT="9525" marB="0" anchor="b"/>
+                </a:tc>
+                <a:tc>
+                  <a:txBody>
+                    <a:bodyPr/>
+                    <a:lstStyle/>
+                    <a:p>
+                      <a:pPr algn="r" fontAlgn="b"/>
+                      <a:r>
+                        <a:rPr lang="en-US" sz="2000" b="0" i="0" u="none" strike="noStrike" dirty="0">
+                          <a:solidFill>
+                            <a:srgbClr val="000000"/>
+                          </a:solidFill>
+                          <a:effectLst/>
+                          <a:latin typeface="Calibri"/>
+                        </a:rPr>
+                        <a:t>30.77</a:t>
+                      </a:r>
+                    </a:p>
+                  </a:txBody>
+                  <a:tcPr marL="9525" marR="9525" marT="9525" marB="0" anchor="b"/>
+                </a:tc>
+                <a:tc>
+                  <a:txBody>
+                    <a:bodyPr/>
+                    <a:lstStyle/>
+                    <a:p>
+                      <a:pPr algn="r" fontAlgn="b"/>
+                      <a:r>
+                        <a:rPr lang="en-US" sz="2000" b="0" i="0" u="none" strike="noStrike">
+                          <a:solidFill>
+                            <a:srgbClr val="000000"/>
+                          </a:solidFill>
+                          <a:effectLst/>
+                          <a:latin typeface="Calibri"/>
+                        </a:rPr>
+                        <a:t>87.66</a:t>
+                      </a:r>
+                    </a:p>
+                  </a:txBody>
+                  <a:tcPr marL="9525" marR="9525" marT="9525" marB="0" anchor="b"/>
+                </a:tc>
+                <a:tc>
+                  <a:txBody>
+                    <a:bodyPr/>
+                    <a:lstStyle/>
+                    <a:p>
+                      <a:pPr algn="r" fontAlgn="b"/>
+                      <a:r>
+                        <a:rPr lang="en-US" sz="2000" b="0" i="0" u="none" strike="noStrike">
+                          <a:solidFill>
+                            <a:srgbClr val="000000"/>
+                          </a:solidFill>
+                          <a:effectLst/>
+                          <a:latin typeface="Calibri"/>
+                        </a:rPr>
+                        <a:t>59.21</a:t>
+                      </a:r>
+                    </a:p>
+                  </a:txBody>
+                  <a:tcPr marL="9525" marR="9525" marT="9525" marB="0" anchor="b"/>
+                </a:tc>
+              </a:tr>
+              <a:tr h="351114">
+                <a:tc>
+                  <a:txBody>
+                    <a:bodyPr/>
+                    <a:lstStyle/>
+                    <a:p>
+                      <a:pPr algn="l" fontAlgn="b"/>
+                      <a:r>
+                        <a:rPr lang="en-US" sz="2000" b="0" i="0" u="none" strike="noStrike">
+                          <a:solidFill>
+                            <a:srgbClr val="000000"/>
+                          </a:solidFill>
+                          <a:effectLst/>
+                          <a:latin typeface="Calibri"/>
+                        </a:rPr>
+                        <a:t> burger </a:t>
+                      </a:r>
+                    </a:p>
+                  </a:txBody>
+                  <a:tcPr marL="9525" marR="9525" marT="9525" marB="0" anchor="b"/>
+                </a:tc>
+                <a:tc>
+                  <a:txBody>
+                    <a:bodyPr/>
+                    <a:lstStyle/>
+                    <a:p>
+                      <a:pPr algn="r" fontAlgn="b"/>
+                      <a:r>
+                        <a:rPr lang="en-US" sz="2000" b="0" i="0" u="none" strike="noStrike" dirty="0">
+                          <a:solidFill>
+                            <a:srgbClr val="000000"/>
+                          </a:solidFill>
+                          <a:effectLst/>
+                          <a:latin typeface="Calibri"/>
+                        </a:rPr>
+                        <a:t>36.36</a:t>
+                      </a:r>
+                    </a:p>
+                  </a:txBody>
+                  <a:tcPr marL="9525" marR="9525" marT="9525" marB="0" anchor="b"/>
+                </a:tc>
+                <a:tc>
+                  <a:txBody>
+                    <a:bodyPr/>
+                    <a:lstStyle/>
+                    <a:p>
+                      <a:pPr algn="r" fontAlgn="b"/>
+                      <a:r>
+                        <a:rPr lang="en-US" sz="2000" b="0" i="0" u="none" strike="noStrike">
+                          <a:solidFill>
+                            <a:srgbClr val="000000"/>
+                          </a:solidFill>
+                          <a:effectLst/>
+                          <a:latin typeface="Calibri"/>
+                        </a:rPr>
+                        <a:t>83.26</a:t>
+                      </a:r>
+                    </a:p>
+                  </a:txBody>
+                  <a:tcPr marL="9525" marR="9525" marT="9525" marB="0" anchor="b"/>
+                </a:tc>
+                <a:tc>
+                  <a:txBody>
+                    <a:bodyPr/>
+                    <a:lstStyle/>
+                    <a:p>
+                      <a:pPr algn="r" fontAlgn="b"/>
+                      <a:r>
+                        <a:rPr lang="en-US" sz="2000" b="0" i="0" u="none" strike="noStrike">
+                          <a:solidFill>
+                            <a:srgbClr val="000000"/>
+                          </a:solidFill>
+                          <a:effectLst/>
+                          <a:latin typeface="Calibri"/>
+                        </a:rPr>
+                        <a:t>59.81</a:t>
+                      </a:r>
+                    </a:p>
+                  </a:txBody>
+                  <a:tcPr marL="9525" marR="9525" marT="9525" marB="0" anchor="b"/>
+                </a:tc>
+              </a:tr>
+              <a:tr h="351114">
+                <a:tc>
+                  <a:txBody>
+                    <a:bodyPr/>
+                    <a:lstStyle/>
+                    <a:p>
+                      <a:pPr algn="l" fontAlgn="b"/>
+                      <a:r>
+                        <a:rPr lang="en-US" sz="2000" b="0" i="0" u="none" strike="noStrike">
+                          <a:solidFill>
+                            <a:srgbClr val="000000"/>
+                          </a:solidFill>
+                          <a:effectLst/>
+                          <a:latin typeface="Calibri"/>
+                        </a:rPr>
+                        <a:t> frenchfry </a:t>
+                      </a:r>
+                    </a:p>
+                  </a:txBody>
+                  <a:tcPr marL="9525" marR="9525" marT="9525" marB="0" anchor="b"/>
+                </a:tc>
+                <a:tc>
+                  <a:txBody>
+                    <a:bodyPr/>
+                    <a:lstStyle/>
+                    <a:p>
+                      <a:pPr algn="r" fontAlgn="b"/>
+                      <a:r>
+                        <a:rPr lang="en-US" sz="2000" b="0" i="0" u="none" strike="noStrike">
+                          <a:solidFill>
+                            <a:srgbClr val="000000"/>
+                          </a:solidFill>
+                          <a:effectLst/>
+                          <a:latin typeface="Calibri"/>
+                        </a:rPr>
+                        <a:t>33.33</a:t>
+                      </a:r>
+                    </a:p>
+                  </a:txBody>
+                  <a:tcPr marL="9525" marR="9525" marT="9525" marB="0" anchor="b"/>
+                </a:tc>
+                <a:tc>
+                  <a:txBody>
+                    <a:bodyPr/>
+                    <a:lstStyle/>
+                    <a:p>
+                      <a:pPr algn="r" fontAlgn="b"/>
+                      <a:r>
+                        <a:rPr lang="en-US" sz="2000" b="0" i="0" u="none" strike="noStrike">
+                          <a:solidFill>
+                            <a:srgbClr val="000000"/>
+                          </a:solidFill>
+                          <a:effectLst/>
+                          <a:latin typeface="Calibri"/>
+                        </a:rPr>
+                        <a:t>83.54</a:t>
+                      </a:r>
+                    </a:p>
+                  </a:txBody>
+                  <a:tcPr marL="9525" marR="9525" marT="9525" marB="0" anchor="b"/>
+                </a:tc>
+                <a:tc>
+                  <a:txBody>
+                    <a:bodyPr/>
+                    <a:lstStyle/>
+                    <a:p>
+                      <a:pPr algn="r" fontAlgn="b"/>
+                      <a:r>
+                        <a:rPr lang="en-US" sz="2000" b="0" i="0" u="none" strike="noStrike">
+                          <a:solidFill>
+                            <a:srgbClr val="000000"/>
+                          </a:solidFill>
+                          <a:effectLst/>
+                          <a:latin typeface="Calibri"/>
+                        </a:rPr>
+                        <a:t>58.44</a:t>
+                      </a:r>
+                    </a:p>
+                  </a:txBody>
+                  <a:tcPr marL="9525" marR="9525" marT="9525" marB="0" anchor="b"/>
+                </a:tc>
+              </a:tr>
+              <a:tr h="351114">
+                <a:tc>
+                  <a:txBody>
+                    <a:bodyPr/>
+                    <a:lstStyle/>
+                    <a:p>
+                      <a:pPr algn="l" fontAlgn="b"/>
+                      <a:r>
+                        <a:rPr lang="en-US" sz="2000" b="0" i="0" u="none" strike="noStrike">
+                          <a:solidFill>
+                            <a:srgbClr val="000000"/>
+                          </a:solidFill>
+                          <a:effectLst/>
+                          <a:latin typeface="Calibri"/>
+                        </a:rPr>
+                        <a:t> pizza </a:t>
+                      </a:r>
+                    </a:p>
+                  </a:txBody>
+                  <a:tcPr marL="9525" marR="9525" marT="9525" marB="0" anchor="b"/>
+                </a:tc>
+                <a:tc>
+                  <a:txBody>
+                    <a:bodyPr/>
+                    <a:lstStyle/>
+                    <a:p>
+                      <a:pPr algn="r" fontAlgn="b"/>
+                      <a:r>
+                        <a:rPr lang="en-US" sz="2000" b="0" i="0" u="none" strike="noStrike">
+                          <a:solidFill>
+                            <a:srgbClr val="000000"/>
+                          </a:solidFill>
+                          <a:effectLst/>
+                          <a:latin typeface="Calibri"/>
+                        </a:rPr>
+                        <a:t>60.87</a:t>
+                      </a:r>
+                    </a:p>
+                  </a:txBody>
+                  <a:tcPr marL="9525" marR="9525" marT="9525" marB="0" anchor="b"/>
+                </a:tc>
+                <a:tc>
+                  <a:txBody>
+                    <a:bodyPr/>
+                    <a:lstStyle/>
+                    <a:p>
+                      <a:pPr algn="r" fontAlgn="b"/>
+                      <a:r>
+                        <a:rPr lang="en-US" sz="2000" b="0" i="0" u="none" strike="noStrike">
+                          <a:solidFill>
+                            <a:srgbClr val="000000"/>
+                          </a:solidFill>
+                          <a:effectLst/>
+                          <a:latin typeface="Calibri"/>
+                        </a:rPr>
+                        <a:t>81.93</a:t>
+                      </a:r>
+                    </a:p>
+                  </a:txBody>
+                  <a:tcPr marL="9525" marR="9525" marT="9525" marB="0" anchor="b"/>
+                </a:tc>
+                <a:tc>
+                  <a:txBody>
+                    <a:bodyPr/>
+                    <a:lstStyle/>
+                    <a:p>
+                      <a:pPr algn="r" fontAlgn="b"/>
+                      <a:r>
+                        <a:rPr lang="en-US" sz="2000" b="0" i="0" u="none" strike="noStrike">
+                          <a:solidFill>
+                            <a:srgbClr val="000000"/>
+                          </a:solidFill>
+                          <a:effectLst/>
+                          <a:latin typeface="Calibri"/>
+                        </a:rPr>
+                        <a:t>71.40</a:t>
+                      </a:r>
+                    </a:p>
+                  </a:txBody>
+                  <a:tcPr marL="9525" marR="9525" marT="9525" marB="0" anchor="b"/>
+                </a:tc>
+              </a:tr>
+              <a:tr h="351114">
+                <a:tc>
+                  <a:txBody>
+                    <a:bodyPr/>
+                    <a:lstStyle/>
+                    <a:p>
+                      <a:pPr algn="l" fontAlgn="b"/>
+                      <a:r>
+                        <a:rPr lang="en-US" sz="2000" b="0" i="0" u="none" strike="noStrike">
+                          <a:solidFill>
+                            <a:srgbClr val="000000"/>
+                          </a:solidFill>
+                          <a:effectLst/>
+                          <a:latin typeface="Calibri"/>
+                        </a:rPr>
+                        <a:t> pasta </a:t>
+                      </a:r>
+                    </a:p>
+                  </a:txBody>
+                  <a:tcPr marL="9525" marR="9525" marT="9525" marB="0" anchor="b"/>
+                </a:tc>
+                <a:tc>
+                  <a:txBody>
+                    <a:bodyPr/>
+                    <a:lstStyle/>
+                    <a:p>
+                      <a:pPr algn="r" fontAlgn="b"/>
+                      <a:r>
+                        <a:rPr lang="en-US" sz="2000" b="0" i="0" u="none" strike="noStrike" dirty="0" smtClean="0">
+                          <a:solidFill>
+                            <a:srgbClr val="000000"/>
+                          </a:solidFill>
+                          <a:effectLst/>
+                          <a:latin typeface="Calibri"/>
+                        </a:rPr>
+                        <a:t>-</a:t>
+                      </a:r>
+                      <a:endParaRPr lang="en-US" sz="2000" b="0" i="0" u="none" strike="noStrike" dirty="0">
+                        <a:solidFill>
+                          <a:srgbClr val="000000"/>
+                        </a:solidFill>
+                        <a:effectLst/>
+                        <a:latin typeface="Calibri"/>
+                      </a:endParaRPr>
+                    </a:p>
+                  </a:txBody>
+                  <a:tcPr marL="9525" marR="9525" marT="9525" marB="0" anchor="b"/>
+                </a:tc>
+                <a:tc>
+                  <a:txBody>
+                    <a:bodyPr/>
+                    <a:lstStyle/>
+                    <a:p>
+                      <a:pPr algn="r" fontAlgn="b"/>
+                      <a:r>
+                        <a:rPr lang="en-US" sz="2000" b="0" i="0" u="none" strike="noStrike" dirty="0" smtClean="0">
+                          <a:solidFill>
+                            <a:srgbClr val="000000"/>
+                          </a:solidFill>
+                          <a:effectLst/>
+                          <a:latin typeface="Calibri"/>
+                        </a:rPr>
+                        <a:t>-</a:t>
+                      </a:r>
+                      <a:endParaRPr lang="en-US" sz="2000" b="0" i="0" u="none" strike="noStrike" dirty="0">
+                        <a:solidFill>
+                          <a:srgbClr val="000000"/>
+                        </a:solidFill>
+                        <a:effectLst/>
+                        <a:latin typeface="Calibri"/>
+                      </a:endParaRPr>
+                    </a:p>
+                  </a:txBody>
+                  <a:tcPr marL="9525" marR="9525" marT="9525" marB="0" anchor="b"/>
+                </a:tc>
+                <a:tc>
+                  <a:txBody>
+                    <a:bodyPr/>
+                    <a:lstStyle/>
+                    <a:p>
+                      <a:pPr algn="r" fontAlgn="b"/>
+                      <a:r>
+                        <a:rPr lang="en-US" sz="2000" b="0" i="0" u="none" strike="noStrike" dirty="0" smtClean="0">
+                          <a:solidFill>
+                            <a:srgbClr val="000000"/>
+                          </a:solidFill>
+                          <a:effectLst/>
+                          <a:latin typeface="Calibri"/>
+                        </a:rPr>
+                        <a:t>-</a:t>
+                      </a:r>
+                      <a:endParaRPr lang="en-US" sz="2000" b="0" i="0" u="none" strike="noStrike" dirty="0">
+                        <a:solidFill>
+                          <a:srgbClr val="000000"/>
+                        </a:solidFill>
+                        <a:effectLst/>
+                        <a:latin typeface="Calibri"/>
+                      </a:endParaRPr>
+                    </a:p>
+                  </a:txBody>
+                  <a:tcPr marL="9525" marR="9525" marT="9525" marB="0" anchor="b"/>
+                </a:tc>
+              </a:tr>
+              <a:tr h="351114">
+                <a:tc>
+                  <a:txBody>
+                    <a:bodyPr/>
+                    <a:lstStyle/>
+                    <a:p>
+                      <a:pPr algn="l" fontAlgn="b"/>
+                      <a:r>
+                        <a:rPr lang="en-US" sz="2000" b="0" i="0" u="none" strike="noStrike">
+                          <a:solidFill>
+                            <a:srgbClr val="000000"/>
+                          </a:solidFill>
+                          <a:effectLst/>
+                          <a:latin typeface="Calibri"/>
+                        </a:rPr>
+                        <a:t> hotdog </a:t>
+                      </a:r>
+                    </a:p>
+                  </a:txBody>
+                  <a:tcPr marL="9525" marR="9525" marT="9525" marB="0" anchor="b"/>
+                </a:tc>
+                <a:tc>
+                  <a:txBody>
+                    <a:bodyPr/>
+                    <a:lstStyle/>
+                    <a:p>
+                      <a:pPr algn="r" fontAlgn="b"/>
+                      <a:r>
+                        <a:rPr lang="en-US" sz="2000" b="0" i="0" u="none" strike="noStrike">
+                          <a:solidFill>
+                            <a:srgbClr val="000000"/>
+                          </a:solidFill>
+                          <a:effectLst/>
+                          <a:latin typeface="Calibri"/>
+                        </a:rPr>
+                        <a:t>31.25</a:t>
+                      </a:r>
+                    </a:p>
+                  </a:txBody>
+                  <a:tcPr marL="9525" marR="9525" marT="9525" marB="0" anchor="b"/>
+                </a:tc>
+                <a:tc>
+                  <a:txBody>
+                    <a:bodyPr/>
+                    <a:lstStyle/>
+                    <a:p>
+                      <a:pPr algn="r" fontAlgn="b"/>
+                      <a:r>
+                        <a:rPr lang="en-US" sz="2000" b="0" i="0" u="none" strike="noStrike">
+                          <a:solidFill>
+                            <a:srgbClr val="000000"/>
+                          </a:solidFill>
+                          <a:effectLst/>
+                          <a:latin typeface="Calibri"/>
+                        </a:rPr>
+                        <a:t>86.12</a:t>
+                      </a:r>
+                    </a:p>
+                  </a:txBody>
+                  <a:tcPr marL="9525" marR="9525" marT="9525" marB="0" anchor="b"/>
+                </a:tc>
+                <a:tc>
+                  <a:txBody>
+                    <a:bodyPr/>
+                    <a:lstStyle/>
+                    <a:p>
+                      <a:pPr algn="r" fontAlgn="b"/>
+                      <a:r>
+                        <a:rPr lang="en-US" sz="2000" b="0" i="0" u="none" strike="noStrike">
+                          <a:solidFill>
+                            <a:srgbClr val="000000"/>
+                          </a:solidFill>
+                          <a:effectLst/>
+                          <a:latin typeface="Calibri"/>
+                        </a:rPr>
+                        <a:t>58.69</a:t>
+                      </a:r>
+                    </a:p>
+                  </a:txBody>
+                  <a:tcPr marL="9525" marR="9525" marT="9525" marB="0" anchor="b"/>
+                </a:tc>
+              </a:tr>
+              <a:tr h="351114">
+                <a:tc>
+                  <a:txBody>
+                    <a:bodyPr/>
+                    <a:lstStyle/>
+                    <a:p>
+                      <a:pPr algn="l" fontAlgn="b"/>
+                      <a:r>
+                        <a:rPr lang="en-US" sz="2000" b="0" i="0" u="none" strike="noStrike">
+                          <a:solidFill>
+                            <a:srgbClr val="000000"/>
+                          </a:solidFill>
+                          <a:effectLst/>
+                          <a:latin typeface="Calibri"/>
+                        </a:rPr>
+                        <a:t> strawberry </a:t>
+                      </a:r>
+                    </a:p>
+                  </a:txBody>
+                  <a:tcPr marL="9525" marR="9525" marT="9525" marB="0" anchor="b"/>
+                </a:tc>
+                <a:tc>
+                  <a:txBody>
+                    <a:bodyPr/>
+                    <a:lstStyle/>
+                    <a:p>
+                      <a:pPr algn="r" fontAlgn="b"/>
+                      <a:r>
+                        <a:rPr lang="en-US" sz="2000" b="0" i="0" u="none" strike="noStrike" dirty="0">
+                          <a:solidFill>
+                            <a:srgbClr val="000000"/>
+                          </a:solidFill>
+                          <a:effectLst/>
+                          <a:latin typeface="Calibri"/>
+                        </a:rPr>
+                        <a:t>60.00</a:t>
+                      </a:r>
+                    </a:p>
+                  </a:txBody>
+                  <a:tcPr marL="9525" marR="9525" marT="9525" marB="0" anchor="b"/>
+                </a:tc>
+                <a:tc>
+                  <a:txBody>
+                    <a:bodyPr/>
+                    <a:lstStyle/>
+                    <a:p>
+                      <a:pPr algn="r" fontAlgn="b"/>
+                      <a:r>
+                        <a:rPr lang="en-US" sz="2000" b="0" i="0" u="none" strike="noStrike">
+                          <a:solidFill>
+                            <a:srgbClr val="000000"/>
+                          </a:solidFill>
+                          <a:effectLst/>
+                          <a:latin typeface="Calibri"/>
+                        </a:rPr>
+                        <a:t>88.38</a:t>
+                      </a:r>
+                    </a:p>
+                  </a:txBody>
+                  <a:tcPr marL="9525" marR="9525" marT="9525" marB="0" anchor="b"/>
+                </a:tc>
+                <a:tc>
+                  <a:txBody>
+                    <a:bodyPr/>
+                    <a:lstStyle/>
+                    <a:p>
+                      <a:pPr algn="r" fontAlgn="b"/>
+                      <a:r>
+                        <a:rPr lang="en-US" sz="2000" b="0" i="0" u="none" strike="noStrike">
+                          <a:solidFill>
+                            <a:srgbClr val="000000"/>
+                          </a:solidFill>
+                          <a:effectLst/>
+                          <a:latin typeface="Calibri"/>
+                        </a:rPr>
+                        <a:t>74.19</a:t>
+                      </a:r>
+                    </a:p>
+                  </a:txBody>
+                  <a:tcPr marL="9525" marR="9525" marT="9525" marB="0" anchor="b"/>
+                </a:tc>
+              </a:tr>
+              <a:tr h="351114">
+                <a:tc>
+                  <a:txBody>
+                    <a:bodyPr/>
+                    <a:lstStyle/>
+                    <a:p>
+                      <a:pPr algn="l" fontAlgn="b"/>
+                      <a:r>
+                        <a:rPr lang="en-US" sz="2000" b="0" i="0" u="none" strike="noStrike">
+                          <a:solidFill>
+                            <a:srgbClr val="000000"/>
+                          </a:solidFill>
+                          <a:effectLst/>
+                          <a:latin typeface="Calibri"/>
+                        </a:rPr>
+                        <a:t> tomato </a:t>
+                      </a:r>
+                    </a:p>
+                  </a:txBody>
+                  <a:tcPr marL="9525" marR="9525" marT="9525" marB="0" anchor="b"/>
+                </a:tc>
+                <a:tc>
+                  <a:txBody>
+                    <a:bodyPr/>
+                    <a:lstStyle/>
+                    <a:p>
+                      <a:pPr algn="r" fontAlgn="b"/>
+                      <a:r>
+                        <a:rPr lang="en-US" sz="2000" b="0" i="0" u="none" strike="noStrike" dirty="0">
+                          <a:solidFill>
+                            <a:srgbClr val="000000"/>
+                          </a:solidFill>
+                          <a:effectLst/>
+                          <a:latin typeface="Calibri"/>
+                        </a:rPr>
+                        <a:t>41.67</a:t>
+                      </a:r>
+                    </a:p>
+                  </a:txBody>
+                  <a:tcPr marL="9525" marR="9525" marT="9525" marB="0" anchor="b"/>
+                </a:tc>
+                <a:tc>
+                  <a:txBody>
+                    <a:bodyPr/>
+                    <a:lstStyle/>
+                    <a:p>
+                      <a:pPr algn="r" fontAlgn="b"/>
+                      <a:r>
+                        <a:rPr lang="en-US" sz="2000" b="0" i="0" u="none" strike="noStrike">
+                          <a:solidFill>
+                            <a:srgbClr val="000000"/>
+                          </a:solidFill>
+                          <a:effectLst/>
+                          <a:latin typeface="Calibri"/>
+                        </a:rPr>
+                        <a:t>85.94</a:t>
+                      </a:r>
+                    </a:p>
+                  </a:txBody>
+                  <a:tcPr marL="9525" marR="9525" marT="9525" marB="0" anchor="b"/>
+                </a:tc>
+                <a:tc>
+                  <a:txBody>
+                    <a:bodyPr/>
+                    <a:lstStyle/>
+                    <a:p>
+                      <a:pPr algn="r" fontAlgn="b"/>
+                      <a:r>
+                        <a:rPr lang="en-US" sz="2000" b="0" i="0" u="none" strike="noStrike">
+                          <a:solidFill>
+                            <a:srgbClr val="000000"/>
+                          </a:solidFill>
+                          <a:effectLst/>
+                          <a:latin typeface="Calibri"/>
+                        </a:rPr>
+                        <a:t>63.81</a:t>
+                      </a:r>
+                    </a:p>
+                  </a:txBody>
+                  <a:tcPr marL="9525" marR="9525" marT="9525" marB="0" anchor="b"/>
+                </a:tc>
+              </a:tr>
+              <a:tr h="351114">
+                <a:tc>
+                  <a:txBody>
+                    <a:bodyPr/>
+                    <a:lstStyle/>
+                    <a:p>
+                      <a:pPr algn="l" fontAlgn="b"/>
+                      <a:r>
+                        <a:rPr lang="en-US" sz="2000" b="0" i="0" u="none" strike="noStrike">
+                          <a:solidFill>
+                            <a:srgbClr val="000000"/>
+                          </a:solidFill>
+                          <a:effectLst/>
+                          <a:latin typeface="Calibri"/>
+                        </a:rPr>
+                        <a:t> egg </a:t>
+                      </a:r>
+                    </a:p>
+                  </a:txBody>
+                  <a:tcPr marL="9525" marR="9525" marT="9525" marB="0" anchor="b"/>
+                </a:tc>
+                <a:tc>
+                  <a:txBody>
+                    <a:bodyPr/>
+                    <a:lstStyle/>
+                    <a:p>
+                      <a:pPr algn="r" fontAlgn="b"/>
+                      <a:r>
+                        <a:rPr lang="en-US" sz="2000" b="0" i="0" u="none" strike="noStrike" dirty="0">
+                          <a:solidFill>
+                            <a:srgbClr val="000000"/>
+                          </a:solidFill>
+                          <a:effectLst/>
+                          <a:latin typeface="Calibri"/>
+                        </a:rPr>
+                        <a:t>41.67</a:t>
+                      </a:r>
+                    </a:p>
+                  </a:txBody>
+                  <a:tcPr marL="9525" marR="9525" marT="9525" marB="0" anchor="b"/>
+                </a:tc>
+                <a:tc>
+                  <a:txBody>
+                    <a:bodyPr/>
+                    <a:lstStyle/>
+                    <a:p>
+                      <a:pPr algn="r" fontAlgn="b"/>
+                      <a:r>
+                        <a:rPr lang="en-US" sz="2000" b="0" i="0" u="none" strike="noStrike">
+                          <a:solidFill>
+                            <a:srgbClr val="000000"/>
+                          </a:solidFill>
+                          <a:effectLst/>
+                          <a:latin typeface="Calibri"/>
+                        </a:rPr>
+                        <a:t>84.34</a:t>
+                      </a:r>
+                    </a:p>
+                  </a:txBody>
+                  <a:tcPr marL="9525" marR="9525" marT="9525" marB="0" anchor="b"/>
+                </a:tc>
+                <a:tc>
+                  <a:txBody>
+                    <a:bodyPr/>
+                    <a:lstStyle/>
+                    <a:p>
+                      <a:pPr algn="r" fontAlgn="b"/>
+                      <a:r>
+                        <a:rPr lang="en-US" sz="2000" b="0" i="0" u="none" strike="noStrike">
+                          <a:solidFill>
+                            <a:srgbClr val="000000"/>
+                          </a:solidFill>
+                          <a:effectLst/>
+                          <a:latin typeface="Calibri"/>
+                        </a:rPr>
+                        <a:t>63.00</a:t>
+                      </a:r>
+                    </a:p>
+                  </a:txBody>
+                  <a:tcPr marL="9525" marR="9525" marT="9525" marB="0" anchor="b"/>
+                </a:tc>
+              </a:tr>
+              <a:tr h="351114">
+                <a:tc>
+                  <a:txBody>
+                    <a:bodyPr/>
+                    <a:lstStyle/>
+                    <a:p>
+                      <a:pPr algn="l" fontAlgn="b"/>
+                      <a:r>
+                        <a:rPr lang="en-US" sz="2000" b="0" i="0" u="none" strike="noStrike">
+                          <a:solidFill>
+                            <a:srgbClr val="000000"/>
+                          </a:solidFill>
+                          <a:effectLst/>
+                          <a:latin typeface="Calibri"/>
+                        </a:rPr>
+                        <a:t> salad </a:t>
+                      </a:r>
+                    </a:p>
+                  </a:txBody>
+                  <a:tcPr marL="9525" marR="9525" marT="9525" marB="0" anchor="b"/>
+                </a:tc>
+                <a:tc>
+                  <a:txBody>
+                    <a:bodyPr/>
+                    <a:lstStyle/>
+                    <a:p>
+                      <a:pPr algn="r" fontAlgn="b"/>
+                      <a:r>
+                        <a:rPr lang="en-US" sz="2000" b="0" i="0" u="none" strike="noStrike">
+                          <a:solidFill>
+                            <a:srgbClr val="000000"/>
+                          </a:solidFill>
+                          <a:effectLst/>
+                          <a:latin typeface="Calibri"/>
+                        </a:rPr>
+                        <a:t>36.36</a:t>
+                      </a:r>
+                    </a:p>
+                  </a:txBody>
+                  <a:tcPr marL="9525" marR="9525" marT="9525" marB="0" anchor="b"/>
+                </a:tc>
+                <a:tc>
+                  <a:txBody>
+                    <a:bodyPr/>
+                    <a:lstStyle/>
+                    <a:p>
+                      <a:pPr algn="r" fontAlgn="b"/>
+                      <a:r>
+                        <a:rPr lang="en-US" sz="2000" b="0" i="0" u="none" strike="noStrike">
+                          <a:solidFill>
+                            <a:srgbClr val="000000"/>
+                          </a:solidFill>
+                          <a:effectLst/>
+                          <a:latin typeface="Calibri"/>
+                        </a:rPr>
+                        <a:t>73.22</a:t>
+                      </a:r>
+                    </a:p>
+                  </a:txBody>
+                  <a:tcPr marL="9525" marR="9525" marT="9525" marB="0" anchor="b"/>
+                </a:tc>
+                <a:tc>
+                  <a:txBody>
+                    <a:bodyPr/>
+                    <a:lstStyle/>
+                    <a:p>
+                      <a:pPr algn="r" fontAlgn="b"/>
+                      <a:r>
+                        <a:rPr lang="en-US" sz="2000" b="0" i="0" u="none" strike="noStrike">
+                          <a:solidFill>
+                            <a:srgbClr val="000000"/>
+                          </a:solidFill>
+                          <a:effectLst/>
+                          <a:latin typeface="Calibri"/>
+                        </a:rPr>
+                        <a:t>54.79</a:t>
+                      </a:r>
+                    </a:p>
+                  </a:txBody>
+                  <a:tcPr marL="9525" marR="9525" marT="9525" marB="0" anchor="b"/>
+                </a:tc>
+              </a:tr>
+              <a:tr h="351114">
+                <a:tc>
+                  <a:txBody>
+                    <a:bodyPr/>
+                    <a:lstStyle/>
+                    <a:p>
+                      <a:pPr algn="l" fontAlgn="b"/>
+                      <a:r>
+                        <a:rPr lang="en-US" sz="2000" b="0" i="0" u="none" strike="noStrike">
+                          <a:solidFill>
+                            <a:srgbClr val="000000"/>
+                          </a:solidFill>
+                          <a:effectLst/>
+                          <a:latin typeface="Calibri"/>
+                        </a:rPr>
+                        <a:t> cookie </a:t>
+                      </a:r>
+                    </a:p>
+                  </a:txBody>
+                  <a:tcPr marL="9525" marR="9525" marT="9525" marB="0" anchor="b"/>
+                </a:tc>
+                <a:tc>
+                  <a:txBody>
+                    <a:bodyPr/>
+                    <a:lstStyle/>
+                    <a:p>
+                      <a:pPr algn="r" fontAlgn="b"/>
+                      <a:r>
+                        <a:rPr lang="en-US" sz="2000" b="0" i="0" u="none" strike="noStrike" dirty="0" smtClean="0">
+                          <a:solidFill>
+                            <a:srgbClr val="000000"/>
+                          </a:solidFill>
+                          <a:effectLst/>
+                          <a:latin typeface="Calibri"/>
+                        </a:rPr>
+                        <a:t>-</a:t>
+                      </a:r>
+                      <a:endParaRPr lang="en-US" sz="2000" b="0" i="0" u="none" strike="noStrike" dirty="0">
+                        <a:solidFill>
+                          <a:srgbClr val="000000"/>
+                        </a:solidFill>
+                        <a:effectLst/>
+                        <a:latin typeface="Calibri"/>
+                      </a:endParaRPr>
+                    </a:p>
+                  </a:txBody>
+                  <a:tcPr marL="9525" marR="9525" marT="9525" marB="0" anchor="b"/>
+                </a:tc>
+                <a:tc>
+                  <a:txBody>
+                    <a:bodyPr/>
+                    <a:lstStyle/>
+                    <a:p>
+                      <a:pPr algn="r" fontAlgn="b"/>
+                      <a:r>
+                        <a:rPr lang="en-US" sz="2000" b="0" i="0" u="none" strike="noStrike" dirty="0" smtClean="0">
+                          <a:solidFill>
+                            <a:srgbClr val="000000"/>
+                          </a:solidFill>
+                          <a:effectLst/>
+                          <a:latin typeface="Calibri"/>
+                        </a:rPr>
+                        <a:t>-</a:t>
+                      </a:r>
+                      <a:endParaRPr lang="en-US" sz="2000" b="0" i="0" u="none" strike="noStrike" dirty="0">
+                        <a:solidFill>
+                          <a:srgbClr val="000000"/>
+                        </a:solidFill>
+                        <a:effectLst/>
+                        <a:latin typeface="Calibri"/>
+                      </a:endParaRPr>
+                    </a:p>
+                  </a:txBody>
+                  <a:tcPr marL="9525" marR="9525" marT="9525" marB="0" anchor="b"/>
+                </a:tc>
+                <a:tc>
+                  <a:txBody>
+                    <a:bodyPr/>
+                    <a:lstStyle/>
+                    <a:p>
+                      <a:pPr algn="r" fontAlgn="b"/>
+                      <a:r>
+                        <a:rPr lang="en-US" sz="2000" b="0" i="0" u="none" strike="noStrike" dirty="0" smtClean="0">
+                          <a:solidFill>
+                            <a:srgbClr val="000000"/>
+                          </a:solidFill>
+                          <a:effectLst/>
+                          <a:latin typeface="Calibri"/>
+                        </a:rPr>
+                        <a:t>-</a:t>
+                      </a:r>
+                      <a:endParaRPr lang="en-US" sz="2000" b="0" i="0" u="none" strike="noStrike" dirty="0">
+                        <a:solidFill>
+                          <a:srgbClr val="000000"/>
+                        </a:solidFill>
+                        <a:effectLst/>
+                        <a:latin typeface="Calibri"/>
+                      </a:endParaRPr>
+                    </a:p>
+                  </a:txBody>
+                  <a:tcPr marL="9525" marR="9525" marT="9525" marB="0" anchor="b"/>
+                </a:tc>
+              </a:tr>
+              <a:tr h="351114">
+                <a:tc>
+                  <a:txBody>
+                    <a:bodyPr/>
+                    <a:lstStyle/>
+                    <a:p>
+                      <a:pPr algn="l" fontAlgn="b"/>
+                      <a:r>
+                        <a:rPr lang="en-US" sz="2000" b="0" i="0" u="none" strike="noStrike">
+                          <a:solidFill>
+                            <a:srgbClr val="000000"/>
+                          </a:solidFill>
+                          <a:effectLst/>
+                          <a:latin typeface="Calibri"/>
+                        </a:rPr>
+                        <a:t> rice </a:t>
+                      </a:r>
+                    </a:p>
+                  </a:txBody>
+                  <a:tcPr marL="9525" marR="9525" marT="9525" marB="0" anchor="b"/>
+                </a:tc>
+                <a:tc>
+                  <a:txBody>
+                    <a:bodyPr/>
+                    <a:lstStyle/>
+                    <a:p>
+                      <a:pPr algn="r" fontAlgn="b"/>
+                      <a:r>
+                        <a:rPr lang="en-US" sz="2000" b="0" i="0" u="none" strike="noStrike" dirty="0">
+                          <a:solidFill>
+                            <a:srgbClr val="000000"/>
+                          </a:solidFill>
+                          <a:effectLst/>
+                          <a:latin typeface="Calibri"/>
+                        </a:rPr>
+                        <a:t>45.45</a:t>
+                      </a:r>
+                    </a:p>
+                  </a:txBody>
+                  <a:tcPr marL="9525" marR="9525" marT="9525" marB="0" anchor="b"/>
+                </a:tc>
+                <a:tc>
+                  <a:txBody>
+                    <a:bodyPr/>
+                    <a:lstStyle/>
+                    <a:p>
+                      <a:pPr algn="r" fontAlgn="b"/>
+                      <a:r>
+                        <a:rPr lang="en-US" sz="2000" b="0" i="0" u="none" strike="noStrike">
+                          <a:solidFill>
+                            <a:srgbClr val="000000"/>
+                          </a:solidFill>
+                          <a:effectLst/>
+                          <a:latin typeface="Calibri"/>
+                        </a:rPr>
+                        <a:t>85.36</a:t>
+                      </a:r>
+                    </a:p>
+                  </a:txBody>
+                  <a:tcPr marL="9525" marR="9525" marT="9525" marB="0" anchor="b"/>
+                </a:tc>
+                <a:tc>
+                  <a:txBody>
+                    <a:bodyPr/>
+                    <a:lstStyle/>
+                    <a:p>
+                      <a:pPr algn="r" fontAlgn="b"/>
+                      <a:r>
+                        <a:rPr lang="en-US" sz="2000" b="0" i="0" u="none" strike="noStrike">
+                          <a:solidFill>
+                            <a:srgbClr val="000000"/>
+                          </a:solidFill>
+                          <a:effectLst/>
+                          <a:latin typeface="Calibri"/>
+                        </a:rPr>
+                        <a:t>65.41</a:t>
+                      </a:r>
+                    </a:p>
+                  </a:txBody>
+                  <a:tcPr marL="9525" marR="9525" marT="9525" marB="0" anchor="b"/>
+                </a:tc>
+              </a:tr>
+              <a:tr h="351114">
+                <a:tc>
+                  <a:txBody>
+                    <a:bodyPr/>
+                    <a:lstStyle/>
+                    <a:p>
+                      <a:pPr algn="l" fontAlgn="b"/>
+                      <a:r>
+                        <a:rPr lang="en-US" sz="2000" b="0" i="0" u="none" strike="noStrike" dirty="0">
+                          <a:solidFill>
+                            <a:srgbClr val="000000"/>
+                          </a:solidFill>
+                          <a:effectLst/>
+                          <a:latin typeface="Calibri"/>
+                        </a:rPr>
+                        <a:t> broccoli </a:t>
+                      </a:r>
+                    </a:p>
+                  </a:txBody>
+                  <a:tcPr marL="9525" marR="9525" marT="9525" marB="0" anchor="b"/>
+                </a:tc>
+                <a:tc>
+                  <a:txBody>
+                    <a:bodyPr/>
+                    <a:lstStyle/>
+                    <a:p>
+                      <a:pPr algn="r" fontAlgn="b"/>
+                      <a:r>
+                        <a:rPr lang="en-US" sz="2000" b="0" i="0" u="none" strike="noStrike" dirty="0">
+                          <a:solidFill>
+                            <a:srgbClr val="000000"/>
+                          </a:solidFill>
+                          <a:effectLst/>
+                          <a:latin typeface="Calibri"/>
+                        </a:rPr>
+                        <a:t>69.23</a:t>
+                      </a:r>
+                    </a:p>
+                  </a:txBody>
+                  <a:tcPr marL="9525" marR="9525" marT="9525" marB="0" anchor="b"/>
+                </a:tc>
+                <a:tc>
+                  <a:txBody>
+                    <a:bodyPr/>
+                    <a:lstStyle/>
+                    <a:p>
+                      <a:pPr algn="r" fontAlgn="b"/>
+                      <a:r>
+                        <a:rPr lang="en-US" sz="2000" b="0" i="0" u="none" strike="noStrike">
+                          <a:solidFill>
+                            <a:srgbClr val="000000"/>
+                          </a:solidFill>
+                          <a:effectLst/>
+                          <a:latin typeface="Calibri"/>
+                        </a:rPr>
+                        <a:t>86.81</a:t>
+                      </a:r>
+                    </a:p>
+                  </a:txBody>
+                  <a:tcPr marL="9525" marR="9525" marT="9525" marB="0" anchor="b"/>
+                </a:tc>
+                <a:tc>
+                  <a:txBody>
+                    <a:bodyPr/>
+                    <a:lstStyle/>
+                    <a:p>
+                      <a:pPr algn="r" fontAlgn="b"/>
+                      <a:r>
+                        <a:rPr lang="en-US" sz="2000" b="0" i="0" u="none" strike="noStrike" dirty="0">
+                          <a:solidFill>
+                            <a:srgbClr val="000000"/>
+                          </a:solidFill>
+                          <a:effectLst/>
+                          <a:latin typeface="Calibri"/>
+                        </a:rPr>
+                        <a:t>78.02</a:t>
+                      </a:r>
+                    </a:p>
+                  </a:txBody>
+                  <a:tcPr marL="9525" marR="9525" marT="9525" marB="0" anchor="b"/>
+                </a:tc>
+              </a:tr>
+              <a:tr h="351114">
+                <a:tc>
+                  <a:txBody>
+                    <a:bodyPr/>
+                    <a:lstStyle/>
+                    <a:p>
+                      <a:pPr algn="l" fontAlgn="b"/>
+                      <a:r>
+                        <a:rPr lang="en-US" sz="2000" b="1" i="0" u="none" strike="noStrike" dirty="0" smtClean="0">
+                          <a:solidFill>
+                            <a:srgbClr val="000000"/>
+                          </a:solidFill>
+                          <a:effectLst/>
+                          <a:latin typeface="Calibri"/>
+                        </a:rPr>
+                        <a:t>Total</a:t>
+                      </a:r>
+                      <a:endParaRPr lang="en-US" sz="2000" b="1" i="0" u="none" strike="noStrike" dirty="0">
+                        <a:solidFill>
+                          <a:srgbClr val="000000"/>
+                        </a:solidFill>
+                        <a:effectLst/>
+                        <a:latin typeface="Calibri"/>
+                      </a:endParaRPr>
+                    </a:p>
+                  </a:txBody>
+                  <a:tcPr marL="9525" marR="9525" marT="9525" marB="0" anchor="b"/>
+                </a:tc>
+                <a:tc>
+                  <a:txBody>
+                    <a:bodyPr/>
+                    <a:lstStyle/>
+                    <a:p>
+                      <a:pPr algn="r" fontAlgn="b"/>
+                      <a:r>
+                        <a:rPr lang="en-US" sz="2000" b="1" i="0" u="none" strike="noStrike" dirty="0">
+                          <a:solidFill>
+                            <a:srgbClr val="000000"/>
+                          </a:solidFill>
+                          <a:effectLst/>
+                          <a:latin typeface="Calibri"/>
+                        </a:rPr>
+                        <a:t>43.99</a:t>
+                      </a:r>
+                    </a:p>
+                  </a:txBody>
+                  <a:tcPr marL="9525" marR="9525" marT="9525" marB="0" anchor="b"/>
+                </a:tc>
+                <a:tc>
+                  <a:txBody>
+                    <a:bodyPr/>
+                    <a:lstStyle/>
+                    <a:p>
+                      <a:pPr algn="r" fontAlgn="b"/>
+                      <a:r>
+                        <a:rPr lang="en-US" sz="2000" b="1" i="0" u="none" strike="noStrike" dirty="0">
+                          <a:solidFill>
+                            <a:srgbClr val="000000"/>
+                          </a:solidFill>
+                          <a:effectLst/>
+                          <a:latin typeface="Calibri"/>
+                        </a:rPr>
+                        <a:t>84.19</a:t>
+                      </a:r>
+                    </a:p>
+                  </a:txBody>
+                  <a:tcPr marL="9525" marR="9525" marT="9525" marB="0" anchor="b"/>
+                </a:tc>
+                <a:tc>
+                  <a:txBody>
+                    <a:bodyPr/>
+                    <a:lstStyle/>
+                    <a:p>
+                      <a:pPr algn="r" fontAlgn="b"/>
+                      <a:r>
+                        <a:rPr lang="en-US" sz="2000" b="1" i="0" u="none" strike="noStrike" dirty="0">
+                          <a:solidFill>
+                            <a:srgbClr val="000000"/>
+                          </a:solidFill>
+                          <a:effectLst/>
+                          <a:latin typeface="Calibri"/>
+                        </a:rPr>
+                        <a:t>64.09</a:t>
+                      </a:r>
+                    </a:p>
+                  </a:txBody>
+                  <a:tcPr marL="9525" marR="9525" marT="9525" marB="0" anchor="b"/>
+                </a:tc>
+              </a:tr>
+            </a:tbl>
+          </a:graphicData>
+        </a:graphic>
+      </p:graphicFrame>
     </p:spTree>
     <p:extLst>
       <p:ext uri="{BB962C8B-B14F-4D97-AF65-F5344CB8AC3E}">
@@ -13687,14 +16060,7 @@
                 <a:latin typeface="Arial" panose="020B0604020202020204" pitchFamily="34" charset="0"/>
                 <a:cs typeface="Arial" panose="020B0604020202020204" pitchFamily="34" charset="0"/>
               </a:rPr>
-              <a:t>Addition of a reject </a:t>
-            </a:r>
-            <a:r>
-              <a:rPr lang="en-US" dirty="0" smtClean="0">
-                <a:latin typeface="Arial" panose="020B0604020202020204" pitchFamily="34" charset="0"/>
-                <a:cs typeface="Arial" panose="020B0604020202020204" pitchFamily="34" charset="0"/>
-              </a:rPr>
-              <a:t>class for images determined to not belong to any of the recognized classes</a:t>
+              <a:t>Addition of a reject class for images determined to not belong to any of the recognized classes</a:t>
             </a:r>
             <a:endParaRPr lang="en-US" dirty="0">
               <a:latin typeface="Arial" panose="020B0604020202020204" pitchFamily="34" charset="0"/>
@@ -16021,21 +18387,7 @@
                 <a:latin typeface="Arial" panose="020B0604020202020204" pitchFamily="34" charset="0"/>
                 <a:cs typeface="Arial" panose="020B0604020202020204" pitchFamily="34" charset="0"/>
               </a:rPr>
-              <a:t>Intensity per pixel in the food image region used as summarizing </a:t>
-            </a:r>
-            <a:r>
-              <a:rPr lang="en-US" dirty="0" smtClean="0">
-                <a:latin typeface="Arial" panose="020B0604020202020204" pitchFamily="34" charset="0"/>
-                <a:cs typeface="Arial" panose="020B0604020202020204" pitchFamily="34" charset="0"/>
-              </a:rPr>
-              <a:t>statistic </a:t>
-            </a:r>
-            <a:r>
-              <a:rPr lang="en-US" dirty="0" smtClean="0">
-                <a:latin typeface="Arial" panose="020B0604020202020204" pitchFamily="34" charset="0"/>
-                <a:cs typeface="Arial" panose="020B0604020202020204" pitchFamily="34" charset="0"/>
-              </a:rPr>
-              <a:t>for each map</a:t>
+              <a:t>Intensity per pixel in the food image region used as summarizing statistic for each map</a:t>
             </a:r>
           </a:p>
           <a:p>

</xml_diff>